<commit_message>
corrections to powerpoints spotted during dry run
</commit_message>
<xml_diff>
--- a/instructors/02-Being_FAIR.pptx
+++ b/instructors/02-Being_FAIR.pptx
@@ -294,9 +294,9 @@
             <a:fld id="{DE72BEAC-A25F-4480-8AFC-1D3E290F2CC8}" type="datetimeFigureOut">
               <a:rPr lang="en-GB" smtClean="0"/>
               <a:pPr/>
-              <a:t>21/07/2022</a:t>
+              <a:t>22/07/2022</a:t>
             </a:fld>
-            <a:endParaRPr lang="en-GB"/>
+            <a:endParaRPr lang="en-GB" dirty="0"/>
           </a:p>
         </p:txBody>
       </p:sp>
@@ -329,7 +329,7 @@
             </a:lvl1pPr>
           </a:lstStyle>
           <a:p>
-            <a:endParaRPr lang="en-GB"/>
+            <a:endParaRPr lang="en-GB" dirty="0"/>
           </a:p>
         </p:txBody>
       </p:sp>
@@ -367,7 +367,7 @@
               <a:pPr/>
               <a:t>‹#›</a:t>
             </a:fld>
-            <a:endParaRPr lang="en-GB"/>
+            <a:endParaRPr lang="en-GB" dirty="0"/>
           </a:p>
         </p:txBody>
       </p:sp>
@@ -558,9 +558,9 @@
           <a:p>
             <a:fld id="{DE72BEAC-A25F-4480-8AFC-1D3E290F2CC8}" type="datetimeFigureOut">
               <a:rPr lang="en-GB" smtClean="0"/>
-              <a:t>21/07/2022</a:t>
+              <a:t>22/07/2022</a:t>
             </a:fld>
-            <a:endParaRPr lang="en-GB"/>
+            <a:endParaRPr lang="en-GB" dirty="0"/>
           </a:p>
         </p:txBody>
       </p:sp>
@@ -585,7 +585,7 @@
           <a:bodyPr/>
           <a:lstStyle/>
           <a:p>
-            <a:endParaRPr lang="en-GB"/>
+            <a:endParaRPr lang="en-GB" dirty="0"/>
           </a:p>
         </p:txBody>
       </p:sp>
@@ -614,7 +614,7 @@
               <a:rPr lang="en-GB" smtClean="0"/>
               <a:t>‹#›</a:t>
             </a:fld>
-            <a:endParaRPr lang="en-GB"/>
+            <a:endParaRPr lang="en-GB" dirty="0"/>
           </a:p>
         </p:txBody>
       </p:sp>
@@ -768,9 +768,9 @@
           <a:p>
             <a:fld id="{DE72BEAC-A25F-4480-8AFC-1D3E290F2CC8}" type="datetimeFigureOut">
               <a:rPr lang="en-GB" smtClean="0"/>
-              <a:t>21/07/2022</a:t>
+              <a:t>22/07/2022</a:t>
             </a:fld>
-            <a:endParaRPr lang="en-GB"/>
+            <a:endParaRPr lang="en-GB" dirty="0"/>
           </a:p>
         </p:txBody>
       </p:sp>
@@ -795,7 +795,7 @@
           <a:bodyPr/>
           <a:lstStyle/>
           <a:p>
-            <a:endParaRPr lang="en-GB"/>
+            <a:endParaRPr lang="en-GB" dirty="0"/>
           </a:p>
         </p:txBody>
       </p:sp>
@@ -824,7 +824,7 @@
               <a:rPr lang="en-GB" smtClean="0"/>
               <a:t>‹#›</a:t>
             </a:fld>
-            <a:endParaRPr lang="en-GB"/>
+            <a:endParaRPr lang="en-GB" dirty="0"/>
           </a:p>
         </p:txBody>
       </p:sp>
@@ -968,9 +968,9 @@
           <a:p>
             <a:fld id="{DE72BEAC-A25F-4480-8AFC-1D3E290F2CC8}" type="datetimeFigureOut">
               <a:rPr lang="en-GB" smtClean="0"/>
-              <a:t>21/07/2022</a:t>
+              <a:t>22/07/2022</a:t>
             </a:fld>
-            <a:endParaRPr lang="en-GB"/>
+            <a:endParaRPr lang="en-GB" dirty="0"/>
           </a:p>
         </p:txBody>
       </p:sp>
@@ -995,7 +995,7 @@
           <a:bodyPr/>
           <a:lstStyle/>
           <a:p>
-            <a:endParaRPr lang="en-GB"/>
+            <a:endParaRPr lang="en-GB" dirty="0"/>
           </a:p>
         </p:txBody>
       </p:sp>
@@ -1024,7 +1024,7 @@
               <a:rPr lang="en-GB" smtClean="0"/>
               <a:t>‹#›</a:t>
             </a:fld>
-            <a:endParaRPr lang="en-GB"/>
+            <a:endParaRPr lang="en-GB" dirty="0"/>
           </a:p>
         </p:txBody>
       </p:sp>
@@ -1244,9 +1244,9 @@
           <a:p>
             <a:fld id="{DE72BEAC-A25F-4480-8AFC-1D3E290F2CC8}" type="datetimeFigureOut">
               <a:rPr lang="en-GB" smtClean="0"/>
-              <a:t>21/07/2022</a:t>
+              <a:t>22/07/2022</a:t>
             </a:fld>
-            <a:endParaRPr lang="en-GB"/>
+            <a:endParaRPr lang="en-GB" dirty="0"/>
           </a:p>
         </p:txBody>
       </p:sp>
@@ -1271,7 +1271,7 @@
           <a:bodyPr/>
           <a:lstStyle/>
           <a:p>
-            <a:endParaRPr lang="en-GB"/>
+            <a:endParaRPr lang="en-GB" dirty="0"/>
           </a:p>
         </p:txBody>
       </p:sp>
@@ -1300,7 +1300,7 @@
               <a:rPr lang="en-GB" smtClean="0"/>
               <a:t>‹#›</a:t>
             </a:fld>
-            <a:endParaRPr lang="en-GB"/>
+            <a:endParaRPr lang="en-GB" dirty="0"/>
           </a:p>
         </p:txBody>
       </p:sp>
@@ -1512,9 +1512,9 @@
           <a:p>
             <a:fld id="{DE72BEAC-A25F-4480-8AFC-1D3E290F2CC8}" type="datetimeFigureOut">
               <a:rPr lang="en-GB" smtClean="0"/>
-              <a:t>21/07/2022</a:t>
+              <a:t>22/07/2022</a:t>
             </a:fld>
-            <a:endParaRPr lang="en-GB"/>
+            <a:endParaRPr lang="en-GB" dirty="0"/>
           </a:p>
         </p:txBody>
       </p:sp>
@@ -1539,7 +1539,7 @@
           <a:bodyPr/>
           <a:lstStyle/>
           <a:p>
-            <a:endParaRPr lang="en-GB"/>
+            <a:endParaRPr lang="en-GB" dirty="0"/>
           </a:p>
         </p:txBody>
       </p:sp>
@@ -1568,7 +1568,7 @@
               <a:rPr lang="en-GB" smtClean="0"/>
               <a:t>‹#›</a:t>
             </a:fld>
-            <a:endParaRPr lang="en-GB"/>
+            <a:endParaRPr lang="en-GB" dirty="0"/>
           </a:p>
         </p:txBody>
       </p:sp>
@@ -1927,9 +1927,9 @@
           <a:p>
             <a:fld id="{DE72BEAC-A25F-4480-8AFC-1D3E290F2CC8}" type="datetimeFigureOut">
               <a:rPr lang="en-GB" smtClean="0"/>
-              <a:t>21/07/2022</a:t>
+              <a:t>22/07/2022</a:t>
             </a:fld>
-            <a:endParaRPr lang="en-GB"/>
+            <a:endParaRPr lang="en-GB" dirty="0"/>
           </a:p>
         </p:txBody>
       </p:sp>
@@ -1954,7 +1954,7 @@
           <a:bodyPr/>
           <a:lstStyle/>
           <a:p>
-            <a:endParaRPr lang="en-GB"/>
+            <a:endParaRPr lang="en-GB" dirty="0"/>
           </a:p>
         </p:txBody>
       </p:sp>
@@ -1983,7 +1983,7 @@
               <a:rPr lang="en-GB" smtClean="0"/>
               <a:t>‹#›</a:t>
             </a:fld>
-            <a:endParaRPr lang="en-GB"/>
+            <a:endParaRPr lang="en-GB" dirty="0"/>
           </a:p>
         </p:txBody>
       </p:sp>
@@ -2069,9 +2069,9 @@
           <a:p>
             <a:fld id="{DE72BEAC-A25F-4480-8AFC-1D3E290F2CC8}" type="datetimeFigureOut">
               <a:rPr lang="en-GB" smtClean="0"/>
-              <a:t>21/07/2022</a:t>
+              <a:t>22/07/2022</a:t>
             </a:fld>
-            <a:endParaRPr lang="en-GB"/>
+            <a:endParaRPr lang="en-GB" dirty="0"/>
           </a:p>
         </p:txBody>
       </p:sp>
@@ -2096,7 +2096,7 @@
           <a:bodyPr/>
           <a:lstStyle/>
           <a:p>
-            <a:endParaRPr lang="en-GB"/>
+            <a:endParaRPr lang="en-GB" dirty="0"/>
           </a:p>
         </p:txBody>
       </p:sp>
@@ -2125,7 +2125,7 @@
               <a:rPr lang="en-GB" smtClean="0"/>
               <a:t>‹#›</a:t>
             </a:fld>
-            <a:endParaRPr lang="en-GB"/>
+            <a:endParaRPr lang="en-GB" dirty="0"/>
           </a:p>
         </p:txBody>
       </p:sp>
@@ -2182,9 +2182,9 @@
           <a:p>
             <a:fld id="{DE72BEAC-A25F-4480-8AFC-1D3E290F2CC8}" type="datetimeFigureOut">
               <a:rPr lang="en-GB" smtClean="0"/>
-              <a:t>21/07/2022</a:t>
+              <a:t>22/07/2022</a:t>
             </a:fld>
-            <a:endParaRPr lang="en-GB"/>
+            <a:endParaRPr lang="en-GB" dirty="0"/>
           </a:p>
         </p:txBody>
       </p:sp>
@@ -2209,7 +2209,7 @@
           <a:bodyPr/>
           <a:lstStyle/>
           <a:p>
-            <a:endParaRPr lang="en-GB"/>
+            <a:endParaRPr lang="en-GB" dirty="0"/>
           </a:p>
         </p:txBody>
       </p:sp>
@@ -2238,7 +2238,7 @@
               <a:rPr lang="en-GB" smtClean="0"/>
               <a:t>‹#›</a:t>
             </a:fld>
-            <a:endParaRPr lang="en-GB"/>
+            <a:endParaRPr lang="en-GB" dirty="0"/>
           </a:p>
         </p:txBody>
       </p:sp>
@@ -2495,9 +2495,9 @@
           <a:p>
             <a:fld id="{DE72BEAC-A25F-4480-8AFC-1D3E290F2CC8}" type="datetimeFigureOut">
               <a:rPr lang="en-GB" smtClean="0"/>
-              <a:t>21/07/2022</a:t>
+              <a:t>22/07/2022</a:t>
             </a:fld>
-            <a:endParaRPr lang="en-GB"/>
+            <a:endParaRPr lang="en-GB" dirty="0"/>
           </a:p>
         </p:txBody>
       </p:sp>
@@ -2522,7 +2522,7 @@
           <a:bodyPr/>
           <a:lstStyle/>
           <a:p>
-            <a:endParaRPr lang="en-GB"/>
+            <a:endParaRPr lang="en-GB" dirty="0"/>
           </a:p>
         </p:txBody>
       </p:sp>
@@ -2551,7 +2551,7 @@
               <a:rPr lang="en-GB" smtClean="0"/>
               <a:t>‹#›</a:t>
             </a:fld>
-            <a:endParaRPr lang="en-GB"/>
+            <a:endParaRPr lang="en-GB" dirty="0"/>
           </a:p>
         </p:txBody>
       </p:sp>
@@ -2686,7 +2686,7 @@
             </a:lvl9pPr>
           </a:lstStyle>
           <a:p>
-            <a:endParaRPr lang="en-GB"/>
+            <a:endParaRPr lang="en-GB" dirty="0"/>
           </a:p>
         </p:txBody>
       </p:sp>
@@ -2784,9 +2784,9 @@
           <a:p>
             <a:fld id="{DE72BEAC-A25F-4480-8AFC-1D3E290F2CC8}" type="datetimeFigureOut">
               <a:rPr lang="en-GB" smtClean="0"/>
-              <a:t>21/07/2022</a:t>
+              <a:t>22/07/2022</a:t>
             </a:fld>
-            <a:endParaRPr lang="en-GB"/>
+            <a:endParaRPr lang="en-GB" dirty="0"/>
           </a:p>
         </p:txBody>
       </p:sp>
@@ -2811,7 +2811,7 @@
           <a:bodyPr/>
           <a:lstStyle/>
           <a:p>
-            <a:endParaRPr lang="en-GB"/>
+            <a:endParaRPr lang="en-GB" dirty="0"/>
           </a:p>
         </p:txBody>
       </p:sp>
@@ -2840,7 +2840,7 @@
               <a:rPr lang="en-GB" smtClean="0"/>
               <a:t>‹#›</a:t>
             </a:fld>
-            <a:endParaRPr lang="en-GB"/>
+            <a:endParaRPr lang="en-GB" dirty="0"/>
           </a:p>
         </p:txBody>
       </p:sp>
@@ -3026,9 +3026,9 @@
             <a:fld id="{DE72BEAC-A25F-4480-8AFC-1D3E290F2CC8}" type="datetimeFigureOut">
               <a:rPr lang="en-GB" smtClean="0"/>
               <a:pPr/>
-              <a:t>21/07/2022</a:t>
+              <a:t>22/07/2022</a:t>
             </a:fld>
-            <a:endParaRPr lang="en-GB"/>
+            <a:endParaRPr lang="en-GB" dirty="0"/>
           </a:p>
         </p:txBody>
       </p:sp>
@@ -3069,7 +3069,7 @@
             </a:lvl1pPr>
           </a:lstStyle>
           <a:p>
-            <a:endParaRPr lang="en-GB"/>
+            <a:endParaRPr lang="en-GB" dirty="0"/>
           </a:p>
         </p:txBody>
       </p:sp>
@@ -3115,7 +3115,7 @@
               <a:pPr/>
               <a:t>‹#›</a:t>
             </a:fld>
-            <a:endParaRPr lang="en-GB"/>
+            <a:endParaRPr lang="en-GB" dirty="0"/>
           </a:p>
         </p:txBody>
       </p:sp>
@@ -3714,7 +3714,7 @@
                 <a:hlinkClick r:id="rId2">
                   <a:extLst>
                     <a:ext uri="{A12FA001-AC4F-418D-AE19-62706E023703}">
-                      <ahyp:hlinkClr xmlns:ahyp="http://schemas.microsoft.com/office/drawing/2018/hyperlinkcolor" xmlns="" val="tx"/>
+                      <ahyp:hlinkClr xmlns="" xmlns:ahyp="http://schemas.microsoft.com/office/drawing/2018/hyperlinkcolor" val="tx"/>
                     </a:ext>
                   </a:extLst>
                 </a:hlinkClick>
@@ -3737,7 +3737,7 @@
                 <a:hlinkClick r:id="rId3">
                   <a:extLst>
                     <a:ext uri="{A12FA001-AC4F-418D-AE19-62706E023703}">
-                      <ahyp:hlinkClr xmlns:ahyp="http://schemas.microsoft.com/office/drawing/2018/hyperlinkcolor" xmlns="" val="tx"/>
+                      <ahyp:hlinkClr xmlns="" xmlns:ahyp="http://schemas.microsoft.com/office/drawing/2018/hyperlinkcolor" val="tx"/>
                     </a:ext>
                   </a:extLst>
                 </a:hlinkClick>
@@ -3760,7 +3760,7 @@
                 <a:hlinkClick r:id="rId4">
                   <a:extLst>
                     <a:ext uri="{A12FA001-AC4F-418D-AE19-62706E023703}">
-                      <ahyp:hlinkClr xmlns:ahyp="http://schemas.microsoft.com/office/drawing/2018/hyperlinkcolor" xmlns="" val="tx"/>
+                      <ahyp:hlinkClr xmlns="" xmlns:ahyp="http://schemas.microsoft.com/office/drawing/2018/hyperlinkcolor" val="tx"/>
                     </a:ext>
                   </a:extLst>
                 </a:hlinkClick>
@@ -3783,7 +3783,7 @@
                 <a:hlinkClick r:id="rId5">
                   <a:extLst>
                     <a:ext uri="{A12FA001-AC4F-418D-AE19-62706E023703}">
-                      <ahyp:hlinkClr xmlns:ahyp="http://schemas.microsoft.com/office/drawing/2018/hyperlinkcolor" xmlns="" val="tx"/>
+                      <ahyp:hlinkClr xmlns="" xmlns:ahyp="http://schemas.microsoft.com/office/drawing/2018/hyperlinkcolor" val="tx"/>
                     </a:ext>
                   </a:extLst>
                 </a:hlinkClick>
@@ -3825,7 +3825,7 @@
                 <a:hlinkClick r:id="rId6">
                   <a:extLst>
                     <a:ext uri="{A12FA001-AC4F-418D-AE19-62706E023703}">
-                      <ahyp:hlinkClr xmlns:ahyp="http://schemas.microsoft.com/office/drawing/2018/hyperlinkcolor" xmlns="" val="tx"/>
+                      <ahyp:hlinkClr xmlns="" xmlns:ahyp="http://schemas.microsoft.com/office/drawing/2018/hyperlinkcolor" val="tx"/>
                     </a:ext>
                   </a:extLst>
                 </a:hlinkClick>
@@ -3848,7 +3848,7 @@
                 <a:hlinkClick r:id="rId7">
                   <a:extLst>
                     <a:ext uri="{A12FA001-AC4F-418D-AE19-62706E023703}">
-                      <ahyp:hlinkClr xmlns:ahyp="http://schemas.microsoft.com/office/drawing/2018/hyperlinkcolor" xmlns="" val="tx"/>
+                      <ahyp:hlinkClr xmlns="" xmlns:ahyp="http://schemas.microsoft.com/office/drawing/2018/hyperlinkcolor" val="tx"/>
                     </a:ext>
                   </a:extLst>
                 </a:hlinkClick>
@@ -3871,7 +3871,7 @@
                 <a:hlinkClick r:id="rId8">
                   <a:extLst>
                     <a:ext uri="{A12FA001-AC4F-418D-AE19-62706E023703}">
-                      <ahyp:hlinkClr xmlns:ahyp="http://schemas.microsoft.com/office/drawing/2018/hyperlinkcolor" xmlns="" val="tx"/>
+                      <ahyp:hlinkClr xmlns="" xmlns:ahyp="http://schemas.microsoft.com/office/drawing/2018/hyperlinkcolor" val="tx"/>
                     </a:ext>
                   </a:extLst>
                 </a:hlinkClick>
@@ -4200,16 +4200,20 @@
           <a:lstStyle/>
           <a:p>
             <a:r>
+              <a:rPr lang="en-GB" dirty="0" smtClean="0"/>
+              <a:t>Use standard or open-source </a:t>
+            </a:r>
+            <a:r>
               <a:rPr lang="en-GB" dirty="0"/>
-              <a:t>Use </a:t>
-            </a:r>
-            <a:r>
-              <a:rPr lang="en-GB" b="1" dirty="0"/>
-              <a:t>common</a:t>
+              <a:t>file </a:t>
+            </a:r>
+            <a:r>
+              <a:rPr lang="en-GB" dirty="0" smtClean="0"/>
+              <a:t>formats where possible </a:t>
             </a:r>
             <a:r>
               <a:rPr lang="en-GB" dirty="0"/>
-              <a:t> file formats (domain specific)</a:t>
+              <a:t>(domain specific)</a:t>
             </a:r>
           </a:p>
           <a:p>
@@ -4222,12 +4226,16 @@
               <a:t>se .csv or .</a:t>
             </a:r>
             <a:r>
-              <a:rPr lang="en-GB" dirty="0" err="1"/>
-              <a:t>xls</a:t>
+              <a:rPr lang="en-GB" dirty="0" smtClean="0"/>
+              <a:t>xlsx</a:t>
+            </a:r>
+            <a:r>
+              <a:rPr lang="en-GB" dirty="0" smtClean="0"/>
+              <a:t> </a:t>
             </a:r>
             <a:r>
               <a:rPr lang="en-GB" dirty="0"/>
-              <a:t> files for numerical data. </a:t>
+              <a:t>files for numerical data. </a:t>
             </a:r>
             <a:r>
               <a:rPr lang="en-GB" b="1" dirty="0"/>
@@ -4250,7 +4258,7 @@
               <a:t>Convert proprietary binary formats to open ones. For example convert </a:t>
             </a:r>
             <a:r>
-              <a:rPr lang="en-GB" dirty="0" err="1"/>
+              <a:rPr lang="en-GB" dirty="0"/>
               <a:t>Snapgene</a:t>
             </a:r>
             <a:r>
@@ -4258,7 +4266,7 @@
               <a:t> to </a:t>
             </a:r>
             <a:r>
-              <a:rPr lang="en-GB" dirty="0" err="1"/>
+              <a:rPr lang="en-GB" dirty="0"/>
               <a:t>Genbank</a:t>
             </a:r>
             <a:r>
@@ -4266,7 +4274,7 @@
               <a:t>/SBOL, microscopy </a:t>
             </a:r>
             <a:r>
-              <a:rPr lang="en-GB" dirty="0" err="1"/>
+              <a:rPr lang="en-GB" dirty="0"/>
               <a:t>multistack</a:t>
             </a:r>
             <a:r>
@@ -4445,7 +4453,7 @@
                 <a14:useLocalDpi xmlns:a14="http://schemas.microsoft.com/office/drawing/2010/main" val="0"/>
               </a:ext>
               <a:ext uri="{96DAC541-7B7A-43D3-8B79-37D633B846F1}">
-                <asvg:svgBlip xmlns:asvg="http://schemas.microsoft.com/office/drawing/2016/SVG/main" xmlns="" r:embed="rId3"/>
+                <asvg:svgBlip xmlns="" xmlns:asvg="http://schemas.microsoft.com/office/drawing/2016/SVG/main" r:embed="rId3"/>
               </a:ext>
             </a:extLst>
           </a:blip>
@@ -4657,7 +4665,7 @@
                 <a14:useLocalDpi xmlns:a14="http://schemas.microsoft.com/office/drawing/2010/main" val="0"/>
               </a:ext>
               <a:ext uri="{96DAC541-7B7A-43D3-8B79-37D633B846F1}">
-                <asvg:svgBlip xmlns:asvg="http://schemas.microsoft.com/office/drawing/2016/SVG/main" xmlns="" r:embed="rId7"/>
+                <asvg:svgBlip xmlns="" xmlns:asvg="http://schemas.microsoft.com/office/drawing/2016/SVG/main" r:embed="rId7"/>
               </a:ext>
             </a:extLst>
           </a:blip>
@@ -5156,7 +5164,7 @@
                 <a16:creationId xmlns:a16="http://schemas.microsoft.com/office/drawing/2014/main" id="{91F32EBA-ED97-466E-8CFA-8382584155D0}"/>
               </a:ext>
               <a:ext uri="{C183D7F6-B498-43B3-948B-1728B52AA6E4}">
-                <adec:decorative xmlns:adec="http://schemas.microsoft.com/office/drawing/2017/decorative" xmlns="" val="1"/>
+                <adec:decorative xmlns="" xmlns:adec="http://schemas.microsoft.com/office/drawing/2017/decorative" val="1"/>
               </a:ext>
             </a:extLst>
           </p:cNvPr>
@@ -5204,7 +5212,7 @@
           <a:lstStyle/>
           <a:p>
             <a:pPr algn="ctr"/>
-            <a:endParaRPr lang="en-US"/>
+            <a:endParaRPr lang="en-US" dirty="0"/>
           </a:p>
         </p:txBody>
       </p:sp>
@@ -5237,7 +5245,7 @@
           <a:lstStyle/>
           <a:p>
             <a:r>
-              <a:rPr lang="en-GB" sz="4000"/>
+              <a:rPr lang="en-GB" sz="4000" dirty="0"/>
               <a:t>FAIR quiz</a:t>
             </a:r>
           </a:p>
@@ -5275,7 +5283,7 @@
               <a:buNone/>
             </a:pPr>
             <a:r>
-              <a:rPr lang="en-GB" sz="2400"/>
+              <a:rPr lang="en-GB" sz="2400" dirty="0"/>
               <a:t>…</a:t>
             </a:r>
           </a:p>
@@ -5289,7 +5297,7 @@
                 <a16:creationId xmlns:a16="http://schemas.microsoft.com/office/drawing/2014/main" id="{62A38935-BB53-4DF7-A56E-48DD25B685D7}"/>
               </a:ext>
               <a:ext uri="{C183D7F6-B498-43B3-948B-1728B52AA6E4}">
-                <adec:decorative xmlns:adec="http://schemas.microsoft.com/office/drawing/2017/decorative" xmlns="" val="1"/>
+                <adec:decorative xmlns="" xmlns:adec="http://schemas.microsoft.com/office/drawing/2017/decorative" val="1"/>
               </a:ext>
             </a:extLst>
           </p:cNvPr>
@@ -6051,7 +6059,7 @@
           <a:lstStyle/>
           <a:p>
             <a:pPr algn="ctr"/>
-            <a:endParaRPr lang="en-US"/>
+            <a:endParaRPr lang="en-US" dirty="0"/>
           </a:p>
         </p:txBody>
       </p:sp>
@@ -6076,7 +6084,7 @@
                 <a14:useLocalDpi xmlns:a14="http://schemas.microsoft.com/office/drawing/2010/main" val="0"/>
               </a:ext>
               <a:ext uri="{96DAC541-7B7A-43D3-8B79-37D633B846F1}">
-                <asvg:svgBlip xmlns:asvg="http://schemas.microsoft.com/office/drawing/2016/SVG/main" xmlns="" r:embed="rId3"/>
+                <asvg:svgBlip xmlns="" xmlns:asvg="http://schemas.microsoft.com/office/drawing/2016/SVG/main" r:embed="rId3"/>
               </a:ext>
             </a:extLst>
           </a:blip>
@@ -6142,7 +6150,7 @@
                 <a16:creationId xmlns:a16="http://schemas.microsoft.com/office/drawing/2014/main" id="{C4E4288A-DFC8-40A2-90E5-70E851A933AD}"/>
               </a:ext>
               <a:ext uri="{C183D7F6-B498-43B3-948B-1728B52AA6E4}">
-                <adec:decorative xmlns:adec="http://schemas.microsoft.com/office/drawing/2017/decorative" xmlns="" val="1"/>
+                <adec:decorative xmlns="" xmlns:adec="http://schemas.microsoft.com/office/drawing/2017/decorative" val="1"/>
               </a:ext>
             </a:extLst>
           </p:cNvPr>
@@ -6237,7 +6245,7 @@
                 <a16:creationId xmlns:a16="http://schemas.microsoft.com/office/drawing/2014/main" id="{A94A2FC9-6D19-473C-B868-99FDB2044AA9}"/>
               </a:ext>
               <a:ext uri="{C183D7F6-B498-43B3-948B-1728B52AA6E4}">
-                <adec:decorative xmlns:adec="http://schemas.microsoft.com/office/drawing/2017/decorative" xmlns="" val="1"/>
+                <adec:decorative xmlns="" xmlns:adec="http://schemas.microsoft.com/office/drawing/2017/decorative" val="1"/>
               </a:ext>
             </a:extLst>
           </p:cNvPr>
@@ -6456,7 +6464,7 @@
                 <a14:useLocalDpi xmlns:a14="http://schemas.microsoft.com/office/drawing/2010/main" val="0"/>
               </a:ext>
               <a:ext uri="{96DAC541-7B7A-43D3-8B79-37D633B846F1}">
-                <asvg:svgBlip xmlns:asvg="http://schemas.microsoft.com/office/drawing/2016/SVG/main" xmlns="" r:embed="rId3"/>
+                <asvg:svgBlip xmlns="" xmlns:asvg="http://schemas.microsoft.com/office/drawing/2016/SVG/main" r:embed="rId3"/>
               </a:ext>
             </a:extLst>
           </a:blip>
@@ -6566,8 +6574,8 @@
               </a:lnSpc>
             </a:pPr>
             <a:r>
-              <a:rPr lang="pl-PL" sz="2400" dirty="0" err="1"/>
-              <a:t>modeles</a:t>
+              <a:rPr lang="pl-PL" sz="2400" smtClean="0"/>
+              <a:t>models</a:t>
             </a:r>
             <a:endParaRPr lang="en-GB" sz="2400" dirty="0"/>
           </a:p>
@@ -6592,7 +6600,7 @@
                 <a16:creationId xmlns:a16="http://schemas.microsoft.com/office/drawing/2014/main" id="{8BED0409-854E-49C4-876E-A78C6D881BC8}"/>
               </a:ext>
               <a:ext uri="{C183D7F6-B498-43B3-948B-1728B52AA6E4}">
-                <adec:decorative xmlns:adec="http://schemas.microsoft.com/office/drawing/2017/decorative" xmlns="" val="1"/>
+                <adec:decorative xmlns="" xmlns:adec="http://schemas.microsoft.com/office/drawing/2017/decorative" val="1"/>
               </a:ext>
             </a:extLst>
           </p:cNvPr>
@@ -7237,7 +7245,7 @@
                 <a16:creationId xmlns:a16="http://schemas.microsoft.com/office/drawing/2014/main" id="{D4340B2E-01FD-4F5D-9C4D-AD3923AD20BA}"/>
               </a:ext>
               <a:ext uri="{C183D7F6-B498-43B3-948B-1728B52AA6E4}">
-                <adec:decorative xmlns:adec="http://schemas.microsoft.com/office/drawing/2017/decorative" xmlns="" val="1"/>
+                <adec:decorative xmlns="" xmlns:adec="http://schemas.microsoft.com/office/drawing/2017/decorative" val="1"/>
               </a:ext>
             </a:extLst>
           </p:cNvPr>
@@ -7456,7 +7464,7 @@
                 <a14:useLocalDpi xmlns:a14="http://schemas.microsoft.com/office/drawing/2010/main" val="0"/>
               </a:ext>
               <a:ext uri="{96DAC541-7B7A-43D3-8B79-37D633B846F1}">
-                <asvg:svgBlip xmlns:asvg="http://schemas.microsoft.com/office/drawing/2016/SVG/main" xmlns="" r:embed="rId5"/>
+                <asvg:svgBlip xmlns="" xmlns:asvg="http://schemas.microsoft.com/office/drawing/2016/SVG/main" r:embed="rId5"/>
               </a:ext>
             </a:extLst>
           </a:blip>
@@ -7495,7 +7503,7 @@
                 <a14:useLocalDpi xmlns:a14="http://schemas.microsoft.com/office/drawing/2010/main" val="0"/>
               </a:ext>
               <a:ext uri="{96DAC541-7B7A-43D3-8B79-37D633B846F1}">
-                <asvg:svgBlip xmlns:asvg="http://schemas.microsoft.com/office/drawing/2016/SVG/main" xmlns="" r:embed="rId7"/>
+                <asvg:svgBlip xmlns="" xmlns:asvg="http://schemas.microsoft.com/office/drawing/2016/SVG/main" r:embed="rId7"/>
               </a:ext>
             </a:extLst>
           </a:blip>

</xml_diff>

<commit_message>
changes from test run
</commit_message>
<xml_diff>
--- a/instructors/02-Being_FAIR.pptx
+++ b/instructors/02-Being_FAIR.pptx
@@ -294,7 +294,7 @@
             <a:fld id="{DE72BEAC-A25F-4480-8AFC-1D3E290F2CC8}" type="datetimeFigureOut">
               <a:rPr lang="en-GB" smtClean="0"/>
               <a:pPr/>
-              <a:t>21/07/2022</a:t>
+              <a:t>22/07/2022</a:t>
             </a:fld>
             <a:endParaRPr lang="en-GB"/>
           </a:p>
@@ -558,7 +558,7 @@
           <a:p>
             <a:fld id="{DE72BEAC-A25F-4480-8AFC-1D3E290F2CC8}" type="datetimeFigureOut">
               <a:rPr lang="en-GB" smtClean="0"/>
-              <a:t>21/07/2022</a:t>
+              <a:t>22/07/2022</a:t>
             </a:fld>
             <a:endParaRPr lang="en-GB"/>
           </a:p>
@@ -768,7 +768,7 @@
           <a:p>
             <a:fld id="{DE72BEAC-A25F-4480-8AFC-1D3E290F2CC8}" type="datetimeFigureOut">
               <a:rPr lang="en-GB" smtClean="0"/>
-              <a:t>21/07/2022</a:t>
+              <a:t>22/07/2022</a:t>
             </a:fld>
             <a:endParaRPr lang="en-GB"/>
           </a:p>
@@ -968,7 +968,7 @@
           <a:p>
             <a:fld id="{DE72BEAC-A25F-4480-8AFC-1D3E290F2CC8}" type="datetimeFigureOut">
               <a:rPr lang="en-GB" smtClean="0"/>
-              <a:t>21/07/2022</a:t>
+              <a:t>22/07/2022</a:t>
             </a:fld>
             <a:endParaRPr lang="en-GB"/>
           </a:p>
@@ -1244,7 +1244,7 @@
           <a:p>
             <a:fld id="{DE72BEAC-A25F-4480-8AFC-1D3E290F2CC8}" type="datetimeFigureOut">
               <a:rPr lang="en-GB" smtClean="0"/>
-              <a:t>21/07/2022</a:t>
+              <a:t>22/07/2022</a:t>
             </a:fld>
             <a:endParaRPr lang="en-GB"/>
           </a:p>
@@ -1512,7 +1512,7 @@
           <a:p>
             <a:fld id="{DE72BEAC-A25F-4480-8AFC-1D3E290F2CC8}" type="datetimeFigureOut">
               <a:rPr lang="en-GB" smtClean="0"/>
-              <a:t>21/07/2022</a:t>
+              <a:t>22/07/2022</a:t>
             </a:fld>
             <a:endParaRPr lang="en-GB"/>
           </a:p>
@@ -1927,7 +1927,7 @@
           <a:p>
             <a:fld id="{DE72BEAC-A25F-4480-8AFC-1D3E290F2CC8}" type="datetimeFigureOut">
               <a:rPr lang="en-GB" smtClean="0"/>
-              <a:t>21/07/2022</a:t>
+              <a:t>22/07/2022</a:t>
             </a:fld>
             <a:endParaRPr lang="en-GB"/>
           </a:p>
@@ -2069,7 +2069,7 @@
           <a:p>
             <a:fld id="{DE72BEAC-A25F-4480-8AFC-1D3E290F2CC8}" type="datetimeFigureOut">
               <a:rPr lang="en-GB" smtClean="0"/>
-              <a:t>21/07/2022</a:t>
+              <a:t>22/07/2022</a:t>
             </a:fld>
             <a:endParaRPr lang="en-GB"/>
           </a:p>
@@ -2182,7 +2182,7 @@
           <a:p>
             <a:fld id="{DE72BEAC-A25F-4480-8AFC-1D3E290F2CC8}" type="datetimeFigureOut">
               <a:rPr lang="en-GB" smtClean="0"/>
-              <a:t>21/07/2022</a:t>
+              <a:t>22/07/2022</a:t>
             </a:fld>
             <a:endParaRPr lang="en-GB"/>
           </a:p>
@@ -2495,7 +2495,7 @@
           <a:p>
             <a:fld id="{DE72BEAC-A25F-4480-8AFC-1D3E290F2CC8}" type="datetimeFigureOut">
               <a:rPr lang="en-GB" smtClean="0"/>
-              <a:t>21/07/2022</a:t>
+              <a:t>22/07/2022</a:t>
             </a:fld>
             <a:endParaRPr lang="en-GB"/>
           </a:p>
@@ -2784,7 +2784,7 @@
           <a:p>
             <a:fld id="{DE72BEAC-A25F-4480-8AFC-1D3E290F2CC8}" type="datetimeFigureOut">
               <a:rPr lang="en-GB" smtClean="0"/>
-              <a:t>21/07/2022</a:t>
+              <a:t>22/07/2022</a:t>
             </a:fld>
             <a:endParaRPr lang="en-GB"/>
           </a:p>
@@ -3026,7 +3026,7 @@
             <a:fld id="{DE72BEAC-A25F-4480-8AFC-1D3E290F2CC8}" type="datetimeFigureOut">
               <a:rPr lang="en-GB" smtClean="0"/>
               <a:pPr/>
-              <a:t>21/07/2022</a:t>
+              <a:t>22/07/2022</a:t>
             </a:fld>
             <a:endParaRPr lang="en-GB"/>
           </a:p>
@@ -3571,6 +3571,13 @@
   <p:clrMapOvr>
     <a:masterClrMapping/>
   </p:clrMapOvr>
+  <p:timing>
+    <p:tnLst>
+      <p:par>
+        <p:cTn id="1" dur="indefinite" restart="never" nodeType="tmRoot"/>
+      </p:par>
+    </p:tnLst>
+  </p:timing>
 </p:sld>
 </file>
 
@@ -3714,7 +3721,7 @@
                 <a:hlinkClick r:id="rId2">
                   <a:extLst>
                     <a:ext uri="{A12FA001-AC4F-418D-AE19-62706E023703}">
-                      <ahyp:hlinkClr xmlns:ahyp="http://schemas.microsoft.com/office/drawing/2018/hyperlinkcolor" xmlns="" val="tx"/>
+                      <ahyp:hlinkClr xmlns="" xmlns:ahyp="http://schemas.microsoft.com/office/drawing/2018/hyperlinkcolor" val="tx"/>
                     </a:ext>
                   </a:extLst>
                 </a:hlinkClick>
@@ -3737,7 +3744,7 @@
                 <a:hlinkClick r:id="rId3">
                   <a:extLst>
                     <a:ext uri="{A12FA001-AC4F-418D-AE19-62706E023703}">
-                      <ahyp:hlinkClr xmlns:ahyp="http://schemas.microsoft.com/office/drawing/2018/hyperlinkcolor" xmlns="" val="tx"/>
+                      <ahyp:hlinkClr xmlns="" xmlns:ahyp="http://schemas.microsoft.com/office/drawing/2018/hyperlinkcolor" val="tx"/>
                     </a:ext>
                   </a:extLst>
                 </a:hlinkClick>
@@ -3760,7 +3767,7 @@
                 <a:hlinkClick r:id="rId4">
                   <a:extLst>
                     <a:ext uri="{A12FA001-AC4F-418D-AE19-62706E023703}">
-                      <ahyp:hlinkClr xmlns:ahyp="http://schemas.microsoft.com/office/drawing/2018/hyperlinkcolor" xmlns="" val="tx"/>
+                      <ahyp:hlinkClr xmlns="" xmlns:ahyp="http://schemas.microsoft.com/office/drawing/2018/hyperlinkcolor" val="tx"/>
                     </a:ext>
                   </a:extLst>
                 </a:hlinkClick>
@@ -3783,7 +3790,7 @@
                 <a:hlinkClick r:id="rId5">
                   <a:extLst>
                     <a:ext uri="{A12FA001-AC4F-418D-AE19-62706E023703}">
-                      <ahyp:hlinkClr xmlns:ahyp="http://schemas.microsoft.com/office/drawing/2018/hyperlinkcolor" xmlns="" val="tx"/>
+                      <ahyp:hlinkClr xmlns="" xmlns:ahyp="http://schemas.microsoft.com/office/drawing/2018/hyperlinkcolor" val="tx"/>
                     </a:ext>
                   </a:extLst>
                 </a:hlinkClick>
@@ -3825,7 +3832,7 @@
                 <a:hlinkClick r:id="rId6">
                   <a:extLst>
                     <a:ext uri="{A12FA001-AC4F-418D-AE19-62706E023703}">
-                      <ahyp:hlinkClr xmlns:ahyp="http://schemas.microsoft.com/office/drawing/2018/hyperlinkcolor" xmlns="" val="tx"/>
+                      <ahyp:hlinkClr xmlns="" xmlns:ahyp="http://schemas.microsoft.com/office/drawing/2018/hyperlinkcolor" val="tx"/>
                     </a:ext>
                   </a:extLst>
                 </a:hlinkClick>
@@ -3848,7 +3855,7 @@
                 <a:hlinkClick r:id="rId7">
                   <a:extLst>
                     <a:ext uri="{A12FA001-AC4F-418D-AE19-62706E023703}">
-                      <ahyp:hlinkClr xmlns:ahyp="http://schemas.microsoft.com/office/drawing/2018/hyperlinkcolor" xmlns="" val="tx"/>
+                      <ahyp:hlinkClr xmlns="" xmlns:ahyp="http://schemas.microsoft.com/office/drawing/2018/hyperlinkcolor" val="tx"/>
                     </a:ext>
                   </a:extLst>
                 </a:hlinkClick>
@@ -3871,7 +3878,7 @@
                 <a:hlinkClick r:id="rId8">
                   <a:extLst>
                     <a:ext uri="{A12FA001-AC4F-418D-AE19-62706E023703}">
-                      <ahyp:hlinkClr xmlns:ahyp="http://schemas.microsoft.com/office/drawing/2018/hyperlinkcolor" xmlns="" val="tx"/>
+                      <ahyp:hlinkClr xmlns="" xmlns:ahyp="http://schemas.microsoft.com/office/drawing/2018/hyperlinkcolor" val="tx"/>
                     </a:ext>
                   </a:extLst>
                 </a:hlinkClick>
@@ -4130,6 +4137,13 @@
   <p:clrMapOvr>
     <a:masterClrMapping/>
   </p:clrMapOvr>
+  <p:timing>
+    <p:tnLst>
+      <p:par>
+        <p:cTn id="1" dur="indefinite" restart="never" nodeType="tmRoot"/>
+      </p:par>
+    </p:tnLst>
+  </p:timing>
 </p:sld>
 </file>
 
@@ -4204,12 +4218,32 @@
               <a:t>Use </a:t>
             </a:r>
             <a:r>
-              <a:rPr lang="en-GB" b="1" dirty="0"/>
-              <a:t>common</a:t>
+              <a:rPr lang="pl-PL" b="1" dirty="0" smtClean="0"/>
+              <a:t>standard / open</a:t>
+            </a:r>
+            <a:r>
+              <a:rPr lang="en-GB" dirty="0" smtClean="0"/>
+              <a:t> </a:t>
             </a:r>
             <a:r>
               <a:rPr lang="en-GB" dirty="0"/>
-              <a:t> file formats (domain specific)</a:t>
+              <a:t>file formats </a:t>
+            </a:r>
+            <a:r>
+              <a:rPr lang="en-GB" dirty="0" smtClean="0"/>
+              <a:t>(</a:t>
+            </a:r>
+            <a:r>
+              <a:rPr lang="pl-PL" smtClean="0"/>
+              <a:t>it is </a:t>
+            </a:r>
+            <a:r>
+              <a:rPr lang="en-GB" smtClean="0"/>
+              <a:t>domain </a:t>
+            </a:r>
+            <a:r>
+              <a:rPr lang="en-GB" dirty="0"/>
+              <a:t>specific)</a:t>
             </a:r>
           </a:p>
           <a:p>
@@ -4292,6 +4326,13 @@
   <p:clrMapOvr>
     <a:masterClrMapping/>
   </p:clrMapOvr>
+  <p:timing>
+    <p:tnLst>
+      <p:par>
+        <p:cTn id="1" dur="indefinite" restart="never" nodeType="tmRoot"/>
+      </p:par>
+    </p:tnLst>
+  </p:timing>
 </p:sld>
 </file>
 
@@ -4445,7 +4486,7 @@
                 <a14:useLocalDpi xmlns:a14="http://schemas.microsoft.com/office/drawing/2010/main" val="0"/>
               </a:ext>
               <a:ext uri="{96DAC541-7B7A-43D3-8B79-37D633B846F1}">
-                <asvg:svgBlip xmlns:asvg="http://schemas.microsoft.com/office/drawing/2016/SVG/main" xmlns="" r:embed="rId3"/>
+                <asvg:svgBlip xmlns="" xmlns:asvg="http://schemas.microsoft.com/office/drawing/2016/SVG/main" r:embed="rId3"/>
               </a:ext>
             </a:extLst>
           </a:blip>
@@ -4473,6 +4514,13 @@
   <p:clrMapOvr>
     <a:masterClrMapping/>
   </p:clrMapOvr>
+  <p:timing>
+    <p:tnLst>
+      <p:par>
+        <p:cTn id="1" dur="indefinite" restart="never" nodeType="tmRoot"/>
+      </p:par>
+    </p:tnLst>
+  </p:timing>
 </p:sld>
 </file>
 
@@ -4657,7 +4705,7 @@
                 <a14:useLocalDpi xmlns:a14="http://schemas.microsoft.com/office/drawing/2010/main" val="0"/>
               </a:ext>
               <a:ext uri="{96DAC541-7B7A-43D3-8B79-37D633B846F1}">
-                <asvg:svgBlip xmlns:asvg="http://schemas.microsoft.com/office/drawing/2016/SVG/main" xmlns="" r:embed="rId7"/>
+                <asvg:svgBlip xmlns="" xmlns:asvg="http://schemas.microsoft.com/office/drawing/2016/SVG/main" r:embed="rId7"/>
               </a:ext>
             </a:extLst>
           </a:blip>
@@ -4685,6 +4733,13 @@
   <p:clrMapOvr>
     <a:masterClrMapping/>
   </p:clrMapOvr>
+  <p:timing>
+    <p:tnLst>
+      <p:par>
+        <p:cTn id="1" dur="indefinite" restart="never" nodeType="tmRoot"/>
+      </p:par>
+    </p:tnLst>
+  </p:timing>
 </p:sld>
 </file>
 
@@ -4996,6 +5051,13 @@
   <p:clrMapOvr>
     <a:masterClrMapping/>
   </p:clrMapOvr>
+  <p:timing>
+    <p:tnLst>
+      <p:par>
+        <p:cTn id="1" dur="indefinite" restart="never" nodeType="tmRoot"/>
+      </p:par>
+    </p:tnLst>
+  </p:timing>
 </p:sld>
 </file>
 
@@ -5120,6 +5182,13 @@
   <p:clrMapOvr>
     <a:masterClrMapping/>
   </p:clrMapOvr>
+  <p:timing>
+    <p:tnLst>
+      <p:par>
+        <p:cTn id="1" dur="indefinite" restart="never" nodeType="tmRoot"/>
+      </p:par>
+    </p:tnLst>
+  </p:timing>
 </p:sld>
 </file>
 
@@ -5156,7 +5225,7 @@
                 <a16:creationId xmlns:a16="http://schemas.microsoft.com/office/drawing/2014/main" id="{91F32EBA-ED97-466E-8CFA-8382584155D0}"/>
               </a:ext>
               <a:ext uri="{C183D7F6-B498-43B3-948B-1728B52AA6E4}">
-                <adec:decorative xmlns:adec="http://schemas.microsoft.com/office/drawing/2017/decorative" xmlns="" val="1"/>
+                <adec:decorative xmlns="" xmlns:adec="http://schemas.microsoft.com/office/drawing/2017/decorative" val="1"/>
               </a:ext>
             </a:extLst>
           </p:cNvPr>
@@ -5289,7 +5358,7 @@
                 <a16:creationId xmlns:a16="http://schemas.microsoft.com/office/drawing/2014/main" id="{62A38935-BB53-4DF7-A56E-48DD25B685D7}"/>
               </a:ext>
               <a:ext uri="{C183D7F6-B498-43B3-948B-1728B52AA6E4}">
-                <adec:decorative xmlns:adec="http://schemas.microsoft.com/office/drawing/2017/decorative" xmlns="" val="1"/>
+                <adec:decorative xmlns="" xmlns:adec="http://schemas.microsoft.com/office/drawing/2017/decorative" val="1"/>
               </a:ext>
             </a:extLst>
           </p:cNvPr>
@@ -6076,7 +6145,7 @@
                 <a14:useLocalDpi xmlns:a14="http://schemas.microsoft.com/office/drawing/2010/main" val="0"/>
               </a:ext>
               <a:ext uri="{96DAC541-7B7A-43D3-8B79-37D633B846F1}">
-                <asvg:svgBlip xmlns:asvg="http://schemas.microsoft.com/office/drawing/2016/SVG/main" xmlns="" r:embed="rId3"/>
+                <asvg:svgBlip xmlns="" xmlns:asvg="http://schemas.microsoft.com/office/drawing/2016/SVG/main" r:embed="rId3"/>
               </a:ext>
             </a:extLst>
           </a:blip>
@@ -6104,6 +6173,13 @@
   <p:clrMapOvr>
     <a:masterClrMapping/>
   </p:clrMapOvr>
+  <p:timing>
+    <p:tnLst>
+      <p:par>
+        <p:cTn id="1" dur="indefinite" restart="never" nodeType="tmRoot"/>
+      </p:par>
+    </p:tnLst>
+  </p:timing>
 </p:sld>
 </file>
 
@@ -6142,7 +6218,7 @@
                 <a16:creationId xmlns:a16="http://schemas.microsoft.com/office/drawing/2014/main" id="{C4E4288A-DFC8-40A2-90E5-70E851A933AD}"/>
               </a:ext>
               <a:ext uri="{C183D7F6-B498-43B3-948B-1728B52AA6E4}">
-                <adec:decorative xmlns:adec="http://schemas.microsoft.com/office/drawing/2017/decorative" xmlns="" val="1"/>
+                <adec:decorative xmlns="" xmlns:adec="http://schemas.microsoft.com/office/drawing/2017/decorative" val="1"/>
               </a:ext>
             </a:extLst>
           </p:cNvPr>
@@ -6237,7 +6313,7 @@
                 <a16:creationId xmlns:a16="http://schemas.microsoft.com/office/drawing/2014/main" id="{A94A2FC9-6D19-473C-B868-99FDB2044AA9}"/>
               </a:ext>
               <a:ext uri="{C183D7F6-B498-43B3-948B-1728B52AA6E4}">
-                <adec:decorative xmlns:adec="http://schemas.microsoft.com/office/drawing/2017/decorative" xmlns="" val="1"/>
+                <adec:decorative xmlns="" xmlns:adec="http://schemas.microsoft.com/office/drawing/2017/decorative" val="1"/>
               </a:ext>
             </a:extLst>
           </p:cNvPr>
@@ -6456,7 +6532,7 @@
                 <a14:useLocalDpi xmlns:a14="http://schemas.microsoft.com/office/drawing/2010/main" val="0"/>
               </a:ext>
               <a:ext uri="{96DAC541-7B7A-43D3-8B79-37D633B846F1}">
-                <asvg:svgBlip xmlns:asvg="http://schemas.microsoft.com/office/drawing/2016/SVG/main" xmlns="" r:embed="rId3"/>
+                <asvg:svgBlip xmlns="" xmlns:asvg="http://schemas.microsoft.com/office/drawing/2016/SVG/main" r:embed="rId3"/>
               </a:ext>
             </a:extLst>
           </a:blip>
@@ -6592,7 +6668,7 @@
                 <a16:creationId xmlns:a16="http://schemas.microsoft.com/office/drawing/2014/main" id="{8BED0409-854E-49C4-876E-A78C6D881BC8}"/>
               </a:ext>
               <a:ext uri="{C183D7F6-B498-43B3-948B-1728B52AA6E4}">
-                <adec:decorative xmlns:adec="http://schemas.microsoft.com/office/drawing/2017/decorative" xmlns="" val="1"/>
+                <adec:decorative xmlns="" xmlns:adec="http://schemas.microsoft.com/office/drawing/2017/decorative" val="1"/>
               </a:ext>
             </a:extLst>
           </p:cNvPr>
@@ -7237,7 +7313,7 @@
                 <a16:creationId xmlns:a16="http://schemas.microsoft.com/office/drawing/2014/main" id="{D4340B2E-01FD-4F5D-9C4D-AD3923AD20BA}"/>
               </a:ext>
               <a:ext uri="{C183D7F6-B498-43B3-948B-1728B52AA6E4}">
-                <adec:decorative xmlns:adec="http://schemas.microsoft.com/office/drawing/2017/decorative" xmlns="" val="1"/>
+                <adec:decorative xmlns="" xmlns:adec="http://schemas.microsoft.com/office/drawing/2017/decorative" val="1"/>
               </a:ext>
             </a:extLst>
           </p:cNvPr>
@@ -7456,7 +7532,7 @@
                 <a14:useLocalDpi xmlns:a14="http://schemas.microsoft.com/office/drawing/2010/main" val="0"/>
               </a:ext>
               <a:ext uri="{96DAC541-7B7A-43D3-8B79-37D633B846F1}">
-                <asvg:svgBlip xmlns:asvg="http://schemas.microsoft.com/office/drawing/2016/SVG/main" xmlns="" r:embed="rId5"/>
+                <asvg:svgBlip xmlns="" xmlns:asvg="http://schemas.microsoft.com/office/drawing/2016/SVG/main" r:embed="rId5"/>
               </a:ext>
             </a:extLst>
           </a:blip>
@@ -7495,7 +7571,7 @@
                 <a14:useLocalDpi xmlns:a14="http://schemas.microsoft.com/office/drawing/2010/main" val="0"/>
               </a:ext>
               <a:ext uri="{96DAC541-7B7A-43D3-8B79-37D633B846F1}">
-                <asvg:svgBlip xmlns:asvg="http://schemas.microsoft.com/office/drawing/2016/SVG/main" xmlns="" r:embed="rId7"/>
+                <asvg:svgBlip xmlns="" xmlns:asvg="http://schemas.microsoft.com/office/drawing/2016/SVG/main" r:embed="rId7"/>
               </a:ext>
             </a:extLst>
           </a:blip>
@@ -7523,6 +7599,13 @@
   <p:clrMapOvr>
     <a:masterClrMapping/>
   </p:clrMapOvr>
+  <p:timing>
+    <p:tnLst>
+      <p:par>
+        <p:cTn id="1" dur="indefinite" restart="never" nodeType="tmRoot"/>
+      </p:par>
+    </p:tnLst>
+  </p:timing>
 </p:sld>
 </file>
 
@@ -7612,6 +7695,13 @@
   <p:clrMapOvr>
     <a:masterClrMapping/>
   </p:clrMapOvr>
+  <p:timing>
+    <p:tnLst>
+      <p:par>
+        <p:cTn id="1" dur="indefinite" restart="never" nodeType="tmRoot"/>
+      </p:par>
+    </p:tnLst>
+  </p:timing>
 </p:sld>
 </file>
 
@@ -7705,6 +7795,13 @@
   <p:clrMapOvr>
     <a:masterClrMapping/>
   </p:clrMapOvr>
+  <p:timing>
+    <p:tnLst>
+      <p:par>
+        <p:cTn id="1" dur="indefinite" restart="never" nodeType="tmRoot"/>
+      </p:par>
+    </p:tnLst>
+  </p:timing>
 </p:sld>
 </file>
 
@@ -7823,6 +7920,13 @@
   <p:clrMapOvr>
     <a:masterClrMapping/>
   </p:clrMapOvr>
+  <p:timing>
+    <p:tnLst>
+      <p:par>
+        <p:cTn id="1" dur="indefinite" restart="never" nodeType="tmRoot"/>
+      </p:par>
+    </p:tnLst>
+  </p:timing>
 </p:sld>
 </file>
 
@@ -7948,6 +8052,13 @@
   <p:clrMapOvr>
     <a:masterClrMapping/>
   </p:clrMapOvr>
+  <p:timing>
+    <p:tnLst>
+      <p:par>
+        <p:cTn id="1" dur="indefinite" restart="never" nodeType="tmRoot"/>
+      </p:par>
+    </p:tnLst>
+  </p:timing>
 </p:sld>
 </file>
 
@@ -8160,6 +8271,13 @@
   <p:clrMapOvr>
     <a:masterClrMapping/>
   </p:clrMapOvr>
+  <p:timing>
+    <p:tnLst>
+      <p:par>
+        <p:cTn id="1" dur="indefinite" restart="never" nodeType="tmRoot"/>
+      </p:par>
+    </p:tnLst>
+  </p:timing>
 </p:sld>
 </file>
 

</xml_diff>

<commit_message>
Added attribution for the FAIR logo
</commit_message>
<xml_diff>
--- a/instructors/02-Being_FAIR.pptx
+++ b/instructors/02-Being_FAIR.pptx
@@ -22,6 +22,7 @@
     <p:sldId id="266" r:id="rId16"/>
     <p:sldId id="277" r:id="rId17"/>
     <p:sldId id="278" r:id="rId18"/>
+    <p:sldId id="280" r:id="rId19"/>
   </p:sldIdLst>
   <p:sldSz cx="12192000" cy="6858000"/>
   <p:notesSz cx="6858000" cy="9144000"/>
@@ -294,9 +295,9 @@
             <a:fld id="{DE72BEAC-A25F-4480-8AFC-1D3E290F2CC8}" type="datetimeFigureOut">
               <a:rPr lang="en-GB" smtClean="0"/>
               <a:pPr/>
-              <a:t>22/07/2022</a:t>
+              <a:t>08/08/2022</a:t>
             </a:fld>
-            <a:endParaRPr lang="en-GB"/>
+            <a:endParaRPr lang="en-GB" dirty="0"/>
           </a:p>
         </p:txBody>
       </p:sp>
@@ -329,7 +330,7 @@
             </a:lvl1pPr>
           </a:lstStyle>
           <a:p>
-            <a:endParaRPr lang="en-GB"/>
+            <a:endParaRPr lang="en-GB" dirty="0"/>
           </a:p>
         </p:txBody>
       </p:sp>
@@ -367,7 +368,7 @@
               <a:pPr/>
               <a:t>‹#›</a:t>
             </a:fld>
-            <a:endParaRPr lang="en-GB"/>
+            <a:endParaRPr lang="en-GB" dirty="0"/>
           </a:p>
         </p:txBody>
       </p:sp>
@@ -558,9 +559,9 @@
           <a:p>
             <a:fld id="{DE72BEAC-A25F-4480-8AFC-1D3E290F2CC8}" type="datetimeFigureOut">
               <a:rPr lang="en-GB" smtClean="0"/>
-              <a:t>22/07/2022</a:t>
+              <a:t>08/08/2022</a:t>
             </a:fld>
-            <a:endParaRPr lang="en-GB"/>
+            <a:endParaRPr lang="en-GB" dirty="0"/>
           </a:p>
         </p:txBody>
       </p:sp>
@@ -585,7 +586,7 @@
           <a:bodyPr/>
           <a:lstStyle/>
           <a:p>
-            <a:endParaRPr lang="en-GB"/>
+            <a:endParaRPr lang="en-GB" dirty="0"/>
           </a:p>
         </p:txBody>
       </p:sp>
@@ -614,7 +615,7 @@
               <a:rPr lang="en-GB" smtClean="0"/>
               <a:t>‹#›</a:t>
             </a:fld>
-            <a:endParaRPr lang="en-GB"/>
+            <a:endParaRPr lang="en-GB" dirty="0"/>
           </a:p>
         </p:txBody>
       </p:sp>
@@ -768,9 +769,9 @@
           <a:p>
             <a:fld id="{DE72BEAC-A25F-4480-8AFC-1D3E290F2CC8}" type="datetimeFigureOut">
               <a:rPr lang="en-GB" smtClean="0"/>
-              <a:t>22/07/2022</a:t>
+              <a:t>08/08/2022</a:t>
             </a:fld>
-            <a:endParaRPr lang="en-GB"/>
+            <a:endParaRPr lang="en-GB" dirty="0"/>
           </a:p>
         </p:txBody>
       </p:sp>
@@ -795,7 +796,7 @@
           <a:bodyPr/>
           <a:lstStyle/>
           <a:p>
-            <a:endParaRPr lang="en-GB"/>
+            <a:endParaRPr lang="en-GB" dirty="0"/>
           </a:p>
         </p:txBody>
       </p:sp>
@@ -824,7 +825,7 @@
               <a:rPr lang="en-GB" smtClean="0"/>
               <a:t>‹#›</a:t>
             </a:fld>
-            <a:endParaRPr lang="en-GB"/>
+            <a:endParaRPr lang="en-GB" dirty="0"/>
           </a:p>
         </p:txBody>
       </p:sp>
@@ -968,9 +969,9 @@
           <a:p>
             <a:fld id="{DE72BEAC-A25F-4480-8AFC-1D3E290F2CC8}" type="datetimeFigureOut">
               <a:rPr lang="en-GB" smtClean="0"/>
-              <a:t>22/07/2022</a:t>
+              <a:t>08/08/2022</a:t>
             </a:fld>
-            <a:endParaRPr lang="en-GB"/>
+            <a:endParaRPr lang="en-GB" dirty="0"/>
           </a:p>
         </p:txBody>
       </p:sp>
@@ -995,7 +996,7 @@
           <a:bodyPr/>
           <a:lstStyle/>
           <a:p>
-            <a:endParaRPr lang="en-GB"/>
+            <a:endParaRPr lang="en-GB" dirty="0"/>
           </a:p>
         </p:txBody>
       </p:sp>
@@ -1024,7 +1025,7 @@
               <a:rPr lang="en-GB" smtClean="0"/>
               <a:t>‹#›</a:t>
             </a:fld>
-            <a:endParaRPr lang="en-GB"/>
+            <a:endParaRPr lang="en-GB" dirty="0"/>
           </a:p>
         </p:txBody>
       </p:sp>
@@ -1244,9 +1245,9 @@
           <a:p>
             <a:fld id="{DE72BEAC-A25F-4480-8AFC-1D3E290F2CC8}" type="datetimeFigureOut">
               <a:rPr lang="en-GB" smtClean="0"/>
-              <a:t>22/07/2022</a:t>
+              <a:t>08/08/2022</a:t>
             </a:fld>
-            <a:endParaRPr lang="en-GB"/>
+            <a:endParaRPr lang="en-GB" dirty="0"/>
           </a:p>
         </p:txBody>
       </p:sp>
@@ -1271,7 +1272,7 @@
           <a:bodyPr/>
           <a:lstStyle/>
           <a:p>
-            <a:endParaRPr lang="en-GB"/>
+            <a:endParaRPr lang="en-GB" dirty="0"/>
           </a:p>
         </p:txBody>
       </p:sp>
@@ -1300,7 +1301,7 @@
               <a:rPr lang="en-GB" smtClean="0"/>
               <a:t>‹#›</a:t>
             </a:fld>
-            <a:endParaRPr lang="en-GB"/>
+            <a:endParaRPr lang="en-GB" dirty="0"/>
           </a:p>
         </p:txBody>
       </p:sp>
@@ -1512,9 +1513,9 @@
           <a:p>
             <a:fld id="{DE72BEAC-A25F-4480-8AFC-1D3E290F2CC8}" type="datetimeFigureOut">
               <a:rPr lang="en-GB" smtClean="0"/>
-              <a:t>22/07/2022</a:t>
+              <a:t>08/08/2022</a:t>
             </a:fld>
-            <a:endParaRPr lang="en-GB"/>
+            <a:endParaRPr lang="en-GB" dirty="0"/>
           </a:p>
         </p:txBody>
       </p:sp>
@@ -1539,7 +1540,7 @@
           <a:bodyPr/>
           <a:lstStyle/>
           <a:p>
-            <a:endParaRPr lang="en-GB"/>
+            <a:endParaRPr lang="en-GB" dirty="0"/>
           </a:p>
         </p:txBody>
       </p:sp>
@@ -1568,7 +1569,7 @@
               <a:rPr lang="en-GB" smtClean="0"/>
               <a:t>‹#›</a:t>
             </a:fld>
-            <a:endParaRPr lang="en-GB"/>
+            <a:endParaRPr lang="en-GB" dirty="0"/>
           </a:p>
         </p:txBody>
       </p:sp>
@@ -1927,9 +1928,9 @@
           <a:p>
             <a:fld id="{DE72BEAC-A25F-4480-8AFC-1D3E290F2CC8}" type="datetimeFigureOut">
               <a:rPr lang="en-GB" smtClean="0"/>
-              <a:t>22/07/2022</a:t>
+              <a:t>08/08/2022</a:t>
             </a:fld>
-            <a:endParaRPr lang="en-GB"/>
+            <a:endParaRPr lang="en-GB" dirty="0"/>
           </a:p>
         </p:txBody>
       </p:sp>
@@ -1954,7 +1955,7 @@
           <a:bodyPr/>
           <a:lstStyle/>
           <a:p>
-            <a:endParaRPr lang="en-GB"/>
+            <a:endParaRPr lang="en-GB" dirty="0"/>
           </a:p>
         </p:txBody>
       </p:sp>
@@ -1983,7 +1984,7 @@
               <a:rPr lang="en-GB" smtClean="0"/>
               <a:t>‹#›</a:t>
             </a:fld>
-            <a:endParaRPr lang="en-GB"/>
+            <a:endParaRPr lang="en-GB" dirty="0"/>
           </a:p>
         </p:txBody>
       </p:sp>
@@ -2069,9 +2070,9 @@
           <a:p>
             <a:fld id="{DE72BEAC-A25F-4480-8AFC-1D3E290F2CC8}" type="datetimeFigureOut">
               <a:rPr lang="en-GB" smtClean="0"/>
-              <a:t>22/07/2022</a:t>
+              <a:t>08/08/2022</a:t>
             </a:fld>
-            <a:endParaRPr lang="en-GB"/>
+            <a:endParaRPr lang="en-GB" dirty="0"/>
           </a:p>
         </p:txBody>
       </p:sp>
@@ -2096,7 +2097,7 @@
           <a:bodyPr/>
           <a:lstStyle/>
           <a:p>
-            <a:endParaRPr lang="en-GB"/>
+            <a:endParaRPr lang="en-GB" dirty="0"/>
           </a:p>
         </p:txBody>
       </p:sp>
@@ -2125,7 +2126,7 @@
               <a:rPr lang="en-GB" smtClean="0"/>
               <a:t>‹#›</a:t>
             </a:fld>
-            <a:endParaRPr lang="en-GB"/>
+            <a:endParaRPr lang="en-GB" dirty="0"/>
           </a:p>
         </p:txBody>
       </p:sp>
@@ -2182,9 +2183,9 @@
           <a:p>
             <a:fld id="{DE72BEAC-A25F-4480-8AFC-1D3E290F2CC8}" type="datetimeFigureOut">
               <a:rPr lang="en-GB" smtClean="0"/>
-              <a:t>22/07/2022</a:t>
+              <a:t>08/08/2022</a:t>
             </a:fld>
-            <a:endParaRPr lang="en-GB"/>
+            <a:endParaRPr lang="en-GB" dirty="0"/>
           </a:p>
         </p:txBody>
       </p:sp>
@@ -2209,7 +2210,7 @@
           <a:bodyPr/>
           <a:lstStyle/>
           <a:p>
-            <a:endParaRPr lang="en-GB"/>
+            <a:endParaRPr lang="en-GB" dirty="0"/>
           </a:p>
         </p:txBody>
       </p:sp>
@@ -2238,7 +2239,7 @@
               <a:rPr lang="en-GB" smtClean="0"/>
               <a:t>‹#›</a:t>
             </a:fld>
-            <a:endParaRPr lang="en-GB"/>
+            <a:endParaRPr lang="en-GB" dirty="0"/>
           </a:p>
         </p:txBody>
       </p:sp>
@@ -2495,9 +2496,9 @@
           <a:p>
             <a:fld id="{DE72BEAC-A25F-4480-8AFC-1D3E290F2CC8}" type="datetimeFigureOut">
               <a:rPr lang="en-GB" smtClean="0"/>
-              <a:t>22/07/2022</a:t>
+              <a:t>08/08/2022</a:t>
             </a:fld>
-            <a:endParaRPr lang="en-GB"/>
+            <a:endParaRPr lang="en-GB" dirty="0"/>
           </a:p>
         </p:txBody>
       </p:sp>
@@ -2522,7 +2523,7 @@
           <a:bodyPr/>
           <a:lstStyle/>
           <a:p>
-            <a:endParaRPr lang="en-GB"/>
+            <a:endParaRPr lang="en-GB" dirty="0"/>
           </a:p>
         </p:txBody>
       </p:sp>
@@ -2551,7 +2552,7 @@
               <a:rPr lang="en-GB" smtClean="0"/>
               <a:t>‹#›</a:t>
             </a:fld>
-            <a:endParaRPr lang="en-GB"/>
+            <a:endParaRPr lang="en-GB" dirty="0"/>
           </a:p>
         </p:txBody>
       </p:sp>
@@ -2686,7 +2687,7 @@
             </a:lvl9pPr>
           </a:lstStyle>
           <a:p>
-            <a:endParaRPr lang="en-GB"/>
+            <a:endParaRPr lang="en-GB" dirty="0"/>
           </a:p>
         </p:txBody>
       </p:sp>
@@ -2784,9 +2785,9 @@
           <a:p>
             <a:fld id="{DE72BEAC-A25F-4480-8AFC-1D3E290F2CC8}" type="datetimeFigureOut">
               <a:rPr lang="en-GB" smtClean="0"/>
-              <a:t>22/07/2022</a:t>
+              <a:t>08/08/2022</a:t>
             </a:fld>
-            <a:endParaRPr lang="en-GB"/>
+            <a:endParaRPr lang="en-GB" dirty="0"/>
           </a:p>
         </p:txBody>
       </p:sp>
@@ -2811,7 +2812,7 @@
           <a:bodyPr/>
           <a:lstStyle/>
           <a:p>
-            <a:endParaRPr lang="en-GB"/>
+            <a:endParaRPr lang="en-GB" dirty="0"/>
           </a:p>
         </p:txBody>
       </p:sp>
@@ -2840,7 +2841,7 @@
               <a:rPr lang="en-GB" smtClean="0"/>
               <a:t>‹#›</a:t>
             </a:fld>
-            <a:endParaRPr lang="en-GB"/>
+            <a:endParaRPr lang="en-GB" dirty="0"/>
           </a:p>
         </p:txBody>
       </p:sp>
@@ -3026,9 +3027,9 @@
             <a:fld id="{DE72BEAC-A25F-4480-8AFC-1D3E290F2CC8}" type="datetimeFigureOut">
               <a:rPr lang="en-GB" smtClean="0"/>
               <a:pPr/>
-              <a:t>22/07/2022</a:t>
+              <a:t>08/08/2022</a:t>
             </a:fld>
-            <a:endParaRPr lang="en-GB"/>
+            <a:endParaRPr lang="en-GB" dirty="0"/>
           </a:p>
         </p:txBody>
       </p:sp>
@@ -3069,7 +3070,7 @@
             </a:lvl1pPr>
           </a:lstStyle>
           <a:p>
-            <a:endParaRPr lang="en-GB"/>
+            <a:endParaRPr lang="en-GB" dirty="0"/>
           </a:p>
         </p:txBody>
       </p:sp>
@@ -3115,7 +3116,7 @@
               <a:pPr/>
               <a:t>‹#›</a:t>
             </a:fld>
-            <a:endParaRPr lang="en-GB"/>
+            <a:endParaRPr lang="en-GB" dirty="0"/>
           </a:p>
         </p:txBody>
       </p:sp>
@@ -4214,35 +4215,19 @@
           <a:lstStyle/>
           <a:p>
             <a:r>
-              <a:rPr lang="en-GB"/>
-              <a:t>Use standard </a:t>
-            </a:r>
-            <a:r>
               <a:rPr lang="en-GB" dirty="0"/>
-              <a:t>or</a:t>
-            </a:r>
-            <a:r>
-              <a:rPr lang="en-GB"/>
-              <a:t> open-source </a:t>
-            </a:r>
-            <a:r>
-              <a:rPr lang="en-GB" smtClean="0"/>
+              <a:t>Use standard or open-source </a:t>
+            </a:r>
+            <a:r>
+              <a:rPr lang="en-GB" dirty="0" smtClean="0"/>
               <a:t>file </a:t>
             </a:r>
             <a:r>
-              <a:rPr lang="en-GB"/>
-              <a:t>formats </a:t>
-            </a:r>
-            <a:r>
               <a:rPr lang="en-GB" dirty="0"/>
-              <a:t>where</a:t>
-            </a:r>
-            <a:r>
-              <a:rPr lang="en-GB"/>
-              <a:t> possible </a:t>
-            </a:r>
-            <a:r>
-              <a:rPr lang="en-GB" smtClean="0"/>
+              <a:t>formats where possible </a:t>
+            </a:r>
+            <a:r>
+              <a:rPr lang="en-GB" dirty="0" smtClean="0"/>
               <a:t>(domain </a:t>
             </a:r>
             <a:r>
@@ -4257,22 +4242,10 @@
             </a:r>
             <a:r>
               <a:rPr lang="en-GB" dirty="0"/>
-              <a:t>se .csv </a:t>
-            </a:r>
-            <a:r>
-              <a:rPr lang="en-GB"/>
-              <a:t>or .</a:t>
-            </a:r>
-            <a:r>
-              <a:rPr lang="en-GB"/>
-              <a:t>xlsx</a:t>
-            </a:r>
-            <a:r>
-              <a:rPr lang="en-GB"/>
-              <a:t> </a:t>
-            </a:r>
-            <a:r>
-              <a:rPr lang="en-GB" smtClean="0"/>
+              <a:t>se .csv or .xlsx </a:t>
+            </a:r>
+            <a:r>
+              <a:rPr lang="en-GB" dirty="0" smtClean="0"/>
               <a:t>files </a:t>
             </a:r>
             <a:r>
@@ -4297,31 +4270,7 @@
           <a:p>
             <a:r>
               <a:rPr lang="en-GB" dirty="0"/>
-              <a:t>Convert proprietary binary formats to open ones. For example convert </a:t>
-            </a:r>
-            <a:r>
-              <a:rPr lang="en-GB" dirty="0" err="1"/>
-              <a:t>Snapgene</a:t>
-            </a:r>
-            <a:r>
-              <a:rPr lang="en-GB" dirty="0"/>
-              <a:t> to </a:t>
-            </a:r>
-            <a:r>
-              <a:rPr lang="en-GB" dirty="0" err="1"/>
-              <a:t>Genbank</a:t>
-            </a:r>
-            <a:r>
-              <a:rPr lang="en-GB" dirty="0"/>
-              <a:t>/SBOL, microscopy </a:t>
-            </a:r>
-            <a:r>
-              <a:rPr lang="en-GB" dirty="0" err="1"/>
-              <a:t>multistack</a:t>
-            </a:r>
-            <a:r>
-              <a:rPr lang="en-GB" dirty="0"/>
-              <a:t> images to OME-TIFF</a:t>
+              <a:t>Convert proprietary binary formats to open ones. For example convert Snapgene to Genbank/SBOL, microscopy multistack images to OME-TIFF</a:t>
             </a:r>
           </a:p>
           <a:p>
@@ -4620,7 +4569,19 @@
             </a:br>
             <a:r>
               <a:rPr lang="en-GB" dirty="0"/>
-              <a:t>and terms by which data and software can be re-used. </a:t>
+              <a:t>and </a:t>
+            </a:r>
+            <a:r>
+              <a:rPr lang="en-GB"/>
+              <a:t>terms </a:t>
+            </a:r>
+            <a:r>
+              <a:rPr lang="en-GB" smtClean="0"/>
+              <a:t>under </a:t>
+            </a:r>
+            <a:r>
+              <a:rPr lang="en-GB" dirty="0"/>
+              <a:t>which data and software can be re-used. </a:t>
             </a:r>
           </a:p>
           <a:p>
@@ -5036,8 +4997,8 @@
         </p:nvSpPr>
         <p:spPr>
           <a:xfrm>
-            <a:off x="0" y="6492875"/>
-            <a:ext cx="1485215" cy="307777"/>
+            <a:off x="54592" y="6465579"/>
+            <a:ext cx="1535357" cy="307777"/>
           </a:xfrm>
           <a:prstGeom prst="rect">
             <a:avLst/>
@@ -5051,9 +5012,14 @@
           <a:lstStyle/>
           <a:p>
             <a:r>
-              <a:rPr lang="en-GB" sz="1400" dirty="0"/>
-              <a:t>CREDITS [5] CC BY</a:t>
-            </a:r>
+              <a:rPr lang="en-GB" sz="1400"/>
+              <a:t>Image: </a:t>
+            </a:r>
+            <a:r>
+              <a:rPr lang="en-GB" sz="1400" smtClean="0"/>
+              <a:t>See Credits</a:t>
+            </a:r>
+            <a:endParaRPr lang="en-GB" sz="1400" dirty="0"/>
           </a:p>
         </p:txBody>
       </p:sp>
@@ -5289,7 +5255,7 @@
           <a:lstStyle/>
           <a:p>
             <a:pPr algn="ctr"/>
-            <a:endParaRPr lang="en-US"/>
+            <a:endParaRPr lang="en-US" dirty="0"/>
           </a:p>
         </p:txBody>
       </p:sp>
@@ -5322,7 +5288,7 @@
           <a:lstStyle/>
           <a:p>
             <a:r>
-              <a:rPr lang="en-GB" sz="4000"/>
+              <a:rPr lang="en-GB" sz="4000" dirty="0"/>
               <a:t>FAIR quiz</a:t>
             </a:r>
           </a:p>
@@ -5360,7 +5326,7 @@
               <a:buNone/>
             </a:pPr>
             <a:r>
-              <a:rPr lang="en-GB" sz="2400"/>
+              <a:rPr lang="en-GB" sz="2400" dirty="0"/>
               <a:t>…</a:t>
             </a:r>
           </a:p>
@@ -6136,7 +6102,7 @@
           <a:lstStyle/>
           <a:p>
             <a:pPr algn="ctr"/>
-            <a:endParaRPr lang="en-US"/>
+            <a:endParaRPr lang="en-US" dirty="0"/>
           </a:p>
         </p:txBody>
       </p:sp>
@@ -6199,6 +6165,95 @@
 </p:sld>
 </file>
 
+<file path=ppt/slides/slide18.xml><?xml version="1.0" encoding="utf-8"?>
+<p:sld xmlns:a="http://schemas.openxmlformats.org/drawingml/2006/main" xmlns:r="http://schemas.openxmlformats.org/officeDocument/2006/relationships" xmlns:p="http://schemas.openxmlformats.org/presentationml/2006/main">
+  <p:cSld>
+    <p:spTree>
+      <p:nvGrpSpPr>
+        <p:cNvPr id="1" name=""/>
+        <p:cNvGrpSpPr/>
+        <p:nvPr/>
+      </p:nvGrpSpPr>
+      <p:grpSpPr>
+        <a:xfrm>
+          <a:off x="0" y="0"/>
+          <a:ext cx="0" cy="0"/>
+          <a:chOff x="0" y="0"/>
+          <a:chExt cx="0" cy="0"/>
+        </a:xfrm>
+      </p:grpSpPr>
+      <p:sp>
+        <p:nvSpPr>
+          <p:cNvPr id="2" name="Title 1"/>
+          <p:cNvSpPr>
+            <a:spLocks noGrp="1"/>
+          </p:cNvSpPr>
+          <p:nvPr>
+            <p:ph type="title"/>
+          </p:nvPr>
+        </p:nvSpPr>
+        <p:spPr/>
+        <p:txBody>
+          <a:bodyPr/>
+          <a:lstStyle/>
+          <a:p>
+            <a:r>
+              <a:rPr lang="en-GB" smtClean="0"/>
+              <a:t>Credits</a:t>
+            </a:r>
+            <a:endParaRPr lang="en-GB"/>
+          </a:p>
+        </p:txBody>
+      </p:sp>
+      <p:sp>
+        <p:nvSpPr>
+          <p:cNvPr id="3" name="Content Placeholder 2"/>
+          <p:cNvSpPr>
+            <a:spLocks noGrp="1"/>
+          </p:cNvSpPr>
+          <p:nvPr>
+            <p:ph idx="1"/>
+          </p:nvPr>
+        </p:nvSpPr>
+        <p:spPr/>
+        <p:txBody>
+          <a:bodyPr/>
+          <a:lstStyle/>
+          <a:p>
+            <a:r>
+              <a:rPr lang="en-GB" smtClean="0"/>
+              <a:t>FAIR logo - </a:t>
+            </a:r>
+            <a:r>
+              <a:rPr lang="en-GB"/>
+              <a:t>SangyaPundir, CC BY-SA 4.0 via Wikimedia Commons </a:t>
+            </a:r>
+            <a:br>
+              <a:rPr lang="en-GB"/>
+            </a:br>
+            <a:r>
+              <a:rPr lang="en-GB"/>
+              <a:t>https://upload.wikimedia.org/wikipedia/commons/thumb/a/aa/FAIR_data_principles.jpg/800px-FAIR_data_principles.jpg</a:t>
+            </a:r>
+          </a:p>
+          <a:p>
+            <a:endParaRPr lang="en-GB"/>
+          </a:p>
+        </p:txBody>
+      </p:sp>
+    </p:spTree>
+    <p:extLst>
+      <p:ext uri="{BB962C8B-B14F-4D97-AF65-F5344CB8AC3E}">
+        <p14:creationId xmlns:p14="http://schemas.microsoft.com/office/powerpoint/2010/main" val="2167788240"/>
+      </p:ext>
+    </p:extLst>
+  </p:cSld>
+  <p:clrMapOvr>
+    <a:masterClrMapping/>
+  </p:clrMapOvr>
+</p:sld>
+</file>
+
 <file path=ppt/slides/slide2.xml><?xml version="1.0" encoding="utf-8"?>
 <p:sld xmlns:a="http://schemas.openxmlformats.org/drawingml/2006/main" xmlns:r="http://schemas.openxmlformats.org/officeDocument/2006/relationships" xmlns:p="http://schemas.openxmlformats.org/presentationml/2006/main">
   <p:cSld>
@@ -6316,8 +6371,13 @@
           <a:p>
             <a:r>
               <a:rPr lang="en-GB" sz="4000" dirty="0"/>
-              <a:t>What is data</a:t>
-            </a:r>
+              <a:t>What is </a:t>
+            </a:r>
+            <a:r>
+              <a:rPr lang="en-GB" sz="4000" dirty="0" smtClean="0"/>
+              <a:t>data?</a:t>
+            </a:r>
+            <a:endParaRPr lang="en-GB" sz="4000" dirty="0"/>
           </a:p>
         </p:txBody>
       </p:sp>
@@ -8394,7 +8454,7 @@
           <p:cNvPr id="5" name="TextBox 4">
             <a:extLst>
               <a:ext uri="{FF2B5EF4-FFF2-40B4-BE49-F238E27FC236}">
-                <a16:creationId xmlns:a16="http://schemas.microsoft.com/office/drawing/2014/main" id="{3376771C-B2F6-4E5B-B128-C9FDB872F544}"/>
+                <a16:creationId xmlns:a16="http://schemas.microsoft.com/office/drawing/2014/main" id="{83A55002-18C5-4D7D-B132-2D7C4273B10D}"/>
               </a:ext>
             </a:extLst>
           </p:cNvPr>
@@ -8403,8 +8463,8 @@
         </p:nvSpPr>
         <p:spPr>
           <a:xfrm>
-            <a:off x="669303" y="6353666"/>
-            <a:ext cx="1485215" cy="307777"/>
+            <a:off x="54592" y="6465579"/>
+            <a:ext cx="1535357" cy="307777"/>
           </a:xfrm>
           <a:prstGeom prst="rect">
             <a:avLst/>
@@ -8418,9 +8478,14 @@
           <a:lstStyle/>
           <a:p>
             <a:r>
-              <a:rPr lang="en-GB" sz="1400" dirty="0"/>
-              <a:t>CREDITS [5] CC BY</a:t>
-            </a:r>
+              <a:rPr lang="en-GB" sz="1400"/>
+              <a:t>Image: </a:t>
+            </a:r>
+            <a:r>
+              <a:rPr lang="en-GB" sz="1400" smtClean="0"/>
+              <a:t>See Credits</a:t>
+            </a:r>
+            <a:endParaRPr lang="en-GB" sz="1400" dirty="0"/>
           </a:p>
         </p:txBody>
       </p:sp>

</xml_diff>

<commit_message>
tidying up, updated hyperlinks
</commit_message>
<xml_diff>
--- a/instructors/02-Being_FAIR.pptx
+++ b/instructors/02-Being_FAIR.pptx
@@ -3719,13 +3719,7 @@
                 <a:solidFill>
                   <a:srgbClr val="0070C0"/>
                 </a:solidFill>
-                <a:hlinkClick r:id="rId2">
-                  <a:extLst>
-                    <a:ext uri="{A12FA001-AC4F-418D-AE19-62706E023703}">
-                      <ahyp:hlinkClr xmlns:ahyp="http://schemas.microsoft.com/office/drawing/2018/hyperlinkcolor" xmlns="" val="tx"/>
-                    </a:ext>
-                  </a:extLst>
-                </a:hlinkClick>
+                <a:hlinkClick r:id="rId2"/>
               </a:rPr>
               <a:t>Dryad</a:t>
             </a:r>
@@ -3742,13 +3736,7 @@
                 <a:solidFill>
                   <a:srgbClr val="0070C0"/>
                 </a:solidFill>
-                <a:hlinkClick r:id="rId3">
-                  <a:extLst>
-                    <a:ext uri="{A12FA001-AC4F-418D-AE19-62706E023703}">
-                      <ahyp:hlinkClr xmlns:ahyp="http://schemas.microsoft.com/office/drawing/2018/hyperlinkcolor" xmlns="" val="tx"/>
-                    </a:ext>
-                  </a:extLst>
-                </a:hlinkClick>
+                <a:hlinkClick r:id="rId3"/>
               </a:rPr>
               <a:t>Zenodo</a:t>
             </a:r>
@@ -3765,13 +3753,7 @@
                 <a:solidFill>
                   <a:srgbClr val="0070C0"/>
                 </a:solidFill>
-                <a:hlinkClick r:id="rId4">
-                  <a:extLst>
-                    <a:ext uri="{A12FA001-AC4F-418D-AE19-62706E023703}">
-                      <ahyp:hlinkClr xmlns:ahyp="http://schemas.microsoft.com/office/drawing/2018/hyperlinkcolor" xmlns="" val="tx"/>
-                    </a:ext>
-                  </a:extLst>
-                </a:hlinkClick>
+                <a:hlinkClick r:id="rId4"/>
               </a:rPr>
               <a:t>FigShare</a:t>
             </a:r>
@@ -3788,13 +3770,7 @@
                 <a:solidFill>
                   <a:srgbClr val="0070C0"/>
                 </a:solidFill>
-                <a:hlinkClick r:id="rId5">
-                  <a:extLst>
-                    <a:ext uri="{A12FA001-AC4F-418D-AE19-62706E023703}">
-                      <ahyp:hlinkClr xmlns:ahyp="http://schemas.microsoft.com/office/drawing/2018/hyperlinkcolor" xmlns="" val="tx"/>
-                    </a:ext>
-                  </a:extLst>
-                </a:hlinkClick>
+                <a:hlinkClick r:id="rId5"/>
               </a:rPr>
               <a:t>Dataverse</a:t>
             </a:r>
@@ -3833,7 +3809,7 @@
                 <a:hlinkClick r:id="rId6">
                   <a:extLst>
                     <a:ext uri="{A12FA001-AC4F-418D-AE19-62706E023703}">
-                      <ahyp:hlinkClr xmlns:ahyp="http://schemas.microsoft.com/office/drawing/2018/hyperlinkcolor" xmlns="" val="tx"/>
+                      <ahyp:hlinkClr xmlns="" xmlns:ahyp="http://schemas.microsoft.com/office/drawing/2018/hyperlinkcolor" val="tx"/>
                     </a:ext>
                   </a:extLst>
                 </a:hlinkClick>
@@ -3856,7 +3832,7 @@
                 <a:hlinkClick r:id="rId7">
                   <a:extLst>
                     <a:ext uri="{A12FA001-AC4F-418D-AE19-62706E023703}">
-                      <ahyp:hlinkClr xmlns:ahyp="http://schemas.microsoft.com/office/drawing/2018/hyperlinkcolor" xmlns="" val="tx"/>
+                      <ahyp:hlinkClr xmlns="" xmlns:ahyp="http://schemas.microsoft.com/office/drawing/2018/hyperlinkcolor" val="tx"/>
                     </a:ext>
                   </a:extLst>
                 </a:hlinkClick>
@@ -3879,7 +3855,7 @@
                 <a:hlinkClick r:id="rId8">
                   <a:extLst>
                     <a:ext uri="{A12FA001-AC4F-418D-AE19-62706E023703}">
-                      <ahyp:hlinkClr xmlns:ahyp="http://schemas.microsoft.com/office/drawing/2018/hyperlinkcolor" xmlns="" val="tx"/>
+                      <ahyp:hlinkClr xmlns="" xmlns:ahyp="http://schemas.microsoft.com/office/drawing/2018/hyperlinkcolor" val="tx"/>
                     </a:ext>
                   </a:extLst>
                 </a:hlinkClick>
@@ -4078,22 +4054,21 @@
               <a:t>Repositories often maintain web addresses in a stable form (permalinks) </a:t>
             </a:r>
             <a:r>
-              <a:rPr lang="en-GB" dirty="0">
-                <a:hlinkClick r:id="rId4"/>
-              </a:rPr>
-              <a:t>http://repository.adress/identifier</a:t>
-            </a:r>
-            <a:r>
-              <a:rPr lang="en-GB" dirty="0"/>
-              <a:t>.</a:t>
-            </a:r>
+              <a:rPr lang="en-GB"/>
+              <a:t>http</a:t>
+            </a:r>
+            <a:r>
+              <a:rPr lang="en-GB" smtClean="0"/>
+              <a:t>://&lt;repository.address&gt;/&lt;identifier&gt;.</a:t>
+            </a:r>
+            <a:endParaRPr lang="en-GB" dirty="0"/>
           </a:p>
           <a:p>
             <a:pPr marL="0" indent="0">
               <a:buNone/>
             </a:pPr>
             <a:endParaRPr lang="en-GB" dirty="0">
-              <a:hlinkClick r:id="rId5"/>
+              <a:hlinkClick r:id="rId4"/>
             </a:endParaRPr>
           </a:p>
           <a:p>
@@ -4102,7 +4077,7 @@
             </a:pPr>
             <a:r>
               <a:rPr lang="en-GB" dirty="0">
-                <a:hlinkClick r:id="rId5"/>
+                <a:hlinkClick r:id="rId4"/>
               </a:rPr>
               <a:t>http://identifiers.org/</a:t>
             </a:r>
@@ -4111,7 +4086,7 @@
                 <a:solidFill>
                   <a:srgbClr val="7030A0"/>
                 </a:solidFill>
-                <a:hlinkClick r:id="rId5"/>
+                <a:hlinkClick r:id="rId4"/>
               </a:rPr>
               <a:t>SO:0000167</a:t>
             </a:r>
@@ -4451,7 +4426,7 @@
                 <a14:useLocalDpi xmlns:a14="http://schemas.microsoft.com/office/drawing/2010/main" val="0"/>
               </a:ext>
               <a:ext uri="{96DAC541-7B7A-43D3-8B79-37D633B846F1}">
-                <asvg:svgBlip xmlns:asvg="http://schemas.microsoft.com/office/drawing/2016/SVG/main" xmlns="" r:embed="rId3"/>
+                <asvg:svgBlip xmlns="" xmlns:asvg="http://schemas.microsoft.com/office/drawing/2016/SVG/main" r:embed="rId3"/>
               </a:ext>
             </a:extLst>
           </a:blip>
@@ -4682,7 +4657,7 @@
                 <a14:useLocalDpi xmlns:a14="http://schemas.microsoft.com/office/drawing/2010/main" val="0"/>
               </a:ext>
               <a:ext uri="{96DAC541-7B7A-43D3-8B79-37D633B846F1}">
-                <asvg:svgBlip xmlns:asvg="http://schemas.microsoft.com/office/drawing/2016/SVG/main" xmlns="" r:embed="rId7"/>
+                <asvg:svgBlip xmlns="" xmlns:asvg="http://schemas.microsoft.com/office/drawing/2016/SVG/main" r:embed="rId7"/>
               </a:ext>
             </a:extLst>
           </a:blip>
@@ -5207,7 +5182,7 @@
                 <a16:creationId xmlns:a16="http://schemas.microsoft.com/office/drawing/2014/main" id="{91F32EBA-ED97-466E-8CFA-8382584155D0}"/>
               </a:ext>
               <a:ext uri="{C183D7F6-B498-43B3-948B-1728B52AA6E4}">
-                <adec:decorative xmlns:adec="http://schemas.microsoft.com/office/drawing/2017/decorative" xmlns="" val="1"/>
+                <adec:decorative xmlns="" xmlns:adec="http://schemas.microsoft.com/office/drawing/2017/decorative" val="1"/>
               </a:ext>
             </a:extLst>
           </p:cNvPr>
@@ -5340,7 +5315,7 @@
                 <a16:creationId xmlns:a16="http://schemas.microsoft.com/office/drawing/2014/main" id="{62A38935-BB53-4DF7-A56E-48DD25B685D7}"/>
               </a:ext>
               <a:ext uri="{C183D7F6-B498-43B3-948B-1728B52AA6E4}">
-                <adec:decorative xmlns:adec="http://schemas.microsoft.com/office/drawing/2017/decorative" xmlns="" val="1"/>
+                <adec:decorative xmlns="" xmlns:adec="http://schemas.microsoft.com/office/drawing/2017/decorative" val="1"/>
               </a:ext>
             </a:extLst>
           </p:cNvPr>
@@ -6127,7 +6102,7 @@
                 <a14:useLocalDpi xmlns:a14="http://schemas.microsoft.com/office/drawing/2010/main" val="0"/>
               </a:ext>
               <a:ext uri="{96DAC541-7B7A-43D3-8B79-37D633B846F1}">
-                <asvg:svgBlip xmlns:asvg="http://schemas.microsoft.com/office/drawing/2016/SVG/main" xmlns="" r:embed="rId3"/>
+                <asvg:svgBlip xmlns="" xmlns:asvg="http://schemas.microsoft.com/office/drawing/2016/SVG/main" r:embed="rId3"/>
               </a:ext>
             </a:extLst>
           </a:blip>
@@ -6257,16 +6232,6 @@
 <file path=ppt/slides/slide2.xml><?xml version="1.0" encoding="utf-8"?>
 <p:sld xmlns:a="http://schemas.openxmlformats.org/drawingml/2006/main" xmlns:r="http://schemas.openxmlformats.org/officeDocument/2006/relationships" xmlns:p="http://schemas.openxmlformats.org/presentationml/2006/main">
   <p:cSld>
-    <p:bg>
-      <p:bgPr>
-        <a:solidFill>
-          <a:schemeClr val="bg1">
-            <a:alpha val="0"/>
-          </a:schemeClr>
-        </a:solidFill>
-        <a:effectLst/>
-      </p:bgPr>
-    </p:bg>
     <p:spTree>
       <p:nvGrpSpPr>
         <p:cNvPr id="1" name=""/>
@@ -6289,7 +6254,7 @@
                 <a16:creationId xmlns:a16="http://schemas.microsoft.com/office/drawing/2014/main" id="{C4E4288A-DFC8-40A2-90E5-70E851A933AD}"/>
               </a:ext>
               <a:ext uri="{C183D7F6-B498-43B3-948B-1728B52AA6E4}">
-                <adec:decorative xmlns:adec="http://schemas.microsoft.com/office/drawing/2017/decorative" xmlns="" val="1"/>
+                <adec:decorative xmlns="" xmlns:adec="http://schemas.microsoft.com/office/drawing/2017/decorative" val="1"/>
               </a:ext>
             </a:extLst>
           </p:cNvPr>
@@ -6389,7 +6354,7 @@
                 <a16:creationId xmlns:a16="http://schemas.microsoft.com/office/drawing/2014/main" id="{A94A2FC9-6D19-473C-B868-99FDB2044AA9}"/>
               </a:ext>
               <a:ext uri="{C183D7F6-B498-43B3-948B-1728B52AA6E4}">
-                <adec:decorative xmlns:adec="http://schemas.microsoft.com/office/drawing/2017/decorative" xmlns="" val="1"/>
+                <adec:decorative xmlns="" xmlns:adec="http://schemas.microsoft.com/office/drawing/2017/decorative" val="1"/>
               </a:ext>
             </a:extLst>
           </p:cNvPr>
@@ -6608,7 +6573,7 @@
                 <a14:useLocalDpi xmlns:a14="http://schemas.microsoft.com/office/drawing/2010/main" val="0"/>
               </a:ext>
               <a:ext uri="{96DAC541-7B7A-43D3-8B79-37D633B846F1}">
-                <asvg:svgBlip xmlns:asvg="http://schemas.microsoft.com/office/drawing/2016/SVG/main" xmlns="" r:embed="rId3"/>
+                <asvg:svgBlip xmlns="" xmlns:asvg="http://schemas.microsoft.com/office/drawing/2016/SVG/main" r:embed="rId3"/>
               </a:ext>
             </a:extLst>
           </a:blip>
@@ -6744,7 +6709,7 @@
                 <a16:creationId xmlns:a16="http://schemas.microsoft.com/office/drawing/2014/main" id="{8BED0409-854E-49C4-876E-A78C6D881BC8}"/>
               </a:ext>
               <a:ext uri="{C183D7F6-B498-43B3-948B-1728B52AA6E4}">
-                <adec:decorative xmlns:adec="http://schemas.microsoft.com/office/drawing/2017/decorative" xmlns="" val="1"/>
+                <adec:decorative xmlns="" xmlns:adec="http://schemas.microsoft.com/office/drawing/2017/decorative" val="1"/>
               </a:ext>
             </a:extLst>
           </p:cNvPr>
@@ -7389,7 +7354,7 @@
                 <a16:creationId xmlns:a16="http://schemas.microsoft.com/office/drawing/2014/main" id="{D4340B2E-01FD-4F5D-9C4D-AD3923AD20BA}"/>
               </a:ext>
               <a:ext uri="{C183D7F6-B498-43B3-948B-1728B52AA6E4}">
-                <adec:decorative xmlns:adec="http://schemas.microsoft.com/office/drawing/2017/decorative" xmlns="" val="1"/>
+                <adec:decorative xmlns="" xmlns:adec="http://schemas.microsoft.com/office/drawing/2017/decorative" val="1"/>
               </a:ext>
             </a:extLst>
           </p:cNvPr>
@@ -7608,7 +7573,7 @@
                 <a14:useLocalDpi xmlns:a14="http://schemas.microsoft.com/office/drawing/2010/main" val="0"/>
               </a:ext>
               <a:ext uri="{96DAC541-7B7A-43D3-8B79-37D633B846F1}">
-                <asvg:svgBlip xmlns:asvg="http://schemas.microsoft.com/office/drawing/2016/SVG/main" xmlns="" r:embed="rId5"/>
+                <asvg:svgBlip xmlns="" xmlns:asvg="http://schemas.microsoft.com/office/drawing/2016/SVG/main" r:embed="rId5"/>
               </a:ext>
             </a:extLst>
           </a:blip>
@@ -7647,7 +7612,7 @@
                 <a14:useLocalDpi xmlns:a14="http://schemas.microsoft.com/office/drawing/2010/main" val="0"/>
               </a:ext>
               <a:ext uri="{96DAC541-7B7A-43D3-8B79-37D633B846F1}">
-                <asvg:svgBlip xmlns:asvg="http://schemas.microsoft.com/office/drawing/2016/SVG/main" xmlns="" r:embed="rId7"/>
+                <asvg:svgBlip xmlns="" xmlns:asvg="http://schemas.microsoft.com/office/drawing/2016/SVG/main" r:embed="rId7"/>
               </a:ext>
             </a:extLst>
           </a:blip>
@@ -7976,13 +7941,10 @@
             </a:r>
           </a:p>
           <a:p>
+            <a:pPr marL="0" indent="0">
+              <a:buNone/>
+            </a:pPr>
             <a:endParaRPr lang="pl-PL" dirty="0"/>
-          </a:p>
-          <a:p>
-            <a:r>
-              <a:rPr lang="pl-PL" dirty="0"/>
-              <a:t> </a:t>
-            </a:r>
           </a:p>
         </p:txBody>
       </p:sp>
@@ -8220,7 +8182,19 @@
           <a:p>
             <a:r>
               <a:rPr lang="en-GB" dirty="0"/>
-              <a:t>the protocol difficult to </a:t>
+              <a:t>the </a:t>
+            </a:r>
+            <a:r>
+              <a:rPr lang="en-GB"/>
+              <a:t>protocol </a:t>
+            </a:r>
+            <a:r>
+              <a:rPr lang="en-GB" smtClean="0"/>
+              <a:t>was difficult </a:t>
+            </a:r>
+            <a:r>
+              <a:rPr lang="en-GB" dirty="0"/>
+              <a:t>to </a:t>
             </a:r>
             <a:r>
               <a:rPr lang="en-GB" b="1" i="1" dirty="0"/>

</xml_diff>

<commit_message>
Added microscope photo and tidied up numbering of ep 02 exercise 1a 1b etc
</commit_message>
<xml_diff>
--- a/instructors/02-Being_FAIR.pptx
+++ b/instructors/02-Being_FAIR.pptx
@@ -296,7 +296,7 @@
             <a:fld id="{DE72BEAC-A25F-4480-8AFC-1D3E290F2CC8}" type="datetimeFigureOut">
               <a:rPr lang="en-GB" smtClean="0"/>
               <a:pPr/>
-              <a:t>11/08/2022</a:t>
+              <a:t>12/08/2022</a:t>
             </a:fld>
             <a:endParaRPr lang="en-GB" dirty="0"/>
           </a:p>
@@ -560,7 +560,7 @@
           <a:p>
             <a:fld id="{DE72BEAC-A25F-4480-8AFC-1D3E290F2CC8}" type="datetimeFigureOut">
               <a:rPr lang="en-GB" smtClean="0"/>
-              <a:t>11/08/2022</a:t>
+              <a:t>12/08/2022</a:t>
             </a:fld>
             <a:endParaRPr lang="en-GB" dirty="0"/>
           </a:p>
@@ -770,7 +770,7 @@
           <a:p>
             <a:fld id="{DE72BEAC-A25F-4480-8AFC-1D3E290F2CC8}" type="datetimeFigureOut">
               <a:rPr lang="en-GB" smtClean="0"/>
-              <a:t>11/08/2022</a:t>
+              <a:t>12/08/2022</a:t>
             </a:fld>
             <a:endParaRPr lang="en-GB" dirty="0"/>
           </a:p>
@@ -970,7 +970,7 @@
           <a:p>
             <a:fld id="{DE72BEAC-A25F-4480-8AFC-1D3E290F2CC8}" type="datetimeFigureOut">
               <a:rPr lang="en-GB" smtClean="0"/>
-              <a:t>11/08/2022</a:t>
+              <a:t>12/08/2022</a:t>
             </a:fld>
             <a:endParaRPr lang="en-GB" dirty="0"/>
           </a:p>
@@ -1246,7 +1246,7 @@
           <a:p>
             <a:fld id="{DE72BEAC-A25F-4480-8AFC-1D3E290F2CC8}" type="datetimeFigureOut">
               <a:rPr lang="en-GB" smtClean="0"/>
-              <a:t>11/08/2022</a:t>
+              <a:t>12/08/2022</a:t>
             </a:fld>
             <a:endParaRPr lang="en-GB" dirty="0"/>
           </a:p>
@@ -1514,7 +1514,7 @@
           <a:p>
             <a:fld id="{DE72BEAC-A25F-4480-8AFC-1D3E290F2CC8}" type="datetimeFigureOut">
               <a:rPr lang="en-GB" smtClean="0"/>
-              <a:t>11/08/2022</a:t>
+              <a:t>12/08/2022</a:t>
             </a:fld>
             <a:endParaRPr lang="en-GB" dirty="0"/>
           </a:p>
@@ -1929,7 +1929,7 @@
           <a:p>
             <a:fld id="{DE72BEAC-A25F-4480-8AFC-1D3E290F2CC8}" type="datetimeFigureOut">
               <a:rPr lang="en-GB" smtClean="0"/>
-              <a:t>11/08/2022</a:t>
+              <a:t>12/08/2022</a:t>
             </a:fld>
             <a:endParaRPr lang="en-GB" dirty="0"/>
           </a:p>
@@ -2071,7 +2071,7 @@
           <a:p>
             <a:fld id="{DE72BEAC-A25F-4480-8AFC-1D3E290F2CC8}" type="datetimeFigureOut">
               <a:rPr lang="en-GB" smtClean="0"/>
-              <a:t>11/08/2022</a:t>
+              <a:t>12/08/2022</a:t>
             </a:fld>
             <a:endParaRPr lang="en-GB" dirty="0"/>
           </a:p>
@@ -2184,7 +2184,7 @@
           <a:p>
             <a:fld id="{DE72BEAC-A25F-4480-8AFC-1D3E290F2CC8}" type="datetimeFigureOut">
               <a:rPr lang="en-GB" smtClean="0"/>
-              <a:t>11/08/2022</a:t>
+              <a:t>12/08/2022</a:t>
             </a:fld>
             <a:endParaRPr lang="en-GB" dirty="0"/>
           </a:p>
@@ -2497,7 +2497,7 @@
           <a:p>
             <a:fld id="{DE72BEAC-A25F-4480-8AFC-1D3E290F2CC8}" type="datetimeFigureOut">
               <a:rPr lang="en-GB" smtClean="0"/>
-              <a:t>11/08/2022</a:t>
+              <a:t>12/08/2022</a:t>
             </a:fld>
             <a:endParaRPr lang="en-GB" dirty="0"/>
           </a:p>
@@ -2786,7 +2786,7 @@
           <a:p>
             <a:fld id="{DE72BEAC-A25F-4480-8AFC-1D3E290F2CC8}" type="datetimeFigureOut">
               <a:rPr lang="en-GB" smtClean="0"/>
-              <a:t>11/08/2022</a:t>
+              <a:t>12/08/2022</a:t>
             </a:fld>
             <a:endParaRPr lang="en-GB" dirty="0"/>
           </a:p>
@@ -3028,7 +3028,7 @@
             <a:fld id="{DE72BEAC-A25F-4480-8AFC-1D3E290F2CC8}" type="datetimeFigureOut">
               <a:rPr lang="en-GB" smtClean="0"/>
               <a:pPr/>
-              <a:t>11/08/2022</a:t>
+              <a:t>12/08/2022</a:t>
             </a:fld>
             <a:endParaRPr lang="en-GB" dirty="0"/>
           </a:p>
@@ -4166,7 +4166,7 @@
                 <a:hlinkClick r:id="rId6">
                   <a:extLst>
                     <a:ext uri="{A12FA001-AC4F-418D-AE19-62706E023703}">
-                      <ahyp:hlinkClr xmlns:ahyp="http://schemas.microsoft.com/office/drawing/2018/hyperlinkcolor" xmlns="" val="tx"/>
+                      <ahyp:hlinkClr xmlns="" xmlns:ahyp="http://schemas.microsoft.com/office/drawing/2018/hyperlinkcolor" val="tx"/>
                     </a:ext>
                   </a:extLst>
                 </a:hlinkClick>
@@ -4189,7 +4189,7 @@
                 <a:hlinkClick r:id="rId7">
                   <a:extLst>
                     <a:ext uri="{A12FA001-AC4F-418D-AE19-62706E023703}">
-                      <ahyp:hlinkClr xmlns:ahyp="http://schemas.microsoft.com/office/drawing/2018/hyperlinkcolor" xmlns="" val="tx"/>
+                      <ahyp:hlinkClr xmlns="" xmlns:ahyp="http://schemas.microsoft.com/office/drawing/2018/hyperlinkcolor" val="tx"/>
                     </a:ext>
                   </a:extLst>
                 </a:hlinkClick>
@@ -4212,7 +4212,7 @@
                 <a:hlinkClick r:id="rId8">
                   <a:extLst>
                     <a:ext uri="{A12FA001-AC4F-418D-AE19-62706E023703}">
-                      <ahyp:hlinkClr xmlns:ahyp="http://schemas.microsoft.com/office/drawing/2018/hyperlinkcolor" xmlns="" val="tx"/>
+                      <ahyp:hlinkClr xmlns="" xmlns:ahyp="http://schemas.microsoft.com/office/drawing/2018/hyperlinkcolor" val="tx"/>
                     </a:ext>
                   </a:extLst>
                 </a:hlinkClick>
@@ -4783,7 +4783,7 @@
                 <a14:useLocalDpi xmlns:a14="http://schemas.microsoft.com/office/drawing/2010/main" val="0"/>
               </a:ext>
               <a:ext uri="{96DAC541-7B7A-43D3-8B79-37D633B846F1}">
-                <asvg:svgBlip xmlns:asvg="http://schemas.microsoft.com/office/drawing/2016/SVG/main" xmlns="" r:embed="rId3"/>
+                <asvg:svgBlip xmlns="" xmlns:asvg="http://schemas.microsoft.com/office/drawing/2016/SVG/main" r:embed="rId3"/>
               </a:ext>
             </a:extLst>
           </a:blip>
@@ -5014,7 +5014,7 @@
                 <a14:useLocalDpi xmlns:a14="http://schemas.microsoft.com/office/drawing/2010/main" val="0"/>
               </a:ext>
               <a:ext uri="{96DAC541-7B7A-43D3-8B79-37D633B846F1}">
-                <asvg:svgBlip xmlns:asvg="http://schemas.microsoft.com/office/drawing/2016/SVG/main" xmlns="" r:embed="rId7"/>
+                <asvg:svgBlip xmlns="" xmlns:asvg="http://schemas.microsoft.com/office/drawing/2016/SVG/main" r:embed="rId7"/>
               </a:ext>
             </a:extLst>
           </a:blip>
@@ -5539,7 +5539,7 @@
                 <a16:creationId xmlns:a16="http://schemas.microsoft.com/office/drawing/2014/main" id="{91F32EBA-ED97-466E-8CFA-8382584155D0}"/>
               </a:ext>
               <a:ext uri="{C183D7F6-B498-43B3-948B-1728B52AA6E4}">
-                <adec:decorative xmlns:adec="http://schemas.microsoft.com/office/drawing/2017/decorative" xmlns="" val="1"/>
+                <adec:decorative xmlns="" xmlns:adec="http://schemas.microsoft.com/office/drawing/2017/decorative" val="1"/>
               </a:ext>
             </a:extLst>
           </p:cNvPr>
@@ -5672,7 +5672,7 @@
                 <a16:creationId xmlns:a16="http://schemas.microsoft.com/office/drawing/2014/main" id="{62A38935-BB53-4DF7-A56E-48DD25B685D7}"/>
               </a:ext>
               <a:ext uri="{C183D7F6-B498-43B3-948B-1728B52AA6E4}">
-                <adec:decorative xmlns:adec="http://schemas.microsoft.com/office/drawing/2017/decorative" xmlns="" val="1"/>
+                <adec:decorative xmlns="" xmlns:adec="http://schemas.microsoft.com/office/drawing/2017/decorative" val="1"/>
               </a:ext>
             </a:extLst>
           </p:cNvPr>
@@ -6459,7 +6459,7 @@
                 <a14:useLocalDpi xmlns:a14="http://schemas.microsoft.com/office/drawing/2010/main" val="0"/>
               </a:ext>
               <a:ext uri="{96DAC541-7B7A-43D3-8B79-37D633B846F1}">
-                <asvg:svgBlip xmlns:asvg="http://schemas.microsoft.com/office/drawing/2016/SVG/main" xmlns="" r:embed="rId3"/>
+                <asvg:svgBlip xmlns="" xmlns:asvg="http://schemas.microsoft.com/office/drawing/2016/SVG/main" r:embed="rId3"/>
               </a:ext>
             </a:extLst>
           </a:blip>
@@ -6550,7 +6550,7 @@
         <p:spPr/>
         <p:txBody>
           <a:bodyPr>
-            <a:normAutofit fontScale="92500" lnSpcReduction="20000"/>
+            <a:normAutofit fontScale="92500" lnSpcReduction="10000"/>
           </a:bodyPr>
           <a:lstStyle/>
           <a:p>
@@ -6563,11 +6563,7 @@
             </a:br>
             <a:r>
               <a:rPr lang="en-GB"/>
-              <a:t>https</a:t>
-            </a:r>
-            <a:r>
-              <a:rPr lang="en-GB"/>
-              <a:t>://</a:t>
+              <a:t>https://</a:t>
             </a:r>
             <a:r>
               <a:rPr lang="en-GB" smtClean="0"/>
@@ -6581,27 +6577,52 @@
           <a:p>
             <a:r>
               <a:rPr lang="en-GB" smtClean="0"/>
-              <a:t>Histology image - Elizabeth </a:t>
+              <a:t>Lab microscope photo </a:t>
+            </a:r>
+            <a:r>
+              <a:rPr lang="en-GB" smtClean="0"/>
+              <a:t>image </a:t>
             </a:r>
             <a:r>
               <a:rPr lang="en-GB"/>
-              <a:t>Graham; Julie Moss; Nick Burton; Yogmatee Roochun; Chris Armit; Lorna Richardson; Richard Baldock. (2015). eHistology Kaufman Atlas Plate 04 image l, [image]. University of Edinburgh. College of Medicine and Veterinary Medicine. https://doi.org/10.7488/ds/423.</a:t>
-            </a:r>
-          </a:p>
-          <a:p>
-            <a:pPr marL="0" indent="0">
-              <a:buNone/>
-            </a:pPr>
+              <a:t>- CSIRO, CC </a:t>
+            </a:r>
+            <a:r>
+              <a:rPr lang="en-GB"/>
+              <a:t>BY </a:t>
+            </a:r>
+            <a:r>
+              <a:rPr lang="en-GB" smtClean="0"/>
+              <a:t>3.0, </a:t>
+            </a:r>
+            <a:r>
+              <a:rPr lang="en-GB"/>
+              <a:t>via </a:t>
+            </a:r>
+            <a:r>
+              <a:rPr lang="en-GB"/>
+              <a:t>Wikimedia </a:t>
+            </a:r>
+            <a:r>
+              <a:rPr lang="en-GB"/>
+              <a:t>Commons https</a:t>
+            </a:r>
+            <a:r>
+              <a:rPr lang="en-GB"/>
+              <a:t>://</a:t>
+            </a:r>
+            <a:r>
+              <a:rPr lang="en-GB" smtClean="0"/>
+              <a:t>commons.wikimedia.org/wiki/File:CSIRO_ScienceImage_435_Scientist_using_microscope.jpg </a:t>
+            </a:r>
+          </a:p>
+          <a:p>
             <a:endParaRPr lang="en-GB" smtClean="0"/>
           </a:p>
           <a:p>
             <a:r>
               <a:rPr lang="en-GB" smtClean="0"/>
-              <a:t>FAIR </a:t>
-            </a:r>
-            <a:r>
-              <a:rPr lang="en-GB" smtClean="0"/>
-              <a:t>logo - </a:t>
+              <a:t>FAIR logo - </a:t>
             </a:r>
             <a:r>
               <a:rPr lang="en-GB"/>
@@ -6611,20 +6632,12 @@
               <a:rPr lang="en-GB"/>
             </a:br>
             <a:r>
-              <a:rPr lang="en-GB">
-                <a:hlinkClick r:id="rId2"/>
-              </a:rPr>
+              <a:rPr lang="en-GB"/>
               <a:t>https://</a:t>
             </a:r>
             <a:r>
-              <a:rPr lang="en-GB" smtClean="0">
-                <a:hlinkClick r:id="rId2"/>
-              </a:rPr>
-              <a:t>upload.wikimedia.org/wikipedia/commons/thumb/a/aa/FAIR_data_principles.jpg/800px-FAIR_data_principles.jpg</a:t>
-            </a:r>
-            <a:r>
               <a:rPr lang="en-GB" smtClean="0"/>
-              <a:t> </a:t>
+              <a:t>upload.wikimedia.org/wikipedia/commons/thumb/a/aa/FAIR_data_principles.jpg/800px-FAIR_data_principles.jpg </a:t>
             </a:r>
             <a:endParaRPr lang="en-GB"/>
           </a:p>
@@ -6706,11 +6719,7 @@
             </a:pPr>
             <a:r>
               <a:rPr lang="en-GB"/>
-              <a:t>"Research </a:t>
-            </a:r>
-            <a:r>
-              <a:rPr lang="en-GB"/>
-              <a:t>data </a:t>
+              <a:t>"Research data </a:t>
             </a:r>
             <a:r>
               <a:rPr lang="en-GB" smtClean="0"/>
@@ -6718,11 +6727,7 @@
             </a:r>
             <a:r>
               <a:rPr lang="en-GB"/>
-              <a:t>collected, observed or generated for the purpose of analysis, to produce and validate original research results</a:t>
-            </a:r>
-            <a:r>
-              <a:rPr lang="en-GB"/>
-              <a:t>... </a:t>
+              <a:t>collected, observed or generated for the purpose of analysis, to produce and validate original research results... </a:t>
             </a:r>
             <a:r>
               <a:rPr lang="en-GB" smtClean="0"/>
@@ -6744,11 +6749,7 @@
             </a:r>
             <a:r>
               <a:rPr lang="en-GB"/>
-              <a:t>] whatever is necessary to verify or reproduce research findings, or to gain a richer understanding </a:t>
-            </a:r>
-            <a:r>
-              <a:rPr lang="en-GB"/>
-              <a:t>of </a:t>
+              <a:t>] whatever is necessary to verify or reproduce research findings, or to gain a richer understanding of </a:t>
             </a:r>
             <a:r>
               <a:rPr lang="en-GB" smtClean="0"/>
@@ -6772,11 +6773,7 @@
             </a:r>
             <a:r>
               <a:rPr lang="en-GB" sz="2000"/>
-              <a:t>Data MANTRA - Research data in context, University </a:t>
-            </a:r>
-            <a:r>
-              <a:rPr lang="en-GB" sz="2000"/>
-              <a:t>of </a:t>
+              <a:t>Data MANTRA - Research data in context, University of </a:t>
             </a:r>
             <a:r>
               <a:rPr lang="en-GB" sz="2000" smtClean="0"/>
@@ -6824,7 +6821,7 @@
                 <a16:creationId xmlns:a16="http://schemas.microsoft.com/office/drawing/2014/main" id="{C4E4288A-DFC8-40A2-90E5-70E851A933AD}"/>
               </a:ext>
               <a:ext uri="{C183D7F6-B498-43B3-948B-1728B52AA6E4}">
-                <adec:decorative xmlns:adec="http://schemas.microsoft.com/office/drawing/2017/decorative" xmlns="" val="1"/>
+                <adec:decorative xmlns="" xmlns:adec="http://schemas.microsoft.com/office/drawing/2017/decorative" val="1"/>
               </a:ext>
             </a:extLst>
           </p:cNvPr>
@@ -6932,7 +6929,7 @@
                 <a16:creationId xmlns:a16="http://schemas.microsoft.com/office/drawing/2014/main" id="{A94A2FC9-6D19-473C-B868-99FDB2044AA9}"/>
               </a:ext>
               <a:ext uri="{C183D7F6-B498-43B3-948B-1728B52AA6E4}">
-                <adec:decorative xmlns:adec="http://schemas.microsoft.com/office/drawing/2017/decorative" xmlns="" val="1"/>
+                <adec:decorative xmlns="" xmlns:adec="http://schemas.microsoft.com/office/drawing/2017/decorative" val="1"/>
               </a:ext>
             </a:extLst>
           </p:cNvPr>
@@ -7151,7 +7148,7 @@
                 <a14:useLocalDpi xmlns:a14="http://schemas.microsoft.com/office/drawing/2010/main" val="0"/>
               </a:ext>
               <a:ext uri="{96DAC541-7B7A-43D3-8B79-37D633B846F1}">
-                <asvg:svgBlip xmlns:asvg="http://schemas.microsoft.com/office/drawing/2016/SVG/main" xmlns="" r:embed="rId3"/>
+                <asvg:svgBlip xmlns="" xmlns:asvg="http://schemas.microsoft.com/office/drawing/2016/SVG/main" r:embed="rId3"/>
               </a:ext>
             </a:extLst>
           </a:blip>
@@ -7287,7 +7284,7 @@
                 <a16:creationId xmlns:a16="http://schemas.microsoft.com/office/drawing/2014/main" id="{8BED0409-854E-49C4-876E-A78C6D881BC8}"/>
               </a:ext>
               <a:ext uri="{C183D7F6-B498-43B3-948B-1728B52AA6E4}">
-                <adec:decorative xmlns:adec="http://schemas.microsoft.com/office/drawing/2017/decorative" xmlns="" val="1"/>
+                <adec:decorative xmlns="" xmlns:adec="http://schemas.microsoft.com/office/drawing/2017/decorative" val="1"/>
               </a:ext>
             </a:extLst>
           </p:cNvPr>
@@ -7932,7 +7929,7 @@
                 <a16:creationId xmlns:a16="http://schemas.microsoft.com/office/drawing/2014/main" id="{D4340B2E-01FD-4F5D-9C4D-AD3923AD20BA}"/>
               </a:ext>
               <a:ext uri="{C183D7F6-B498-43B3-948B-1728B52AA6E4}">
-                <adec:decorative xmlns:adec="http://schemas.microsoft.com/office/drawing/2017/decorative" xmlns="" val="1"/>
+                <adec:decorative xmlns="" xmlns:adec="http://schemas.microsoft.com/office/drawing/2017/decorative" val="1"/>
               </a:ext>
             </a:extLst>
           </p:cNvPr>
@@ -8151,7 +8148,7 @@
                 <a14:useLocalDpi xmlns:a14="http://schemas.microsoft.com/office/drawing/2010/main" val="0"/>
               </a:ext>
               <a:ext uri="{96DAC541-7B7A-43D3-8B79-37D633B846F1}">
-                <asvg:svgBlip xmlns:asvg="http://schemas.microsoft.com/office/drawing/2016/SVG/main" xmlns="" r:embed="rId5"/>
+                <asvg:svgBlip xmlns="" xmlns:asvg="http://schemas.microsoft.com/office/drawing/2016/SVG/main" r:embed="rId5"/>
               </a:ext>
             </a:extLst>
           </a:blip>
@@ -8190,7 +8187,7 @@
                 <a14:useLocalDpi xmlns:a14="http://schemas.microsoft.com/office/drawing/2010/main" val="0"/>
               </a:ext>
               <a:ext uri="{96DAC541-7B7A-43D3-8B79-37D633B846F1}">
-                <asvg:svgBlip xmlns:asvg="http://schemas.microsoft.com/office/drawing/2016/SVG/main" xmlns="" r:embed="rId7"/>
+                <asvg:svgBlip xmlns="" xmlns:asvg="http://schemas.microsoft.com/office/drawing/2016/SVG/main" r:embed="rId7"/>
               </a:ext>
             </a:extLst>
           </a:blip>
@@ -8316,9 +8313,39 @@
           </a:p>
         </p:txBody>
       </p:sp>
+      <p:sp>
+        <p:nvSpPr>
+          <p:cNvPr id="6" name="TextBox 5"/>
+          <p:cNvSpPr txBox="1"/>
+          <p:nvPr/>
+        </p:nvSpPr>
+        <p:spPr>
+          <a:xfrm>
+            <a:off x="1234911" y="6176963"/>
+            <a:ext cx="7390615" cy="338554"/>
+          </a:xfrm>
+          <a:prstGeom prst="rect">
+            <a:avLst/>
+          </a:prstGeom>
+          <a:noFill/>
+        </p:spPr>
+        <p:txBody>
+          <a:bodyPr wrap="square" rtlCol="0">
+            <a:spAutoFit/>
+          </a:bodyPr>
+          <a:lstStyle/>
+          <a:p>
+            <a:r>
+              <a:rPr lang="en-GB" sz="1600" smtClean="0"/>
+              <a:t>Image: CSIRO</a:t>
+            </a:r>
+            <a:endParaRPr lang="en-GB" sz="1600"/>
+          </a:p>
+        </p:txBody>
+      </p:sp>
       <p:pic>
         <p:nvPicPr>
-          <p:cNvPr id="5" name="Picture 4"/>
+          <p:cNvPr id="7" name="Picture 6"/>
           <p:cNvPicPr>
             <a:picLocks noChangeAspect="1"/>
           </p:cNvPicPr>
@@ -8332,44 +8359,14 @@
         </p:blipFill>
         <p:spPr>
           <a:xfrm>
-            <a:off x="3355158" y="2856322"/>
-            <a:ext cx="4106220" cy="3150145"/>
+            <a:off x="3525625" y="2320387"/>
+            <a:ext cx="3677760" cy="3605904"/>
           </a:xfrm>
           <a:prstGeom prst="rect">
             <a:avLst/>
           </a:prstGeom>
         </p:spPr>
       </p:pic>
-      <p:sp>
-        <p:nvSpPr>
-          <p:cNvPr id="6" name="TextBox 5"/>
-          <p:cNvSpPr txBox="1"/>
-          <p:nvPr/>
-        </p:nvSpPr>
-        <p:spPr>
-          <a:xfrm>
-            <a:off x="1234911" y="6176963"/>
-            <a:ext cx="7390615" cy="338554"/>
-          </a:xfrm>
-          <a:prstGeom prst="rect">
-            <a:avLst/>
-          </a:prstGeom>
-          <a:noFill/>
-        </p:spPr>
-        <p:txBody>
-          <a:bodyPr wrap="square" rtlCol="0">
-            <a:spAutoFit/>
-          </a:bodyPr>
-          <a:lstStyle/>
-          <a:p>
-            <a:r>
-              <a:rPr lang="en-GB" sz="1600" smtClean="0"/>
-              <a:t>Image: Graham et al, (2015) DataShare </a:t>
-            </a:r>
-            <a:endParaRPr lang="en-GB" sz="1600"/>
-          </a:p>
-        </p:txBody>
-      </p:sp>
     </p:spTree>
     <p:extLst>
       <p:ext uri="{BB962C8B-B14F-4D97-AF65-F5344CB8AC3E}">
@@ -8429,8 +8426,12 @@
           <a:lstStyle/>
           <a:p>
             <a:r>
+              <a:rPr lang="en-GB" smtClean="0"/>
+              <a:t>Exercise 1a: Impossible </a:t>
+            </a:r>
+            <a:r>
               <a:rPr lang="en-GB" dirty="0"/>
-              <a:t>Impossible protocol</a:t>
+              <a:t>protocol</a:t>
             </a:r>
           </a:p>
         </p:txBody>
@@ -8529,8 +8530,8 @@
           <a:lstStyle/>
           <a:p>
             <a:r>
-              <a:rPr lang="en-GB" dirty="0"/>
-              <a:t>Impossible </a:t>
+              <a:rPr lang="en-GB" smtClean="0"/>
+              <a:t>Exercise 1b: Impossible </a:t>
             </a:r>
             <a:r>
               <a:rPr lang="en-GB" dirty="0" smtClean="0"/>

</xml_diff>

<commit_message>
combined two slides on what is data
</commit_message>
<xml_diff>
--- a/instructors/02-Being_FAIR.pptx
+++ b/instructors/02-Being_FAIR.pptx
@@ -4166,7 +4166,7 @@
                 <a:hlinkClick r:id="rId6">
                   <a:extLst>
                     <a:ext uri="{A12FA001-AC4F-418D-AE19-62706E023703}">
-                      <ahyp:hlinkClr xmlns="" xmlns:ahyp="http://schemas.microsoft.com/office/drawing/2018/hyperlinkcolor" val="tx"/>
+                      <ahyp:hlinkClr xmlns:ahyp="http://schemas.microsoft.com/office/drawing/2018/hyperlinkcolor" xmlns="" val="tx"/>
                     </a:ext>
                   </a:extLst>
                 </a:hlinkClick>
@@ -4189,7 +4189,7 @@
                 <a:hlinkClick r:id="rId7">
                   <a:extLst>
                     <a:ext uri="{A12FA001-AC4F-418D-AE19-62706E023703}">
-                      <ahyp:hlinkClr xmlns="" xmlns:ahyp="http://schemas.microsoft.com/office/drawing/2018/hyperlinkcolor" val="tx"/>
+                      <ahyp:hlinkClr xmlns:ahyp="http://schemas.microsoft.com/office/drawing/2018/hyperlinkcolor" xmlns="" val="tx"/>
                     </a:ext>
                   </a:extLst>
                 </a:hlinkClick>
@@ -4212,7 +4212,7 @@
                 <a:hlinkClick r:id="rId8">
                   <a:extLst>
                     <a:ext uri="{A12FA001-AC4F-418D-AE19-62706E023703}">
-                      <ahyp:hlinkClr xmlns="" xmlns:ahyp="http://schemas.microsoft.com/office/drawing/2018/hyperlinkcolor" val="tx"/>
+                      <ahyp:hlinkClr xmlns:ahyp="http://schemas.microsoft.com/office/drawing/2018/hyperlinkcolor" xmlns="" val="tx"/>
                     </a:ext>
                   </a:extLst>
                 </a:hlinkClick>
@@ -4783,7 +4783,7 @@
                 <a14:useLocalDpi xmlns:a14="http://schemas.microsoft.com/office/drawing/2010/main" val="0"/>
               </a:ext>
               <a:ext uri="{96DAC541-7B7A-43D3-8B79-37D633B846F1}">
-                <asvg:svgBlip xmlns="" xmlns:asvg="http://schemas.microsoft.com/office/drawing/2016/SVG/main" r:embed="rId3"/>
+                <asvg:svgBlip xmlns:asvg="http://schemas.microsoft.com/office/drawing/2016/SVG/main" xmlns="" r:embed="rId3"/>
               </a:ext>
             </a:extLst>
           </a:blip>
@@ -5014,7 +5014,7 @@
                 <a14:useLocalDpi xmlns:a14="http://schemas.microsoft.com/office/drawing/2010/main" val="0"/>
               </a:ext>
               <a:ext uri="{96DAC541-7B7A-43D3-8B79-37D633B846F1}">
-                <asvg:svgBlip xmlns="" xmlns:asvg="http://schemas.microsoft.com/office/drawing/2016/SVG/main" r:embed="rId7"/>
+                <asvg:svgBlip xmlns:asvg="http://schemas.microsoft.com/office/drawing/2016/SVG/main" xmlns="" r:embed="rId7"/>
               </a:ext>
             </a:extLst>
           </a:blip>
@@ -5330,7 +5330,7 @@
         <p:spPr>
           <a:xfrm>
             <a:off x="54592" y="6465579"/>
-            <a:ext cx="1535357" cy="307777"/>
+            <a:ext cx="1775807" cy="307777"/>
           </a:xfrm>
           <a:prstGeom prst="rect">
             <a:avLst/>
@@ -5349,7 +5349,11 @@
             </a:r>
             <a:r>
               <a:rPr lang="en-GB" sz="1400" smtClean="0"/>
-              <a:t>See Credits</a:t>
+              <a:t>See </a:t>
+            </a:r>
+            <a:r>
+              <a:rPr lang="en-GB" sz="1400" smtClean="0"/>
+              <a:t>Credits [3]</a:t>
             </a:r>
             <a:endParaRPr lang="en-GB" sz="1400" dirty="0"/>
           </a:p>
@@ -5539,7 +5543,7 @@
                 <a16:creationId xmlns:a16="http://schemas.microsoft.com/office/drawing/2014/main" id="{91F32EBA-ED97-466E-8CFA-8382584155D0}"/>
               </a:ext>
               <a:ext uri="{C183D7F6-B498-43B3-948B-1728B52AA6E4}">
-                <adec:decorative xmlns="" xmlns:adec="http://schemas.microsoft.com/office/drawing/2017/decorative" val="1"/>
+                <adec:decorative xmlns:adec="http://schemas.microsoft.com/office/drawing/2017/decorative" xmlns="" val="1"/>
               </a:ext>
             </a:extLst>
           </p:cNvPr>
@@ -5672,7 +5676,7 @@
                 <a16:creationId xmlns:a16="http://schemas.microsoft.com/office/drawing/2014/main" id="{62A38935-BB53-4DF7-A56E-48DD25B685D7}"/>
               </a:ext>
               <a:ext uri="{C183D7F6-B498-43B3-948B-1728B52AA6E4}">
-                <adec:decorative xmlns="" xmlns:adec="http://schemas.microsoft.com/office/drawing/2017/decorative" val="1"/>
+                <adec:decorative xmlns:adec="http://schemas.microsoft.com/office/drawing/2017/decorative" xmlns="" val="1"/>
               </a:ext>
             </a:extLst>
           </p:cNvPr>
@@ -6459,7 +6463,7 @@
                 <a14:useLocalDpi xmlns:a14="http://schemas.microsoft.com/office/drawing/2010/main" val="0"/>
               </a:ext>
               <a:ext uri="{96DAC541-7B7A-43D3-8B79-37D633B846F1}">
-                <asvg:svgBlip xmlns="" xmlns:asvg="http://schemas.microsoft.com/office/drawing/2016/SVG/main" r:embed="rId3"/>
+                <asvg:svgBlip xmlns:asvg="http://schemas.microsoft.com/office/drawing/2016/SVG/main" xmlns="" r:embed="rId3"/>
               </a:ext>
             </a:extLst>
           </a:blip>
@@ -6554,9 +6558,29 @@
           </a:bodyPr>
           <a:lstStyle/>
           <a:p>
+            <a:pPr marL="514350" indent="-514350">
+              <a:buFont typeface="+mj-lt"/>
+              <a:buAutoNum type="arabicPeriod"/>
+            </a:pPr>
             <a:r>
               <a:rPr lang="en-GB" smtClean="0"/>
-              <a:t>Research data MANTRA ('Research Data Management training'), University of Edinburgh </a:t>
+              <a:t>Research data </a:t>
+            </a:r>
+            <a:r>
+              <a:rPr lang="en-GB" smtClean="0"/>
+              <a:t>MANTRA </a:t>
+            </a:r>
+            <a:r>
+              <a:rPr lang="en-GB" smtClean="0"/>
+              <a:t>('Research Data Management training</a:t>
+            </a:r>
+            <a:r>
+              <a:rPr lang="en-GB" smtClean="0"/>
+              <a:t>') – Research data in context, </a:t>
+            </a:r>
+            <a:r>
+              <a:rPr lang="en-GB" smtClean="0"/>
+              <a:t>University of Edinburgh </a:t>
             </a:r>
             <a:br>
               <a:rPr lang="en-GB" smtClean="0"/>
@@ -6575,21 +6599,17 @@
             <a:endParaRPr lang="en-GB" smtClean="0"/>
           </a:p>
           <a:p>
+            <a:pPr marL="514350" indent="-514350">
+              <a:buFont typeface="+mj-lt"/>
+              <a:buAutoNum type="arabicPeriod"/>
+            </a:pPr>
             <a:r>
               <a:rPr lang="en-GB" smtClean="0"/>
-              <a:t>Lab microscope photo </a:t>
-            </a:r>
-            <a:r>
-              <a:rPr lang="en-GB" smtClean="0"/>
-              <a:t>image </a:t>
+              <a:t>Lab microscope photo image </a:t>
             </a:r>
             <a:r>
               <a:rPr lang="en-GB"/>
-              <a:t>- CSIRO, CC </a:t>
-            </a:r>
-            <a:r>
-              <a:rPr lang="en-GB"/>
-              <a:t>BY </a:t>
+              <a:t>- CSIRO, CC BY </a:t>
             </a:r>
             <a:r>
               <a:rPr lang="en-GB" smtClean="0"/>
@@ -6597,19 +6617,7 @@
             </a:r>
             <a:r>
               <a:rPr lang="en-GB"/>
-              <a:t>via </a:t>
-            </a:r>
-            <a:r>
-              <a:rPr lang="en-GB"/>
-              <a:t>Wikimedia </a:t>
-            </a:r>
-            <a:r>
-              <a:rPr lang="en-GB"/>
-              <a:t>Commons https</a:t>
-            </a:r>
-            <a:r>
-              <a:rPr lang="en-GB"/>
-              <a:t>://</a:t>
+              <a:t>via Wikimedia Commons https://</a:t>
             </a:r>
             <a:r>
               <a:rPr lang="en-GB" smtClean="0"/>
@@ -6617,9 +6625,17 @@
             </a:r>
           </a:p>
           <a:p>
+            <a:pPr marL="514350" indent="-514350">
+              <a:buFont typeface="+mj-lt"/>
+              <a:buAutoNum type="arabicPeriod"/>
+            </a:pPr>
             <a:endParaRPr lang="en-GB" smtClean="0"/>
           </a:p>
           <a:p>
+            <a:pPr marL="514350" indent="-514350">
+              <a:buFont typeface="+mj-lt"/>
+              <a:buAutoNum type="arabicPeriod"/>
+            </a:pPr>
             <a:r>
               <a:rPr lang="en-GB" smtClean="0"/>
               <a:t>FAIR logo - </a:t>
@@ -6821,7 +6837,7 @@
                 <a16:creationId xmlns:a16="http://schemas.microsoft.com/office/drawing/2014/main" id="{C4E4288A-DFC8-40A2-90E5-70E851A933AD}"/>
               </a:ext>
               <a:ext uri="{C183D7F6-B498-43B3-948B-1728B52AA6E4}">
-                <adec:decorative xmlns="" xmlns:adec="http://schemas.microsoft.com/office/drawing/2017/decorative" val="1"/>
+                <adec:decorative xmlns:adec="http://schemas.microsoft.com/office/drawing/2017/decorative" xmlns="" val="1"/>
               </a:ext>
             </a:extLst>
           </p:cNvPr>
@@ -6891,7 +6907,7 @@
         </p:nvSpPr>
         <p:spPr>
           <a:xfrm>
-            <a:off x="991694" y="435547"/>
+            <a:off x="391093" y="435547"/>
             <a:ext cx="5613822" cy="832285"/>
           </a:xfrm>
         </p:spPr>
@@ -6929,7 +6945,7 @@
                 <a16:creationId xmlns:a16="http://schemas.microsoft.com/office/drawing/2014/main" id="{A94A2FC9-6D19-473C-B868-99FDB2044AA9}"/>
               </a:ext>
               <a:ext uri="{C183D7F6-B498-43B3-948B-1728B52AA6E4}">
-                <adec:decorative xmlns="" xmlns:adec="http://schemas.microsoft.com/office/drawing/2017/decorative" val="1"/>
+                <adec:decorative xmlns:adec="http://schemas.microsoft.com/office/drawing/2017/decorative" xmlns="" val="1"/>
               </a:ext>
             </a:extLst>
           </p:cNvPr>
@@ -7148,7 +7164,7 @@
                 <a14:useLocalDpi xmlns:a14="http://schemas.microsoft.com/office/drawing/2010/main" val="0"/>
               </a:ext>
               <a:ext uri="{96DAC541-7B7A-43D3-8B79-37D633B846F1}">
-                <asvg:svgBlip xmlns="" xmlns:asvg="http://schemas.microsoft.com/office/drawing/2016/SVG/main" r:embed="rId3"/>
+                <asvg:svgBlip xmlns:asvg="http://schemas.microsoft.com/office/drawing/2016/SVG/main" xmlns="" r:embed="rId3"/>
               </a:ext>
             </a:extLst>
           </a:blip>
@@ -7184,95 +7200,190 @@
         </p:nvSpPr>
         <p:spPr>
           <a:xfrm>
-            <a:off x="991693" y="1267832"/>
-            <a:ext cx="5258180" cy="4584961"/>
+            <a:off x="408069" y="1261964"/>
+            <a:ext cx="6860894" cy="1561628"/>
           </a:xfrm>
+          <a:solidFill>
+            <a:schemeClr val="accent1">
+              <a:lumMod val="75000"/>
+            </a:schemeClr>
+          </a:solidFill>
+          <a:scene3d>
+            <a:camera prst="orthographicFront"/>
+            <a:lightRig rig="threePt" dir="t"/>
+          </a:scene3d>
+          <a:sp3d prstMaterial="metal">
+            <a:bevelT prst="angle"/>
+          </a:sp3d>
         </p:spPr>
+        <p:style>
+          <a:lnRef idx="3">
+            <a:schemeClr val="lt1"/>
+          </a:lnRef>
+          <a:fillRef idx="1">
+            <a:schemeClr val="accent5"/>
+          </a:fillRef>
+          <a:effectRef idx="1">
+            <a:schemeClr val="accent5"/>
+          </a:effectRef>
+          <a:fontRef idx="minor">
+            <a:schemeClr val="lt1"/>
+          </a:fontRef>
+        </p:style>
         <p:txBody>
           <a:bodyPr anchor="t">
-            <a:normAutofit fontScale="85000" lnSpcReduction="20000"/>
+            <a:noAutofit/>
           </a:bodyPr>
           <a:lstStyle/>
           <a:p>
             <a:pPr marL="0" indent="0">
-              <a:lnSpc>
-                <a:spcPct val="120000"/>
-              </a:lnSpc>
               <a:buNone/>
             </a:pPr>
             <a:r>
-              <a:rPr lang="en-GB" sz="2400" dirty="0"/>
-              <a:t>Data does not only mean Excel files with recorded measurements from a machine. </a:t>
-            </a:r>
-          </a:p>
-          <a:p>
-            <a:pPr marL="0" indent="0">
-              <a:lnSpc>
-                <a:spcPct val="120000"/>
-              </a:lnSpc>
+              <a:rPr lang="en-GB" sz="2000">
+                <a:solidFill>
+                  <a:schemeClr val="accent1">
+                    <a:lumMod val="40000"/>
+                    <a:lumOff val="60000"/>
+                  </a:schemeClr>
+                </a:solidFill>
+              </a:rPr>
+              <a:t>"Research data [is] collected, observed or generated for the purpose of analysis, to produce and validate original </a:t>
+            </a:r>
+            <a:r>
+              <a:rPr lang="en-GB" sz="2000">
+                <a:solidFill>
+                  <a:schemeClr val="accent1">
+                    <a:lumMod val="40000"/>
+                    <a:lumOff val="60000"/>
+                  </a:schemeClr>
+                </a:solidFill>
+              </a:rPr>
+              <a:t>research </a:t>
+            </a:r>
+            <a:r>
+              <a:rPr lang="en-GB" sz="2000" smtClean="0">
+                <a:solidFill>
+                  <a:schemeClr val="accent1">
+                    <a:lumMod val="40000"/>
+                    <a:lumOff val="60000"/>
+                  </a:schemeClr>
+                </a:solidFill>
+              </a:rPr>
+              <a:t>results</a:t>
+            </a:r>
+            <a:r>
+              <a:rPr lang="en-GB" sz="2000">
+                <a:solidFill>
+                  <a:schemeClr val="accent1">
+                    <a:lumMod val="40000"/>
+                    <a:lumOff val="60000"/>
+                  </a:schemeClr>
+                </a:solidFill>
+              </a:rPr>
+              <a:t> </a:t>
+            </a:r>
+            <a:r>
+              <a:rPr lang="en-GB" sz="2000" smtClean="0">
+                <a:solidFill>
+                  <a:schemeClr val="accent1">
+                    <a:lumMod val="40000"/>
+                    <a:lumOff val="60000"/>
+                  </a:schemeClr>
+                </a:solidFill>
+              </a:rPr>
+              <a:t>[.. </a:t>
+            </a:r>
+            <a:r>
+              <a:rPr lang="en-GB" sz="2000">
+                <a:solidFill>
+                  <a:schemeClr val="accent1">
+                    <a:lumMod val="40000"/>
+                    <a:lumOff val="60000"/>
+                  </a:schemeClr>
+                </a:solidFill>
+              </a:rPr>
+              <a:t>ie] whatever is necessary to verify or reproduce research findings, or to gain a richer understanding of them"</a:t>
+            </a:r>
+          </a:p>
+          <a:p>
+            <a:pPr marL="457200" lvl="1" indent="0" algn="ctr">
               <a:buNone/>
             </a:pPr>
             <a:r>
-              <a:rPr lang="en-GB" sz="3000" b="1" dirty="0"/>
-              <a:t>Data also includes:</a:t>
-            </a:r>
-          </a:p>
-          <a:p>
-            <a:pPr>
-              <a:lnSpc>
-                <a:spcPct val="120000"/>
-              </a:lnSpc>
-            </a:pPr>
-            <a:r>
-              <a:rPr lang="en-GB" sz="2400" dirty="0"/>
-              <a:t>images, not only from microscopes</a:t>
-            </a:r>
-          </a:p>
-          <a:p>
-            <a:pPr>
-              <a:lnSpc>
-                <a:spcPct val="120000"/>
-              </a:lnSpc>
-            </a:pPr>
-            <a:r>
-              <a:rPr lang="en-GB" sz="2400" dirty="0"/>
-              <a:t>information about biological materials, like strain or patient details</a:t>
-            </a:r>
-          </a:p>
-          <a:p>
-            <a:pPr>
-              <a:lnSpc>
-                <a:spcPct val="120000"/>
-              </a:lnSpc>
-            </a:pPr>
-            <a:r>
-              <a:rPr lang="en-GB" sz="2400" dirty="0"/>
-              <a:t>recipes, laboratory and measurement protocols</a:t>
-            </a:r>
-            <a:endParaRPr lang="pl-PL" sz="2400" dirty="0"/>
-          </a:p>
-          <a:p>
-            <a:pPr>
-              <a:lnSpc>
-                <a:spcPct val="120000"/>
-              </a:lnSpc>
-            </a:pPr>
-            <a:r>
-              <a:rPr lang="pl-PL" sz="2400" smtClean="0"/>
-              <a:t>models</a:t>
-            </a:r>
-            <a:endParaRPr lang="en-GB" sz="2400" dirty="0"/>
-          </a:p>
-          <a:p>
-            <a:pPr>
-              <a:lnSpc>
-                <a:spcPct val="120000"/>
-              </a:lnSpc>
-            </a:pPr>
-            <a:r>
-              <a:rPr lang="en-GB" sz="2400" dirty="0"/>
-              <a:t>scripts, analysis procedures, and custom software are also considered data</a:t>
-            </a:r>
+              <a:rPr lang="en-GB" sz="1600" smtClean="0">
+                <a:solidFill>
+                  <a:schemeClr val="accent1">
+                    <a:lumMod val="40000"/>
+                    <a:lumOff val="60000"/>
+                  </a:schemeClr>
+                </a:solidFill>
+              </a:rPr>
+              <a:t>Research </a:t>
+            </a:r>
+            <a:r>
+              <a:rPr lang="en-GB" sz="1600">
+                <a:solidFill>
+                  <a:schemeClr val="accent1">
+                    <a:lumMod val="40000"/>
+                    <a:lumOff val="60000"/>
+                  </a:schemeClr>
+                </a:solidFill>
+              </a:rPr>
+              <a:t>Data </a:t>
+            </a:r>
+            <a:r>
+              <a:rPr lang="en-GB" sz="1600" smtClean="0">
+                <a:solidFill>
+                  <a:schemeClr val="accent1">
+                    <a:lumMod val="40000"/>
+                    <a:lumOff val="60000"/>
+                  </a:schemeClr>
+                </a:solidFill>
+              </a:rPr>
+              <a:t>MANTRA, </a:t>
+            </a:r>
+            <a:r>
+              <a:rPr lang="en-GB" sz="1600">
+                <a:solidFill>
+                  <a:schemeClr val="accent1">
+                    <a:lumMod val="40000"/>
+                    <a:lumOff val="60000"/>
+                  </a:schemeClr>
+                </a:solidFill>
+              </a:rPr>
+              <a:t>University </a:t>
+            </a:r>
+            <a:r>
+              <a:rPr lang="en-GB" sz="1600">
+                <a:solidFill>
+                  <a:schemeClr val="accent1">
+                    <a:lumMod val="40000"/>
+                    <a:lumOff val="60000"/>
+                  </a:schemeClr>
+                </a:solidFill>
+              </a:rPr>
+              <a:t>of </a:t>
+            </a:r>
+            <a:r>
+              <a:rPr lang="en-GB" sz="1600" smtClean="0">
+                <a:solidFill>
+                  <a:schemeClr val="accent1">
+                    <a:lumMod val="40000"/>
+                    <a:lumOff val="60000"/>
+                  </a:schemeClr>
+                </a:solidFill>
+              </a:rPr>
+              <a:t>Edinburgh </a:t>
+            </a:r>
+            <a:endParaRPr lang="en-GB" sz="1600" smtClean="0">
+              <a:solidFill>
+                <a:schemeClr val="accent1">
+                  <a:lumMod val="40000"/>
+                  <a:lumOff val="60000"/>
+                </a:schemeClr>
+              </a:solidFill>
+            </a:endParaRPr>
           </a:p>
         </p:txBody>
       </p:sp>
@@ -7284,7 +7395,7 @@
                 <a16:creationId xmlns:a16="http://schemas.microsoft.com/office/drawing/2014/main" id="{8BED0409-854E-49C4-876E-A78C6D881BC8}"/>
               </a:ext>
               <a:ext uri="{C183D7F6-B498-43B3-948B-1728B52AA6E4}">
-                <adec:decorative xmlns="" xmlns:adec="http://schemas.microsoft.com/office/drawing/2017/decorative" val="1"/>
+                <adec:decorative xmlns:adec="http://schemas.microsoft.com/office/drawing/2017/decorative" xmlns="" val="1"/>
               </a:ext>
             </a:extLst>
           </p:cNvPr>
@@ -7929,7 +8040,7 @@
                 <a16:creationId xmlns:a16="http://schemas.microsoft.com/office/drawing/2014/main" id="{D4340B2E-01FD-4F5D-9C4D-AD3923AD20BA}"/>
               </a:ext>
               <a:ext uri="{C183D7F6-B498-43B3-948B-1728B52AA6E4}">
-                <adec:decorative xmlns="" xmlns:adec="http://schemas.microsoft.com/office/drawing/2017/decorative" val="1"/>
+                <adec:decorative xmlns:adec="http://schemas.microsoft.com/office/drawing/2017/decorative" xmlns="" val="1"/>
               </a:ext>
             </a:extLst>
           </p:cNvPr>
@@ -8148,7 +8259,7 @@
                 <a14:useLocalDpi xmlns:a14="http://schemas.microsoft.com/office/drawing/2010/main" val="0"/>
               </a:ext>
               <a:ext uri="{96DAC541-7B7A-43D3-8B79-37D633B846F1}">
-                <asvg:svgBlip xmlns="" xmlns:asvg="http://schemas.microsoft.com/office/drawing/2016/SVG/main" r:embed="rId5"/>
+                <asvg:svgBlip xmlns:asvg="http://schemas.microsoft.com/office/drawing/2016/SVG/main" xmlns="" r:embed="rId5"/>
               </a:ext>
             </a:extLst>
           </a:blip>
@@ -8187,7 +8298,7 @@
                 <a14:useLocalDpi xmlns:a14="http://schemas.microsoft.com/office/drawing/2010/main" val="0"/>
               </a:ext>
               <a:ext uri="{96DAC541-7B7A-43D3-8B79-37D633B846F1}">
-                <asvg:svgBlip xmlns="" xmlns:asvg="http://schemas.microsoft.com/office/drawing/2016/SVG/main" r:embed="rId7"/>
+                <asvg:svgBlip xmlns:asvg="http://schemas.microsoft.com/office/drawing/2016/SVG/main" xmlns="" r:embed="rId7"/>
               </a:ext>
             </a:extLst>
           </a:blip>
@@ -8205,6 +8316,288 @@
           </a:prstGeom>
         </p:spPr>
       </p:pic>
+      <p:sp>
+        <p:nvSpPr>
+          <p:cNvPr id="11" name="Content Placeholder 2">
+            <a:extLst>
+              <a:ext uri="{FF2B5EF4-FFF2-40B4-BE49-F238E27FC236}">
+                <a16:creationId xmlns:a16="http://schemas.microsoft.com/office/drawing/2014/main" id="{81C9C253-9151-4F30-875B-B69CD1772575}"/>
+              </a:ext>
+            </a:extLst>
+          </p:cNvPr>
+          <p:cNvSpPr txBox="1">
+            <a:spLocks/>
+          </p:cNvSpPr>
+          <p:nvPr/>
+        </p:nvSpPr>
+        <p:spPr>
+          <a:xfrm>
+            <a:off x="408063" y="3063687"/>
+            <a:ext cx="8873778" cy="3337432"/>
+          </a:xfrm>
+          <a:prstGeom prst="rect">
+            <a:avLst/>
+          </a:prstGeom>
+        </p:spPr>
+        <p:txBody>
+          <a:bodyPr vert="horz" lIns="91440" tIns="45720" rIns="91440" bIns="45720" rtlCol="0" anchor="t">
+            <a:noAutofit/>
+          </a:bodyPr>
+          <a:lstStyle>
+            <a:lvl1pPr marL="228600" indent="-228600" algn="l" defTabSz="914400" rtl="0" eaLnBrk="1" latinLnBrk="0" hangingPunct="1">
+              <a:lnSpc>
+                <a:spcPct val="90000"/>
+              </a:lnSpc>
+              <a:spcBef>
+                <a:spcPts val="1000"/>
+              </a:spcBef>
+              <a:buFont typeface="Arial" panose="020B0604020202020204" pitchFamily="34" charset="0"/>
+              <a:buChar char="•"/>
+              <a:defRPr sz="2800" kern="1200">
+                <a:solidFill>
+                  <a:srgbClr val="0070C0"/>
+                </a:solidFill>
+                <a:latin typeface="+mn-lt"/>
+                <a:ea typeface="+mn-ea"/>
+                <a:cs typeface="+mn-cs"/>
+              </a:defRPr>
+            </a:lvl1pPr>
+            <a:lvl2pPr marL="685800" indent="-228600" algn="l" defTabSz="914400" rtl="0" eaLnBrk="1" latinLnBrk="0" hangingPunct="1">
+              <a:lnSpc>
+                <a:spcPct val="90000"/>
+              </a:lnSpc>
+              <a:spcBef>
+                <a:spcPts val="500"/>
+              </a:spcBef>
+              <a:buFont typeface="Arial" panose="020B0604020202020204" pitchFamily="34" charset="0"/>
+              <a:buChar char="•"/>
+              <a:defRPr sz="2400" kern="1200">
+                <a:solidFill>
+                  <a:srgbClr val="0070C0"/>
+                </a:solidFill>
+                <a:latin typeface="+mn-lt"/>
+                <a:ea typeface="+mn-ea"/>
+                <a:cs typeface="+mn-cs"/>
+              </a:defRPr>
+            </a:lvl2pPr>
+            <a:lvl3pPr marL="1143000" indent="-228600" algn="l" defTabSz="914400" rtl="0" eaLnBrk="1" latinLnBrk="0" hangingPunct="1">
+              <a:lnSpc>
+                <a:spcPct val="90000"/>
+              </a:lnSpc>
+              <a:spcBef>
+                <a:spcPts val="500"/>
+              </a:spcBef>
+              <a:buFont typeface="Arial" panose="020B0604020202020204" pitchFamily="34" charset="0"/>
+              <a:buChar char="•"/>
+              <a:defRPr sz="2000" kern="1200">
+                <a:solidFill>
+                  <a:srgbClr val="0070C0"/>
+                </a:solidFill>
+                <a:latin typeface="+mn-lt"/>
+                <a:ea typeface="+mn-ea"/>
+                <a:cs typeface="+mn-cs"/>
+              </a:defRPr>
+            </a:lvl3pPr>
+            <a:lvl4pPr marL="1600200" indent="-228600" algn="l" defTabSz="914400" rtl="0" eaLnBrk="1" latinLnBrk="0" hangingPunct="1">
+              <a:lnSpc>
+                <a:spcPct val="90000"/>
+              </a:lnSpc>
+              <a:spcBef>
+                <a:spcPts val="500"/>
+              </a:spcBef>
+              <a:buFont typeface="Arial" panose="020B0604020202020204" pitchFamily="34" charset="0"/>
+              <a:buChar char="•"/>
+              <a:defRPr sz="1800" kern="1200">
+                <a:solidFill>
+                  <a:srgbClr val="0070C0"/>
+                </a:solidFill>
+                <a:latin typeface="+mn-lt"/>
+                <a:ea typeface="+mn-ea"/>
+                <a:cs typeface="+mn-cs"/>
+              </a:defRPr>
+            </a:lvl4pPr>
+            <a:lvl5pPr marL="2057400" indent="-228600" algn="l" defTabSz="914400" rtl="0" eaLnBrk="1" latinLnBrk="0" hangingPunct="1">
+              <a:lnSpc>
+                <a:spcPct val="90000"/>
+              </a:lnSpc>
+              <a:spcBef>
+                <a:spcPts val="500"/>
+              </a:spcBef>
+              <a:buFont typeface="Arial" panose="020B0604020202020204" pitchFamily="34" charset="0"/>
+              <a:buChar char="•"/>
+              <a:defRPr sz="1800" kern="1200">
+                <a:solidFill>
+                  <a:srgbClr val="0070C0"/>
+                </a:solidFill>
+                <a:latin typeface="+mn-lt"/>
+                <a:ea typeface="+mn-ea"/>
+                <a:cs typeface="+mn-cs"/>
+              </a:defRPr>
+            </a:lvl5pPr>
+            <a:lvl6pPr marL="2514600" indent="-228600" algn="l" defTabSz="914400" rtl="0" eaLnBrk="1" latinLnBrk="0" hangingPunct="1">
+              <a:lnSpc>
+                <a:spcPct val="90000"/>
+              </a:lnSpc>
+              <a:spcBef>
+                <a:spcPts val="500"/>
+              </a:spcBef>
+              <a:buFont typeface="Arial" panose="020B0604020202020204" pitchFamily="34" charset="0"/>
+              <a:buChar char="•"/>
+              <a:defRPr sz="1800" kern="1200">
+                <a:solidFill>
+                  <a:schemeClr val="tx1"/>
+                </a:solidFill>
+                <a:latin typeface="+mn-lt"/>
+                <a:ea typeface="+mn-ea"/>
+                <a:cs typeface="+mn-cs"/>
+              </a:defRPr>
+            </a:lvl6pPr>
+            <a:lvl7pPr marL="2971800" indent="-228600" algn="l" defTabSz="914400" rtl="0" eaLnBrk="1" latinLnBrk="0" hangingPunct="1">
+              <a:lnSpc>
+                <a:spcPct val="90000"/>
+              </a:lnSpc>
+              <a:spcBef>
+                <a:spcPts val="500"/>
+              </a:spcBef>
+              <a:buFont typeface="Arial" panose="020B0604020202020204" pitchFamily="34" charset="0"/>
+              <a:buChar char="•"/>
+              <a:defRPr sz="1800" kern="1200">
+                <a:solidFill>
+                  <a:schemeClr val="tx1"/>
+                </a:solidFill>
+                <a:latin typeface="+mn-lt"/>
+                <a:ea typeface="+mn-ea"/>
+                <a:cs typeface="+mn-cs"/>
+              </a:defRPr>
+            </a:lvl7pPr>
+            <a:lvl8pPr marL="3429000" indent="-228600" algn="l" defTabSz="914400" rtl="0" eaLnBrk="1" latinLnBrk="0" hangingPunct="1">
+              <a:lnSpc>
+                <a:spcPct val="90000"/>
+              </a:lnSpc>
+              <a:spcBef>
+                <a:spcPts val="500"/>
+              </a:spcBef>
+              <a:buFont typeface="Arial" panose="020B0604020202020204" pitchFamily="34" charset="0"/>
+              <a:buChar char="•"/>
+              <a:defRPr sz="1800" kern="1200">
+                <a:solidFill>
+                  <a:schemeClr val="tx1"/>
+                </a:solidFill>
+                <a:latin typeface="+mn-lt"/>
+                <a:ea typeface="+mn-ea"/>
+                <a:cs typeface="+mn-cs"/>
+              </a:defRPr>
+            </a:lvl8pPr>
+            <a:lvl9pPr marL="3886200" indent="-228600" algn="l" defTabSz="914400" rtl="0" eaLnBrk="1" latinLnBrk="0" hangingPunct="1">
+              <a:lnSpc>
+                <a:spcPct val="90000"/>
+              </a:lnSpc>
+              <a:spcBef>
+                <a:spcPts val="500"/>
+              </a:spcBef>
+              <a:buFont typeface="Arial" panose="020B0604020202020204" pitchFamily="34" charset="0"/>
+              <a:buChar char="•"/>
+              <a:defRPr sz="1800" kern="1200">
+                <a:solidFill>
+                  <a:schemeClr val="tx1"/>
+                </a:solidFill>
+                <a:latin typeface="+mn-lt"/>
+                <a:ea typeface="+mn-ea"/>
+                <a:cs typeface="+mn-cs"/>
+              </a:defRPr>
+            </a:lvl9pPr>
+          </a:lstStyle>
+          <a:p>
+            <a:pPr marL="0" indent="0">
+              <a:lnSpc>
+                <a:spcPct val="120000"/>
+              </a:lnSpc>
+              <a:buFont typeface="Arial" panose="020B0604020202020204" pitchFamily="34" charset="0"/>
+              <a:buNone/>
+            </a:pPr>
+            <a:r>
+              <a:rPr lang="en-GB" sz="2000" smtClean="0"/>
+              <a:t>Data does not only mean Excel files or readings</a:t>
+            </a:r>
+            <a:br>
+              <a:rPr lang="en-GB" sz="2000" smtClean="0"/>
+            </a:br>
+            <a:r>
+              <a:rPr lang="en-GB" sz="2000" smtClean="0"/>
+              <a:t>from a machine. </a:t>
+            </a:r>
+            <a:r>
+              <a:rPr lang="en-GB" sz="2000" b="1" smtClean="0"/>
+              <a:t>Data also includes:</a:t>
+            </a:r>
+          </a:p>
+          <a:p>
+            <a:pPr>
+              <a:lnSpc>
+                <a:spcPct val="120000"/>
+              </a:lnSpc>
+            </a:pPr>
+            <a:r>
+              <a:rPr lang="en-GB" sz="2000" smtClean="0"/>
+              <a:t>images, not only from microscopes</a:t>
+            </a:r>
+          </a:p>
+          <a:p>
+            <a:pPr>
+              <a:lnSpc>
+                <a:spcPct val="120000"/>
+              </a:lnSpc>
+            </a:pPr>
+            <a:r>
+              <a:rPr lang="en-GB" sz="2000" smtClean="0"/>
+              <a:t>information about biological materials, </a:t>
+            </a:r>
+            <a:br>
+              <a:rPr lang="en-GB" sz="2000" smtClean="0"/>
+            </a:br>
+            <a:r>
+              <a:rPr lang="en-GB" sz="2000" smtClean="0"/>
+              <a:t>like strain or patient details</a:t>
+            </a:r>
+          </a:p>
+          <a:p>
+            <a:pPr>
+              <a:lnSpc>
+                <a:spcPct val="120000"/>
+              </a:lnSpc>
+            </a:pPr>
+            <a:r>
+              <a:rPr lang="en-GB" sz="2000" smtClean="0"/>
+              <a:t>recipes, laboratory and measurement protocols</a:t>
+            </a:r>
+            <a:endParaRPr lang="pl-PL" sz="2000" smtClean="0"/>
+          </a:p>
+          <a:p>
+            <a:pPr>
+              <a:lnSpc>
+                <a:spcPct val="120000"/>
+              </a:lnSpc>
+            </a:pPr>
+            <a:r>
+              <a:rPr lang="pl-PL" sz="2000" smtClean="0"/>
+              <a:t>models</a:t>
+            </a:r>
+            <a:endParaRPr lang="en-GB" sz="2000" smtClean="0"/>
+          </a:p>
+          <a:p>
+            <a:pPr>
+              <a:lnSpc>
+                <a:spcPct val="120000"/>
+              </a:lnSpc>
+            </a:pPr>
+            <a:r>
+              <a:rPr lang="en-GB" sz="2000" smtClean="0"/>
+              <a:t>scripts, analysis procedures, and custom software are also considered data</a:t>
+            </a:r>
+            <a:endParaRPr lang="en-GB" sz="2000" dirty="0"/>
+          </a:p>
+        </p:txBody>
+      </p:sp>
     </p:spTree>
     <p:extLst>
       <p:ext uri="{BB962C8B-B14F-4D97-AF65-F5344CB8AC3E}">
@@ -8337,7 +8730,11 @@
           <a:p>
             <a:r>
               <a:rPr lang="en-GB" sz="1600" smtClean="0"/>
-              <a:t>Image: CSIRO</a:t>
+              <a:t>Image: </a:t>
+            </a:r>
+            <a:r>
+              <a:rPr lang="en-GB" sz="1600" smtClean="0"/>
+              <a:t>See Credits [2]</a:t>
             </a:r>
             <a:endParaRPr lang="en-GB" sz="1600"/>
           </a:p>
@@ -9083,7 +9480,7 @@
         <p:spPr>
           <a:xfrm>
             <a:off x="54592" y="6465579"/>
-            <a:ext cx="1535357" cy="307777"/>
+            <a:ext cx="1775807" cy="307777"/>
           </a:xfrm>
           <a:prstGeom prst="rect">
             <a:avLst/>
@@ -9102,7 +9499,11 @@
             </a:r>
             <a:r>
               <a:rPr lang="en-GB" sz="1400" smtClean="0"/>
-              <a:t>See Credits</a:t>
+              <a:t>See </a:t>
+            </a:r>
+            <a:r>
+              <a:rPr lang="en-GB" sz="1400" smtClean="0"/>
+              <a:t>Credits [3]</a:t>
             </a:r>
             <a:endParaRPr lang="en-GB" sz="1400" dirty="0"/>
           </a:p>

</xml_diff>

<commit_message>
added solution to ex 1b inc new figure
</commit_message>
<xml_diff>
--- a/instructors/02-Being_FAIR.pptx
+++ b/instructors/02-Being_FAIR.pptx
@@ -4,6 +4,9 @@
   <p:sldMasterIdLst>
     <p:sldMasterId id="2147483648" r:id="rId1"/>
   </p:sldMasterIdLst>
+  <p:notesMasterIdLst>
+    <p:notesMasterId r:id="rId20"/>
+  </p:notesMasterIdLst>
   <p:sldIdLst>
     <p:sldId id="256" r:id="rId2"/>
     <p:sldId id="257" r:id="rId3"/>
@@ -127,6 +130,492 @@
     </p:ext>
   </p:extLst>
 </p:presentation>
+</file>
+
+<file path=ppt/notesMasters/notesMaster1.xml><?xml version="1.0" encoding="utf-8"?>
+<p:notesMaster xmlns:a="http://schemas.openxmlformats.org/drawingml/2006/main" xmlns:r="http://schemas.openxmlformats.org/officeDocument/2006/relationships" xmlns:p="http://schemas.openxmlformats.org/presentationml/2006/main">
+  <p:cSld>
+    <p:bg>
+      <p:bgRef idx="1001">
+        <a:schemeClr val="bg1"/>
+      </p:bgRef>
+    </p:bg>
+    <p:spTree>
+      <p:nvGrpSpPr>
+        <p:cNvPr id="1" name=""/>
+        <p:cNvGrpSpPr/>
+        <p:nvPr/>
+      </p:nvGrpSpPr>
+      <p:grpSpPr>
+        <a:xfrm>
+          <a:off x="0" y="0"/>
+          <a:ext cx="0" cy="0"/>
+          <a:chOff x="0" y="0"/>
+          <a:chExt cx="0" cy="0"/>
+        </a:xfrm>
+      </p:grpSpPr>
+      <p:sp>
+        <p:nvSpPr>
+          <p:cNvPr id="2" name="Header Placeholder 1"/>
+          <p:cNvSpPr>
+            <a:spLocks noGrp="1"/>
+          </p:cNvSpPr>
+          <p:nvPr>
+            <p:ph type="hdr" sz="quarter"/>
+          </p:nvPr>
+        </p:nvSpPr>
+        <p:spPr>
+          <a:xfrm>
+            <a:off x="0" y="0"/>
+            <a:ext cx="2971800" cy="458788"/>
+          </a:xfrm>
+          <a:prstGeom prst="rect">
+            <a:avLst/>
+          </a:prstGeom>
+        </p:spPr>
+        <p:txBody>
+          <a:bodyPr vert="horz" lIns="91440" tIns="45720" rIns="91440" bIns="45720" rtlCol="0"/>
+          <a:lstStyle>
+            <a:lvl1pPr algn="l">
+              <a:defRPr sz="1200"/>
+            </a:lvl1pPr>
+          </a:lstStyle>
+          <a:p>
+            <a:endParaRPr lang="en-GB"/>
+          </a:p>
+        </p:txBody>
+      </p:sp>
+      <p:sp>
+        <p:nvSpPr>
+          <p:cNvPr id="3" name="Date Placeholder 2"/>
+          <p:cNvSpPr>
+            <a:spLocks noGrp="1"/>
+          </p:cNvSpPr>
+          <p:nvPr>
+            <p:ph type="dt" idx="1"/>
+          </p:nvPr>
+        </p:nvSpPr>
+        <p:spPr>
+          <a:xfrm>
+            <a:off x="3884613" y="0"/>
+            <a:ext cx="2971800" cy="458788"/>
+          </a:xfrm>
+          <a:prstGeom prst="rect">
+            <a:avLst/>
+          </a:prstGeom>
+        </p:spPr>
+        <p:txBody>
+          <a:bodyPr vert="horz" lIns="91440" tIns="45720" rIns="91440" bIns="45720" rtlCol="0"/>
+          <a:lstStyle>
+            <a:lvl1pPr algn="r">
+              <a:defRPr sz="1200"/>
+            </a:lvl1pPr>
+          </a:lstStyle>
+          <a:p>
+            <a:fld id="{AA8A194F-1EDC-44D6-902F-D21F13A5BCE4}" type="datetimeFigureOut">
+              <a:rPr lang="en-GB" smtClean="0"/>
+              <a:t>12/08/2022</a:t>
+            </a:fld>
+            <a:endParaRPr lang="en-GB"/>
+          </a:p>
+        </p:txBody>
+      </p:sp>
+      <p:sp>
+        <p:nvSpPr>
+          <p:cNvPr id="4" name="Slide Image Placeholder 3"/>
+          <p:cNvSpPr>
+            <a:spLocks noGrp="1" noRot="1" noChangeAspect="1"/>
+          </p:cNvSpPr>
+          <p:nvPr>
+            <p:ph type="sldImg" idx="2"/>
+          </p:nvPr>
+        </p:nvSpPr>
+        <p:spPr>
+          <a:xfrm>
+            <a:off x="685800" y="1143000"/>
+            <a:ext cx="5486400" cy="3086100"/>
+          </a:xfrm>
+          <a:prstGeom prst="rect">
+            <a:avLst/>
+          </a:prstGeom>
+          <a:noFill/>
+          <a:ln w="12700">
+            <a:solidFill>
+              <a:prstClr val="black"/>
+            </a:solidFill>
+          </a:ln>
+        </p:spPr>
+        <p:txBody>
+          <a:bodyPr vert="horz" lIns="91440" tIns="45720" rIns="91440" bIns="45720" rtlCol="0" anchor="ctr"/>
+          <a:lstStyle/>
+          <a:p>
+            <a:endParaRPr lang="en-GB"/>
+          </a:p>
+        </p:txBody>
+      </p:sp>
+      <p:sp>
+        <p:nvSpPr>
+          <p:cNvPr id="5" name="Notes Placeholder 4"/>
+          <p:cNvSpPr>
+            <a:spLocks noGrp="1"/>
+          </p:cNvSpPr>
+          <p:nvPr>
+            <p:ph type="body" sz="quarter" idx="3"/>
+          </p:nvPr>
+        </p:nvSpPr>
+        <p:spPr>
+          <a:xfrm>
+            <a:off x="685800" y="4400550"/>
+            <a:ext cx="5486400" cy="3600450"/>
+          </a:xfrm>
+          <a:prstGeom prst="rect">
+            <a:avLst/>
+          </a:prstGeom>
+        </p:spPr>
+        <p:txBody>
+          <a:bodyPr vert="horz" lIns="91440" tIns="45720" rIns="91440" bIns="45720" rtlCol="0"/>
+          <a:lstStyle/>
+          <a:p>
+            <a:pPr lvl="0"/>
+            <a:r>
+              <a:rPr lang="en-US" smtClean="0"/>
+              <a:t>Edit Master text styles</a:t>
+            </a:r>
+          </a:p>
+          <a:p>
+            <a:pPr lvl="1"/>
+            <a:r>
+              <a:rPr lang="en-US" smtClean="0"/>
+              <a:t>Second level</a:t>
+            </a:r>
+          </a:p>
+          <a:p>
+            <a:pPr lvl="2"/>
+            <a:r>
+              <a:rPr lang="en-US" smtClean="0"/>
+              <a:t>Third level</a:t>
+            </a:r>
+          </a:p>
+          <a:p>
+            <a:pPr lvl="3"/>
+            <a:r>
+              <a:rPr lang="en-US" smtClean="0"/>
+              <a:t>Fourth level</a:t>
+            </a:r>
+          </a:p>
+          <a:p>
+            <a:pPr lvl="4"/>
+            <a:r>
+              <a:rPr lang="en-US" smtClean="0"/>
+              <a:t>Fifth level</a:t>
+            </a:r>
+            <a:endParaRPr lang="en-GB"/>
+          </a:p>
+        </p:txBody>
+      </p:sp>
+      <p:sp>
+        <p:nvSpPr>
+          <p:cNvPr id="6" name="Footer Placeholder 5"/>
+          <p:cNvSpPr>
+            <a:spLocks noGrp="1"/>
+          </p:cNvSpPr>
+          <p:nvPr>
+            <p:ph type="ftr" sz="quarter" idx="4"/>
+          </p:nvPr>
+        </p:nvSpPr>
+        <p:spPr>
+          <a:xfrm>
+            <a:off x="0" y="8685213"/>
+            <a:ext cx="2971800" cy="458787"/>
+          </a:xfrm>
+          <a:prstGeom prst="rect">
+            <a:avLst/>
+          </a:prstGeom>
+        </p:spPr>
+        <p:txBody>
+          <a:bodyPr vert="horz" lIns="91440" tIns="45720" rIns="91440" bIns="45720" rtlCol="0" anchor="b"/>
+          <a:lstStyle>
+            <a:lvl1pPr algn="l">
+              <a:defRPr sz="1200"/>
+            </a:lvl1pPr>
+          </a:lstStyle>
+          <a:p>
+            <a:endParaRPr lang="en-GB"/>
+          </a:p>
+        </p:txBody>
+      </p:sp>
+      <p:sp>
+        <p:nvSpPr>
+          <p:cNvPr id="7" name="Slide Number Placeholder 6"/>
+          <p:cNvSpPr>
+            <a:spLocks noGrp="1"/>
+          </p:cNvSpPr>
+          <p:nvPr>
+            <p:ph type="sldNum" sz="quarter" idx="5"/>
+          </p:nvPr>
+        </p:nvSpPr>
+        <p:spPr>
+          <a:xfrm>
+            <a:off x="3884613" y="8685213"/>
+            <a:ext cx="2971800" cy="458787"/>
+          </a:xfrm>
+          <a:prstGeom prst="rect">
+            <a:avLst/>
+          </a:prstGeom>
+        </p:spPr>
+        <p:txBody>
+          <a:bodyPr vert="horz" lIns="91440" tIns="45720" rIns="91440" bIns="45720" rtlCol="0" anchor="b"/>
+          <a:lstStyle>
+            <a:lvl1pPr algn="r">
+              <a:defRPr sz="1200"/>
+            </a:lvl1pPr>
+          </a:lstStyle>
+          <a:p>
+            <a:fld id="{27F2A17F-794C-4A77-AA96-7995838280EB}" type="slidenum">
+              <a:rPr lang="en-GB" smtClean="0"/>
+              <a:t>‹#›</a:t>
+            </a:fld>
+            <a:endParaRPr lang="en-GB"/>
+          </a:p>
+        </p:txBody>
+      </p:sp>
+    </p:spTree>
+    <p:extLst>
+      <p:ext uri="{BB962C8B-B14F-4D97-AF65-F5344CB8AC3E}">
+        <p14:creationId xmlns:p14="http://schemas.microsoft.com/office/powerpoint/2010/main" val="1023193453"/>
+      </p:ext>
+    </p:extLst>
+  </p:cSld>
+  <p:clrMap bg1="lt1" tx1="dk1" bg2="lt2" tx2="dk2" accent1="accent1" accent2="accent2" accent3="accent3" accent4="accent4" accent5="accent5" accent6="accent6" hlink="hlink" folHlink="folHlink"/>
+  <p:notesStyle>
+    <a:lvl1pPr marL="0" algn="l" defTabSz="914400" rtl="0" eaLnBrk="1" latinLnBrk="0" hangingPunct="1">
+      <a:defRPr sz="1200" kern="1200">
+        <a:solidFill>
+          <a:schemeClr val="tx1"/>
+        </a:solidFill>
+        <a:latin typeface="+mn-lt"/>
+        <a:ea typeface="+mn-ea"/>
+        <a:cs typeface="+mn-cs"/>
+      </a:defRPr>
+    </a:lvl1pPr>
+    <a:lvl2pPr marL="457200" algn="l" defTabSz="914400" rtl="0" eaLnBrk="1" latinLnBrk="0" hangingPunct="1">
+      <a:defRPr sz="1200" kern="1200">
+        <a:solidFill>
+          <a:schemeClr val="tx1"/>
+        </a:solidFill>
+        <a:latin typeface="+mn-lt"/>
+        <a:ea typeface="+mn-ea"/>
+        <a:cs typeface="+mn-cs"/>
+      </a:defRPr>
+    </a:lvl2pPr>
+    <a:lvl3pPr marL="914400" algn="l" defTabSz="914400" rtl="0" eaLnBrk="1" latinLnBrk="0" hangingPunct="1">
+      <a:defRPr sz="1200" kern="1200">
+        <a:solidFill>
+          <a:schemeClr val="tx1"/>
+        </a:solidFill>
+        <a:latin typeface="+mn-lt"/>
+        <a:ea typeface="+mn-ea"/>
+        <a:cs typeface="+mn-cs"/>
+      </a:defRPr>
+    </a:lvl3pPr>
+    <a:lvl4pPr marL="1371600" algn="l" defTabSz="914400" rtl="0" eaLnBrk="1" latinLnBrk="0" hangingPunct="1">
+      <a:defRPr sz="1200" kern="1200">
+        <a:solidFill>
+          <a:schemeClr val="tx1"/>
+        </a:solidFill>
+        <a:latin typeface="+mn-lt"/>
+        <a:ea typeface="+mn-ea"/>
+        <a:cs typeface="+mn-cs"/>
+      </a:defRPr>
+    </a:lvl4pPr>
+    <a:lvl5pPr marL="1828800" algn="l" defTabSz="914400" rtl="0" eaLnBrk="1" latinLnBrk="0" hangingPunct="1">
+      <a:defRPr sz="1200" kern="1200">
+        <a:solidFill>
+          <a:schemeClr val="tx1"/>
+        </a:solidFill>
+        <a:latin typeface="+mn-lt"/>
+        <a:ea typeface="+mn-ea"/>
+        <a:cs typeface="+mn-cs"/>
+      </a:defRPr>
+    </a:lvl5pPr>
+    <a:lvl6pPr marL="2286000" algn="l" defTabSz="914400" rtl="0" eaLnBrk="1" latinLnBrk="0" hangingPunct="1">
+      <a:defRPr sz="1200" kern="1200">
+        <a:solidFill>
+          <a:schemeClr val="tx1"/>
+        </a:solidFill>
+        <a:latin typeface="+mn-lt"/>
+        <a:ea typeface="+mn-ea"/>
+        <a:cs typeface="+mn-cs"/>
+      </a:defRPr>
+    </a:lvl6pPr>
+    <a:lvl7pPr marL="2743200" algn="l" defTabSz="914400" rtl="0" eaLnBrk="1" latinLnBrk="0" hangingPunct="1">
+      <a:defRPr sz="1200" kern="1200">
+        <a:solidFill>
+          <a:schemeClr val="tx1"/>
+        </a:solidFill>
+        <a:latin typeface="+mn-lt"/>
+        <a:ea typeface="+mn-ea"/>
+        <a:cs typeface="+mn-cs"/>
+      </a:defRPr>
+    </a:lvl7pPr>
+    <a:lvl8pPr marL="3200400" algn="l" defTabSz="914400" rtl="0" eaLnBrk="1" latinLnBrk="0" hangingPunct="1">
+      <a:defRPr sz="1200" kern="1200">
+        <a:solidFill>
+          <a:schemeClr val="tx1"/>
+        </a:solidFill>
+        <a:latin typeface="+mn-lt"/>
+        <a:ea typeface="+mn-ea"/>
+        <a:cs typeface="+mn-cs"/>
+      </a:defRPr>
+    </a:lvl8pPr>
+    <a:lvl9pPr marL="3657600" algn="l" defTabSz="914400" rtl="0" eaLnBrk="1" latinLnBrk="0" hangingPunct="1">
+      <a:defRPr sz="1200" kern="1200">
+        <a:solidFill>
+          <a:schemeClr val="tx1"/>
+        </a:solidFill>
+        <a:latin typeface="+mn-lt"/>
+        <a:ea typeface="+mn-ea"/>
+        <a:cs typeface="+mn-cs"/>
+      </a:defRPr>
+    </a:lvl9pPr>
+  </p:notesStyle>
+</p:notesMaster>
+</file>
+
+<file path=ppt/notesSlides/notesSlide1.xml><?xml version="1.0" encoding="utf-8"?>
+<p:notes xmlns:a="http://schemas.openxmlformats.org/drawingml/2006/main" xmlns:r="http://schemas.openxmlformats.org/officeDocument/2006/relationships" xmlns:p="http://schemas.openxmlformats.org/presentationml/2006/main">
+  <p:cSld>
+    <p:spTree>
+      <p:nvGrpSpPr>
+        <p:cNvPr id="1" name=""/>
+        <p:cNvGrpSpPr/>
+        <p:nvPr/>
+      </p:nvGrpSpPr>
+      <p:grpSpPr>
+        <a:xfrm>
+          <a:off x="0" y="0"/>
+          <a:ext cx="0" cy="0"/>
+          <a:chOff x="0" y="0"/>
+          <a:chExt cx="0" cy="0"/>
+        </a:xfrm>
+      </p:grpSpPr>
+      <p:sp>
+        <p:nvSpPr>
+          <p:cNvPr id="2" name="Slide Image Placeholder 1"/>
+          <p:cNvSpPr>
+            <a:spLocks noGrp="1" noRot="1" noChangeAspect="1"/>
+          </p:cNvSpPr>
+          <p:nvPr>
+            <p:ph type="sldImg"/>
+          </p:nvPr>
+        </p:nvSpPr>
+        <p:spPr/>
+      </p:sp>
+      <p:sp>
+        <p:nvSpPr>
+          <p:cNvPr id="3" name="Notes Placeholder 2"/>
+          <p:cNvSpPr>
+            <a:spLocks noGrp="1"/>
+          </p:cNvSpPr>
+          <p:nvPr>
+            <p:ph type="body" idx="1"/>
+          </p:nvPr>
+        </p:nvSpPr>
+        <p:spPr/>
+        <p:txBody>
+          <a:bodyPr/>
+          <a:lstStyle/>
+          <a:p>
+            <a:r>
+              <a:rPr lang="en-GB" smtClean="0"/>
+              <a:t>This example is from a real</a:t>
+            </a:r>
+            <a:r>
+              <a:rPr lang="en-GB" baseline="0" smtClean="0"/>
+              <a:t> reference given on t</a:t>
+            </a:r>
+            <a:r>
+              <a:rPr lang="en-GB" smtClean="0"/>
+              <a:t>he antibody</a:t>
+            </a:r>
+            <a:r>
+              <a:rPr lang="en-GB" baseline="0" smtClean="0"/>
+              <a:t> </a:t>
+            </a:r>
+            <a:r>
+              <a:rPr lang="en-GB" smtClean="0"/>
+              <a:t>supplier website</a:t>
+            </a:r>
+            <a:r>
+              <a:rPr lang="en-GB" baseline="0" smtClean="0"/>
+              <a:t> </a:t>
+            </a:r>
+            <a:r>
+              <a:rPr lang="en-GB" sz="1200" b="0" kern="1200" smtClean="0">
+                <a:solidFill>
+                  <a:schemeClr val="tx1"/>
+                </a:solidFill>
+                <a:effectLst/>
+                <a:latin typeface="+mn-lt"/>
+                <a:ea typeface="+mn-ea"/>
+                <a:cs typeface="+mn-cs"/>
+              </a:rPr>
+              <a:t>citing the Meng Yu paper: </a:t>
+            </a:r>
+          </a:p>
+          <a:p>
+            <a:r>
+              <a:rPr lang="en-GB" sz="1200" b="0" kern="1200" smtClean="0">
+                <a:solidFill>
+                  <a:schemeClr val="tx1"/>
+                </a:solidFill>
+                <a:effectLst/>
+                <a:latin typeface="+mn-lt"/>
+                <a:ea typeface="+mn-ea"/>
+                <a:cs typeface="+mn-cs"/>
+              </a:rPr>
+              <a:t>https://www.sigmaaldrich.com/GB/en/product/sigma/sab1400284</a:t>
+            </a:r>
+          </a:p>
+          <a:p>
+            <a:endParaRPr lang="en-GB"/>
+          </a:p>
+        </p:txBody>
+      </p:sp>
+      <p:sp>
+        <p:nvSpPr>
+          <p:cNvPr id="4" name="Slide Number Placeholder 3"/>
+          <p:cNvSpPr>
+            <a:spLocks noGrp="1"/>
+          </p:cNvSpPr>
+          <p:nvPr>
+            <p:ph type="sldNum" sz="quarter" idx="10"/>
+          </p:nvPr>
+        </p:nvSpPr>
+        <p:spPr/>
+        <p:txBody>
+          <a:bodyPr/>
+          <a:lstStyle/>
+          <a:p>
+            <a:fld id="{27F2A17F-794C-4A77-AA96-7995838280EB}" type="slidenum">
+              <a:rPr lang="en-GB" smtClean="0"/>
+              <a:t>4</a:t>
+            </a:fld>
+            <a:endParaRPr lang="en-GB"/>
+          </a:p>
+        </p:txBody>
+      </p:sp>
+    </p:spTree>
+    <p:extLst>
+      <p:ext uri="{BB962C8B-B14F-4D97-AF65-F5344CB8AC3E}">
+        <p14:creationId xmlns:p14="http://schemas.microsoft.com/office/powerpoint/2010/main" val="1495745150"/>
+      </p:ext>
+    </p:extLst>
+  </p:cSld>
+  <p:clrMapOvr>
+    <a:masterClrMapping/>
+  </p:clrMapOvr>
+</p:notes>
 </file>
 
 <file path=ppt/slideLayouts/slideLayout1.xml><?xml version="1.0" encoding="utf-8"?>
@@ -3809,7 +4298,7 @@
                 <a:hlinkClick r:id="rId6">
                   <a:extLst>
                     <a:ext uri="{A12FA001-AC4F-418D-AE19-62706E023703}">
-                      <ahyp:hlinkClr xmlns="" xmlns:ahyp="http://schemas.microsoft.com/office/drawing/2018/hyperlinkcolor" val="tx"/>
+                      <ahyp:hlinkClr xmlns:ahyp="http://schemas.microsoft.com/office/drawing/2018/hyperlinkcolor" xmlns="" val="tx"/>
                     </a:ext>
                   </a:extLst>
                 </a:hlinkClick>
@@ -3832,7 +4321,7 @@
                 <a:hlinkClick r:id="rId7">
                   <a:extLst>
                     <a:ext uri="{A12FA001-AC4F-418D-AE19-62706E023703}">
-                      <ahyp:hlinkClr xmlns="" xmlns:ahyp="http://schemas.microsoft.com/office/drawing/2018/hyperlinkcolor" val="tx"/>
+                      <ahyp:hlinkClr xmlns:ahyp="http://schemas.microsoft.com/office/drawing/2018/hyperlinkcolor" xmlns="" val="tx"/>
                     </a:ext>
                   </a:extLst>
                 </a:hlinkClick>
@@ -3855,7 +4344,7 @@
                 <a:hlinkClick r:id="rId8">
                   <a:extLst>
                     <a:ext uri="{A12FA001-AC4F-418D-AE19-62706E023703}">
-                      <ahyp:hlinkClr xmlns="" xmlns:ahyp="http://schemas.microsoft.com/office/drawing/2018/hyperlinkcolor" val="tx"/>
+                      <ahyp:hlinkClr xmlns:ahyp="http://schemas.microsoft.com/office/drawing/2018/hyperlinkcolor" xmlns="" val="tx"/>
                     </a:ext>
                   </a:extLst>
                 </a:hlinkClick>
@@ -4426,7 +4915,7 @@
                 <a14:useLocalDpi xmlns:a14="http://schemas.microsoft.com/office/drawing/2010/main" val="0"/>
               </a:ext>
               <a:ext uri="{96DAC541-7B7A-43D3-8B79-37D633B846F1}">
-                <asvg:svgBlip xmlns="" xmlns:asvg="http://schemas.microsoft.com/office/drawing/2016/SVG/main" r:embed="rId3"/>
+                <asvg:svgBlip xmlns:asvg="http://schemas.microsoft.com/office/drawing/2016/SVG/main" xmlns="" r:embed="rId3"/>
               </a:ext>
             </a:extLst>
           </a:blip>
@@ -4657,7 +5146,7 @@
                 <a14:useLocalDpi xmlns:a14="http://schemas.microsoft.com/office/drawing/2010/main" val="0"/>
               </a:ext>
               <a:ext uri="{96DAC541-7B7A-43D3-8B79-37D633B846F1}">
-                <asvg:svgBlip xmlns="" xmlns:asvg="http://schemas.microsoft.com/office/drawing/2016/SVG/main" r:embed="rId7"/>
+                <asvg:svgBlip xmlns:asvg="http://schemas.microsoft.com/office/drawing/2016/SVG/main" xmlns="" r:embed="rId7"/>
               </a:ext>
             </a:extLst>
           </a:blip>
@@ -5182,7 +5671,7 @@
                 <a16:creationId xmlns:a16="http://schemas.microsoft.com/office/drawing/2014/main" id="{91F32EBA-ED97-466E-8CFA-8382584155D0}"/>
               </a:ext>
               <a:ext uri="{C183D7F6-B498-43B3-948B-1728B52AA6E4}">
-                <adec:decorative xmlns="" xmlns:adec="http://schemas.microsoft.com/office/drawing/2017/decorative" val="1"/>
+                <adec:decorative xmlns:adec="http://schemas.microsoft.com/office/drawing/2017/decorative" xmlns="" val="1"/>
               </a:ext>
             </a:extLst>
           </p:cNvPr>
@@ -5315,7 +5804,7 @@
                 <a16:creationId xmlns:a16="http://schemas.microsoft.com/office/drawing/2014/main" id="{62A38935-BB53-4DF7-A56E-48DD25B685D7}"/>
               </a:ext>
               <a:ext uri="{C183D7F6-B498-43B3-948B-1728B52AA6E4}">
-                <adec:decorative xmlns="" xmlns:adec="http://schemas.microsoft.com/office/drawing/2017/decorative" val="1"/>
+                <adec:decorative xmlns:adec="http://schemas.microsoft.com/office/drawing/2017/decorative" xmlns="" val="1"/>
               </a:ext>
             </a:extLst>
           </p:cNvPr>
@@ -6102,7 +6591,7 @@
                 <a14:useLocalDpi xmlns:a14="http://schemas.microsoft.com/office/drawing/2010/main" val="0"/>
               </a:ext>
               <a:ext uri="{96DAC541-7B7A-43D3-8B79-37D633B846F1}">
-                <asvg:svgBlip xmlns="" xmlns:asvg="http://schemas.microsoft.com/office/drawing/2016/SVG/main" r:embed="rId3"/>
+                <asvg:svgBlip xmlns:asvg="http://schemas.microsoft.com/office/drawing/2016/SVG/main" xmlns="" r:embed="rId3"/>
               </a:ext>
             </a:extLst>
           </a:blip>
@@ -6323,7 +6812,7 @@
                 <a16:creationId xmlns:a16="http://schemas.microsoft.com/office/drawing/2014/main" id="{C4E4288A-DFC8-40A2-90E5-70E851A933AD}"/>
               </a:ext>
               <a:ext uri="{C183D7F6-B498-43B3-948B-1728B52AA6E4}">
-                <adec:decorative xmlns="" xmlns:adec="http://schemas.microsoft.com/office/drawing/2017/decorative" val="1"/>
+                <adec:decorative xmlns:adec="http://schemas.microsoft.com/office/drawing/2017/decorative" xmlns="" val="1"/>
               </a:ext>
             </a:extLst>
           </p:cNvPr>
@@ -6431,7 +6920,7 @@
                 <a16:creationId xmlns:a16="http://schemas.microsoft.com/office/drawing/2014/main" id="{A94A2FC9-6D19-473C-B868-99FDB2044AA9}"/>
               </a:ext>
               <a:ext uri="{C183D7F6-B498-43B3-948B-1728B52AA6E4}">
-                <adec:decorative xmlns="" xmlns:adec="http://schemas.microsoft.com/office/drawing/2017/decorative" val="1"/>
+                <adec:decorative xmlns:adec="http://schemas.microsoft.com/office/drawing/2017/decorative" xmlns="" val="1"/>
               </a:ext>
             </a:extLst>
           </p:cNvPr>
@@ -6650,7 +7139,7 @@
                 <a14:useLocalDpi xmlns:a14="http://schemas.microsoft.com/office/drawing/2010/main" val="0"/>
               </a:ext>
               <a:ext uri="{96DAC541-7B7A-43D3-8B79-37D633B846F1}">
-                <asvg:svgBlip xmlns="" xmlns:asvg="http://schemas.microsoft.com/office/drawing/2016/SVG/main" r:embed="rId3"/>
+                <asvg:svgBlip xmlns:asvg="http://schemas.microsoft.com/office/drawing/2016/SVG/main" xmlns="" r:embed="rId3"/>
               </a:ext>
             </a:extLst>
           </a:blip>
@@ -6851,7 +7340,7 @@
                 <a16:creationId xmlns:a16="http://schemas.microsoft.com/office/drawing/2014/main" id="{8BED0409-854E-49C4-876E-A78C6D881BC8}"/>
               </a:ext>
               <a:ext uri="{C183D7F6-B498-43B3-948B-1728B52AA6E4}">
-                <adec:decorative xmlns="" xmlns:adec="http://schemas.microsoft.com/office/drawing/2017/decorative" val="1"/>
+                <adec:decorative xmlns:adec="http://schemas.microsoft.com/office/drawing/2017/decorative" xmlns="" val="1"/>
               </a:ext>
             </a:extLst>
           </p:cNvPr>
@@ -7496,7 +7985,7 @@
                 <a16:creationId xmlns:a16="http://schemas.microsoft.com/office/drawing/2014/main" id="{D4340B2E-01FD-4F5D-9C4D-AD3923AD20BA}"/>
               </a:ext>
               <a:ext uri="{C183D7F6-B498-43B3-948B-1728B52AA6E4}">
-                <adec:decorative xmlns="" xmlns:adec="http://schemas.microsoft.com/office/drawing/2017/decorative" val="1"/>
+                <adec:decorative xmlns:adec="http://schemas.microsoft.com/office/drawing/2017/decorative" xmlns="" val="1"/>
               </a:ext>
             </a:extLst>
           </p:cNvPr>
@@ -7715,7 +8204,7 @@
                 <a14:useLocalDpi xmlns:a14="http://schemas.microsoft.com/office/drawing/2010/main" val="0"/>
               </a:ext>
               <a:ext uri="{96DAC541-7B7A-43D3-8B79-37D633B846F1}">
-                <asvg:svgBlip xmlns="" xmlns:asvg="http://schemas.microsoft.com/office/drawing/2016/SVG/main" r:embed="rId5"/>
+                <asvg:svgBlip xmlns:asvg="http://schemas.microsoft.com/office/drawing/2016/SVG/main" xmlns="" r:embed="rId5"/>
               </a:ext>
             </a:extLst>
           </a:blip>
@@ -7754,7 +8243,7 @@
                 <a14:useLocalDpi xmlns:a14="http://schemas.microsoft.com/office/drawing/2010/main" val="0"/>
               </a:ext>
               <a:ext uri="{96DAC541-7B7A-43D3-8B79-37D633B846F1}">
-                <asvg:svgBlip xmlns="" xmlns:asvg="http://schemas.microsoft.com/office/drawing/2016/SVG/main" r:embed="rId7"/>
+                <asvg:svgBlip xmlns:asvg="http://schemas.microsoft.com/office/drawing/2016/SVG/main" xmlns="" r:embed="rId7"/>
               </a:ext>
             </a:extLst>
           </a:blip>
@@ -8302,7 +8791,7 @@
           </p:nvPr>
         </p:nvPicPr>
         <p:blipFill>
-          <a:blip r:embed="rId2">
+          <a:blip r:embed="rId3">
             <a:extLst>
               <a:ext uri="{28A0092B-C50C-407E-A947-70E740481C1C}">
                 <a14:useLocalDpi xmlns:a14="http://schemas.microsoft.com/office/drawing/2010/main" val="0"/>
@@ -9626,4 +10115,265 @@
     </a:ext>
   </a:extLst>
 </a:theme>
+</file>
+
+<file path=ppt/theme/theme2.xml><?xml version="1.0" encoding="utf-8"?>
+<a:theme xmlns:a="http://schemas.openxmlformats.org/drawingml/2006/main" name="Office Theme">
+  <a:themeElements>
+    <a:clrScheme name="Office">
+      <a:dk1>
+        <a:sysClr val="windowText" lastClr="000000"/>
+      </a:dk1>
+      <a:lt1>
+        <a:sysClr val="window" lastClr="FFFFFF"/>
+      </a:lt1>
+      <a:dk2>
+        <a:srgbClr val="44546A"/>
+      </a:dk2>
+      <a:lt2>
+        <a:srgbClr val="E7E6E6"/>
+      </a:lt2>
+      <a:accent1>
+        <a:srgbClr val="5B9BD5"/>
+      </a:accent1>
+      <a:accent2>
+        <a:srgbClr val="ED7D31"/>
+      </a:accent2>
+      <a:accent3>
+        <a:srgbClr val="A5A5A5"/>
+      </a:accent3>
+      <a:accent4>
+        <a:srgbClr val="FFC000"/>
+      </a:accent4>
+      <a:accent5>
+        <a:srgbClr val="4472C4"/>
+      </a:accent5>
+      <a:accent6>
+        <a:srgbClr val="70AD47"/>
+      </a:accent6>
+      <a:hlink>
+        <a:srgbClr val="0563C1"/>
+      </a:hlink>
+      <a:folHlink>
+        <a:srgbClr val="954F72"/>
+      </a:folHlink>
+    </a:clrScheme>
+    <a:fontScheme name="Office">
+      <a:majorFont>
+        <a:latin typeface="Calibri Light" panose="020F0302020204030204"/>
+        <a:ea typeface=""/>
+        <a:cs typeface=""/>
+        <a:font script="Jpan" typeface="游ゴシック Light"/>
+        <a:font script="Hang" typeface="맑은 고딕"/>
+        <a:font script="Hans" typeface="等线 Light"/>
+        <a:font script="Hant" typeface="新細明體"/>
+        <a:font script="Arab" typeface="Times New Roman"/>
+        <a:font script="Hebr" typeface="Times New Roman"/>
+        <a:font script="Thai" typeface="Angsana New"/>
+        <a:font script="Ethi" typeface="Nyala"/>
+        <a:font script="Beng" typeface="Vrinda"/>
+        <a:font script="Gujr" typeface="Shruti"/>
+        <a:font script="Khmr" typeface="MoolBoran"/>
+        <a:font script="Knda" typeface="Tunga"/>
+        <a:font script="Guru" typeface="Raavi"/>
+        <a:font script="Cans" typeface="Euphemia"/>
+        <a:font script="Cher" typeface="Plantagenet Cherokee"/>
+        <a:font script="Yiii" typeface="Microsoft Yi Baiti"/>
+        <a:font script="Tibt" typeface="Microsoft Himalaya"/>
+        <a:font script="Thaa" typeface="MV Boli"/>
+        <a:font script="Deva" typeface="Mangal"/>
+        <a:font script="Telu" typeface="Gautami"/>
+        <a:font script="Taml" typeface="Latha"/>
+        <a:font script="Syrc" typeface="Estrangelo Edessa"/>
+        <a:font script="Orya" typeface="Kalinga"/>
+        <a:font script="Mlym" typeface="Kartika"/>
+        <a:font script="Laoo" typeface="DokChampa"/>
+        <a:font script="Sinh" typeface="Iskoola Pota"/>
+        <a:font script="Mong" typeface="Mongolian Baiti"/>
+        <a:font script="Viet" typeface="Times New Roman"/>
+        <a:font script="Uigh" typeface="Microsoft Uighur"/>
+        <a:font script="Geor" typeface="Sylfaen"/>
+      </a:majorFont>
+      <a:minorFont>
+        <a:latin typeface="Calibri" panose="020F0502020204030204"/>
+        <a:ea typeface=""/>
+        <a:cs typeface=""/>
+        <a:font script="Jpan" typeface="游ゴシック"/>
+        <a:font script="Hang" typeface="맑은 고딕"/>
+        <a:font script="Hans" typeface="等线"/>
+        <a:font script="Hant" typeface="新細明體"/>
+        <a:font script="Arab" typeface="Arial"/>
+        <a:font script="Hebr" typeface="Arial"/>
+        <a:font script="Thai" typeface="Cordia New"/>
+        <a:font script="Ethi" typeface="Nyala"/>
+        <a:font script="Beng" typeface="Vrinda"/>
+        <a:font script="Gujr" typeface="Shruti"/>
+        <a:font script="Khmr" typeface="DaunPenh"/>
+        <a:font script="Knda" typeface="Tunga"/>
+        <a:font script="Guru" typeface="Raavi"/>
+        <a:font script="Cans" typeface="Euphemia"/>
+        <a:font script="Cher" typeface="Plantagenet Cherokee"/>
+        <a:font script="Yiii" typeface="Microsoft Yi Baiti"/>
+        <a:font script="Tibt" typeface="Microsoft Himalaya"/>
+        <a:font script="Thaa" typeface="MV Boli"/>
+        <a:font script="Deva" typeface="Mangal"/>
+        <a:font script="Telu" typeface="Gautami"/>
+        <a:font script="Taml" typeface="Latha"/>
+        <a:font script="Syrc" typeface="Estrangelo Edessa"/>
+        <a:font script="Orya" typeface="Kalinga"/>
+        <a:font script="Mlym" typeface="Kartika"/>
+        <a:font script="Laoo" typeface="DokChampa"/>
+        <a:font script="Sinh" typeface="Iskoola Pota"/>
+        <a:font script="Mong" typeface="Mongolian Baiti"/>
+        <a:font script="Viet" typeface="Arial"/>
+        <a:font script="Uigh" typeface="Microsoft Uighur"/>
+        <a:font script="Geor" typeface="Sylfaen"/>
+      </a:minorFont>
+    </a:fontScheme>
+    <a:fmtScheme name="Office">
+      <a:fillStyleLst>
+        <a:solidFill>
+          <a:schemeClr val="phClr"/>
+        </a:solidFill>
+        <a:gradFill rotWithShape="1">
+          <a:gsLst>
+            <a:gs pos="0">
+              <a:schemeClr val="phClr">
+                <a:lumMod val="110000"/>
+                <a:satMod val="105000"/>
+                <a:tint val="67000"/>
+              </a:schemeClr>
+            </a:gs>
+            <a:gs pos="50000">
+              <a:schemeClr val="phClr">
+                <a:lumMod val="105000"/>
+                <a:satMod val="103000"/>
+                <a:tint val="73000"/>
+              </a:schemeClr>
+            </a:gs>
+            <a:gs pos="100000">
+              <a:schemeClr val="phClr">
+                <a:lumMod val="105000"/>
+                <a:satMod val="109000"/>
+                <a:tint val="81000"/>
+              </a:schemeClr>
+            </a:gs>
+          </a:gsLst>
+          <a:lin ang="5400000" scaled="0"/>
+        </a:gradFill>
+        <a:gradFill rotWithShape="1">
+          <a:gsLst>
+            <a:gs pos="0">
+              <a:schemeClr val="phClr">
+                <a:satMod val="103000"/>
+                <a:lumMod val="102000"/>
+                <a:tint val="94000"/>
+              </a:schemeClr>
+            </a:gs>
+            <a:gs pos="50000">
+              <a:schemeClr val="phClr">
+                <a:satMod val="110000"/>
+                <a:lumMod val="100000"/>
+                <a:shade val="100000"/>
+              </a:schemeClr>
+            </a:gs>
+            <a:gs pos="100000">
+              <a:schemeClr val="phClr">
+                <a:lumMod val="99000"/>
+                <a:satMod val="120000"/>
+                <a:shade val="78000"/>
+              </a:schemeClr>
+            </a:gs>
+          </a:gsLst>
+          <a:lin ang="5400000" scaled="0"/>
+        </a:gradFill>
+      </a:fillStyleLst>
+      <a:lnStyleLst>
+        <a:ln w="6350" cap="flat" cmpd="sng" algn="ctr">
+          <a:solidFill>
+            <a:schemeClr val="phClr"/>
+          </a:solidFill>
+          <a:prstDash val="solid"/>
+          <a:miter lim="800000"/>
+        </a:ln>
+        <a:ln w="12700" cap="flat" cmpd="sng" algn="ctr">
+          <a:solidFill>
+            <a:schemeClr val="phClr"/>
+          </a:solidFill>
+          <a:prstDash val="solid"/>
+          <a:miter lim="800000"/>
+        </a:ln>
+        <a:ln w="19050" cap="flat" cmpd="sng" algn="ctr">
+          <a:solidFill>
+            <a:schemeClr val="phClr"/>
+          </a:solidFill>
+          <a:prstDash val="solid"/>
+          <a:miter lim="800000"/>
+        </a:ln>
+      </a:lnStyleLst>
+      <a:effectStyleLst>
+        <a:effectStyle>
+          <a:effectLst/>
+        </a:effectStyle>
+        <a:effectStyle>
+          <a:effectLst/>
+        </a:effectStyle>
+        <a:effectStyle>
+          <a:effectLst>
+            <a:outerShdw blurRad="57150" dist="19050" dir="5400000" algn="ctr" rotWithShape="0">
+              <a:srgbClr val="000000">
+                <a:alpha val="63000"/>
+              </a:srgbClr>
+            </a:outerShdw>
+          </a:effectLst>
+        </a:effectStyle>
+      </a:effectStyleLst>
+      <a:bgFillStyleLst>
+        <a:solidFill>
+          <a:schemeClr val="phClr"/>
+        </a:solidFill>
+        <a:solidFill>
+          <a:schemeClr val="phClr">
+            <a:tint val="95000"/>
+            <a:satMod val="170000"/>
+          </a:schemeClr>
+        </a:solidFill>
+        <a:gradFill rotWithShape="1">
+          <a:gsLst>
+            <a:gs pos="0">
+              <a:schemeClr val="phClr">
+                <a:tint val="93000"/>
+                <a:satMod val="150000"/>
+                <a:shade val="98000"/>
+                <a:lumMod val="102000"/>
+              </a:schemeClr>
+            </a:gs>
+            <a:gs pos="50000">
+              <a:schemeClr val="phClr">
+                <a:tint val="98000"/>
+                <a:satMod val="130000"/>
+                <a:shade val="90000"/>
+                <a:lumMod val="103000"/>
+              </a:schemeClr>
+            </a:gs>
+            <a:gs pos="100000">
+              <a:schemeClr val="phClr">
+                <a:shade val="63000"/>
+                <a:satMod val="120000"/>
+              </a:schemeClr>
+            </a:gs>
+          </a:gsLst>
+          <a:lin ang="5400000" scaled="0"/>
+        </a:gradFill>
+      </a:bgFillStyleLst>
+    </a:fmtScheme>
+  </a:themeElements>
+  <a:objectDefaults/>
+  <a:extraClrSchemeLst/>
+  <a:extLst>
+    <a:ext uri="{05A4C25C-085E-4340-85A3-A5531E510DB2}">
+      <thm15:themeFamily xmlns:thm15="http://schemas.microsoft.com/office/thememl/2012/main" name="Office Theme" id="{62F939B6-93AF-4DB8-9C6B-D6C7DFDC589F}" vid="{4A3C46E8-61CC-4603-A589-7422A47A8E4A}"/>
+    </a:ext>
+  </a:extLst>
+</a:theme>
 </file>
</xml_diff>

<commit_message>
tidied up key points
</commit_message>
<xml_diff>
--- a/instructors/02-Being_FAIR.pptx
+++ b/instructors/02-Being_FAIR.pptx
@@ -214,7 +214,7 @@
           <a:p>
             <a:fld id="{AA8A194F-1EDC-44D6-902F-D21F13A5BCE4}" type="datetimeFigureOut">
               <a:rPr lang="en-GB" smtClean="0"/>
-              <a:t>12/08/2022</a:t>
+              <a:t>15/08/2022</a:t>
             </a:fld>
             <a:endParaRPr lang="en-GB"/>
           </a:p>
@@ -528,7 +528,17 @@
           <a:p>
             <a:r>
               <a:rPr lang="en-GB" smtClean="0"/>
-              <a:t>This example is from a real</a:t>
+              <a:t>Please see webpage or etherpad for the detailed instructions for exercise 1a. </a:t>
+            </a:r>
+          </a:p>
+          <a:p>
+            <a:r>
+              <a:rPr lang="en-GB" smtClean="0"/>
+              <a:t>This </a:t>
+            </a:r>
+            <a:r>
+              <a:rPr lang="en-GB" smtClean="0"/>
+              <a:t>example is from a real</a:t>
             </a:r>
             <a:r>
               <a:rPr lang="en-GB" baseline="0" smtClean="0"/>
@@ -784,7 +794,7 @@
             <a:fld id="{DE72BEAC-A25F-4480-8AFC-1D3E290F2CC8}" type="datetimeFigureOut">
               <a:rPr lang="en-GB" smtClean="0"/>
               <a:pPr/>
-              <a:t>12/08/2022</a:t>
+              <a:t>15/08/2022</a:t>
             </a:fld>
             <a:endParaRPr lang="en-GB" dirty="0"/>
           </a:p>
@@ -1048,7 +1058,7 @@
           <a:p>
             <a:fld id="{DE72BEAC-A25F-4480-8AFC-1D3E290F2CC8}" type="datetimeFigureOut">
               <a:rPr lang="en-GB" smtClean="0"/>
-              <a:t>12/08/2022</a:t>
+              <a:t>15/08/2022</a:t>
             </a:fld>
             <a:endParaRPr lang="en-GB" dirty="0"/>
           </a:p>
@@ -1258,7 +1268,7 @@
           <a:p>
             <a:fld id="{DE72BEAC-A25F-4480-8AFC-1D3E290F2CC8}" type="datetimeFigureOut">
               <a:rPr lang="en-GB" smtClean="0"/>
-              <a:t>12/08/2022</a:t>
+              <a:t>15/08/2022</a:t>
             </a:fld>
             <a:endParaRPr lang="en-GB" dirty="0"/>
           </a:p>
@@ -1458,7 +1468,7 @@
           <a:p>
             <a:fld id="{DE72BEAC-A25F-4480-8AFC-1D3E290F2CC8}" type="datetimeFigureOut">
               <a:rPr lang="en-GB" smtClean="0"/>
-              <a:t>12/08/2022</a:t>
+              <a:t>15/08/2022</a:t>
             </a:fld>
             <a:endParaRPr lang="en-GB" dirty="0"/>
           </a:p>
@@ -1734,7 +1744,7 @@
           <a:p>
             <a:fld id="{DE72BEAC-A25F-4480-8AFC-1D3E290F2CC8}" type="datetimeFigureOut">
               <a:rPr lang="en-GB" smtClean="0"/>
-              <a:t>12/08/2022</a:t>
+              <a:t>15/08/2022</a:t>
             </a:fld>
             <a:endParaRPr lang="en-GB" dirty="0"/>
           </a:p>
@@ -2002,7 +2012,7 @@
           <a:p>
             <a:fld id="{DE72BEAC-A25F-4480-8AFC-1D3E290F2CC8}" type="datetimeFigureOut">
               <a:rPr lang="en-GB" smtClean="0"/>
-              <a:t>12/08/2022</a:t>
+              <a:t>15/08/2022</a:t>
             </a:fld>
             <a:endParaRPr lang="en-GB" dirty="0"/>
           </a:p>
@@ -2417,7 +2427,7 @@
           <a:p>
             <a:fld id="{DE72BEAC-A25F-4480-8AFC-1D3E290F2CC8}" type="datetimeFigureOut">
               <a:rPr lang="en-GB" smtClean="0"/>
-              <a:t>12/08/2022</a:t>
+              <a:t>15/08/2022</a:t>
             </a:fld>
             <a:endParaRPr lang="en-GB" dirty="0"/>
           </a:p>
@@ -2559,7 +2569,7 @@
           <a:p>
             <a:fld id="{DE72BEAC-A25F-4480-8AFC-1D3E290F2CC8}" type="datetimeFigureOut">
               <a:rPr lang="en-GB" smtClean="0"/>
-              <a:t>12/08/2022</a:t>
+              <a:t>15/08/2022</a:t>
             </a:fld>
             <a:endParaRPr lang="en-GB" dirty="0"/>
           </a:p>
@@ -2672,7 +2682,7 @@
           <a:p>
             <a:fld id="{DE72BEAC-A25F-4480-8AFC-1D3E290F2CC8}" type="datetimeFigureOut">
               <a:rPr lang="en-GB" smtClean="0"/>
-              <a:t>12/08/2022</a:t>
+              <a:t>15/08/2022</a:t>
             </a:fld>
             <a:endParaRPr lang="en-GB" dirty="0"/>
           </a:p>
@@ -2985,7 +2995,7 @@
           <a:p>
             <a:fld id="{DE72BEAC-A25F-4480-8AFC-1D3E290F2CC8}" type="datetimeFigureOut">
               <a:rPr lang="en-GB" smtClean="0"/>
-              <a:t>12/08/2022</a:t>
+              <a:t>15/08/2022</a:t>
             </a:fld>
             <a:endParaRPr lang="en-GB" dirty="0"/>
           </a:p>
@@ -3274,7 +3284,7 @@
           <a:p>
             <a:fld id="{DE72BEAC-A25F-4480-8AFC-1D3E290F2CC8}" type="datetimeFigureOut">
               <a:rPr lang="en-GB" smtClean="0"/>
-              <a:t>12/08/2022</a:t>
+              <a:t>15/08/2022</a:t>
             </a:fld>
             <a:endParaRPr lang="en-GB" dirty="0"/>
           </a:p>
@@ -3516,7 +3526,7 @@
             <a:fld id="{DE72BEAC-A25F-4480-8AFC-1D3E290F2CC8}" type="datetimeFigureOut">
               <a:rPr lang="en-GB" smtClean="0"/>
               <a:pPr/>
-              <a:t>12/08/2022</a:t>
+              <a:t>15/08/2022</a:t>
             </a:fld>
             <a:endParaRPr lang="en-GB" dirty="0"/>
           </a:p>
@@ -4298,7 +4308,7 @@
                 <a:hlinkClick r:id="rId6">
                   <a:extLst>
                     <a:ext uri="{A12FA001-AC4F-418D-AE19-62706E023703}">
-                      <ahyp:hlinkClr xmlns:ahyp="http://schemas.microsoft.com/office/drawing/2018/hyperlinkcolor" xmlns="" val="tx"/>
+                      <ahyp:hlinkClr xmlns="" xmlns:ahyp="http://schemas.microsoft.com/office/drawing/2018/hyperlinkcolor" val="tx"/>
                     </a:ext>
                   </a:extLst>
                 </a:hlinkClick>
@@ -4321,7 +4331,7 @@
                 <a:hlinkClick r:id="rId7">
                   <a:extLst>
                     <a:ext uri="{A12FA001-AC4F-418D-AE19-62706E023703}">
-                      <ahyp:hlinkClr xmlns:ahyp="http://schemas.microsoft.com/office/drawing/2018/hyperlinkcolor" xmlns="" val="tx"/>
+                      <ahyp:hlinkClr xmlns="" xmlns:ahyp="http://schemas.microsoft.com/office/drawing/2018/hyperlinkcolor" val="tx"/>
                     </a:ext>
                   </a:extLst>
                 </a:hlinkClick>
@@ -4344,7 +4354,7 @@
                 <a:hlinkClick r:id="rId8">
                   <a:extLst>
                     <a:ext uri="{A12FA001-AC4F-418D-AE19-62706E023703}">
-                      <ahyp:hlinkClr xmlns:ahyp="http://schemas.microsoft.com/office/drawing/2018/hyperlinkcolor" xmlns="" val="tx"/>
+                      <ahyp:hlinkClr xmlns="" xmlns:ahyp="http://schemas.microsoft.com/office/drawing/2018/hyperlinkcolor" val="tx"/>
                     </a:ext>
                   </a:extLst>
                 </a:hlinkClick>
@@ -4915,7 +4925,7 @@
                 <a14:useLocalDpi xmlns:a14="http://schemas.microsoft.com/office/drawing/2010/main" val="0"/>
               </a:ext>
               <a:ext uri="{96DAC541-7B7A-43D3-8B79-37D633B846F1}">
-                <asvg:svgBlip xmlns:asvg="http://schemas.microsoft.com/office/drawing/2016/SVG/main" xmlns="" r:embed="rId3"/>
+                <asvg:svgBlip xmlns="" xmlns:asvg="http://schemas.microsoft.com/office/drawing/2016/SVG/main" r:embed="rId3"/>
               </a:ext>
             </a:extLst>
           </a:blip>
@@ -5146,7 +5156,7 @@
                 <a14:useLocalDpi xmlns:a14="http://schemas.microsoft.com/office/drawing/2010/main" val="0"/>
               </a:ext>
               <a:ext uri="{96DAC541-7B7A-43D3-8B79-37D633B846F1}">
-                <asvg:svgBlip xmlns:asvg="http://schemas.microsoft.com/office/drawing/2016/SVG/main" xmlns="" r:embed="rId7"/>
+                <asvg:svgBlip xmlns="" xmlns:asvg="http://schemas.microsoft.com/office/drawing/2016/SVG/main" r:embed="rId7"/>
               </a:ext>
             </a:extLst>
           </a:blip>
@@ -5671,7 +5681,7 @@
                 <a16:creationId xmlns:a16="http://schemas.microsoft.com/office/drawing/2014/main" id="{91F32EBA-ED97-466E-8CFA-8382584155D0}"/>
               </a:ext>
               <a:ext uri="{C183D7F6-B498-43B3-948B-1728B52AA6E4}">
-                <adec:decorative xmlns:adec="http://schemas.microsoft.com/office/drawing/2017/decorative" xmlns="" val="1"/>
+                <adec:decorative xmlns="" xmlns:adec="http://schemas.microsoft.com/office/drawing/2017/decorative" val="1"/>
               </a:ext>
             </a:extLst>
           </p:cNvPr>
@@ -5804,7 +5814,7 @@
                 <a16:creationId xmlns:a16="http://schemas.microsoft.com/office/drawing/2014/main" id="{62A38935-BB53-4DF7-A56E-48DD25B685D7}"/>
               </a:ext>
               <a:ext uri="{C183D7F6-B498-43B3-948B-1728B52AA6E4}">
-                <adec:decorative xmlns:adec="http://schemas.microsoft.com/office/drawing/2017/decorative" xmlns="" val="1"/>
+                <adec:decorative xmlns="" xmlns:adec="http://schemas.microsoft.com/office/drawing/2017/decorative" val="1"/>
               </a:ext>
             </a:extLst>
           </p:cNvPr>
@@ -6591,7 +6601,7 @@
                 <a14:useLocalDpi xmlns:a14="http://schemas.microsoft.com/office/drawing/2010/main" val="0"/>
               </a:ext>
               <a:ext uri="{96DAC541-7B7A-43D3-8B79-37D633B846F1}">
-                <asvg:svgBlip xmlns:asvg="http://schemas.microsoft.com/office/drawing/2016/SVG/main" xmlns="" r:embed="rId3"/>
+                <asvg:svgBlip xmlns="" xmlns:asvg="http://schemas.microsoft.com/office/drawing/2016/SVG/main" r:embed="rId3"/>
               </a:ext>
             </a:extLst>
           </a:blip>
@@ -6812,7 +6822,7 @@
                 <a16:creationId xmlns:a16="http://schemas.microsoft.com/office/drawing/2014/main" id="{C4E4288A-DFC8-40A2-90E5-70E851A933AD}"/>
               </a:ext>
               <a:ext uri="{C183D7F6-B498-43B3-948B-1728B52AA6E4}">
-                <adec:decorative xmlns:adec="http://schemas.microsoft.com/office/drawing/2017/decorative" xmlns="" val="1"/>
+                <adec:decorative xmlns="" xmlns:adec="http://schemas.microsoft.com/office/drawing/2017/decorative" val="1"/>
               </a:ext>
             </a:extLst>
           </p:cNvPr>
@@ -6920,7 +6930,7 @@
                 <a16:creationId xmlns:a16="http://schemas.microsoft.com/office/drawing/2014/main" id="{A94A2FC9-6D19-473C-B868-99FDB2044AA9}"/>
               </a:ext>
               <a:ext uri="{C183D7F6-B498-43B3-948B-1728B52AA6E4}">
-                <adec:decorative xmlns:adec="http://schemas.microsoft.com/office/drawing/2017/decorative" xmlns="" val="1"/>
+                <adec:decorative xmlns="" xmlns:adec="http://schemas.microsoft.com/office/drawing/2017/decorative" val="1"/>
               </a:ext>
             </a:extLst>
           </p:cNvPr>
@@ -7139,7 +7149,7 @@
                 <a14:useLocalDpi xmlns:a14="http://schemas.microsoft.com/office/drawing/2010/main" val="0"/>
               </a:ext>
               <a:ext uri="{96DAC541-7B7A-43D3-8B79-37D633B846F1}">
-                <asvg:svgBlip xmlns:asvg="http://schemas.microsoft.com/office/drawing/2016/SVG/main" xmlns="" r:embed="rId3"/>
+                <asvg:svgBlip xmlns="" xmlns:asvg="http://schemas.microsoft.com/office/drawing/2016/SVG/main" r:embed="rId3"/>
               </a:ext>
             </a:extLst>
           </a:blip>
@@ -7340,7 +7350,7 @@
                 <a16:creationId xmlns:a16="http://schemas.microsoft.com/office/drawing/2014/main" id="{8BED0409-854E-49C4-876E-A78C6D881BC8}"/>
               </a:ext>
               <a:ext uri="{C183D7F6-B498-43B3-948B-1728B52AA6E4}">
-                <adec:decorative xmlns:adec="http://schemas.microsoft.com/office/drawing/2017/decorative" xmlns="" val="1"/>
+                <adec:decorative xmlns="" xmlns:adec="http://schemas.microsoft.com/office/drawing/2017/decorative" val="1"/>
               </a:ext>
             </a:extLst>
           </p:cNvPr>
@@ -7985,7 +7995,7 @@
                 <a16:creationId xmlns:a16="http://schemas.microsoft.com/office/drawing/2014/main" id="{D4340B2E-01FD-4F5D-9C4D-AD3923AD20BA}"/>
               </a:ext>
               <a:ext uri="{C183D7F6-B498-43B3-948B-1728B52AA6E4}">
-                <adec:decorative xmlns:adec="http://schemas.microsoft.com/office/drawing/2017/decorative" xmlns="" val="1"/>
+                <adec:decorative xmlns="" xmlns:adec="http://schemas.microsoft.com/office/drawing/2017/decorative" val="1"/>
               </a:ext>
             </a:extLst>
           </p:cNvPr>
@@ -8204,7 +8214,7 @@
                 <a14:useLocalDpi xmlns:a14="http://schemas.microsoft.com/office/drawing/2010/main" val="0"/>
               </a:ext>
               <a:ext uri="{96DAC541-7B7A-43D3-8B79-37D633B846F1}">
-                <asvg:svgBlip xmlns:asvg="http://schemas.microsoft.com/office/drawing/2016/SVG/main" xmlns="" r:embed="rId5"/>
+                <asvg:svgBlip xmlns="" xmlns:asvg="http://schemas.microsoft.com/office/drawing/2016/SVG/main" r:embed="rId5"/>
               </a:ext>
             </a:extLst>
           </a:blip>
@@ -8243,7 +8253,7 @@
                 <a14:useLocalDpi xmlns:a14="http://schemas.microsoft.com/office/drawing/2010/main" val="0"/>
               </a:ext>
               <a:ext uri="{96DAC541-7B7A-43D3-8B79-37D633B846F1}">
-                <asvg:svgBlip xmlns:asvg="http://schemas.microsoft.com/office/drawing/2016/SVG/main" xmlns="" r:embed="rId7"/>
+                <asvg:svgBlip xmlns="" xmlns:asvg="http://schemas.microsoft.com/office/drawing/2016/SVG/main" r:embed="rId7"/>
               </a:ext>
             </a:extLst>
           </a:blip>

</xml_diff>

<commit_message>
tidied up FAIR info
</commit_message>
<xml_diff>
--- a/instructors/02-Being_FAIR.pptx
+++ b/instructors/02-Being_FAIR.pptx
@@ -214,7 +214,7 @@
           <a:p>
             <a:fld id="{AA8A194F-1EDC-44D6-902F-D21F13A5BCE4}" type="datetimeFigureOut">
               <a:rPr lang="en-GB" smtClean="0"/>
-              <a:t>15/08/2022</a:t>
+              <a:t>19/08/2022</a:t>
             </a:fld>
             <a:endParaRPr lang="en-GB"/>
           </a:p>
@@ -534,11 +534,7 @@
           <a:p>
             <a:r>
               <a:rPr lang="en-GB" smtClean="0"/>
-              <a:t>This </a:t>
-            </a:r>
-            <a:r>
-              <a:rPr lang="en-GB" smtClean="0"/>
-              <a:t>example is from a real</a:t>
+              <a:t>This example is from a real</a:t>
             </a:r>
             <a:r>
               <a:rPr lang="en-GB" baseline="0" smtClean="0"/>
@@ -794,7 +790,7 @@
             <a:fld id="{DE72BEAC-A25F-4480-8AFC-1D3E290F2CC8}" type="datetimeFigureOut">
               <a:rPr lang="en-GB" smtClean="0"/>
               <a:pPr/>
-              <a:t>15/08/2022</a:t>
+              <a:t>19/08/2022</a:t>
             </a:fld>
             <a:endParaRPr lang="en-GB" dirty="0"/>
           </a:p>
@@ -1058,7 +1054,7 @@
           <a:p>
             <a:fld id="{DE72BEAC-A25F-4480-8AFC-1D3E290F2CC8}" type="datetimeFigureOut">
               <a:rPr lang="en-GB" smtClean="0"/>
-              <a:t>15/08/2022</a:t>
+              <a:t>19/08/2022</a:t>
             </a:fld>
             <a:endParaRPr lang="en-GB" dirty="0"/>
           </a:p>
@@ -1268,7 +1264,7 @@
           <a:p>
             <a:fld id="{DE72BEAC-A25F-4480-8AFC-1D3E290F2CC8}" type="datetimeFigureOut">
               <a:rPr lang="en-GB" smtClean="0"/>
-              <a:t>15/08/2022</a:t>
+              <a:t>19/08/2022</a:t>
             </a:fld>
             <a:endParaRPr lang="en-GB" dirty="0"/>
           </a:p>
@@ -1468,7 +1464,7 @@
           <a:p>
             <a:fld id="{DE72BEAC-A25F-4480-8AFC-1D3E290F2CC8}" type="datetimeFigureOut">
               <a:rPr lang="en-GB" smtClean="0"/>
-              <a:t>15/08/2022</a:t>
+              <a:t>19/08/2022</a:t>
             </a:fld>
             <a:endParaRPr lang="en-GB" dirty="0"/>
           </a:p>
@@ -1744,7 +1740,7 @@
           <a:p>
             <a:fld id="{DE72BEAC-A25F-4480-8AFC-1D3E290F2CC8}" type="datetimeFigureOut">
               <a:rPr lang="en-GB" smtClean="0"/>
-              <a:t>15/08/2022</a:t>
+              <a:t>19/08/2022</a:t>
             </a:fld>
             <a:endParaRPr lang="en-GB" dirty="0"/>
           </a:p>
@@ -2012,7 +2008,7 @@
           <a:p>
             <a:fld id="{DE72BEAC-A25F-4480-8AFC-1D3E290F2CC8}" type="datetimeFigureOut">
               <a:rPr lang="en-GB" smtClean="0"/>
-              <a:t>15/08/2022</a:t>
+              <a:t>19/08/2022</a:t>
             </a:fld>
             <a:endParaRPr lang="en-GB" dirty="0"/>
           </a:p>
@@ -2427,7 +2423,7 @@
           <a:p>
             <a:fld id="{DE72BEAC-A25F-4480-8AFC-1D3E290F2CC8}" type="datetimeFigureOut">
               <a:rPr lang="en-GB" smtClean="0"/>
-              <a:t>15/08/2022</a:t>
+              <a:t>19/08/2022</a:t>
             </a:fld>
             <a:endParaRPr lang="en-GB" dirty="0"/>
           </a:p>
@@ -2569,7 +2565,7 @@
           <a:p>
             <a:fld id="{DE72BEAC-A25F-4480-8AFC-1D3E290F2CC8}" type="datetimeFigureOut">
               <a:rPr lang="en-GB" smtClean="0"/>
-              <a:t>15/08/2022</a:t>
+              <a:t>19/08/2022</a:t>
             </a:fld>
             <a:endParaRPr lang="en-GB" dirty="0"/>
           </a:p>
@@ -2682,7 +2678,7 @@
           <a:p>
             <a:fld id="{DE72BEAC-A25F-4480-8AFC-1D3E290F2CC8}" type="datetimeFigureOut">
               <a:rPr lang="en-GB" smtClean="0"/>
-              <a:t>15/08/2022</a:t>
+              <a:t>19/08/2022</a:t>
             </a:fld>
             <a:endParaRPr lang="en-GB" dirty="0"/>
           </a:p>
@@ -2995,7 +2991,7 @@
           <a:p>
             <a:fld id="{DE72BEAC-A25F-4480-8AFC-1D3E290F2CC8}" type="datetimeFigureOut">
               <a:rPr lang="en-GB" smtClean="0"/>
-              <a:t>15/08/2022</a:t>
+              <a:t>19/08/2022</a:t>
             </a:fld>
             <a:endParaRPr lang="en-GB" dirty="0"/>
           </a:p>
@@ -3284,7 +3280,7 @@
           <a:p>
             <a:fld id="{DE72BEAC-A25F-4480-8AFC-1D3E290F2CC8}" type="datetimeFigureOut">
               <a:rPr lang="en-GB" smtClean="0"/>
-              <a:t>15/08/2022</a:t>
+              <a:t>19/08/2022</a:t>
             </a:fld>
             <a:endParaRPr lang="en-GB" dirty="0"/>
           </a:p>
@@ -3526,7 +3522,7 @@
             <a:fld id="{DE72BEAC-A25F-4480-8AFC-1D3E290F2CC8}" type="datetimeFigureOut">
               <a:rPr lang="en-GB" smtClean="0"/>
               <a:pPr/>
-              <a:t>15/08/2022</a:t>
+              <a:t>19/08/2022</a:t>
             </a:fld>
             <a:endParaRPr lang="en-GB" dirty="0"/>
           </a:p>
@@ -4140,8 +4136,8 @@
         </p:nvSpPr>
         <p:spPr>
           <a:xfrm>
-            <a:off x="633167" y="1461257"/>
-            <a:ext cx="10925666" cy="4154984"/>
+            <a:off x="633167" y="2234145"/>
+            <a:ext cx="10925666" cy="3785652"/>
           </a:xfrm>
           <a:prstGeom prst="rect">
             <a:avLst/>
@@ -4154,12 +4150,147 @@
           <a:lstStyle/>
           <a:p>
             <a:r>
+              <a:rPr lang="en-GB" sz="2400" smtClean="0">
+                <a:solidFill>
+                  <a:srgbClr val="0070C0"/>
+                </a:solidFill>
+              </a:rPr>
+              <a:t>Repositories provide </a:t>
+            </a:r>
+            <a:r>
+              <a:rPr lang="en-GB" sz="2400" b="1" smtClean="0">
+                <a:solidFill>
+                  <a:srgbClr val="0070C0"/>
+                </a:solidFill>
+              </a:rPr>
+              <a:t>persistent identifiers </a:t>
+            </a:r>
+            <a:r>
+              <a:rPr lang="en-GB" sz="2400">
+                <a:solidFill>
+                  <a:srgbClr val="0070C0"/>
+                </a:solidFill>
+              </a:rPr>
+              <a:t>(PIDs), controlled vocabularies for efficient cataloguing</a:t>
+            </a:r>
+            <a:r>
+              <a:rPr lang="en-GB" sz="2400">
+                <a:solidFill>
+                  <a:srgbClr val="0070C0"/>
+                </a:solidFill>
+              </a:rPr>
+              <a:t>, </a:t>
+            </a:r>
+            <a:r>
+              <a:rPr lang="en-GB" sz="2400" smtClean="0">
+                <a:solidFill>
+                  <a:srgbClr val="0070C0"/>
+                </a:solidFill>
+              </a:rPr>
+              <a:t>advanced </a:t>
+            </a:r>
+            <a:r>
+              <a:rPr lang="en-GB" sz="2400">
+                <a:solidFill>
+                  <a:srgbClr val="0070C0"/>
+                </a:solidFill>
+              </a:rPr>
+              <a:t>metadata searching and download statistics. Some repositories can also host supported curation, digital preservation, private data or provide embargo periods, meaning access to all data can be delayed or restricted.</a:t>
+            </a:r>
+          </a:p>
+          <a:p>
+            <a:endParaRPr lang="en-GB" sz="2400" smtClean="0">
+              <a:solidFill>
+                <a:srgbClr val="0070C0"/>
+              </a:solidFill>
+            </a:endParaRPr>
+          </a:p>
+          <a:p>
+            <a:r>
+              <a:rPr lang="en-GB" sz="2400" smtClean="0">
+                <a:solidFill>
+                  <a:srgbClr val="0070C0"/>
+                </a:solidFill>
+              </a:rPr>
+              <a:t>There </a:t>
+            </a:r>
+            <a:r>
               <a:rPr lang="en-GB" sz="2400" dirty="0">
                 <a:solidFill>
                   <a:srgbClr val="0070C0"/>
                 </a:solidFill>
               </a:rPr>
-              <a:t>Deposit data to an external, reputable public repository.</a:t>
+              <a:t>are general “data agnostic” repositories, for example: </a:t>
+            </a:r>
+          </a:p>
+          <a:p>
+            <a:r>
+              <a:rPr lang="en-GB" sz="2400" dirty="0">
+                <a:solidFill>
+                  <a:srgbClr val="0070C0"/>
+                </a:solidFill>
+                <a:hlinkClick r:id="rId2"/>
+              </a:rPr>
+              <a:t>Dryad</a:t>
+            </a:r>
+            <a:r>
+              <a:rPr lang="en-GB" sz="2400" dirty="0">
+                <a:solidFill>
+                  <a:srgbClr val="0070C0"/>
+                </a:solidFill>
+              </a:rPr>
+              <a:t>, </a:t>
+            </a:r>
+            <a:r>
+              <a:rPr lang="en-GB" sz="2400" dirty="0">
+                <a:solidFill>
+                  <a:srgbClr val="0070C0"/>
+                </a:solidFill>
+                <a:hlinkClick r:id="rId3"/>
+              </a:rPr>
+              <a:t>Zenodo</a:t>
+            </a:r>
+            <a:r>
+              <a:rPr lang="en-GB" sz="2400" dirty="0">
+                <a:solidFill>
+                  <a:srgbClr val="0070C0"/>
+                </a:solidFill>
+              </a:rPr>
+              <a:t>, </a:t>
+            </a:r>
+            <a:r>
+              <a:rPr lang="en-GB" sz="2400" dirty="0">
+                <a:solidFill>
+                  <a:srgbClr val="0070C0"/>
+                </a:solidFill>
+                <a:hlinkClick r:id="rId4"/>
+              </a:rPr>
+              <a:t>FigShare</a:t>
+            </a:r>
+            <a:r>
+              <a:rPr lang="en-GB" sz="2400" dirty="0">
+                <a:solidFill>
+                  <a:srgbClr val="0070C0"/>
+                </a:solidFill>
+              </a:rPr>
+              <a:t>, </a:t>
+            </a:r>
+            <a:r>
+              <a:rPr lang="en-GB" sz="2400" dirty="0">
+                <a:solidFill>
+                  <a:srgbClr val="0070C0"/>
+                </a:solidFill>
+                <a:hlinkClick r:id="rId5"/>
+              </a:rPr>
+              <a:t>Dataverse</a:t>
+            </a:r>
+            <a:r>
+              <a:rPr lang="en-GB" sz="2400" dirty="0">
+                <a:solidFill>
+                  <a:srgbClr val="0070C0"/>
+                </a:solidFill>
+              </a:rPr>
+              <a:t>. </a:t>
             </a:r>
           </a:p>
           <a:p>
@@ -4176,126 +4307,6 @@
                   <a:srgbClr val="0070C0"/>
                 </a:solidFill>
               </a:rPr>
-              <a:t>Repositories provide </a:t>
-            </a:r>
-            <a:r>
-              <a:rPr lang="en-GB" sz="2400" b="1" dirty="0">
-                <a:solidFill>
-                  <a:srgbClr val="0070C0"/>
-                </a:solidFill>
-              </a:rPr>
-              <a:t>persistent identifiers </a:t>
-            </a:r>
-            <a:r>
-              <a:rPr lang="en-GB" sz="2400" dirty="0">
-                <a:solidFill>
-                  <a:srgbClr val="0070C0"/>
-                </a:solidFill>
-              </a:rPr>
-              <a:t>(PIDs), catalogue options, advanced metadata searching, and download statistics. Some repositories can also host private data or provide embargo periods, meaning access to all data can be delayed.</a:t>
-            </a:r>
-          </a:p>
-          <a:p>
-            <a:endParaRPr lang="en-GB" sz="2400" dirty="0">
-              <a:solidFill>
-                <a:srgbClr val="0070C0"/>
-              </a:solidFill>
-            </a:endParaRPr>
-          </a:p>
-          <a:p>
-            <a:r>
-              <a:rPr lang="en-GB" sz="2400" dirty="0">
-                <a:solidFill>
-                  <a:srgbClr val="0070C0"/>
-                </a:solidFill>
-              </a:rPr>
-              <a:t>There are general “data agnostic” repositories, for example: </a:t>
-            </a:r>
-          </a:p>
-          <a:p>
-            <a:r>
-              <a:rPr lang="en-GB" sz="2400" dirty="0">
-                <a:solidFill>
-                  <a:srgbClr val="0070C0"/>
-                </a:solidFill>
-                <a:hlinkClick r:id="rId2"/>
-              </a:rPr>
-              <a:t>Dryad</a:t>
-            </a:r>
-            <a:r>
-              <a:rPr lang="en-GB" sz="2400" dirty="0">
-                <a:solidFill>
-                  <a:srgbClr val="0070C0"/>
-                </a:solidFill>
-              </a:rPr>
-              <a:t>, </a:t>
-            </a:r>
-            <a:r>
-              <a:rPr lang="en-GB" sz="2400" dirty="0">
-                <a:solidFill>
-                  <a:srgbClr val="0070C0"/>
-                </a:solidFill>
-                <a:hlinkClick r:id="rId3"/>
-              </a:rPr>
-              <a:t>Zenodo</a:t>
-            </a:r>
-            <a:r>
-              <a:rPr lang="en-GB" sz="2400" dirty="0">
-                <a:solidFill>
-                  <a:srgbClr val="0070C0"/>
-                </a:solidFill>
-              </a:rPr>
-              <a:t>, </a:t>
-            </a:r>
-            <a:r>
-              <a:rPr lang="en-GB" sz="2400" dirty="0">
-                <a:solidFill>
-                  <a:srgbClr val="0070C0"/>
-                </a:solidFill>
-                <a:hlinkClick r:id="rId4"/>
-              </a:rPr>
-              <a:t>FigShare</a:t>
-            </a:r>
-            <a:r>
-              <a:rPr lang="en-GB" sz="2400" dirty="0">
-                <a:solidFill>
-                  <a:srgbClr val="0070C0"/>
-                </a:solidFill>
-              </a:rPr>
-              <a:t>, </a:t>
-            </a:r>
-            <a:r>
-              <a:rPr lang="en-GB" sz="2400" dirty="0">
-                <a:solidFill>
-                  <a:srgbClr val="0070C0"/>
-                </a:solidFill>
-                <a:hlinkClick r:id="rId5"/>
-              </a:rPr>
-              <a:t>Dataverse</a:t>
-            </a:r>
-            <a:r>
-              <a:rPr lang="en-GB" sz="2400" dirty="0">
-                <a:solidFill>
-                  <a:srgbClr val="0070C0"/>
-                </a:solidFill>
-              </a:rPr>
-              <a:t>. </a:t>
-            </a:r>
-          </a:p>
-          <a:p>
-            <a:endParaRPr lang="en-GB" sz="2400" dirty="0">
-              <a:solidFill>
-                <a:srgbClr val="0070C0"/>
-              </a:solidFill>
-            </a:endParaRPr>
-          </a:p>
-          <a:p>
-            <a:r>
-              <a:rPr lang="en-GB" sz="2400" dirty="0">
-                <a:solidFill>
-                  <a:srgbClr val="0070C0"/>
-                </a:solidFill>
-              </a:rPr>
               <a:t>Or domain specific, for example: </a:t>
             </a:r>
           </a:p>
@@ -4308,7 +4319,7 @@
                 <a:hlinkClick r:id="rId6">
                   <a:extLst>
                     <a:ext uri="{A12FA001-AC4F-418D-AE19-62706E023703}">
-                      <ahyp:hlinkClr xmlns="" xmlns:ahyp="http://schemas.microsoft.com/office/drawing/2018/hyperlinkcolor" val="tx"/>
+                      <ahyp:hlinkClr xmlns:ahyp="http://schemas.microsoft.com/office/drawing/2018/hyperlinkcolor" xmlns="" val="tx"/>
                     </a:ext>
                   </a:extLst>
                 </a:hlinkClick>
@@ -4331,7 +4342,7 @@
                 <a:hlinkClick r:id="rId7">
                   <a:extLst>
                     <a:ext uri="{A12FA001-AC4F-418D-AE19-62706E023703}">
-                      <ahyp:hlinkClr xmlns="" xmlns:ahyp="http://schemas.microsoft.com/office/drawing/2018/hyperlinkcolor" val="tx"/>
+                      <ahyp:hlinkClr xmlns:ahyp="http://schemas.microsoft.com/office/drawing/2018/hyperlinkcolor" xmlns="" val="tx"/>
                     </a:ext>
                   </a:extLst>
                 </a:hlinkClick>
@@ -4354,7 +4365,7 @@
                 <a:hlinkClick r:id="rId8">
                   <a:extLst>
                     <a:ext uri="{A12FA001-AC4F-418D-AE19-62706E023703}">
-                      <ahyp:hlinkClr xmlns="" xmlns:ahyp="http://schemas.microsoft.com/office/drawing/2018/hyperlinkcolor" val="tx"/>
+                      <ahyp:hlinkClr xmlns:ahyp="http://schemas.microsoft.com/office/drawing/2018/hyperlinkcolor" xmlns="" val="tx"/>
                     </a:ext>
                   </a:extLst>
                 </a:hlinkClick>
@@ -4369,6 +4380,118 @@
               </a:rPr>
               <a:t> – metabolomics data.</a:t>
             </a:r>
+          </a:p>
+        </p:txBody>
+      </p:sp>
+      <p:sp>
+        <p:nvSpPr>
+          <p:cNvPr id="3" name="Rectangle 2"/>
+          <p:cNvSpPr/>
+          <p:nvPr/>
+        </p:nvSpPr>
+        <p:spPr>
+          <a:xfrm>
+            <a:off x="633167" y="1410681"/>
+            <a:ext cx="10925666" cy="584775"/>
+          </a:xfrm>
+          <a:prstGeom prst="rect">
+            <a:avLst/>
+          </a:prstGeom>
+          <a:noFill/>
+        </p:spPr>
+        <p:txBody>
+          <a:bodyPr wrap="square" lIns="91440" tIns="45720" rIns="91440" bIns="45720">
+            <a:spAutoFit/>
+          </a:bodyPr>
+          <a:lstStyle/>
+          <a:p>
+            <a:r>
+              <a:rPr lang="en-GB" sz="3200" b="1">
+                <a:ln w="9525">
+                  <a:solidFill>
+                    <a:schemeClr val="bg1"/>
+                  </a:solidFill>
+                  <a:prstDash val="solid"/>
+                </a:ln>
+                <a:effectLst>
+                  <a:outerShdw blurRad="12700" dist="38100" dir="2700000" algn="tl" rotWithShape="0">
+                    <a:schemeClr val="bg1">
+                      <a:lumMod val="50000"/>
+                    </a:schemeClr>
+                  </a:outerShdw>
+                </a:effectLst>
+              </a:rPr>
+              <a:t>TOP TIP: </a:t>
+            </a:r>
+            <a:r>
+              <a:rPr lang="en-GB" sz="3200" b="1">
+                <a:ln w="9525">
+                  <a:solidFill>
+                    <a:schemeClr val="bg1"/>
+                  </a:solidFill>
+                  <a:prstDash val="solid"/>
+                </a:ln>
+                <a:effectLst>
+                  <a:outerShdw blurRad="12700" dist="38100" dir="2700000" algn="tl" rotWithShape="0">
+                    <a:schemeClr val="bg1">
+                      <a:lumMod val="50000"/>
+                    </a:schemeClr>
+                  </a:outerShdw>
+                </a:effectLst>
+              </a:rPr>
+              <a:t>Deposit </a:t>
+            </a:r>
+            <a:r>
+              <a:rPr lang="en-GB" sz="3200" b="1" smtClean="0">
+                <a:ln w="9525">
+                  <a:solidFill>
+                    <a:schemeClr val="bg1"/>
+                  </a:solidFill>
+                  <a:prstDash val="solid"/>
+                </a:ln>
+                <a:effectLst>
+                  <a:outerShdw blurRad="12700" dist="38100" dir="2700000" algn="tl" rotWithShape="0">
+                    <a:schemeClr val="bg1">
+                      <a:lumMod val="50000"/>
+                    </a:schemeClr>
+                  </a:outerShdw>
+                </a:effectLst>
+              </a:rPr>
+              <a:t>your data in </a:t>
+            </a:r>
+            <a:r>
+              <a:rPr lang="en-GB" sz="3200" b="1">
+                <a:ln w="9525">
+                  <a:solidFill>
+                    <a:schemeClr val="bg1"/>
+                  </a:solidFill>
+                  <a:prstDash val="solid"/>
+                </a:ln>
+                <a:effectLst>
+                  <a:outerShdw blurRad="12700" dist="38100" dir="2700000" algn="tl" rotWithShape="0">
+                    <a:schemeClr val="bg1">
+                      <a:lumMod val="50000"/>
+                    </a:schemeClr>
+                  </a:outerShdw>
+                </a:effectLst>
+              </a:rPr>
+              <a:t>a trustworthy public repository! </a:t>
+            </a:r>
+            <a:endParaRPr lang="en-GB" sz="3200" b="1" dirty="0">
+              <a:ln w="9525">
+                <a:solidFill>
+                  <a:schemeClr val="bg1"/>
+                </a:solidFill>
+                <a:prstDash val="solid"/>
+              </a:ln>
+              <a:effectLst>
+                <a:outerShdw blurRad="12700" dist="38100" dir="2700000" algn="tl" rotWithShape="0">
+                  <a:schemeClr val="bg1">
+                    <a:lumMod val="50000"/>
+                  </a:schemeClr>
+                </a:outerShdw>
+              </a:effectLst>
+            </a:endParaRPr>
           </a:p>
         </p:txBody>
       </p:sp>
@@ -4925,7 +5048,7 @@
                 <a14:useLocalDpi xmlns:a14="http://schemas.microsoft.com/office/drawing/2010/main" val="0"/>
               </a:ext>
               <a:ext uri="{96DAC541-7B7A-43D3-8B79-37D633B846F1}">
-                <asvg:svgBlip xmlns="" xmlns:asvg="http://schemas.microsoft.com/office/drawing/2016/SVG/main" r:embed="rId3"/>
+                <asvg:svgBlip xmlns:asvg="http://schemas.microsoft.com/office/drawing/2016/SVG/main" xmlns="" r:embed="rId3"/>
               </a:ext>
             </a:extLst>
           </a:blip>
@@ -5156,7 +5279,7 @@
                 <a14:useLocalDpi xmlns:a14="http://schemas.microsoft.com/office/drawing/2010/main" val="0"/>
               </a:ext>
               <a:ext uri="{96DAC541-7B7A-43D3-8B79-37D633B846F1}">
-                <asvg:svgBlip xmlns="" xmlns:asvg="http://schemas.microsoft.com/office/drawing/2016/SVG/main" r:embed="rId7"/>
+                <asvg:svgBlip xmlns:asvg="http://schemas.microsoft.com/office/drawing/2016/SVG/main" xmlns="" r:embed="rId7"/>
               </a:ext>
             </a:extLst>
           </a:blip>
@@ -5681,7 +5804,7 @@
                 <a16:creationId xmlns:a16="http://schemas.microsoft.com/office/drawing/2014/main" id="{91F32EBA-ED97-466E-8CFA-8382584155D0}"/>
               </a:ext>
               <a:ext uri="{C183D7F6-B498-43B3-948B-1728B52AA6E4}">
-                <adec:decorative xmlns="" xmlns:adec="http://schemas.microsoft.com/office/drawing/2017/decorative" val="1"/>
+                <adec:decorative xmlns:adec="http://schemas.microsoft.com/office/drawing/2017/decorative" xmlns="" val="1"/>
               </a:ext>
             </a:extLst>
           </p:cNvPr>
@@ -5814,7 +5937,7 @@
                 <a16:creationId xmlns:a16="http://schemas.microsoft.com/office/drawing/2014/main" id="{62A38935-BB53-4DF7-A56E-48DD25B685D7}"/>
               </a:ext>
               <a:ext uri="{C183D7F6-B498-43B3-948B-1728B52AA6E4}">
-                <adec:decorative xmlns="" xmlns:adec="http://schemas.microsoft.com/office/drawing/2017/decorative" val="1"/>
+                <adec:decorative xmlns:adec="http://schemas.microsoft.com/office/drawing/2017/decorative" xmlns="" val="1"/>
               </a:ext>
             </a:extLst>
           </p:cNvPr>
@@ -6601,7 +6724,7 @@
                 <a14:useLocalDpi xmlns:a14="http://schemas.microsoft.com/office/drawing/2010/main" val="0"/>
               </a:ext>
               <a:ext uri="{96DAC541-7B7A-43D3-8B79-37D633B846F1}">
-                <asvg:svgBlip xmlns="" xmlns:asvg="http://schemas.microsoft.com/office/drawing/2016/SVG/main" r:embed="rId3"/>
+                <asvg:svgBlip xmlns:asvg="http://schemas.microsoft.com/office/drawing/2016/SVG/main" xmlns="" r:embed="rId3"/>
               </a:ext>
             </a:extLst>
           </a:blip>
@@ -6692,7 +6815,7 @@
         <p:spPr/>
         <p:txBody>
           <a:bodyPr>
-            <a:normAutofit fontScale="92500" lnSpcReduction="10000"/>
+            <a:normAutofit fontScale="85000" lnSpcReduction="20000"/>
           </a:bodyPr>
           <a:lstStyle/>
           <a:p>
@@ -6776,6 +6899,39 @@
             <a:r>
               <a:rPr lang="en-GB" smtClean="0"/>
               <a:t>upload.wikimedia.org/wikipedia/commons/thumb/a/aa/FAIR_data_principles.jpg/800px-FAIR_data_principles.jpg </a:t>
+            </a:r>
+            <a:r>
+              <a:rPr lang="en-GB"/>
+              <a:t/>
+            </a:r>
+            <a:br>
+              <a:rPr lang="en-GB"/>
+            </a:br>
+            <a:endParaRPr lang="en-GB" smtClean="0"/>
+          </a:p>
+          <a:p>
+            <a:pPr marL="514350" indent="-514350">
+              <a:buFont typeface="+mj-lt"/>
+              <a:buAutoNum type="arabicPeriod"/>
+            </a:pPr>
+            <a:r>
+              <a:rPr lang="en-GB"/>
+              <a:t>FAIR </a:t>
+            </a:r>
+            <a:r>
+              <a:rPr lang="en-GB" smtClean="0"/>
+              <a:t>Principles, GO FAIR Initiative </a:t>
+            </a:r>
+            <a:r>
+              <a:rPr lang="en-GB"/>
+              <a:t/>
+            </a:r>
+            <a:br>
+              <a:rPr lang="en-GB"/>
+            </a:br>
+            <a:r>
+              <a:rPr lang="en-GB" smtClean="0"/>
+              <a:t>www.go-fair.org/fair-principles</a:t>
             </a:r>
             <a:endParaRPr lang="en-GB"/>
           </a:p>
@@ -6822,7 +6978,7 @@
                 <a16:creationId xmlns:a16="http://schemas.microsoft.com/office/drawing/2014/main" id="{C4E4288A-DFC8-40A2-90E5-70E851A933AD}"/>
               </a:ext>
               <a:ext uri="{C183D7F6-B498-43B3-948B-1728B52AA6E4}">
-                <adec:decorative xmlns="" xmlns:adec="http://schemas.microsoft.com/office/drawing/2017/decorative" val="1"/>
+                <adec:decorative xmlns:adec="http://schemas.microsoft.com/office/drawing/2017/decorative" xmlns="" val="1"/>
               </a:ext>
             </a:extLst>
           </p:cNvPr>
@@ -6930,7 +7086,7 @@
                 <a16:creationId xmlns:a16="http://schemas.microsoft.com/office/drawing/2014/main" id="{A94A2FC9-6D19-473C-B868-99FDB2044AA9}"/>
               </a:ext>
               <a:ext uri="{C183D7F6-B498-43B3-948B-1728B52AA6E4}">
-                <adec:decorative xmlns="" xmlns:adec="http://schemas.microsoft.com/office/drawing/2017/decorative" val="1"/>
+                <adec:decorative xmlns:adec="http://schemas.microsoft.com/office/drawing/2017/decorative" xmlns="" val="1"/>
               </a:ext>
             </a:extLst>
           </p:cNvPr>
@@ -7149,7 +7305,7 @@
                 <a14:useLocalDpi xmlns:a14="http://schemas.microsoft.com/office/drawing/2010/main" val="0"/>
               </a:ext>
               <a:ext uri="{96DAC541-7B7A-43D3-8B79-37D633B846F1}">
-                <asvg:svgBlip xmlns="" xmlns:asvg="http://schemas.microsoft.com/office/drawing/2016/SVG/main" r:embed="rId3"/>
+                <asvg:svgBlip xmlns:asvg="http://schemas.microsoft.com/office/drawing/2016/SVG/main" xmlns="" r:embed="rId3"/>
               </a:ext>
             </a:extLst>
           </a:blip>
@@ -7350,7 +7506,7 @@
                 <a16:creationId xmlns:a16="http://schemas.microsoft.com/office/drawing/2014/main" id="{8BED0409-854E-49C4-876E-A78C6D881BC8}"/>
               </a:ext>
               <a:ext uri="{C183D7F6-B498-43B3-948B-1728B52AA6E4}">
-                <adec:decorative xmlns="" xmlns:adec="http://schemas.microsoft.com/office/drawing/2017/decorative" val="1"/>
+                <adec:decorative xmlns:adec="http://schemas.microsoft.com/office/drawing/2017/decorative" xmlns="" val="1"/>
               </a:ext>
             </a:extLst>
           </p:cNvPr>
@@ -7995,7 +8151,7 @@
                 <a16:creationId xmlns:a16="http://schemas.microsoft.com/office/drawing/2014/main" id="{D4340B2E-01FD-4F5D-9C4D-AD3923AD20BA}"/>
               </a:ext>
               <a:ext uri="{C183D7F6-B498-43B3-948B-1728B52AA6E4}">
-                <adec:decorative xmlns="" xmlns:adec="http://schemas.microsoft.com/office/drawing/2017/decorative" val="1"/>
+                <adec:decorative xmlns:adec="http://schemas.microsoft.com/office/drawing/2017/decorative" xmlns="" val="1"/>
               </a:ext>
             </a:extLst>
           </p:cNvPr>
@@ -8214,7 +8370,7 @@
                 <a14:useLocalDpi xmlns:a14="http://schemas.microsoft.com/office/drawing/2010/main" val="0"/>
               </a:ext>
               <a:ext uri="{96DAC541-7B7A-43D3-8B79-37D633B846F1}">
-                <asvg:svgBlip xmlns="" xmlns:asvg="http://schemas.microsoft.com/office/drawing/2016/SVG/main" r:embed="rId5"/>
+                <asvg:svgBlip xmlns:asvg="http://schemas.microsoft.com/office/drawing/2016/SVG/main" xmlns="" r:embed="rId5"/>
               </a:ext>
             </a:extLst>
           </a:blip>
@@ -8253,7 +8409,7 @@
                 <a14:useLocalDpi xmlns:a14="http://schemas.microsoft.com/office/drawing/2010/main" val="0"/>
               </a:ext>
               <a:ext uri="{96DAC541-7B7A-43D3-8B79-37D633B846F1}">
-                <asvg:svgBlip xmlns="" xmlns:asvg="http://schemas.microsoft.com/office/drawing/2016/SVG/main" r:embed="rId7"/>
+                <asvg:svgBlip xmlns:asvg="http://schemas.microsoft.com/office/drawing/2016/SVG/main" xmlns="" r:embed="rId7"/>
               </a:ext>
             </a:extLst>
           </a:blip>
@@ -9536,7 +9692,7 @@
         <p:spPr>
           <a:xfrm>
             <a:off x="633167" y="1423550"/>
-            <a:ext cx="10925666" cy="4708981"/>
+            <a:ext cx="10925666" cy="5324535"/>
           </a:xfrm>
           <a:prstGeom prst="rect">
             <a:avLst/>
@@ -9557,12 +9713,60 @@
               <a:t>Findable</a:t>
             </a:r>
             <a:r>
+              <a:rPr lang="en-GB" sz="2000">
+                <a:solidFill>
+                  <a:srgbClr val="0070C0"/>
+                </a:solidFill>
+              </a:rPr>
+              <a:t>: </a:t>
+            </a:r>
+            <a:r>
+              <a:rPr lang="en-GB" sz="2000" smtClean="0">
+                <a:solidFill>
+                  <a:srgbClr val="0070C0"/>
+                </a:solidFill>
+              </a:rPr>
+              <a:t>Metadata </a:t>
+            </a:r>
+            <a:r>
+              <a:rPr lang="en-GB" sz="2000">
+                <a:solidFill>
+                  <a:srgbClr val="0070C0"/>
+                </a:solidFill>
+              </a:rPr>
+              <a:t>and data should be easy to find for both humans and </a:t>
+            </a:r>
+            <a:r>
+              <a:rPr lang="en-GB" sz="2000">
+                <a:solidFill>
+                  <a:srgbClr val="0070C0"/>
+                </a:solidFill>
+              </a:rPr>
+              <a:t>computers</a:t>
+            </a:r>
+            <a:r>
+              <a:rPr lang="en-GB" sz="2000" smtClean="0">
+                <a:solidFill>
+                  <a:srgbClr val="0070C0"/>
+                </a:solidFill>
+              </a:rPr>
+              <a:t>. </a:t>
+            </a:r>
+            <a:r>
+              <a:rPr lang="en-GB" sz="2000">
+                <a:solidFill>
+                  <a:srgbClr val="0070C0"/>
+                </a:solidFill>
+              </a:rPr>
+              <a:t>Automatic </a:t>
+            </a:r>
+            <a:r>
               <a:rPr lang="en-GB" sz="2000" dirty="0">
                 <a:solidFill>
                   <a:srgbClr val="0070C0"/>
                 </a:solidFill>
               </a:rPr>
-              <a:t>: Easy to find the data and the metadata for both humans and computers. Automatic and reliable discovery of datasets and services depends on machine-readable persistent identifiers (PIDs) and metadata.</a:t>
+              <a:t>and reliable discovery of datasets and services depends on machine-readable persistent identifiers (PIDs) and metadata.</a:t>
             </a:r>
           </a:p>
           <a:p>
@@ -9582,12 +9786,92 @@
               <a:t>Accessible</a:t>
             </a:r>
             <a:r>
+              <a:rPr lang="en-GB" sz="2000">
+                <a:solidFill>
+                  <a:srgbClr val="0070C0"/>
+                </a:solidFill>
+              </a:rPr>
+              <a:t>: </a:t>
+            </a:r>
+            <a:r>
+              <a:rPr lang="en-GB" sz="2000">
+                <a:solidFill>
+                  <a:srgbClr val="0070C0"/>
+                </a:solidFill>
+              </a:rPr>
+              <a:t>(Meta)data should be retrievable by their </a:t>
+            </a:r>
+            <a:r>
+              <a:rPr lang="en-GB" sz="2000">
+                <a:solidFill>
+                  <a:srgbClr val="0070C0"/>
+                </a:solidFill>
+              </a:rPr>
+              <a:t>identifiers </a:t>
+            </a:r>
+            <a:r>
+              <a:rPr lang="en-GB" sz="2000" smtClean="0">
+                <a:solidFill>
+                  <a:srgbClr val="0070C0"/>
+                </a:solidFill>
+              </a:rPr>
+              <a:t>using a </a:t>
+            </a:r>
+            <a:r>
+              <a:rPr lang="en-GB" sz="2000">
+                <a:solidFill>
+                  <a:srgbClr val="0070C0"/>
+                </a:solidFill>
+              </a:rPr>
+              <a:t>standardised and open communications protocol (</a:t>
+            </a:r>
+            <a:r>
+              <a:rPr lang="en-GB" sz="2000">
+                <a:solidFill>
+                  <a:srgbClr val="0070C0"/>
+                </a:solidFill>
+              </a:rPr>
+              <a:t>including </a:t>
+            </a:r>
+            <a:r>
+              <a:rPr lang="en-GB" sz="2000" smtClean="0">
+                <a:solidFill>
+                  <a:srgbClr val="0070C0"/>
+                </a:solidFill>
+              </a:rPr>
+              <a:t>authentication </a:t>
+            </a:r>
+            <a:r>
+              <a:rPr lang="en-GB" sz="2000">
+                <a:solidFill>
+                  <a:srgbClr val="0070C0"/>
+                </a:solidFill>
+              </a:rPr>
+              <a:t>and </a:t>
+            </a:r>
+            <a:r>
+              <a:rPr lang="en-GB" sz="2000">
+                <a:solidFill>
+                  <a:srgbClr val="0070C0"/>
+                </a:solidFill>
+              </a:rPr>
+              <a:t>authorisation</a:t>
+            </a:r>
+            <a:r>
+              <a:rPr lang="en-GB" sz="2000" smtClean="0">
+                <a:solidFill>
+                  <a:srgbClr val="0070C0"/>
+                </a:solidFill>
+              </a:rPr>
+              <a:t>). Metadata </a:t>
+            </a:r>
+            <a:r>
               <a:rPr lang="en-GB" sz="2000" dirty="0">
                 <a:solidFill>
                   <a:srgbClr val="0070C0"/>
                 </a:solidFill>
               </a:rPr>
-              <a:t>: The (meta)data retrievable by their identifier using a standardised and open communications protocol (including authentication and authorisation). Metadata should be available even when the data are no longer available.</a:t>
+              <a:t>should be available even when the data are no longer available.</a:t>
             </a:r>
           </a:p>
           <a:p>
@@ -9607,12 +9891,108 @@
               <a:t>Interoperable</a:t>
             </a:r>
             <a:r>
-              <a:rPr lang="en-GB" sz="2000" dirty="0">
+              <a:rPr lang="en-GB" sz="2000">
                 <a:solidFill>
                   <a:srgbClr val="0070C0"/>
                 </a:solidFill>
               </a:rPr>
-              <a:t>: The data should be able to be combined with and used with other data or tools. The format of the data should be open and interpretable for various tools. It applies both to the data and metadata, the (meta)data should use vocabularies that follow FAIR principles.</a:t>
+              <a:t>: </a:t>
+            </a:r>
+            <a:r>
+              <a:rPr lang="en-GB" sz="2000">
+                <a:solidFill>
+                  <a:srgbClr val="0070C0"/>
+                </a:solidFill>
+              </a:rPr>
+              <a:t>Data should be able to be combined with </a:t>
+            </a:r>
+            <a:r>
+              <a:rPr lang="en-GB" sz="2000">
+                <a:solidFill>
+                  <a:srgbClr val="0070C0"/>
+                </a:solidFill>
+              </a:rPr>
+              <a:t>and </a:t>
+            </a:r>
+            <a:r>
+              <a:rPr lang="en-GB" sz="2000" smtClean="0">
+                <a:solidFill>
+                  <a:srgbClr val="0070C0"/>
+                </a:solidFill>
+              </a:rPr>
+              <a:t>used </a:t>
+            </a:r>
+            <a:r>
+              <a:rPr lang="en-GB" sz="2000">
+                <a:solidFill>
+                  <a:srgbClr val="0070C0"/>
+                </a:solidFill>
+              </a:rPr>
+              <a:t>with other data or tools. The format of the data should be </a:t>
+            </a:r>
+            <a:r>
+              <a:rPr lang="en-GB" sz="2000">
+                <a:solidFill>
+                  <a:srgbClr val="0070C0"/>
+                </a:solidFill>
+              </a:rPr>
+              <a:t>open </a:t>
+            </a:r>
+            <a:r>
+              <a:rPr lang="en-GB" sz="2000" smtClean="0">
+                <a:solidFill>
+                  <a:srgbClr val="0070C0"/>
+                </a:solidFill>
+              </a:rPr>
+              <a:t>and </a:t>
+            </a:r>
+            <a:r>
+              <a:rPr lang="en-GB" sz="2000">
+                <a:solidFill>
+                  <a:srgbClr val="0070C0"/>
+                </a:solidFill>
+              </a:rPr>
+              <a:t>interpretable for various tools. This principle, just like the others, applies both to </a:t>
+            </a:r>
+            <a:r>
+              <a:rPr lang="en-GB" sz="2000">
+                <a:solidFill>
+                  <a:srgbClr val="0070C0"/>
+                </a:solidFill>
+              </a:rPr>
+              <a:t>data </a:t>
+            </a:r>
+            <a:r>
+              <a:rPr lang="en-GB" sz="2000" smtClean="0">
+                <a:solidFill>
+                  <a:srgbClr val="0070C0"/>
+                </a:solidFill>
+              </a:rPr>
+              <a:t>and metadata</a:t>
+            </a:r>
+            <a:r>
+              <a:rPr lang="en-GB" sz="2000">
+                <a:solidFill>
+                  <a:srgbClr val="0070C0"/>
+                </a:solidFill>
+              </a:rPr>
+              <a:t>; (meta)data should use vocabularies that follow FAIR </a:t>
+            </a:r>
+            <a:r>
+              <a:rPr lang="en-GB" sz="2000">
+                <a:solidFill>
+                  <a:srgbClr val="0070C0"/>
+                </a:solidFill>
+              </a:rPr>
+              <a:t>principles</a:t>
+            </a:r>
+            <a:r>
+              <a:rPr lang="en-GB" sz="2000" smtClean="0">
+                <a:solidFill>
+                  <a:srgbClr val="0070C0"/>
+                </a:solidFill>
+              </a:rPr>
+              <a:t>. </a:t>
             </a:r>
           </a:p>
           <a:p>
@@ -9632,13 +10012,203 @@
               <a:t>Re-usable</a:t>
             </a:r>
             <a:r>
-              <a:rPr lang="en-GB" sz="2000" dirty="0">
+              <a:rPr lang="en-GB" sz="2000">
                 <a:solidFill>
                   <a:srgbClr val="0070C0"/>
                 </a:solidFill>
               </a:rPr>
-              <a:t>: FAIR aims at optimising the reuse of data. Metadata and data should be well-described so that they can be replicated and/or combined in different settings. The reuse of the (meta)data should be stated with clear and accessible license(s)</a:t>
-            </a:r>
+              <a:t>: </a:t>
+            </a:r>
+            <a:r>
+              <a:rPr lang="en-GB" sz="2000">
+                <a:solidFill>
+                  <a:srgbClr val="0070C0"/>
+                </a:solidFill>
+              </a:rPr>
+              <a:t>FAIR aims to optimise the reuse of </a:t>
+            </a:r>
+            <a:r>
+              <a:rPr lang="en-GB" sz="2000">
+                <a:solidFill>
+                  <a:srgbClr val="0070C0"/>
+                </a:solidFill>
+              </a:rPr>
+              <a:t>data</a:t>
+            </a:r>
+            <a:r>
+              <a:rPr lang="en-GB" sz="2000" smtClean="0">
+                <a:solidFill>
+                  <a:srgbClr val="0070C0"/>
+                </a:solidFill>
+              </a:rPr>
+              <a:t>. Metadata </a:t>
+            </a:r>
+            <a:r>
+              <a:rPr lang="en-GB" sz="2000">
+                <a:solidFill>
+                  <a:srgbClr val="0070C0"/>
+                </a:solidFill>
+              </a:rPr>
+              <a:t>and data should be well-described so that they can </a:t>
+            </a:r>
+            <a:r>
+              <a:rPr lang="en-GB" sz="2000">
+                <a:solidFill>
+                  <a:srgbClr val="0070C0"/>
+                </a:solidFill>
+              </a:rPr>
+              <a:t>be </a:t>
+            </a:r>
+            <a:r>
+              <a:rPr lang="en-GB" sz="2000" smtClean="0">
+                <a:solidFill>
+                  <a:srgbClr val="0070C0"/>
+                </a:solidFill>
+              </a:rPr>
+              <a:t>replicated </a:t>
+            </a:r>
+            <a:r>
+              <a:rPr lang="en-GB" sz="2000">
+                <a:solidFill>
+                  <a:srgbClr val="0070C0"/>
+                </a:solidFill>
+              </a:rPr>
+              <a:t>and/or combined in different settings. The </a:t>
+            </a:r>
+            <a:r>
+              <a:rPr lang="en-GB" sz="2000">
+                <a:solidFill>
+                  <a:srgbClr val="0070C0"/>
+                </a:solidFill>
+              </a:rPr>
+              <a:t>conditions </a:t>
+            </a:r>
+            <a:r>
+              <a:rPr lang="en-GB" sz="2000" smtClean="0">
+                <a:solidFill>
+                  <a:srgbClr val="0070C0"/>
+                </a:solidFill>
+              </a:rPr>
+              <a:t>attached to reuse </a:t>
+            </a:r>
+            <a:r>
+              <a:rPr lang="en-GB" sz="2000">
+                <a:solidFill>
+                  <a:srgbClr val="0070C0"/>
+                </a:solidFill>
+              </a:rPr>
+              <a:t>of </a:t>
+            </a:r>
+            <a:r>
+              <a:rPr lang="en-GB" sz="2000">
+                <a:solidFill>
+                  <a:srgbClr val="0070C0"/>
+                </a:solidFill>
+              </a:rPr>
+              <a:t>(</a:t>
+            </a:r>
+            <a:r>
+              <a:rPr lang="en-GB" sz="2000" smtClean="0">
+                <a:solidFill>
+                  <a:srgbClr val="0070C0"/>
+                </a:solidFill>
+              </a:rPr>
+              <a:t>meta)data, </a:t>
+            </a:r>
+            <a:r>
+              <a:rPr lang="en-GB" sz="2000">
+                <a:solidFill>
+                  <a:srgbClr val="0070C0"/>
+                </a:solidFill>
+              </a:rPr>
+              <a:t>or the absence of conditions</a:t>
+            </a:r>
+            <a:r>
+              <a:rPr lang="en-GB" sz="2000">
+                <a:solidFill>
+                  <a:srgbClr val="0070C0"/>
+                </a:solidFill>
+              </a:rPr>
+              <a:t>, </a:t>
+            </a:r>
+            <a:r>
+              <a:rPr lang="en-GB" sz="2000" smtClean="0">
+                <a:solidFill>
+                  <a:srgbClr val="0070C0"/>
+                </a:solidFill>
+              </a:rPr>
+              <a:t>should </a:t>
+            </a:r>
+            <a:r>
+              <a:rPr lang="en-GB" sz="2000">
+                <a:solidFill>
+                  <a:srgbClr val="0070C0"/>
+                </a:solidFill>
+              </a:rPr>
+              <a:t>be stated </a:t>
+            </a:r>
+            <a:r>
+              <a:rPr lang="en-GB" sz="2000">
+                <a:solidFill>
+                  <a:srgbClr val="0070C0"/>
+                </a:solidFill>
+              </a:rPr>
+              <a:t>with </a:t>
+            </a:r>
+            <a:r>
+              <a:rPr lang="en-GB" sz="2000" smtClean="0">
+                <a:solidFill>
+                  <a:srgbClr val="0070C0"/>
+                </a:solidFill>
+              </a:rPr>
+              <a:t>a clear </a:t>
+            </a:r>
+            <a:r>
+              <a:rPr lang="en-GB" sz="2000">
+                <a:solidFill>
+                  <a:srgbClr val="0070C0"/>
+                </a:solidFill>
+              </a:rPr>
+              <a:t>and accessible </a:t>
+            </a:r>
+            <a:r>
+              <a:rPr lang="en-GB" sz="2000">
+                <a:solidFill>
+                  <a:srgbClr val="0070C0"/>
+                </a:solidFill>
+              </a:rPr>
+              <a:t>license(s</a:t>
+            </a:r>
+            <a:r>
+              <a:rPr lang="en-GB" sz="2000" smtClean="0">
+                <a:solidFill>
+                  <a:srgbClr val="0070C0"/>
+                </a:solidFill>
+              </a:rPr>
+              <a:t>). </a:t>
+            </a:r>
+          </a:p>
+          <a:p>
+            <a:endParaRPr lang="en-GB" sz="2000">
+              <a:solidFill>
+                <a:srgbClr val="0070C0"/>
+              </a:solidFill>
+            </a:endParaRPr>
+          </a:p>
+          <a:p>
+            <a:r>
+              <a:rPr lang="en-GB" sz="2000" smtClean="0">
+                <a:solidFill>
+                  <a:srgbClr val="0070C0"/>
+                </a:solidFill>
+              </a:rPr>
+              <a:t>Credits[4]</a:t>
+            </a:r>
+            <a:endParaRPr lang="en-GB" sz="2000" dirty="0">
+              <a:solidFill>
+                <a:srgbClr val="0070C0"/>
+              </a:solidFill>
+            </a:endParaRPr>
           </a:p>
         </p:txBody>
       </p:sp>
@@ -9787,6 +10357,55 @@
                                           <p:spTgt spid="9">
                                             <p:txEl>
                                               <p:pRg st="6" end="6"/>
+                                            </p:txEl>
+                                          </p:spTgt>
+                                        </p:tgtEl>
+                                        <p:attrNameLst>
+                                          <p:attrName>style.visibility</p:attrName>
+                                        </p:attrNameLst>
+                                      </p:cBhvr>
+                                      <p:to>
+                                        <p:strVal val="visible"/>
+                                      </p:to>
+                                    </p:set>
+                                  </p:childTnLst>
+                                </p:cTn>
+                              </p:par>
+                            </p:childTnLst>
+                          </p:cTn>
+                        </p:par>
+                      </p:childTnLst>
+                    </p:cTn>
+                  </p:par>
+                  <p:par>
+                    <p:cTn id="15" fill="hold">
+                      <p:stCondLst>
+                        <p:cond delay="indefinite"/>
+                      </p:stCondLst>
+                      <p:childTnLst>
+                        <p:par>
+                          <p:cTn id="16" fill="hold">
+                            <p:stCondLst>
+                              <p:cond delay="0"/>
+                            </p:stCondLst>
+                            <p:childTnLst>
+                              <p:par>
+                                <p:cTn id="17" presetID="1" presetClass="entr" presetSubtype="0" fill="hold" nodeType="clickEffect">
+                                  <p:stCondLst>
+                                    <p:cond delay="0"/>
+                                  </p:stCondLst>
+                                  <p:childTnLst>
+                                    <p:set>
+                                      <p:cBhvr>
+                                        <p:cTn id="18" dur="1" fill="hold">
+                                          <p:stCondLst>
+                                            <p:cond delay="0"/>
+                                          </p:stCondLst>
+                                        </p:cTn>
+                                        <p:tgtEl>
+                                          <p:spTgt spid="9">
+                                            <p:txEl>
+                                              <p:pRg st="8" end="8"/>
                                             </p:txEl>
                                           </p:spTgt>
                                         </p:tgtEl>

</xml_diff>

<commit_message>
Tidied up final slides in episode 02
</commit_message>
<xml_diff>
--- a/instructors/02-Being_FAIR.pptx
+++ b/instructors/02-Being_FAIR.pptx
@@ -4171,15 +4171,7 @@
                   <a:srgbClr val="0070C0"/>
                 </a:solidFill>
               </a:rPr>
-              <a:t>(PIDs), controlled vocabularies for efficient cataloguing</a:t>
-            </a:r>
-            <a:r>
-              <a:rPr lang="en-GB" sz="2400">
-                <a:solidFill>
-                  <a:srgbClr val="0070C0"/>
-                </a:solidFill>
-              </a:rPr>
-              <a:t>, </a:t>
+              <a:t>(PIDs), controlled vocabularies for efficient cataloguing, </a:t>
             </a:r>
             <a:r>
               <a:rPr lang="en-GB" sz="2400" smtClean="0">
@@ -4319,7 +4311,7 @@
                 <a:hlinkClick r:id="rId6">
                   <a:extLst>
                     <a:ext uri="{A12FA001-AC4F-418D-AE19-62706E023703}">
-                      <ahyp:hlinkClr xmlns:ahyp="http://schemas.microsoft.com/office/drawing/2018/hyperlinkcolor" xmlns="" val="tx"/>
+                      <ahyp:hlinkClr xmlns="" xmlns:ahyp="http://schemas.microsoft.com/office/drawing/2018/hyperlinkcolor" val="tx"/>
                     </a:ext>
                   </a:extLst>
                 </a:hlinkClick>
@@ -4342,7 +4334,7 @@
                 <a:hlinkClick r:id="rId7">
                   <a:extLst>
                     <a:ext uri="{A12FA001-AC4F-418D-AE19-62706E023703}">
-                      <ahyp:hlinkClr xmlns:ahyp="http://schemas.microsoft.com/office/drawing/2018/hyperlinkcolor" xmlns="" val="tx"/>
+                      <ahyp:hlinkClr xmlns="" xmlns:ahyp="http://schemas.microsoft.com/office/drawing/2018/hyperlinkcolor" val="tx"/>
                     </a:ext>
                   </a:extLst>
                 </a:hlinkClick>
@@ -4365,7 +4357,7 @@
                 <a:hlinkClick r:id="rId8">
                   <a:extLst>
                     <a:ext uri="{A12FA001-AC4F-418D-AE19-62706E023703}">
-                      <ahyp:hlinkClr xmlns:ahyp="http://schemas.microsoft.com/office/drawing/2018/hyperlinkcolor" xmlns="" val="tx"/>
+                      <ahyp:hlinkClr xmlns="" xmlns:ahyp="http://schemas.microsoft.com/office/drawing/2018/hyperlinkcolor" val="tx"/>
                     </a:ext>
                   </a:extLst>
                 </a:hlinkClick>
@@ -4421,25 +4413,7 @@
                   </a:outerShdw>
                 </a:effectLst>
               </a:rPr>
-              <a:t>TOP TIP: </a:t>
-            </a:r>
-            <a:r>
-              <a:rPr lang="en-GB" sz="3200" b="1">
-                <a:ln w="9525">
-                  <a:solidFill>
-                    <a:schemeClr val="bg1"/>
-                  </a:solidFill>
-                  <a:prstDash val="solid"/>
-                </a:ln>
-                <a:effectLst>
-                  <a:outerShdw blurRad="12700" dist="38100" dir="2700000" algn="tl" rotWithShape="0">
-                    <a:schemeClr val="bg1">
-                      <a:lumMod val="50000"/>
-                    </a:schemeClr>
-                  </a:outerShdw>
-                </a:effectLst>
-              </a:rPr>
-              <a:t>Deposit </a:t>
+              <a:t>TOP TIP: Deposit </a:t>
             </a:r>
             <a:r>
               <a:rPr lang="en-GB" sz="3200" b="1" smtClean="0">
@@ -4866,9 +4840,30 @@
           </a:p>
           <a:p>
             <a:r>
+              <a:rPr lang="en-GB" smtClean="0"/>
+              <a:t>Convert proprietary formats </a:t>
+            </a:r>
+            <a:r>
+              <a:rPr lang="en-GB"/>
+              <a:t>to </a:t>
+            </a:r>
+            <a:r>
+              <a:rPr lang="en-GB" smtClean="0"/>
+              <a:t>open and/or standard ones, and convert binary formats to plain text. Whenever practicable, without losing the meaning of the data. For </a:t>
+            </a:r>
+            <a:r>
               <a:rPr lang="en-GB" dirty="0"/>
-              <a:t>Convert proprietary binary formats to open ones. For example convert Snapgene to Genbank/SBOL, microscopy multistack images to OME-TIFF</a:t>
-            </a:r>
+              <a:t>example convert Snapgene to Genbank/SBOL, microscopy multistack images </a:t>
+            </a:r>
+            <a:r>
+              <a:rPr lang="en-GB"/>
+              <a:t>to </a:t>
+            </a:r>
+            <a:r>
+              <a:rPr lang="en-GB" smtClean="0"/>
+              <a:t>OME-TIFF . </a:t>
+            </a:r>
+            <a:endParaRPr lang="en-GB" dirty="0"/>
           </a:p>
           <a:p>
             <a:pPr marL="0" indent="0">
@@ -5048,7 +5043,7 @@
                 <a14:useLocalDpi xmlns:a14="http://schemas.microsoft.com/office/drawing/2010/main" val="0"/>
               </a:ext>
               <a:ext uri="{96DAC541-7B7A-43D3-8B79-37D633B846F1}">
-                <asvg:svgBlip xmlns:asvg="http://schemas.microsoft.com/office/drawing/2016/SVG/main" xmlns="" r:embed="rId3"/>
+                <asvg:svgBlip xmlns="" xmlns:asvg="http://schemas.microsoft.com/office/drawing/2016/SVG/main" r:embed="rId3"/>
               </a:ext>
             </a:extLst>
           </a:blip>
@@ -5279,7 +5274,7 @@
                 <a14:useLocalDpi xmlns:a14="http://schemas.microsoft.com/office/drawing/2010/main" val="0"/>
               </a:ext>
               <a:ext uri="{96DAC541-7B7A-43D3-8B79-37D633B846F1}">
-                <asvg:svgBlip xmlns:asvg="http://schemas.microsoft.com/office/drawing/2016/SVG/main" xmlns="" r:embed="rId7"/>
+                <asvg:svgBlip xmlns="" xmlns:asvg="http://schemas.microsoft.com/office/drawing/2016/SVG/main" r:embed="rId7"/>
               </a:ext>
             </a:extLst>
           </a:blip>
@@ -5804,7 +5799,7 @@
                 <a16:creationId xmlns:a16="http://schemas.microsoft.com/office/drawing/2014/main" id="{91F32EBA-ED97-466E-8CFA-8382584155D0}"/>
               </a:ext>
               <a:ext uri="{C183D7F6-B498-43B3-948B-1728B52AA6E4}">
-                <adec:decorative xmlns:adec="http://schemas.microsoft.com/office/drawing/2017/decorative" xmlns="" val="1"/>
+                <adec:decorative xmlns="" xmlns:adec="http://schemas.microsoft.com/office/drawing/2017/decorative" val="1"/>
               </a:ext>
             </a:extLst>
           </p:cNvPr>
@@ -5923,9 +5918,10 @@
               <a:buNone/>
             </a:pPr>
             <a:r>
-              <a:rPr lang="en-GB" sz="2400" dirty="0"/>
-              <a:t>…</a:t>
-            </a:r>
+              <a:rPr lang="en-GB" sz="2400" smtClean="0"/>
+              <a:t>Answer the quiz questions on the webpage. </a:t>
+            </a:r>
+            <a:endParaRPr lang="en-GB" sz="2400" dirty="0"/>
           </a:p>
         </p:txBody>
       </p:sp>
@@ -5937,7 +5933,7 @@
                 <a16:creationId xmlns:a16="http://schemas.microsoft.com/office/drawing/2014/main" id="{62A38935-BB53-4DF7-A56E-48DD25B685D7}"/>
               </a:ext>
               <a:ext uri="{C183D7F6-B498-43B3-948B-1728B52AA6E4}">
-                <adec:decorative xmlns:adec="http://schemas.microsoft.com/office/drawing/2017/decorative" xmlns="" val="1"/>
+                <adec:decorative xmlns="" xmlns:adec="http://schemas.microsoft.com/office/drawing/2017/decorative" val="1"/>
               </a:ext>
             </a:extLst>
           </p:cNvPr>
@@ -6724,7 +6720,7 @@
                 <a14:useLocalDpi xmlns:a14="http://schemas.microsoft.com/office/drawing/2010/main" val="0"/>
               </a:ext>
               <a:ext uri="{96DAC541-7B7A-43D3-8B79-37D633B846F1}">
-                <asvg:svgBlip xmlns:asvg="http://schemas.microsoft.com/office/drawing/2016/SVG/main" xmlns="" r:embed="rId3"/>
+                <asvg:svgBlip xmlns="" xmlns:asvg="http://schemas.microsoft.com/office/drawing/2016/SVG/main" r:embed="rId3"/>
               </a:ext>
             </a:extLst>
           </a:blip>
@@ -6978,7 +6974,7 @@
                 <a16:creationId xmlns:a16="http://schemas.microsoft.com/office/drawing/2014/main" id="{C4E4288A-DFC8-40A2-90E5-70E851A933AD}"/>
               </a:ext>
               <a:ext uri="{C183D7F6-B498-43B3-948B-1728B52AA6E4}">
-                <adec:decorative xmlns:adec="http://schemas.microsoft.com/office/drawing/2017/decorative" xmlns="" val="1"/>
+                <adec:decorative xmlns="" xmlns:adec="http://schemas.microsoft.com/office/drawing/2017/decorative" val="1"/>
               </a:ext>
             </a:extLst>
           </p:cNvPr>
@@ -7086,7 +7082,7 @@
                 <a16:creationId xmlns:a16="http://schemas.microsoft.com/office/drawing/2014/main" id="{A94A2FC9-6D19-473C-B868-99FDB2044AA9}"/>
               </a:ext>
               <a:ext uri="{C183D7F6-B498-43B3-948B-1728B52AA6E4}">
-                <adec:decorative xmlns:adec="http://schemas.microsoft.com/office/drawing/2017/decorative" xmlns="" val="1"/>
+                <adec:decorative xmlns="" xmlns:adec="http://schemas.microsoft.com/office/drawing/2017/decorative" val="1"/>
               </a:ext>
             </a:extLst>
           </p:cNvPr>
@@ -7305,7 +7301,7 @@
                 <a14:useLocalDpi xmlns:a14="http://schemas.microsoft.com/office/drawing/2010/main" val="0"/>
               </a:ext>
               <a:ext uri="{96DAC541-7B7A-43D3-8B79-37D633B846F1}">
-                <asvg:svgBlip xmlns:asvg="http://schemas.microsoft.com/office/drawing/2016/SVG/main" xmlns="" r:embed="rId3"/>
+                <asvg:svgBlip xmlns="" xmlns:asvg="http://schemas.microsoft.com/office/drawing/2016/SVG/main" r:embed="rId3"/>
               </a:ext>
             </a:extLst>
           </a:blip>
@@ -7506,7 +7502,7 @@
                 <a16:creationId xmlns:a16="http://schemas.microsoft.com/office/drawing/2014/main" id="{8BED0409-854E-49C4-876E-A78C6D881BC8}"/>
               </a:ext>
               <a:ext uri="{C183D7F6-B498-43B3-948B-1728B52AA6E4}">
-                <adec:decorative xmlns:adec="http://schemas.microsoft.com/office/drawing/2017/decorative" xmlns="" val="1"/>
+                <adec:decorative xmlns="" xmlns:adec="http://schemas.microsoft.com/office/drawing/2017/decorative" val="1"/>
               </a:ext>
             </a:extLst>
           </p:cNvPr>
@@ -8151,7 +8147,7 @@
                 <a16:creationId xmlns:a16="http://schemas.microsoft.com/office/drawing/2014/main" id="{D4340B2E-01FD-4F5D-9C4D-AD3923AD20BA}"/>
               </a:ext>
               <a:ext uri="{C183D7F6-B498-43B3-948B-1728B52AA6E4}">
-                <adec:decorative xmlns:adec="http://schemas.microsoft.com/office/drawing/2017/decorative" xmlns="" val="1"/>
+                <adec:decorative xmlns="" xmlns:adec="http://schemas.microsoft.com/office/drawing/2017/decorative" val="1"/>
               </a:ext>
             </a:extLst>
           </p:cNvPr>
@@ -8370,7 +8366,7 @@
                 <a14:useLocalDpi xmlns:a14="http://schemas.microsoft.com/office/drawing/2010/main" val="0"/>
               </a:ext>
               <a:ext uri="{96DAC541-7B7A-43D3-8B79-37D633B846F1}">
-                <asvg:svgBlip xmlns:asvg="http://schemas.microsoft.com/office/drawing/2016/SVG/main" xmlns="" r:embed="rId5"/>
+                <asvg:svgBlip xmlns="" xmlns:asvg="http://schemas.microsoft.com/office/drawing/2016/SVG/main" r:embed="rId5"/>
               </a:ext>
             </a:extLst>
           </a:blip>
@@ -8409,7 +8405,7 @@
                 <a14:useLocalDpi xmlns:a14="http://schemas.microsoft.com/office/drawing/2010/main" val="0"/>
               </a:ext>
               <a:ext uri="{96DAC541-7B7A-43D3-8B79-37D633B846F1}">
-                <asvg:svgBlip xmlns:asvg="http://schemas.microsoft.com/office/drawing/2016/SVG/main" xmlns="" r:embed="rId7"/>
+                <asvg:svgBlip xmlns="" xmlns:asvg="http://schemas.microsoft.com/office/drawing/2016/SVG/main" r:embed="rId7"/>
               </a:ext>
             </a:extLst>
           </a:blip>
@@ -9734,15 +9730,7 @@
                   <a:srgbClr val="0070C0"/>
                 </a:solidFill>
               </a:rPr>
-              <a:t>and data should be easy to find for both humans and </a:t>
-            </a:r>
-            <a:r>
-              <a:rPr lang="en-GB" sz="2000">
-                <a:solidFill>
-                  <a:srgbClr val="0070C0"/>
-                </a:solidFill>
-              </a:rPr>
-              <a:t>computers</a:t>
+              <a:t>and data should be easy to find for both humans and computers</a:t>
             </a:r>
             <a:r>
               <a:rPr lang="en-GB" sz="2000" smtClean="0">
@@ -9791,23 +9779,7 @@
                   <a:srgbClr val="0070C0"/>
                 </a:solidFill>
               </a:rPr>
-              <a:t>: </a:t>
-            </a:r>
-            <a:r>
-              <a:rPr lang="en-GB" sz="2000">
-                <a:solidFill>
-                  <a:srgbClr val="0070C0"/>
-                </a:solidFill>
-              </a:rPr>
-              <a:t>(Meta)data should be retrievable by their </a:t>
-            </a:r>
-            <a:r>
-              <a:rPr lang="en-GB" sz="2000">
-                <a:solidFill>
-                  <a:srgbClr val="0070C0"/>
-                </a:solidFill>
-              </a:rPr>
-              <a:t>identifiers </a:t>
+              <a:t>: (Meta)data should be retrievable by their identifiers </a:t>
             </a:r>
             <a:r>
               <a:rPr lang="en-GB" sz="2000" smtClean="0">
@@ -9823,15 +9795,7 @@
                   <a:srgbClr val="0070C0"/>
                 </a:solidFill>
               </a:rPr>
-              <a:t>standardised and open communications protocol (</a:t>
-            </a:r>
-            <a:r>
-              <a:rPr lang="en-GB" sz="2000">
-                <a:solidFill>
-                  <a:srgbClr val="0070C0"/>
-                </a:solidFill>
-              </a:rPr>
-              <a:t>including </a:t>
+              <a:t>standardised and open communications protocol (including </a:t>
             </a:r>
             <a:r>
               <a:rPr lang="en-GB" sz="2000" smtClean="0">
@@ -9847,15 +9811,7 @@
                   <a:srgbClr val="0070C0"/>
                 </a:solidFill>
               </a:rPr>
-              <a:t>and </a:t>
-            </a:r>
-            <a:r>
-              <a:rPr lang="en-GB" sz="2000">
-                <a:solidFill>
-                  <a:srgbClr val="0070C0"/>
-                </a:solidFill>
-              </a:rPr>
-              <a:t>authorisation</a:t>
+              <a:t>and authorisation</a:t>
             </a:r>
             <a:r>
               <a:rPr lang="en-GB" sz="2000" smtClean="0">
@@ -9896,7 +9852,15 @@
                   <a:srgbClr val="0070C0"/>
                 </a:solidFill>
               </a:rPr>
-              <a:t>: </a:t>
+              <a:t>: Data should be able to be combined with and </a:t>
+            </a:r>
+            <a:r>
+              <a:rPr lang="en-GB" sz="2000" smtClean="0">
+                <a:solidFill>
+                  <a:srgbClr val="0070C0"/>
+                </a:solidFill>
+              </a:rPr>
+              <a:t>used </a:t>
             </a:r>
             <a:r>
               <a:rPr lang="en-GB" sz="2000">
@@ -9904,10 +9868,10 @@
                   <a:srgbClr val="0070C0"/>
                 </a:solidFill>
               </a:rPr>
-              <a:t>Data should be able to be combined with </a:t>
-            </a:r>
-            <a:r>
-              <a:rPr lang="en-GB" sz="2000">
+              <a:t>with other data or tools. The format of the data should be open </a:t>
+            </a:r>
+            <a:r>
+              <a:rPr lang="en-GB" sz="2000" smtClean="0">
                 <a:solidFill>
                   <a:srgbClr val="0070C0"/>
                 </a:solidFill>
@@ -9915,52 +9879,12 @@
               <a:t>and </a:t>
             </a:r>
             <a:r>
-              <a:rPr lang="en-GB" sz="2000" smtClean="0">
+              <a:rPr lang="en-GB" sz="2000">
                 <a:solidFill>
                   <a:srgbClr val="0070C0"/>
                 </a:solidFill>
               </a:rPr>
-              <a:t>used </a:t>
-            </a:r>
-            <a:r>
-              <a:rPr lang="en-GB" sz="2000">
-                <a:solidFill>
-                  <a:srgbClr val="0070C0"/>
-                </a:solidFill>
-              </a:rPr>
-              <a:t>with other data or tools. The format of the data should be </a:t>
-            </a:r>
-            <a:r>
-              <a:rPr lang="en-GB" sz="2000">
-                <a:solidFill>
-                  <a:srgbClr val="0070C0"/>
-                </a:solidFill>
-              </a:rPr>
-              <a:t>open </a:t>
-            </a:r>
-            <a:r>
-              <a:rPr lang="en-GB" sz="2000" smtClean="0">
-                <a:solidFill>
-                  <a:srgbClr val="0070C0"/>
-                </a:solidFill>
-              </a:rPr>
-              <a:t>and </a:t>
-            </a:r>
-            <a:r>
-              <a:rPr lang="en-GB" sz="2000">
-                <a:solidFill>
-                  <a:srgbClr val="0070C0"/>
-                </a:solidFill>
-              </a:rPr>
-              <a:t>interpretable for various tools. This principle, just like the others, applies both to </a:t>
-            </a:r>
-            <a:r>
-              <a:rPr lang="en-GB" sz="2000">
-                <a:solidFill>
-                  <a:srgbClr val="0070C0"/>
-                </a:solidFill>
-              </a:rPr>
-              <a:t>data </a:t>
+              <a:t>interpretable for various tools. This principle, just like the others, applies both to data </a:t>
             </a:r>
             <a:r>
               <a:rPr lang="en-GB" sz="2000" smtClean="0">
@@ -9976,15 +9900,7 @@
                   <a:srgbClr val="0070C0"/>
                 </a:solidFill>
               </a:rPr>
-              <a:t>; (meta)data should use vocabularies that follow FAIR </a:t>
-            </a:r>
-            <a:r>
-              <a:rPr lang="en-GB" sz="2000">
-                <a:solidFill>
-                  <a:srgbClr val="0070C0"/>
-                </a:solidFill>
-              </a:rPr>
-              <a:t>principles</a:t>
+              <a:t>; (meta)data should use vocabularies that follow FAIR principles</a:t>
             </a:r>
             <a:r>
               <a:rPr lang="en-GB" sz="2000" smtClean="0">
@@ -10017,23 +9933,7 @@
                   <a:srgbClr val="0070C0"/>
                 </a:solidFill>
               </a:rPr>
-              <a:t>: </a:t>
-            </a:r>
-            <a:r>
-              <a:rPr lang="en-GB" sz="2000">
-                <a:solidFill>
-                  <a:srgbClr val="0070C0"/>
-                </a:solidFill>
-              </a:rPr>
-              <a:t>FAIR aims to optimise the reuse of </a:t>
-            </a:r>
-            <a:r>
-              <a:rPr lang="en-GB" sz="2000">
-                <a:solidFill>
-                  <a:srgbClr val="0070C0"/>
-                </a:solidFill>
-              </a:rPr>
-              <a:t>data</a:t>
+              <a:t>: FAIR aims to optimise the reuse of data</a:t>
             </a:r>
             <a:r>
               <a:rPr lang="en-GB" sz="2000" smtClean="0">
@@ -10049,15 +9949,7 @@
                   <a:srgbClr val="0070C0"/>
                 </a:solidFill>
               </a:rPr>
-              <a:t>and data should be well-described so that they can </a:t>
-            </a:r>
-            <a:r>
-              <a:rPr lang="en-GB" sz="2000">
-                <a:solidFill>
-                  <a:srgbClr val="0070C0"/>
-                </a:solidFill>
-              </a:rPr>
-              <a:t>be </a:t>
+              <a:t>and data should be well-described so that they can be </a:t>
             </a:r>
             <a:r>
               <a:rPr lang="en-GB" sz="2000" smtClean="0">
@@ -10073,15 +9965,7 @@
                   <a:srgbClr val="0070C0"/>
                 </a:solidFill>
               </a:rPr>
-              <a:t>and/or combined in different settings. The </a:t>
-            </a:r>
-            <a:r>
-              <a:rPr lang="en-GB" sz="2000">
-                <a:solidFill>
-                  <a:srgbClr val="0070C0"/>
-                </a:solidFill>
-              </a:rPr>
-              <a:t>conditions </a:t>
+              <a:t>and/or combined in different settings. The conditions </a:t>
             </a:r>
             <a:r>
               <a:rPr lang="en-GB" sz="2000" smtClean="0">
@@ -10097,15 +9981,7 @@
                   <a:srgbClr val="0070C0"/>
                 </a:solidFill>
               </a:rPr>
-              <a:t>of </a:t>
-            </a:r>
-            <a:r>
-              <a:rPr lang="en-GB" sz="2000">
-                <a:solidFill>
-                  <a:srgbClr val="0070C0"/>
-                </a:solidFill>
-              </a:rPr>
-              <a:t>(</a:t>
+              <a:t>of (</a:t>
             </a:r>
             <a:r>
               <a:rPr lang="en-GB" sz="2000" smtClean="0">
@@ -10121,15 +9997,7 @@
                   <a:srgbClr val="0070C0"/>
                 </a:solidFill>
               </a:rPr>
-              <a:t>or the absence of conditions</a:t>
-            </a:r>
-            <a:r>
-              <a:rPr lang="en-GB" sz="2000">
-                <a:solidFill>
-                  <a:srgbClr val="0070C0"/>
-                </a:solidFill>
-              </a:rPr>
-              <a:t>, </a:t>
+              <a:t>or the absence of conditions, </a:t>
             </a:r>
             <a:r>
               <a:rPr lang="en-GB" sz="2000" smtClean="0">
@@ -10145,15 +10013,7 @@
                   <a:srgbClr val="0070C0"/>
                 </a:solidFill>
               </a:rPr>
-              <a:t>be stated </a:t>
-            </a:r>
-            <a:r>
-              <a:rPr lang="en-GB" sz="2000">
-                <a:solidFill>
-                  <a:srgbClr val="0070C0"/>
-                </a:solidFill>
-              </a:rPr>
-              <a:t>with </a:t>
+              <a:t>be stated with </a:t>
             </a:r>
             <a:r>
               <a:rPr lang="en-GB" sz="2000" smtClean="0">
@@ -10169,15 +10029,7 @@
                   <a:srgbClr val="0070C0"/>
                 </a:solidFill>
               </a:rPr>
-              <a:t>and accessible </a:t>
-            </a:r>
-            <a:r>
-              <a:rPr lang="en-GB" sz="2000">
-                <a:solidFill>
-                  <a:srgbClr val="0070C0"/>
-                </a:solidFill>
-              </a:rPr>
-              <a:t>license(s</a:t>
+              <a:t>and accessible license(s</a:t>
             </a:r>
             <a:r>
               <a:rPr lang="en-GB" sz="2000" smtClean="0">

</xml_diff>

<commit_message>
Got rid of duplicated list of repos between ep 2 and ep 4
</commit_message>
<xml_diff>
--- a/instructors/02-Being_FAIR.pptx
+++ b/instructors/02-Being_FAIR.pptx
@@ -615,6 +615,147 @@
     <p:extLst>
       <p:ext uri="{BB962C8B-B14F-4D97-AF65-F5344CB8AC3E}">
         <p14:creationId xmlns:p14="http://schemas.microsoft.com/office/powerpoint/2010/main" val="1495745150"/>
+      </p:ext>
+    </p:extLst>
+  </p:cSld>
+  <p:clrMapOvr>
+    <a:masterClrMapping/>
+  </p:clrMapOvr>
+</p:notes>
+</file>
+
+<file path=ppt/notesSlides/notesSlide2.xml><?xml version="1.0" encoding="utf-8"?>
+<p:notes xmlns:a="http://schemas.openxmlformats.org/drawingml/2006/main" xmlns:r="http://schemas.openxmlformats.org/officeDocument/2006/relationships" xmlns:p="http://schemas.openxmlformats.org/presentationml/2006/main">
+  <p:cSld>
+    <p:spTree>
+      <p:nvGrpSpPr>
+        <p:cNvPr id="1" name=""/>
+        <p:cNvGrpSpPr/>
+        <p:nvPr/>
+      </p:nvGrpSpPr>
+      <p:grpSpPr>
+        <a:xfrm>
+          <a:off x="0" y="0"/>
+          <a:ext cx="0" cy="0"/>
+          <a:chOff x="0" y="0"/>
+          <a:chExt cx="0" cy="0"/>
+        </a:xfrm>
+      </p:grpSpPr>
+      <p:sp>
+        <p:nvSpPr>
+          <p:cNvPr id="2" name="Slide Image Placeholder 1"/>
+          <p:cNvSpPr>
+            <a:spLocks noGrp="1" noRot="1" noChangeAspect="1"/>
+          </p:cNvSpPr>
+          <p:nvPr>
+            <p:ph type="sldImg"/>
+          </p:nvPr>
+        </p:nvSpPr>
+        <p:spPr/>
+      </p:sp>
+      <p:sp>
+        <p:nvSpPr>
+          <p:cNvPr id="3" name="Notes Placeholder 2"/>
+          <p:cNvSpPr>
+            <a:spLocks noGrp="1"/>
+          </p:cNvSpPr>
+          <p:nvPr>
+            <p:ph type="body" idx="1"/>
+          </p:nvPr>
+        </p:nvSpPr>
+        <p:spPr/>
+        <p:txBody>
+          <a:bodyPr/>
+          <a:lstStyle/>
+          <a:p>
+            <a:r>
+              <a:rPr lang="en-GB" smtClean="0"/>
+              <a:t>Removed, because of duplication with the</a:t>
+            </a:r>
+            <a:r>
+              <a:rPr lang="en-GB" baseline="0" smtClean="0"/>
+              <a:t> repositories episode: </a:t>
+            </a:r>
+          </a:p>
+          <a:p>
+            <a:r>
+              <a:rPr lang="en-GB" sz="1200" smtClean="0">
+                <a:solidFill>
+                  <a:srgbClr val="0070C0"/>
+                </a:solidFill>
+              </a:rPr>
+              <a:t>There are general “data agnostic” repositories, for example: </a:t>
+            </a:r>
+          </a:p>
+          <a:p>
+            <a:r>
+              <a:rPr lang="en-GB" sz="1200" smtClean="0">
+                <a:solidFill>
+                  <a:srgbClr val="0070C0"/>
+                </a:solidFill>
+              </a:rPr>
+              <a:t>Dryad, Zenodo, FigShare, Harvard Dataverse. </a:t>
+            </a:r>
+          </a:p>
+          <a:p>
+            <a:endParaRPr lang="en-GB" sz="1200" smtClean="0">
+              <a:solidFill>
+                <a:srgbClr val="0070C0"/>
+              </a:solidFill>
+            </a:endParaRPr>
+          </a:p>
+          <a:p>
+            <a:r>
+              <a:rPr lang="en-GB" sz="1200" smtClean="0">
+                <a:solidFill>
+                  <a:srgbClr val="0070C0"/>
+                </a:solidFill>
+              </a:rPr>
+              <a:t>Or domain specific, for example: </a:t>
+            </a:r>
+          </a:p>
+          <a:p>
+            <a:r>
+              <a:rPr lang="en-GB" sz="1200" smtClean="0">
+                <a:solidFill>
+                  <a:srgbClr val="0070C0"/>
+                </a:solidFill>
+              </a:rPr>
+              <a:t>UniProt, GenBank, MetaboLights.</a:t>
+            </a:r>
+          </a:p>
+          <a:p>
+            <a:endParaRPr lang="en-GB"/>
+          </a:p>
+        </p:txBody>
+      </p:sp>
+      <p:sp>
+        <p:nvSpPr>
+          <p:cNvPr id="4" name="Slide Number Placeholder 3"/>
+          <p:cNvSpPr>
+            <a:spLocks noGrp="1"/>
+          </p:cNvSpPr>
+          <p:nvPr>
+            <p:ph type="sldNum" sz="quarter" idx="10"/>
+          </p:nvPr>
+        </p:nvSpPr>
+        <p:spPr/>
+        <p:txBody>
+          <a:bodyPr/>
+          <a:lstStyle/>
+          <a:p>
+            <a:fld id="{27F2A17F-794C-4A77-AA96-7995838280EB}" type="slidenum">
+              <a:rPr lang="en-GB" smtClean="0"/>
+              <a:t>10</a:t>
+            </a:fld>
+            <a:endParaRPr lang="en-GB"/>
+          </a:p>
+        </p:txBody>
+      </p:sp>
+    </p:spTree>
+    <p:extLst>
+      <p:ext uri="{BB962C8B-B14F-4D97-AF65-F5344CB8AC3E}">
+        <p14:creationId xmlns:p14="http://schemas.microsoft.com/office/powerpoint/2010/main" val="3639087782"/>
       </p:ext>
     </p:extLst>
   </p:cSld>
@@ -4137,7 +4278,7 @@
         <p:spPr>
           <a:xfrm>
             <a:off x="633167" y="2234145"/>
-            <a:ext cx="10925666" cy="3785652"/>
+            <a:ext cx="10925666" cy="2677656"/>
           </a:xfrm>
           <a:prstGeom prst="rect">
             <a:avLst/>
@@ -4212,166 +4353,45 @@
                   <a:srgbClr val="0070C0"/>
                 </a:solidFill>
               </a:rPr>
-              <a:t>are general “data agnostic” repositories, for example: </a:t>
-            </a:r>
-          </a:p>
-          <a:p>
-            <a:r>
-              <a:rPr lang="en-GB" sz="2400" dirty="0">
-                <a:solidFill>
-                  <a:srgbClr val="0070C0"/>
-                </a:solidFill>
-                <a:hlinkClick r:id="rId2"/>
-              </a:rPr>
-              <a:t>Dryad</a:t>
-            </a:r>
-            <a:r>
-              <a:rPr lang="en-GB" sz="2400" dirty="0">
+              <a:t>are general “data agnostic</a:t>
+            </a:r>
+            <a:r>
+              <a:rPr lang="en-GB" sz="2400">
                 <a:solidFill>
                   <a:srgbClr val="0070C0"/>
                 </a:solidFill>
               </a:rPr>
-              <a:t>, </a:t>
-            </a:r>
-            <a:r>
-              <a:rPr lang="en-GB" sz="2400" dirty="0">
-                <a:solidFill>
-                  <a:srgbClr val="0070C0"/>
-                </a:solidFill>
-                <a:hlinkClick r:id="rId3"/>
-              </a:rPr>
-              <a:t>Zenodo</a:t>
-            </a:r>
-            <a:r>
-              <a:rPr lang="en-GB" sz="2400" dirty="0">
+              <a:t>” </a:t>
+            </a:r>
+            <a:r>
+              <a:rPr lang="en-GB" sz="2400" smtClean="0">
                 <a:solidFill>
                   <a:srgbClr val="0070C0"/>
                 </a:solidFill>
               </a:rPr>
-              <a:t>, </a:t>
-            </a:r>
-            <a:r>
-              <a:rPr lang="en-GB" sz="2400" dirty="0">
-                <a:solidFill>
-                  <a:srgbClr val="0070C0"/>
-                </a:solidFill>
-                <a:hlinkClick r:id="rId4"/>
-              </a:rPr>
-              <a:t>FigShare</a:t>
-            </a:r>
-            <a:r>
-              <a:rPr lang="en-GB" sz="2400" dirty="0">
+              <a:t>repositories such as Zenodo, or </a:t>
+            </a:r>
+            <a:r>
+              <a:rPr lang="en-GB" sz="2400">
                 <a:solidFill>
                   <a:srgbClr val="0070C0"/>
                 </a:solidFill>
               </a:rPr>
-              <a:t>, </a:t>
-            </a:r>
-            <a:r>
-              <a:rPr lang="en-GB" sz="2400" dirty="0">
-                <a:solidFill>
-                  <a:srgbClr val="0070C0"/>
-                </a:solidFill>
-                <a:hlinkClick r:id="rId5"/>
-              </a:rPr>
-              <a:t>Dataverse</a:t>
-            </a:r>
-            <a:r>
-              <a:rPr lang="en-GB" sz="2400" dirty="0">
+              <a:t>domain </a:t>
+            </a:r>
+            <a:r>
+              <a:rPr lang="en-GB" sz="2400" smtClean="0">
                 <a:solidFill>
                   <a:srgbClr val="0070C0"/>
                 </a:solidFill>
               </a:rPr>
-              <a:t>. </a:t>
-            </a:r>
-          </a:p>
-          <a:p>
+              <a:t>specific ones such as Genbank. We will delve into more detail in a later episode.  </a:t>
+            </a:r>
             <a:endParaRPr lang="en-GB" sz="2400" dirty="0">
               <a:solidFill>
                 <a:srgbClr val="0070C0"/>
               </a:solidFill>
             </a:endParaRPr>
-          </a:p>
-          <a:p>
-            <a:r>
-              <a:rPr lang="en-GB" sz="2400" dirty="0">
-                <a:solidFill>
-                  <a:srgbClr val="0070C0"/>
-                </a:solidFill>
-              </a:rPr>
-              <a:t>Or domain specific, for example: </a:t>
-            </a:r>
-          </a:p>
-          <a:p>
-            <a:r>
-              <a:rPr lang="en-GB" sz="2400" dirty="0">
-                <a:solidFill>
-                  <a:srgbClr val="0070C0"/>
-                </a:solidFill>
-                <a:hlinkClick r:id="rId6">
-                  <a:extLst>
-                    <a:ext uri="{A12FA001-AC4F-418D-AE19-62706E023703}">
-                      <ahyp:hlinkClr xmlns="" xmlns:ahyp="http://schemas.microsoft.com/office/drawing/2018/hyperlinkcolor" val="tx"/>
-                    </a:ext>
-                  </a:extLst>
-                </a:hlinkClick>
-              </a:rPr>
-              <a:t>UniProt</a:t>
-            </a:r>
-            <a:r>
-              <a:rPr lang="en-GB" sz="2400" dirty="0">
-                <a:solidFill>
-                  <a:srgbClr val="0070C0"/>
-                </a:solidFill>
-              </a:rPr>
-              <a:t> – protein data, </a:t>
-            </a:r>
-            <a:r>
-              <a:rPr lang="en-GB" sz="2400" dirty="0">
-                <a:solidFill>
-                  <a:srgbClr val="0070C0"/>
-                </a:solidFill>
-                <a:hlinkClick r:id="rId7">
-                  <a:extLst>
-                    <a:ext uri="{A12FA001-AC4F-418D-AE19-62706E023703}">
-                      <ahyp:hlinkClr xmlns="" xmlns:ahyp="http://schemas.microsoft.com/office/drawing/2018/hyperlinkcolor" val="tx"/>
-                    </a:ext>
-                  </a:extLst>
-                </a:hlinkClick>
-              </a:rPr>
-              <a:t>GenBank</a:t>
-            </a:r>
-            <a:r>
-              <a:rPr lang="en-GB" sz="2400" dirty="0">
-                <a:solidFill>
-                  <a:srgbClr val="0070C0"/>
-                </a:solidFill>
-              </a:rPr>
-              <a:t> – sequence data, </a:t>
-            </a:r>
-            <a:r>
-              <a:rPr lang="en-GB" sz="2400" dirty="0">
-                <a:solidFill>
-                  <a:srgbClr val="0070C0"/>
-                </a:solidFill>
-                <a:hlinkClick r:id="rId8">
-                  <a:extLst>
-                    <a:ext uri="{A12FA001-AC4F-418D-AE19-62706E023703}">
-                      <ahyp:hlinkClr xmlns="" xmlns:ahyp="http://schemas.microsoft.com/office/drawing/2018/hyperlinkcolor" val="tx"/>
-                    </a:ext>
-                  </a:extLst>
-                </a:hlinkClick>
-              </a:rPr>
-              <a:t>MetaboLights</a:t>
-            </a:r>
-            <a:r>
-              <a:rPr lang="en-GB" sz="2400" dirty="0">
-                <a:solidFill>
-                  <a:srgbClr val="0070C0"/>
-                </a:solidFill>
-              </a:rPr>
-              <a:t> – metabolomics data.</a:t>
-            </a:r>
           </a:p>
         </p:txBody>
       </p:sp>

</xml_diff>

<commit_message>
updated being FAIR exercise
</commit_message>
<xml_diff>
--- a/instructors/02-Being_FAIR.pptx
+++ b/instructors/02-Being_FAIR.pptx
@@ -18,15 +18,15 @@
     <p:sldId id="265" r:id="rId9"/>
     <p:sldId id="281" r:id="rId10"/>
     <p:sldId id="282" r:id="rId11"/>
-    <p:sldId id="272" r:id="rId12"/>
-    <p:sldId id="271" r:id="rId13"/>
-    <p:sldId id="274" r:id="rId14"/>
-    <p:sldId id="273" r:id="rId15"/>
-    <p:sldId id="283" r:id="rId16"/>
-    <p:sldId id="266" r:id="rId17"/>
-    <p:sldId id="277" r:id="rId18"/>
-    <p:sldId id="278" r:id="rId19"/>
-    <p:sldId id="280" r:id="rId20"/>
+    <p:sldId id="271" r:id="rId12"/>
+    <p:sldId id="274" r:id="rId13"/>
+    <p:sldId id="273" r:id="rId14"/>
+    <p:sldId id="283" r:id="rId15"/>
+    <p:sldId id="266" r:id="rId16"/>
+    <p:sldId id="277" r:id="rId17"/>
+    <p:sldId id="278" r:id="rId18"/>
+    <p:sldId id="280" r:id="rId19"/>
+    <p:sldId id="272" r:id="rId20"/>
   </p:sldIdLst>
   <p:sldSz cx="12192000" cy="6858000"/>
   <p:notesSz cx="6858000" cy="9144000"/>
@@ -215,7 +215,7 @@
           <a:p>
             <a:fld id="{AA8A194F-1EDC-44D6-902F-D21F13A5BCE4}" type="datetimeFigureOut">
               <a:rPr lang="en-GB" smtClean="0"/>
-              <a:t>16/12/2022</a:t>
+              <a:t>14/01/2024</a:t>
             </a:fld>
             <a:endParaRPr lang="en-GB"/>
           </a:p>
@@ -279,35 +279,35 @@
           <a:p>
             <a:pPr lvl="0"/>
             <a:r>
-              <a:rPr lang="en-US" smtClean="0"/>
+              <a:rPr lang="en-US"/>
               <a:t>Edit Master text styles</a:t>
             </a:r>
           </a:p>
           <a:p>
             <a:pPr lvl="1"/>
             <a:r>
-              <a:rPr lang="en-US" smtClean="0"/>
+              <a:rPr lang="en-US"/>
               <a:t>Second level</a:t>
             </a:r>
           </a:p>
           <a:p>
             <a:pPr lvl="2"/>
             <a:r>
-              <a:rPr lang="en-US" smtClean="0"/>
+              <a:rPr lang="en-US"/>
               <a:t>Third level</a:t>
             </a:r>
           </a:p>
           <a:p>
             <a:pPr lvl="3"/>
             <a:r>
-              <a:rPr lang="en-US" smtClean="0"/>
+              <a:rPr lang="en-US"/>
               <a:t>Fourth level</a:t>
             </a:r>
           </a:p>
           <a:p>
             <a:pPr lvl="4"/>
             <a:r>
-              <a:rPr lang="en-US" smtClean="0"/>
+              <a:rPr lang="en-US"/>
               <a:t>Fifth level</a:t>
             </a:r>
             <a:endParaRPr lang="en-GB"/>
@@ -528,37 +528,37 @@
           <a:lstStyle/>
           <a:p>
             <a:r>
-              <a:rPr lang="en-GB" smtClean="0"/>
+              <a:rPr lang="en-GB"/>
               <a:t>Please see webpage or etherpad for the detailed instructions for exercise 1a. </a:t>
             </a:r>
           </a:p>
           <a:p>
             <a:r>
-              <a:rPr lang="en-GB" smtClean="0"/>
+              <a:rPr lang="en-GB"/>
               <a:t>This example is from a real</a:t>
             </a:r>
             <a:r>
-              <a:rPr lang="en-GB" baseline="0" smtClean="0"/>
+              <a:rPr lang="en-GB" baseline="0"/>
               <a:t> reference given on t</a:t>
             </a:r>
             <a:r>
-              <a:rPr lang="en-GB" smtClean="0"/>
+              <a:rPr lang="en-GB"/>
               <a:t>he antibody</a:t>
             </a:r>
             <a:r>
-              <a:rPr lang="en-GB" baseline="0" smtClean="0"/>
+              <a:rPr lang="en-GB" baseline="0"/>
               <a:t> </a:t>
             </a:r>
             <a:r>
-              <a:rPr lang="en-GB" smtClean="0"/>
+              <a:rPr lang="en-GB"/>
               <a:t>supplier website</a:t>
             </a:r>
             <a:r>
-              <a:rPr lang="en-GB" baseline="0" smtClean="0"/>
+              <a:rPr lang="en-GB" baseline="0"/>
               <a:t> </a:t>
             </a:r>
             <a:r>
-              <a:rPr lang="en-GB" sz="1200" b="0" kern="1200" smtClean="0">
+              <a:rPr lang="en-GB" sz="1200" b="0" kern="1200">
                 <a:solidFill>
                   <a:schemeClr val="tx1"/>
                 </a:solidFill>
@@ -572,7 +572,7 @@
           </a:p>
           <a:p>
             <a:r>
-              <a:rPr lang="en-GB" sz="1200" b="0" kern="1200" smtClean="0">
+              <a:rPr lang="en-GB" sz="1200" b="0" kern="1200">
                 <a:solidFill>
                   <a:schemeClr val="tx1"/>
                 </a:solidFill>
@@ -791,7 +791,7 @@
             <a:fld id="{DE72BEAC-A25F-4480-8AFC-1D3E290F2CC8}" type="datetimeFigureOut">
               <a:rPr lang="en-GB" smtClean="0"/>
               <a:pPr/>
-              <a:t>16/12/2022</a:t>
+              <a:t>14/01/2024</a:t>
             </a:fld>
             <a:endParaRPr lang="en-GB" dirty="0"/>
           </a:p>
@@ -1055,7 +1055,7 @@
           <a:p>
             <a:fld id="{DE72BEAC-A25F-4480-8AFC-1D3E290F2CC8}" type="datetimeFigureOut">
               <a:rPr lang="en-GB" smtClean="0"/>
-              <a:t>16/12/2022</a:t>
+              <a:t>14/01/2024</a:t>
             </a:fld>
             <a:endParaRPr lang="en-GB" dirty="0"/>
           </a:p>
@@ -1265,7 +1265,7 @@
           <a:p>
             <a:fld id="{DE72BEAC-A25F-4480-8AFC-1D3E290F2CC8}" type="datetimeFigureOut">
               <a:rPr lang="en-GB" smtClean="0"/>
-              <a:t>16/12/2022</a:t>
+              <a:t>14/01/2024</a:t>
             </a:fld>
             <a:endParaRPr lang="en-GB" dirty="0"/>
           </a:p>
@@ -1465,7 +1465,7 @@
           <a:p>
             <a:fld id="{DE72BEAC-A25F-4480-8AFC-1D3E290F2CC8}" type="datetimeFigureOut">
               <a:rPr lang="en-GB" smtClean="0"/>
-              <a:t>16/12/2022</a:t>
+              <a:t>14/01/2024</a:t>
             </a:fld>
             <a:endParaRPr lang="en-GB" dirty="0"/>
           </a:p>
@@ -1741,7 +1741,7 @@
           <a:p>
             <a:fld id="{DE72BEAC-A25F-4480-8AFC-1D3E290F2CC8}" type="datetimeFigureOut">
               <a:rPr lang="en-GB" smtClean="0"/>
-              <a:t>16/12/2022</a:t>
+              <a:t>14/01/2024</a:t>
             </a:fld>
             <a:endParaRPr lang="en-GB" dirty="0"/>
           </a:p>
@@ -2009,7 +2009,7 @@
           <a:p>
             <a:fld id="{DE72BEAC-A25F-4480-8AFC-1D3E290F2CC8}" type="datetimeFigureOut">
               <a:rPr lang="en-GB" smtClean="0"/>
-              <a:t>16/12/2022</a:t>
+              <a:t>14/01/2024</a:t>
             </a:fld>
             <a:endParaRPr lang="en-GB" dirty="0"/>
           </a:p>
@@ -2424,7 +2424,7 @@
           <a:p>
             <a:fld id="{DE72BEAC-A25F-4480-8AFC-1D3E290F2CC8}" type="datetimeFigureOut">
               <a:rPr lang="en-GB" smtClean="0"/>
-              <a:t>16/12/2022</a:t>
+              <a:t>14/01/2024</a:t>
             </a:fld>
             <a:endParaRPr lang="en-GB" dirty="0"/>
           </a:p>
@@ -2566,7 +2566,7 @@
           <a:p>
             <a:fld id="{DE72BEAC-A25F-4480-8AFC-1D3E290F2CC8}" type="datetimeFigureOut">
               <a:rPr lang="en-GB" smtClean="0"/>
-              <a:t>16/12/2022</a:t>
+              <a:t>14/01/2024</a:t>
             </a:fld>
             <a:endParaRPr lang="en-GB" dirty="0"/>
           </a:p>
@@ -2679,7 +2679,7 @@
           <a:p>
             <a:fld id="{DE72BEAC-A25F-4480-8AFC-1D3E290F2CC8}" type="datetimeFigureOut">
               <a:rPr lang="en-GB" smtClean="0"/>
-              <a:t>16/12/2022</a:t>
+              <a:t>14/01/2024</a:t>
             </a:fld>
             <a:endParaRPr lang="en-GB" dirty="0"/>
           </a:p>
@@ -2992,7 +2992,7 @@
           <a:p>
             <a:fld id="{DE72BEAC-A25F-4480-8AFC-1D3E290F2CC8}" type="datetimeFigureOut">
               <a:rPr lang="en-GB" smtClean="0"/>
-              <a:t>16/12/2022</a:t>
+              <a:t>14/01/2024</a:t>
             </a:fld>
             <a:endParaRPr lang="en-GB" dirty="0"/>
           </a:p>
@@ -3281,7 +3281,7 @@
           <a:p>
             <a:fld id="{DE72BEAC-A25F-4480-8AFC-1D3E290F2CC8}" type="datetimeFigureOut">
               <a:rPr lang="en-GB" smtClean="0"/>
-              <a:t>16/12/2022</a:t>
+              <a:t>14/01/2024</a:t>
             </a:fld>
             <a:endParaRPr lang="en-GB" dirty="0"/>
           </a:p>
@@ -3523,7 +3523,7 @@
             <a:fld id="{DE72BEAC-A25F-4480-8AFC-1D3E290F2CC8}" type="datetimeFigureOut">
               <a:rPr lang="en-GB" smtClean="0"/>
               <a:pPr/>
-              <a:t>16/12/2022</a:t>
+              <a:t>14/01/2024</a:t>
             </a:fld>
             <a:endParaRPr lang="en-GB" dirty="0"/>
           </a:p>
@@ -4059,13 +4059,13 @@
                 <a:t>Open </a:t>
               </a:r>
               <a:r>
-                <a:rPr lang="en-GB" smtClean="0">
+                <a:rPr lang="en-GB">
                   <a:hlinkClick r:id="rId2"/>
                 </a:rPr>
                 <a:t>https://pad.carpentries.org/fair-4-leaders-begins-20YY-MM-DD</a:t>
               </a:r>
               <a:r>
-                <a:rPr lang="en-GB" smtClean="0"/>
+                <a:rPr lang="en-GB"/>
                 <a:t>  </a:t>
               </a:r>
               <a:endParaRPr lang="en-GB" dirty="0">
@@ -4133,13 +4133,6 @@
   <p:clrMapOvr>
     <a:masterClrMapping/>
   </p:clrMapOvr>
-  <p:timing>
-    <p:tnLst>
-      <p:par>
-        <p:cTn id="1" dur="indefinite" restart="never" nodeType="tmRoot"/>
-      </p:par>
-    </p:tnLst>
-  </p:timing>
 </p:sld>
 </file>
 
@@ -4206,8 +4199,8 @@
         </p:nvSpPr>
         <p:spPr>
           <a:xfrm>
-            <a:off x="633167" y="1461257"/>
-            <a:ext cx="10925666" cy="4893647"/>
+            <a:off x="633167" y="1690688"/>
+            <a:ext cx="10925666" cy="3046988"/>
           </a:xfrm>
           <a:prstGeom prst="rect">
             <a:avLst/>
@@ -4220,7 +4213,7 @@
           <a:lstStyle/>
           <a:p>
             <a:r>
-              <a:rPr lang="en-GB" sz="2400" b="1">
+              <a:rPr lang="en-GB" sz="2400" b="1" dirty="0">
                 <a:solidFill>
                   <a:srgbClr val="0070C0"/>
                 </a:solidFill>
@@ -4229,7 +4222,7 @@
             </a:r>
           </a:p>
           <a:p>
-            <a:endParaRPr lang="en-GB" sz="2400">
+            <a:endParaRPr lang="en-GB" sz="2400" dirty="0">
               <a:solidFill>
                 <a:srgbClr val="0070C0"/>
               </a:solidFill>
@@ -4237,14 +4230,30 @@
           </a:p>
           <a:p>
             <a:r>
-              <a:rPr lang="en-GB" sz="2400">
+              <a:rPr lang="en-GB" sz="2400" dirty="0">
                 <a:solidFill>
                   <a:srgbClr val="0070C0"/>
                 </a:solidFill>
               </a:rPr>
-              <a:t>Deposit data to an external, reputable public repository.</a:t>
-            </a:r>
-            <a:endParaRPr lang="en-GB" sz="2400">
+              <a:t>Deposit data to an external, reputable </a:t>
+            </a:r>
+            <a:r>
+              <a:rPr lang="en-GB" sz="2400" b="1" dirty="0">
+                <a:solidFill>
+                  <a:srgbClr val="0070C0"/>
+                </a:solidFill>
+              </a:rPr>
+              <a:t>public repository</a:t>
+            </a:r>
+            <a:r>
+              <a:rPr lang="en-GB" sz="2400" dirty="0">
+                <a:solidFill>
+                  <a:srgbClr val="0070C0"/>
+                </a:solidFill>
+              </a:rPr>
+              <a:t>.</a:t>
+            </a:r>
+            <a:endParaRPr lang="en-GB" sz="2400" dirty="0">
               <a:solidFill>
                 <a:srgbClr val="0070C0"/>
               </a:solidFill>
@@ -4252,15 +4261,19 @@
             </a:endParaRPr>
           </a:p>
           <a:p>
-            <a:endParaRPr lang="en-GB" sz="2400">
+            <a:endParaRPr lang="en-GB" sz="2400" dirty="0">
               <a:solidFill>
                 <a:srgbClr val="0070C0"/>
               </a:solidFill>
             </a:endParaRPr>
           </a:p>
           <a:p>
-            <a:r>
-              <a:rPr lang="en-GB" sz="2400">
+            <a:pPr marL="342900" indent="-342900">
+              <a:buFont typeface="Arial" panose="020B0604020202020204" pitchFamily="34" charset="0"/>
+              <a:buChar char="•"/>
+            </a:pPr>
+            <a:r>
+              <a:rPr lang="en-GB" sz="2400" dirty="0">
                 <a:solidFill>
                   <a:srgbClr val="0070C0"/>
                 </a:solidFill>
@@ -4268,7 +4281,7 @@
               <a:t>Repositories provide </a:t>
             </a:r>
             <a:r>
-              <a:rPr lang="en-GB" sz="2400" b="1">
+              <a:rPr lang="en-GB" sz="2400" b="1" dirty="0">
                 <a:solidFill>
                   <a:srgbClr val="0070C0"/>
                 </a:solidFill>
@@ -4276,236 +4289,28 @@
               <a:t>persistent identifiers </a:t>
             </a:r>
             <a:r>
-              <a:rPr lang="en-GB" sz="2400">
+              <a:rPr lang="en-GB" sz="2400" dirty="0">
                 <a:solidFill>
                   <a:srgbClr val="0070C0"/>
                 </a:solidFill>
               </a:rPr>
-              <a:t>(PIDs), catalogue options, advanced metadata searching, and download statistics. Some repositories can also host private data or provide embargo periods, meaning access to all data can be delayed.</a:t>
-            </a:r>
-            <a:endParaRPr lang="en-GB" sz="2400">
-              <a:solidFill>
-                <a:srgbClr val="0070C0"/>
-              </a:solidFill>
-              <a:cs typeface="Calibri"/>
-            </a:endParaRPr>
-          </a:p>
-          <a:p>
-            <a:endParaRPr lang="en-GB" sz="2400">
-              <a:solidFill>
-                <a:srgbClr val="0070C0"/>
-              </a:solidFill>
-            </a:endParaRPr>
-          </a:p>
-          <a:p>
-            <a:r>
-              <a:rPr lang="en-GB" sz="2400">
+              <a:t>(PIDs), catalogue options, advanced metadata searching, and download statistics. </a:t>
+            </a:r>
+          </a:p>
+          <a:p>
+            <a:pPr marL="342900" indent="-342900">
+              <a:buFont typeface="Arial" panose="020B0604020202020204" pitchFamily="34" charset="0"/>
+              <a:buChar char="•"/>
+            </a:pPr>
+            <a:r>
+              <a:rPr lang="en-GB" sz="2400" dirty="0">
                 <a:solidFill>
                   <a:srgbClr val="0070C0"/>
                 </a:solidFill>
               </a:rPr>
-              <a:t>There are general “data agnostic” repositories, for example: </a:t>
-            </a:r>
-            <a:r>
-              <a:rPr lang="en-GB" sz="2400">
-                <a:solidFill>
-                  <a:srgbClr val="0070C0"/>
-                </a:solidFill>
-                <a:hlinkClick r:id="rId2"/>
-              </a:rPr>
-              <a:t>Dryad</a:t>
-            </a:r>
-            <a:r>
-              <a:rPr lang="en-GB" sz="2400">
-                <a:solidFill>
-                  <a:srgbClr val="0070C0"/>
-                </a:solidFill>
-              </a:rPr>
-              <a:t>, </a:t>
-            </a:r>
-            <a:r>
-              <a:rPr lang="en-GB" sz="2400">
-                <a:solidFill>
-                  <a:srgbClr val="0070C0"/>
-                </a:solidFill>
-                <a:hlinkClick r:id="rId3"/>
-              </a:rPr>
-              <a:t>Zenodo</a:t>
-            </a:r>
-            <a:r>
-              <a:rPr lang="en-GB" sz="2400">
-                <a:solidFill>
-                  <a:srgbClr val="0070C0"/>
-                </a:solidFill>
-              </a:rPr>
-              <a:t>, </a:t>
-            </a:r>
-            <a:r>
-              <a:rPr lang="en-GB" sz="2400">
-                <a:solidFill>
-                  <a:srgbClr val="0070C0"/>
-                </a:solidFill>
-                <a:hlinkClick r:id="rId4"/>
-              </a:rPr>
-              <a:t>FigShare</a:t>
-            </a:r>
-            <a:r>
-              <a:rPr lang="en-GB" sz="2400">
-                <a:solidFill>
-                  <a:srgbClr val="0070C0"/>
-                </a:solidFill>
-              </a:rPr>
-              <a:t>, </a:t>
-            </a:r>
-            <a:r>
-              <a:rPr lang="en-GB" sz="2400">
-                <a:solidFill>
-                  <a:srgbClr val="0070C0"/>
-                </a:solidFill>
-                <a:hlinkClick r:id="rId5"/>
-              </a:rPr>
-              <a:t>Dataverse</a:t>
-            </a:r>
-            <a:r>
-              <a:rPr lang="pl-PL" sz="2400">
-                <a:solidFill>
-                  <a:srgbClr val="0070C0"/>
-                </a:solidFill>
-              </a:rPr>
-              <a:t> and THE </a:t>
-            </a:r>
-            <a:r>
-              <a:rPr lang="pl-PL" sz="2400" err="1">
-                <a:solidFill>
-                  <a:srgbClr val="0070C0"/>
-                </a:solidFill>
-              </a:rPr>
-              <a:t>UNIVERSITY’s</a:t>
-            </a:r>
-            <a:r>
-              <a:rPr lang="pl-PL" sz="2400">
-                <a:solidFill>
-                  <a:srgbClr val="0070C0"/>
-                </a:solidFill>
-              </a:rPr>
-              <a:t> </a:t>
-            </a:r>
-            <a:r>
-              <a:rPr lang="pl-PL" sz="2400" err="1">
-                <a:solidFill>
-                  <a:srgbClr val="0070C0"/>
-                </a:solidFill>
-              </a:rPr>
-              <a:t>own</a:t>
-            </a:r>
-            <a:r>
-              <a:rPr lang="pl-PL" sz="2400">
-                <a:solidFill>
-                  <a:srgbClr val="0070C0"/>
-                </a:solidFill>
-              </a:rPr>
-              <a:t> </a:t>
-            </a:r>
-            <a:r>
-              <a:rPr lang="pl-PL" sz="2400">
-                <a:solidFill>
-                  <a:srgbClr val="0070C0"/>
-                </a:solidFill>
-                <a:hlinkClick r:id="rId6"/>
-              </a:rPr>
-              <a:t>DataShare</a:t>
-            </a:r>
-            <a:r>
-              <a:rPr lang="pl-PL" sz="2400">
-                <a:solidFill>
-                  <a:srgbClr val="0070C0"/>
-                </a:solidFill>
-              </a:rPr>
-              <a:t> </a:t>
-            </a:r>
-            <a:r>
-              <a:rPr lang="en-GB" sz="2400">
-                <a:solidFill>
-                  <a:srgbClr val="0070C0"/>
-                </a:solidFill>
-              </a:rPr>
-              <a:t>. </a:t>
-            </a:r>
-            <a:endParaRPr lang="en-GB" sz="2400">
-              <a:solidFill>
-                <a:srgbClr val="0070C0"/>
-              </a:solidFill>
-              <a:cs typeface="Calibri"/>
-            </a:endParaRPr>
-          </a:p>
-          <a:p>
-            <a:endParaRPr lang="en-GB" sz="2400">
-              <a:solidFill>
-                <a:srgbClr val="0070C0"/>
-              </a:solidFill>
-            </a:endParaRPr>
-          </a:p>
-          <a:p>
-            <a:r>
-              <a:rPr lang="en-GB" sz="2400">
-                <a:solidFill>
-                  <a:srgbClr val="0070C0"/>
-                </a:solidFill>
-              </a:rPr>
-              <a:t>Or domain specific, for example: </a:t>
-            </a:r>
-            <a:r>
-              <a:rPr lang="en-GB" sz="2400">
-                <a:solidFill>
-                  <a:srgbClr val="0070C0"/>
-                </a:solidFill>
-                <a:hlinkClick r:id="rId7"/>
-              </a:rPr>
-              <a:t>UniProt</a:t>
-            </a:r>
-            <a:r>
-              <a:rPr lang="en-GB" sz="2400">
-                <a:solidFill>
-                  <a:srgbClr val="0070C0"/>
-                </a:solidFill>
-              </a:rPr>
-              <a:t> – protein data, </a:t>
-            </a:r>
-            <a:r>
-              <a:rPr lang="en-GB" sz="2400">
-                <a:solidFill>
-                  <a:srgbClr val="0070C0"/>
-                </a:solidFill>
-                <a:hlinkClick r:id="rId8"/>
-              </a:rPr>
-              <a:t>GenBank</a:t>
-            </a:r>
-            <a:r>
-              <a:rPr lang="en-GB" sz="2400">
-                <a:solidFill>
-                  <a:srgbClr val="0070C0"/>
-                </a:solidFill>
-              </a:rPr>
-              <a:t> – sequence data, </a:t>
-            </a:r>
-            <a:r>
-              <a:rPr lang="en-GB" sz="2400">
-                <a:solidFill>
-                  <a:srgbClr val="0070C0"/>
-                </a:solidFill>
-                <a:hlinkClick r:id="rId9"/>
-              </a:rPr>
-              <a:t>MetaboLights</a:t>
-            </a:r>
-            <a:r>
-              <a:rPr lang="en-GB" sz="2400">
-                <a:solidFill>
-                  <a:srgbClr val="0070C0"/>
-                </a:solidFill>
-              </a:rPr>
-              <a:t> – metabolomics data.</a:t>
-            </a:r>
-            <a:endParaRPr lang="en-GB" sz="2400">
+              <a:t>Some repositories can also host private data or provide embargo periods, meaning access to all data can be delayed.</a:t>
+            </a:r>
+            <a:endParaRPr lang="en-GB" sz="2400" dirty="0">
               <a:solidFill>
                 <a:srgbClr val="0070C0"/>
               </a:solidFill>
@@ -4567,7 +4372,7 @@
           <a:p>
             <a:r>
               <a:rPr lang="en-GB" dirty="0"/>
-              <a:t>Persistent identifiers (PIDs)</a:t>
+              <a:t>Interoperable</a:t>
             </a:r>
           </a:p>
         </p:txBody>
@@ -4588,28 +4393,44 @@
             <p:ph idx="1"/>
           </p:nvPr>
         </p:nvSpPr>
-        <p:spPr>
-          <a:xfrm>
-            <a:off x="838200" y="1555422"/>
-            <a:ext cx="10515600" cy="4817097"/>
-          </a:xfrm>
-        </p:spPr>
-        <p:txBody>
-          <a:bodyPr>
-            <a:normAutofit lnSpcReduction="10000"/>
-          </a:bodyPr>
+        <p:spPr/>
+        <p:txBody>
+          <a:bodyPr/>
           <a:lstStyle/>
           <a:p>
-            <a:pPr marL="0" indent="0">
-              <a:buNone/>
-            </a:pPr>
             <a:r>
               <a:rPr lang="en-GB" dirty="0"/>
-              <a:t>A persistent identifier is a long-lasting reference to a digital resource</a:t>
-            </a:r>
-            <a:r>
-              <a:rPr lang="en-GB" dirty="0" smtClean="0"/>
-              <a:t>.</a:t>
+              <a:t>Use standard or open-source file formats where possible (domain specific)</a:t>
+            </a:r>
+          </a:p>
+          <a:p>
+            <a:r>
+              <a:rPr lang="pl-PL" dirty="0"/>
+              <a:t>U</a:t>
+            </a:r>
+            <a:r>
+              <a:rPr lang="en-GB" dirty="0"/>
+              <a:t>se .csv or .xlsx files for numerical data. </a:t>
+            </a:r>
+            <a:r>
+              <a:rPr lang="en-GB" b="1" dirty="0"/>
+              <a:t>Never</a:t>
+            </a:r>
+            <a:r>
+              <a:rPr lang="en-GB" dirty="0"/>
+              <a:t> share data tables as word or .pdf</a:t>
+            </a:r>
+          </a:p>
+          <a:p>
+            <a:r>
+              <a:rPr lang="en-GB" dirty="0"/>
+              <a:t>Provide underlying numerical data for all plots and graphs</a:t>
+            </a:r>
+          </a:p>
+          <a:p>
+            <a:r>
+              <a:rPr lang="en-GB" dirty="0"/>
+              <a:t>Convert proprietary formats to open and/or standard ones, and convert binary formats to plain text. Whenever practicable, without losing the meaning of the data. For example convert Snapgene to Genbank/SBOL, microscopy multistack images to OME-TIFF . </a:t>
             </a:r>
           </a:p>
           <a:p>
@@ -4618,142 +4439,18 @@
             </a:pPr>
             <a:endParaRPr lang="en-GB" dirty="0"/>
           </a:p>
-          <a:p>
-            <a:pPr marL="0" indent="0">
-              <a:buNone/>
-            </a:pPr>
-            <a:r>
-              <a:rPr lang="en-GB" dirty="0" smtClean="0"/>
-              <a:t>Digital </a:t>
-            </a:r>
-            <a:r>
-              <a:rPr lang="en-GB" dirty="0"/>
-              <a:t>Object Identifier </a:t>
-            </a:r>
-            <a:r>
-              <a:rPr lang="en-GB" dirty="0">
-                <a:hlinkClick r:id="rId2"/>
-              </a:rPr>
-              <a:t>(DOI)</a:t>
-            </a:r>
-            <a:r>
-              <a:rPr lang="en-GB" dirty="0"/>
-              <a:t> (prefix doi.org in the web links). </a:t>
-            </a:r>
-          </a:p>
-          <a:p>
-            <a:pPr marL="0" indent="0">
-              <a:buNone/>
-            </a:pPr>
-            <a:endParaRPr lang="en-GB" dirty="0">
-              <a:hlinkClick r:id="rId3"/>
-            </a:endParaRPr>
-          </a:p>
-          <a:p>
-            <a:pPr marL="0" indent="0">
-              <a:buNone/>
-            </a:pPr>
-            <a:r>
-              <a:rPr lang="en-GB" dirty="0">
-                <a:hlinkClick r:id="rId3"/>
-              </a:rPr>
-              <a:t>https://doi.org/10.1038/</a:t>
-            </a:r>
-            <a:r>
-              <a:rPr lang="en-GB" dirty="0">
-                <a:solidFill>
-                  <a:srgbClr val="7030A0"/>
-                </a:solidFill>
-                <a:hlinkClick r:id="rId3"/>
-              </a:rPr>
-              <a:t>sdata.2016.18</a:t>
-            </a:r>
-            <a:r>
-              <a:rPr lang="en-GB" dirty="0"/>
-              <a:t> resolves to the FAIR paper</a:t>
-            </a:r>
-          </a:p>
-          <a:p>
-            <a:pPr marL="0" indent="0">
-              <a:buNone/>
-            </a:pPr>
-            <a:endParaRPr lang="en-GB" dirty="0"/>
-          </a:p>
-          <a:p>
-            <a:pPr marL="0" indent="0">
-              <a:buNone/>
-            </a:pPr>
-            <a:r>
-              <a:rPr lang="en-GB" dirty="0"/>
-              <a:t>Repositories often maintain web addresses in a stable form (permalinks) </a:t>
-            </a:r>
-            <a:r>
-              <a:rPr lang="en-GB"/>
-              <a:t>http</a:t>
-            </a:r>
-            <a:r>
-              <a:rPr lang="en-GB" smtClean="0"/>
-              <a:t>://&lt;repository.address&gt;/&lt;identifier&gt;.</a:t>
-            </a:r>
-            <a:endParaRPr lang="en-GB" dirty="0"/>
-          </a:p>
-          <a:p>
-            <a:pPr marL="0" indent="0">
-              <a:buNone/>
-            </a:pPr>
-            <a:endParaRPr lang="en-GB" dirty="0">
-              <a:hlinkClick r:id="rId4"/>
-            </a:endParaRPr>
-          </a:p>
-          <a:p>
-            <a:pPr marL="0" indent="0">
-              <a:buNone/>
-            </a:pPr>
-            <a:r>
-              <a:rPr lang="en-GB" dirty="0">
-                <a:hlinkClick r:id="rId4"/>
-              </a:rPr>
-              <a:t>http://identifiers.org/</a:t>
-            </a:r>
-            <a:r>
-              <a:rPr lang="en-GB" dirty="0">
-                <a:solidFill>
-                  <a:srgbClr val="7030A0"/>
-                </a:solidFill>
-                <a:hlinkClick r:id="rId4"/>
-              </a:rPr>
-              <a:t>SO:0000167</a:t>
-            </a:r>
-            <a:r>
-              <a:rPr lang="en-GB" dirty="0"/>
-              <a:t> defines promoter role</a:t>
-            </a:r>
-          </a:p>
-          <a:p>
-            <a:pPr marL="0" indent="0">
-              <a:buNone/>
-            </a:pPr>
-            <a:endParaRPr lang="en-GB" dirty="0"/>
-          </a:p>
         </p:txBody>
       </p:sp>
     </p:spTree>
     <p:extLst>
       <p:ext uri="{BB962C8B-B14F-4D97-AF65-F5344CB8AC3E}">
-        <p14:creationId xmlns:p14="http://schemas.microsoft.com/office/powerpoint/2010/main" val="802694384"/>
+        <p14:creationId xmlns:p14="http://schemas.microsoft.com/office/powerpoint/2010/main" val="1277050596"/>
       </p:ext>
     </p:extLst>
   </p:cSld>
   <p:clrMapOvr>
     <a:masterClrMapping/>
   </p:clrMapOvr>
-  <p:timing>
-    <p:tnLst>
-      <p:par>
-        <p:cTn id="1" dur="indefinite" restart="never" nodeType="tmRoot"/>
-      </p:par>
-    </p:tnLst>
-  </p:timing>
 </p:sld>
 </file>
 
@@ -4797,7 +4494,7 @@
           <a:p>
             <a:r>
               <a:rPr lang="en-GB" dirty="0"/>
-              <a:t>Interoperable</a:t>
+              <a:t>Reusable</a:t>
             </a:r>
           </a:p>
         </p:txBody>
@@ -4818,90 +4515,25 @@
             <p:ph idx="1"/>
           </p:nvPr>
         </p:nvSpPr>
-        <p:spPr/>
-        <p:txBody>
-          <a:bodyPr/>
+        <p:spPr>
+          <a:xfrm>
+            <a:off x="838200" y="2073412"/>
+            <a:ext cx="10515600" cy="3551295"/>
+          </a:xfrm>
+        </p:spPr>
+        <p:txBody>
+          <a:bodyPr>
+            <a:normAutofit fontScale="85000" lnSpcReduction="20000"/>
+          </a:bodyPr>
           <a:lstStyle/>
           <a:p>
+            <a:pPr marL="0" indent="0">
+              <a:buNone/>
+            </a:pPr>
             <a:r>
               <a:rPr lang="en-GB" dirty="0"/>
-              <a:t>Use standard or open-source </a:t>
-            </a:r>
-            <a:r>
-              <a:rPr lang="en-GB" dirty="0" smtClean="0"/>
-              <a:t>file </a:t>
-            </a:r>
-            <a:r>
-              <a:rPr lang="en-GB" dirty="0"/>
-              <a:t>formats where possible </a:t>
-            </a:r>
-            <a:r>
-              <a:rPr lang="en-GB" dirty="0" smtClean="0"/>
-              <a:t>(domain </a:t>
-            </a:r>
-            <a:r>
-              <a:rPr lang="en-GB" dirty="0"/>
-              <a:t>specific)</a:t>
-            </a:r>
-          </a:p>
-          <a:p>
-            <a:r>
-              <a:rPr lang="pl-PL" dirty="0"/>
-              <a:t>U</a:t>
-            </a:r>
-            <a:r>
-              <a:rPr lang="en-GB" dirty="0"/>
-              <a:t>se .csv or .xlsx </a:t>
-            </a:r>
-            <a:r>
-              <a:rPr lang="en-GB" dirty="0" smtClean="0"/>
-              <a:t>files </a:t>
-            </a:r>
-            <a:r>
-              <a:rPr lang="en-GB" dirty="0"/>
-              <a:t>for numerical data. </a:t>
-            </a:r>
-            <a:r>
-              <a:rPr lang="en-GB" b="1" dirty="0"/>
-              <a:t>Never</a:t>
-            </a:r>
-            <a:r>
-              <a:rPr lang="en-GB" dirty="0"/>
-              <a:t> share data tables as word or .pdf</a:t>
-            </a:r>
-          </a:p>
-          <a:p>
-            <a:r>
-              <a:rPr lang="en-GB" dirty="0"/>
-              <a:t>Provide underlying numerical data for all plots and graphs</a:t>
-            </a:r>
-          </a:p>
-          <a:p>
-            <a:r>
-              <a:rPr lang="en-GB" smtClean="0"/>
-              <a:t>Convert proprietary formats </a:t>
-            </a:r>
-            <a:r>
-              <a:rPr lang="en-GB"/>
-              <a:t>to </a:t>
-            </a:r>
-            <a:r>
-              <a:rPr lang="en-GB" smtClean="0"/>
-              <a:t>open and/or standard ones, and convert binary formats to plain text. Whenever practicable, without losing the meaning of the data. For </a:t>
-            </a:r>
-            <a:r>
-              <a:rPr lang="en-GB" dirty="0"/>
-              <a:t>example convert Snapgene to Genbank/SBOL, microscopy multistack images </a:t>
-            </a:r>
-            <a:r>
-              <a:rPr lang="en-GB"/>
-              <a:t>to </a:t>
-            </a:r>
-            <a:r>
-              <a:rPr lang="en-GB" smtClean="0"/>
-              <a:t>OME-TIFF . </a:t>
-            </a:r>
-            <a:endParaRPr lang="en-GB" dirty="0"/>
+              <a:t>Describe your data well (good metadata)</a:t>
+            </a:r>
           </a:p>
           <a:p>
             <a:pPr marL="0" indent="0">
@@ -4909,154 +4541,50 @@
             </a:pPr>
             <a:endParaRPr lang="en-GB" dirty="0"/>
           </a:p>
-        </p:txBody>
-      </p:sp>
-    </p:spTree>
-    <p:extLst>
-      <p:ext uri="{BB962C8B-B14F-4D97-AF65-F5344CB8AC3E}">
-        <p14:creationId xmlns:p14="http://schemas.microsoft.com/office/powerpoint/2010/main" val="1277050596"/>
-      </p:ext>
-    </p:extLst>
-  </p:cSld>
-  <p:clrMapOvr>
-    <a:masterClrMapping/>
-  </p:clrMapOvr>
-  <p:timing>
-    <p:tnLst>
-      <p:par>
-        <p:cTn id="1" dur="indefinite" restart="never" nodeType="tmRoot"/>
-      </p:par>
-    </p:tnLst>
-  </p:timing>
-</p:sld>
-</file>
-
-<file path=ppt/slides/slide13.xml><?xml version="1.0" encoding="utf-8"?>
-<p:sld xmlns:a="http://schemas.openxmlformats.org/drawingml/2006/main" xmlns:r="http://schemas.openxmlformats.org/officeDocument/2006/relationships" xmlns:p="http://schemas.openxmlformats.org/presentationml/2006/main">
-  <p:cSld>
-    <p:spTree>
-      <p:nvGrpSpPr>
-        <p:cNvPr id="1" name=""/>
-        <p:cNvGrpSpPr/>
-        <p:nvPr/>
-      </p:nvGrpSpPr>
-      <p:grpSpPr>
-        <a:xfrm>
-          <a:off x="0" y="0"/>
-          <a:ext cx="0" cy="0"/>
-          <a:chOff x="0" y="0"/>
-          <a:chExt cx="0" cy="0"/>
-        </a:xfrm>
-      </p:grpSpPr>
-      <p:sp>
-        <p:nvSpPr>
-          <p:cNvPr id="2" name="Title 1">
-            <a:extLst>
-              <a:ext uri="{FF2B5EF4-FFF2-40B4-BE49-F238E27FC236}">
-                <a16:creationId xmlns:a16="http://schemas.microsoft.com/office/drawing/2014/main" id="{DCE85B1F-4F7D-4B0E-B52B-0D935F9C12EE}"/>
-              </a:ext>
-            </a:extLst>
-          </p:cNvPr>
-          <p:cNvSpPr>
-            <a:spLocks noGrp="1"/>
-          </p:cNvSpPr>
-          <p:nvPr>
-            <p:ph type="title"/>
-          </p:nvPr>
-        </p:nvSpPr>
-        <p:spPr/>
-        <p:txBody>
-          <a:bodyPr/>
-          <a:lstStyle/>
           <a:p>
             <a:r>
               <a:rPr lang="en-GB" dirty="0"/>
-              <a:t>Reusable</a:t>
-            </a:r>
-          </a:p>
-        </p:txBody>
-      </p:sp>
-      <p:sp>
-        <p:nvSpPr>
-          <p:cNvPr id="6" name="Content Placeholder 5">
-            <a:extLst>
-              <a:ext uri="{FF2B5EF4-FFF2-40B4-BE49-F238E27FC236}">
-                <a16:creationId xmlns:a16="http://schemas.microsoft.com/office/drawing/2014/main" id="{EF786E17-0337-4633-BDF5-676F4C563757}"/>
-              </a:ext>
-            </a:extLst>
-          </p:cNvPr>
-          <p:cNvSpPr>
-            <a:spLocks noGrp="1"/>
-          </p:cNvSpPr>
-          <p:nvPr>
-            <p:ph idx="1"/>
-          </p:nvPr>
-        </p:nvSpPr>
-        <p:spPr>
-          <a:xfrm>
-            <a:off x="838200" y="1527142"/>
-            <a:ext cx="10515600" cy="5071621"/>
-          </a:xfrm>
-        </p:spPr>
-        <p:txBody>
-          <a:bodyPr>
-            <a:normAutofit/>
-          </a:bodyPr>
-          <a:lstStyle/>
+              <a:t>write a README file describing the data</a:t>
+            </a:r>
+          </a:p>
+          <a:p>
+            <a:r>
+              <a:rPr lang="en-GB" dirty="0"/>
+              <a:t>provide as many details as possible (prepare good metadata)</a:t>
+            </a:r>
+          </a:p>
+          <a:p>
+            <a:r>
+              <a:rPr lang="en-GB" dirty="0"/>
+              <a:t>use descriptive column headers for the data tables</a:t>
+            </a:r>
+          </a:p>
+          <a:p>
+            <a:r>
+              <a:rPr lang="en-GB" dirty="0"/>
+              <a:t>tidy data tables, make them analysis friendly</a:t>
+            </a:r>
+          </a:p>
+          <a:p>
+            <a:r>
+              <a:rPr lang="en-GB" dirty="0"/>
+              <a:t>Use standard (meta)data formats (e.g. SBML, SBOL)</a:t>
+            </a:r>
+          </a:p>
+          <a:p>
+            <a:r>
+              <a:rPr lang="en-GB" dirty="0"/>
+              <a:t>follow Minimum Information Standards </a:t>
+            </a:r>
+          </a:p>
           <a:p>
             <a:pPr marL="0" indent="0">
               <a:buNone/>
             </a:pPr>
             <a:r>
               <a:rPr lang="en-GB" dirty="0"/>
-              <a:t>Describe your data well (good metadata)</a:t>
-            </a:r>
-          </a:p>
-          <a:p>
-            <a:r>
-              <a:rPr lang="en-GB" dirty="0"/>
-              <a:t>write a README file describing the data</a:t>
-            </a:r>
-          </a:p>
-          <a:p>
-            <a:r>
-              <a:rPr lang="en-GB" dirty="0"/>
-              <a:t>provide as many details as possible (prepare good metadata)</a:t>
-            </a:r>
-          </a:p>
-          <a:p>
-            <a:r>
-              <a:rPr lang="en-GB" dirty="0"/>
-              <a:t>use descriptive column headers for the data tables</a:t>
-            </a:r>
-          </a:p>
-          <a:p>
-            <a:r>
-              <a:rPr lang="en-GB" dirty="0"/>
-              <a:t>tidy data tables, make them analysis friendly</a:t>
-            </a:r>
-          </a:p>
-          <a:p>
-            <a:r>
-              <a:rPr lang="en-GB" dirty="0"/>
-              <a:t>use (meta)data formats (e.g. SBML, SBOL)</a:t>
-            </a:r>
-          </a:p>
-          <a:p>
-            <a:r>
-              <a:rPr lang="en-GB" dirty="0" smtClean="0"/>
-              <a:t>follow </a:t>
-            </a:r>
-            <a:r>
-              <a:rPr lang="en-GB" dirty="0"/>
-              <a:t>Minimum Information Standards</a:t>
-            </a:r>
-          </a:p>
-          <a:p>
-            <a:pPr marL="0" indent="0">
-              <a:buNone/>
-            </a:pPr>
-            <a:endParaRPr lang="en-GB" dirty="0"/>
+              <a:t>   (e.g. MIAME -Minimum Information About a Microarray Experiment)</a:t>
+            </a:r>
           </a:p>
         </p:txBody>
       </p:sp>
@@ -5081,7 +4609,7 @@
                 <a14:useLocalDpi xmlns:a14="http://schemas.microsoft.com/office/drawing/2010/main" val="0"/>
               </a:ext>
               <a:ext uri="{96DAC541-7B7A-43D3-8B79-37D633B846F1}">
-                <asvg:svgBlip xmlns="" xmlns:asvg="http://schemas.microsoft.com/office/drawing/2016/SVG/main" r:embed="rId3"/>
+                <asvg:svgBlip xmlns:asvg="http://schemas.microsoft.com/office/drawing/2016/SVG/main" r:embed="rId3"/>
               </a:ext>
             </a:extLst>
           </a:blip>
@@ -5109,17 +4637,10 @@
   <p:clrMapOvr>
     <a:masterClrMapping/>
   </p:clrMapOvr>
-  <p:timing>
-    <p:tnLst>
-      <p:par>
-        <p:cTn id="1" dur="indefinite" restart="never" nodeType="tmRoot"/>
-      </p:par>
-    </p:tnLst>
-  </p:timing>
 </p:sld>
 </file>
 
-<file path=ppt/slides/slide14.xml><?xml version="1.0" encoding="utf-8"?>
+<file path=ppt/slides/slide13.xml><?xml version="1.0" encoding="utf-8"?>
 <p:sld xmlns:a="http://schemas.openxmlformats.org/drawingml/2006/main" xmlns:r="http://schemas.openxmlformats.org/officeDocument/2006/relationships" xmlns:p="http://schemas.openxmlformats.org/presentationml/2006/main">
   <p:cSld>
     <p:spTree>
@@ -5203,11 +4724,7 @@
             </a:r>
             <a:r>
               <a:rPr lang="en-GB"/>
-              <a:t>terms </a:t>
-            </a:r>
-            <a:r>
-              <a:rPr lang="en-GB" smtClean="0"/>
-              <a:t>under </a:t>
+              <a:t>terms under </a:t>
             </a:r>
             <a:r>
               <a:rPr lang="en-GB" dirty="0"/>
@@ -5312,7 +4829,7 @@
                 <a14:useLocalDpi xmlns:a14="http://schemas.microsoft.com/office/drawing/2010/main" val="0"/>
               </a:ext>
               <a:ext uri="{96DAC541-7B7A-43D3-8B79-37D633B846F1}">
-                <asvg:svgBlip xmlns="" xmlns:asvg="http://schemas.microsoft.com/office/drawing/2016/SVG/main" r:embed="rId7"/>
+                <asvg:svgBlip xmlns:asvg="http://schemas.microsoft.com/office/drawing/2016/SVG/main" r:embed="rId7"/>
               </a:ext>
             </a:extLst>
           </a:blip>
@@ -5340,13 +4857,167 @@
   <p:clrMapOvr>
     <a:masterClrMapping/>
   </p:clrMapOvr>
-  <p:timing>
-    <p:tnLst>
-      <p:par>
-        <p:cTn id="1" dur="indefinite" restart="never" nodeType="tmRoot"/>
-      </p:par>
-    </p:tnLst>
-  </p:timing>
+</p:sld>
+</file>
+
+<file path=ppt/slides/slide14.xml><?xml version="1.0" encoding="utf-8"?>
+<p:sld xmlns:a="http://schemas.openxmlformats.org/drawingml/2006/main" xmlns:r="http://schemas.openxmlformats.org/officeDocument/2006/relationships" xmlns:p="http://schemas.openxmlformats.org/presentationml/2006/main">
+  <p:cSld>
+    <p:spTree>
+      <p:nvGrpSpPr>
+        <p:cNvPr id="1" name=""/>
+        <p:cNvGrpSpPr/>
+        <p:nvPr/>
+      </p:nvGrpSpPr>
+      <p:grpSpPr>
+        <a:xfrm>
+          <a:off x="0" y="0"/>
+          <a:ext cx="0" cy="0"/>
+          <a:chOff x="0" y="0"/>
+          <a:chExt cx="0" cy="0"/>
+        </a:xfrm>
+      </p:grpSpPr>
+      <p:sp>
+        <p:nvSpPr>
+          <p:cNvPr id="2" name="Title 1">
+            <a:extLst>
+              <a:ext uri="{FF2B5EF4-FFF2-40B4-BE49-F238E27FC236}">
+                <a16:creationId xmlns:a16="http://schemas.microsoft.com/office/drawing/2014/main" id="{DCE85B1F-4F7D-4B0E-B52B-0D935F9C12EE}"/>
+              </a:ext>
+            </a:extLst>
+          </p:cNvPr>
+          <p:cNvSpPr>
+            <a:spLocks noGrp="1"/>
+          </p:cNvSpPr>
+          <p:nvPr>
+            <p:ph type="title"/>
+          </p:nvPr>
+        </p:nvSpPr>
+        <p:spPr/>
+        <p:txBody>
+          <a:bodyPr/>
+          <a:lstStyle/>
+          <a:p>
+            <a:r>
+              <a:rPr lang="en-GB" dirty="0"/>
+              <a:t>Exercise 2 – Public record FAIR elements</a:t>
+            </a:r>
+          </a:p>
+        </p:txBody>
+      </p:sp>
+      <p:sp>
+        <p:nvSpPr>
+          <p:cNvPr id="6" name="Content Placeholder 5">
+            <a:extLst>
+              <a:ext uri="{FF2B5EF4-FFF2-40B4-BE49-F238E27FC236}">
+                <a16:creationId xmlns:a16="http://schemas.microsoft.com/office/drawing/2014/main" id="{EF786E17-0337-4633-BDF5-676F4C563757}"/>
+              </a:ext>
+            </a:extLst>
+          </p:cNvPr>
+          <p:cNvSpPr>
+            <a:spLocks noGrp="1"/>
+          </p:cNvSpPr>
+          <p:nvPr>
+            <p:ph idx="1"/>
+          </p:nvPr>
+        </p:nvSpPr>
+        <p:spPr/>
+        <p:txBody>
+          <a:bodyPr>
+            <a:normAutofit/>
+          </a:bodyPr>
+          <a:lstStyle/>
+          <a:p>
+            <a:pPr marL="0" indent="0">
+              <a:buNone/>
+            </a:pPr>
+            <a:r>
+              <a:rPr lang="en-GB" sz="2800" dirty="0">
+                <a:solidFill>
+                  <a:srgbClr val="0070C0"/>
+                </a:solidFill>
+              </a:rPr>
+              <a:t>			</a:t>
+            </a:r>
+            <a:endParaRPr lang="pl-PL" dirty="0"/>
+          </a:p>
+          <a:p>
+            <a:pPr marL="0" indent="0">
+              <a:buNone/>
+            </a:pPr>
+            <a:r>
+              <a:rPr lang="en-GB" dirty="0"/>
+              <a:t>Dataset: </a:t>
+            </a:r>
+            <a:r>
+              <a:rPr lang="pl-PL" dirty="0"/>
+              <a:t>https://doi.org/10.5281/zenodo.5045374 </a:t>
+            </a:r>
+          </a:p>
+          <a:p>
+            <a:pPr marL="0" indent="0">
+              <a:buNone/>
+            </a:pPr>
+            <a:endParaRPr lang="en-GB" sz="3200" dirty="0">
+              <a:solidFill>
+                <a:srgbClr val="0070C0"/>
+              </a:solidFill>
+            </a:endParaRPr>
+          </a:p>
+          <a:p>
+            <a:pPr marL="0" indent="0">
+              <a:buNone/>
+            </a:pPr>
+            <a:r>
+              <a:rPr lang="en-GB" sz="3200" dirty="0">
+                <a:solidFill>
+                  <a:srgbClr val="0070C0"/>
+                </a:solidFill>
+              </a:rPr>
+              <a:t>W</a:t>
+            </a:r>
+            <a:r>
+              <a:rPr lang="pl-PL" sz="3200" dirty="0">
+                <a:solidFill>
+                  <a:srgbClr val="0070C0"/>
+                </a:solidFill>
+              </a:rPr>
+              <a:t>hat makes it FAIR</a:t>
+            </a:r>
+            <a:r>
+              <a:rPr lang="en-GB" sz="3200" dirty="0">
+                <a:solidFill>
+                  <a:srgbClr val="0070C0"/>
+                </a:solidFill>
+              </a:rPr>
+              <a:t>?</a:t>
+            </a:r>
+            <a:endParaRPr lang="pl-PL" sz="3200" dirty="0"/>
+          </a:p>
+          <a:p>
+            <a:pPr marL="0" indent="0">
+              <a:buNone/>
+            </a:pPr>
+            <a:endParaRPr lang="pl-PL" dirty="0"/>
+          </a:p>
+          <a:p>
+            <a:pPr marL="0" indent="0">
+              <a:buNone/>
+            </a:pPr>
+            <a:endParaRPr lang="pl-PL" dirty="0"/>
+          </a:p>
+        </p:txBody>
+      </p:sp>
+    </p:spTree>
+    <p:extLst>
+      <p:ext uri="{BB962C8B-B14F-4D97-AF65-F5344CB8AC3E}">
+        <p14:creationId xmlns:p14="http://schemas.microsoft.com/office/powerpoint/2010/main" val="729282085"/>
+      </p:ext>
+    </p:extLst>
+  </p:cSld>
+  <p:clrMapOvr>
+    <a:masterClrMapping/>
+  </p:clrMapOvr>
 </p:sld>
 </file>
 
@@ -5372,7 +5043,7 @@
           <p:cNvPr id="2" name="Title 1">
             <a:extLst>
               <a:ext uri="{FF2B5EF4-FFF2-40B4-BE49-F238E27FC236}">
-                <a16:creationId xmlns:a16="http://schemas.microsoft.com/office/drawing/2014/main" id="{DCE85B1F-4F7D-4B0E-B52B-0D935F9C12EE}"/>
+                <a16:creationId xmlns:a16="http://schemas.microsoft.com/office/drawing/2014/main" id="{775BFE92-9990-4094-B7B2-01514614F16E}"/>
               </a:ext>
             </a:extLst>
           </p:cNvPr>
@@ -5390,88 +5061,269 @@
           <a:p>
             <a:r>
               <a:rPr lang="en-GB" dirty="0"/>
-              <a:t>FAIR example</a:t>
-            </a:r>
-          </a:p>
-        </p:txBody>
-      </p:sp>
-      <p:sp>
-        <p:nvSpPr>
-          <p:cNvPr id="6" name="Content Placeholder 5">
-            <a:extLst>
-              <a:ext uri="{FF2B5EF4-FFF2-40B4-BE49-F238E27FC236}">
-                <a16:creationId xmlns:a16="http://schemas.microsoft.com/office/drawing/2014/main" id="{EF786E17-0337-4633-BDF5-676F4C563757}"/>
-              </a:ext>
-            </a:extLst>
-          </p:cNvPr>
-          <p:cNvSpPr>
-            <a:spLocks noGrp="1"/>
-          </p:cNvSpPr>
-          <p:nvPr>
-            <p:ph idx="1"/>
-          </p:nvPr>
-        </p:nvSpPr>
-        <p:spPr/>
-        <p:txBody>
-          <a:bodyPr>
-            <a:normAutofit/>
+              <a:t>FAIR and You</a:t>
+            </a:r>
+          </a:p>
+        </p:txBody>
+      </p:sp>
+      <p:pic>
+        <p:nvPicPr>
+          <p:cNvPr id="4" name="Picture 2" descr="http://2.bp.blogspot.com/-pSVlRf9P_q0/V-zHNtoNHmI/AAAAAAAALGU/mVlaYp0n1DMtmp9rRMtAwV_a0Jj-MD2fwCK4B/s1600/FAIR.png">
+            <a:extLst>
+              <a:ext uri="{FF2B5EF4-FFF2-40B4-BE49-F238E27FC236}">
+                <a16:creationId xmlns:a16="http://schemas.microsoft.com/office/drawing/2014/main" id="{F1145B5C-E672-4E3C-B4D6-B2EC43366A16}"/>
+              </a:ext>
+            </a:extLst>
+          </p:cNvPr>
+          <p:cNvPicPr>
+            <a:picLocks noChangeAspect="1" noChangeArrowheads="1"/>
+          </p:cNvPicPr>
+          <p:nvPr/>
+        </p:nvPicPr>
+        <p:blipFill>
+          <a:blip r:embed="rId2">
+            <a:extLst>
+              <a:ext uri="{28A0092B-C50C-407E-A947-70E740481C1C}">
+                <a14:useLocalDpi xmlns:a14="http://schemas.microsoft.com/office/drawing/2010/main" val="0"/>
+              </a:ext>
+            </a:extLst>
+          </a:blip>
+          <a:srcRect/>
+          <a:stretch>
+            <a:fillRect/>
+          </a:stretch>
+        </p:blipFill>
+        <p:spPr bwMode="auto">
+          <a:xfrm>
+            <a:off x="1326968" y="2190209"/>
+            <a:ext cx="9036496" cy="3066791"/>
+          </a:xfrm>
+          <a:prstGeom prst="rect">
+            <a:avLst/>
+          </a:prstGeom>
+          <a:noFill/>
+          <a:extLst>
+            <a:ext uri="{909E8E84-426E-40DD-AFC4-6F175D3DCCD1}">
+              <a14:hiddenFill xmlns:a14="http://schemas.microsoft.com/office/drawing/2010/main">
+                <a:solidFill>
+                  <a:srgbClr val="FFFFFF"/>
+                </a:solidFill>
+              </a14:hiddenFill>
+            </a:ext>
+          </a:extLst>
+        </p:spPr>
+      </p:pic>
+      <p:sp>
+        <p:nvSpPr>
+          <p:cNvPr id="5" name="Rectangle 4">
+            <a:extLst>
+              <a:ext uri="{FF2B5EF4-FFF2-40B4-BE49-F238E27FC236}">
+                <a16:creationId xmlns:a16="http://schemas.microsoft.com/office/drawing/2014/main" id="{C79D8DC5-0E5F-4B99-900C-3E278A5F248F}"/>
+              </a:ext>
+            </a:extLst>
+          </p:cNvPr>
+          <p:cNvSpPr/>
+          <p:nvPr/>
+        </p:nvSpPr>
+        <p:spPr>
+          <a:xfrm>
+            <a:off x="6096000" y="5244416"/>
+            <a:ext cx="1354858" cy="415498"/>
+          </a:xfrm>
+          <a:prstGeom prst="rect">
+            <a:avLst/>
+          </a:prstGeom>
+        </p:spPr>
+        <p:txBody>
+          <a:bodyPr wrap="none">
+            <a:spAutoFit/>
           </a:bodyPr>
           <a:lstStyle/>
           <a:p>
-            <a:pPr marL="0" indent="0">
-              <a:buNone/>
-            </a:pPr>
-            <a:r>
-              <a:rPr lang="en-GB" dirty="0"/>
-              <a:t>…</a:t>
-            </a:r>
-            <a:endParaRPr lang="pl-PL" dirty="0"/>
-          </a:p>
-          <a:p>
-            <a:pPr marL="0" indent="0">
-              <a:buNone/>
-            </a:pPr>
-            <a:endParaRPr lang="pl-PL" dirty="0"/>
-          </a:p>
-          <a:p>
-            <a:pPr marL="0" indent="0">
-              <a:buNone/>
-            </a:pPr>
-            <a:endParaRPr lang="pl-PL" dirty="0"/>
-          </a:p>
-          <a:p>
-            <a:pPr marL="0" indent="0">
-              <a:buNone/>
-            </a:pPr>
-            <a:endParaRPr lang="pl-PL" dirty="0"/>
-          </a:p>
-          <a:p>
-            <a:pPr marL="0" indent="0">
-              <a:buNone/>
-            </a:pPr>
-            <a:endParaRPr lang="pl-PL" dirty="0"/>
-          </a:p>
-          <a:p>
-            <a:pPr marL="0" indent="0">
-              <a:buNone/>
-            </a:pPr>
-            <a:endParaRPr lang="pl-PL" dirty="0"/>
-          </a:p>
-          <a:p>
-            <a:pPr marL="0" indent="0">
-              <a:buNone/>
-            </a:pPr>
-            <a:r>
-              <a:rPr lang="en-GB" dirty="0"/>
-              <a:t>https://doi.org/10.5281/zenodo.6339631</a:t>
-            </a:r>
+            <a:r>
+              <a:rPr lang="en-GB" sz="2100" dirty="0">
+                <a:solidFill>
+                  <a:schemeClr val="tx2">
+                    <a:lumMod val="60000"/>
+                    <a:lumOff val="40000"/>
+                  </a:schemeClr>
+                </a:solidFill>
+                <a:latin typeface="Corbel" panose="020B0503020204020204" pitchFamily="34" charset="0"/>
+              </a:rPr>
+              <a:t>Intelligible</a:t>
+            </a:r>
+          </a:p>
+        </p:txBody>
+      </p:sp>
+      <p:sp>
+        <p:nvSpPr>
+          <p:cNvPr id="6" name="Rectangle 5">
+            <a:extLst>
+              <a:ext uri="{FF2B5EF4-FFF2-40B4-BE49-F238E27FC236}">
+                <a16:creationId xmlns:a16="http://schemas.microsoft.com/office/drawing/2014/main" id="{F1F2D28B-48FB-4842-BF60-77A16A3FBD58}"/>
+              </a:ext>
+            </a:extLst>
+          </p:cNvPr>
+          <p:cNvSpPr/>
+          <p:nvPr/>
+        </p:nvSpPr>
+        <p:spPr>
+          <a:xfrm>
+            <a:off x="8210279" y="5257000"/>
+            <a:ext cx="1655774" cy="415498"/>
+          </a:xfrm>
+          <a:prstGeom prst="rect">
+            <a:avLst/>
+          </a:prstGeom>
+          <a:solidFill>
+            <a:schemeClr val="bg1"/>
+          </a:solidFill>
+        </p:spPr>
+        <p:txBody>
+          <a:bodyPr wrap="none">
+            <a:spAutoFit/>
+          </a:bodyPr>
+          <a:lstStyle/>
+          <a:p>
+            <a:r>
+              <a:rPr lang="en-GB" sz="2100" dirty="0">
+                <a:solidFill>
+                  <a:schemeClr val="tx2">
+                    <a:lumMod val="60000"/>
+                    <a:lumOff val="40000"/>
+                  </a:schemeClr>
+                </a:solidFill>
+                <a:latin typeface="Corbel" panose="020B0503020204020204" pitchFamily="34" charset="0"/>
+              </a:rPr>
+              <a:t>Reproducible</a:t>
+            </a:r>
+          </a:p>
+        </p:txBody>
+      </p:sp>
+      <p:sp>
+        <p:nvSpPr>
+          <p:cNvPr id="7" name="Rectangle 6">
+            <a:extLst>
+              <a:ext uri="{FF2B5EF4-FFF2-40B4-BE49-F238E27FC236}">
+                <a16:creationId xmlns:a16="http://schemas.microsoft.com/office/drawing/2014/main" id="{725D77CC-C0EF-4659-87DC-E623FBCA6E30}"/>
+              </a:ext>
+            </a:extLst>
+          </p:cNvPr>
+          <p:cNvSpPr/>
+          <p:nvPr/>
+        </p:nvSpPr>
+        <p:spPr>
+          <a:xfrm>
+            <a:off x="1988588" y="5257000"/>
+            <a:ext cx="971741" cy="415498"/>
+          </a:xfrm>
+          <a:prstGeom prst="rect">
+            <a:avLst/>
+          </a:prstGeom>
+        </p:spPr>
+        <p:txBody>
+          <a:bodyPr wrap="none">
+            <a:spAutoFit/>
+          </a:bodyPr>
+          <a:lstStyle/>
+          <a:p>
+            <a:r>
+              <a:rPr lang="en-GB" sz="2100" dirty="0">
+                <a:solidFill>
+                  <a:schemeClr val="tx2">
+                    <a:lumMod val="60000"/>
+                    <a:lumOff val="40000"/>
+                  </a:schemeClr>
+                </a:solidFill>
+                <a:latin typeface="Corbel" panose="020B0503020204020204" pitchFamily="34" charset="0"/>
+              </a:rPr>
+              <a:t>Citable</a:t>
+            </a:r>
+          </a:p>
+        </p:txBody>
+      </p:sp>
+      <p:sp>
+        <p:nvSpPr>
+          <p:cNvPr id="8" name="Rectangle 7">
+            <a:extLst>
+              <a:ext uri="{FF2B5EF4-FFF2-40B4-BE49-F238E27FC236}">
+                <a16:creationId xmlns:a16="http://schemas.microsoft.com/office/drawing/2014/main" id="{C66A31C1-ACF8-4FA1-AF05-7B006780E7B3}"/>
+              </a:ext>
+            </a:extLst>
+          </p:cNvPr>
+          <p:cNvSpPr/>
+          <p:nvPr/>
+        </p:nvSpPr>
+        <p:spPr>
+          <a:xfrm>
+            <a:off x="3440316" y="5257000"/>
+            <a:ext cx="2216889" cy="415498"/>
+          </a:xfrm>
+          <a:prstGeom prst="rect">
+            <a:avLst/>
+          </a:prstGeom>
+        </p:spPr>
+        <p:txBody>
+          <a:bodyPr wrap="none">
+            <a:spAutoFit/>
+          </a:bodyPr>
+          <a:lstStyle/>
+          <a:p>
+            <a:r>
+              <a:rPr lang="en-GB" sz="2100" dirty="0">
+                <a:solidFill>
+                  <a:schemeClr val="tx2">
+                    <a:lumMod val="60000"/>
+                    <a:lumOff val="40000"/>
+                  </a:schemeClr>
+                </a:solidFill>
+                <a:latin typeface="Corbel" panose="020B0503020204020204" pitchFamily="34" charset="0"/>
+              </a:rPr>
+              <a:t>Track &amp; Countable</a:t>
+            </a:r>
+          </a:p>
+        </p:txBody>
+      </p:sp>
+      <p:sp>
+        <p:nvSpPr>
+          <p:cNvPr id="9" name="TextBox 8">
+            <a:extLst>
+              <a:ext uri="{FF2B5EF4-FFF2-40B4-BE49-F238E27FC236}">
+                <a16:creationId xmlns:a16="http://schemas.microsoft.com/office/drawing/2014/main" id="{83A55002-18C5-4D7D-B132-2D7C4273B10D}"/>
+              </a:ext>
+            </a:extLst>
+          </p:cNvPr>
+          <p:cNvSpPr txBox="1"/>
+          <p:nvPr/>
+        </p:nvSpPr>
+        <p:spPr>
+          <a:xfrm>
+            <a:off x="54592" y="6465579"/>
+            <a:ext cx="1775807" cy="307777"/>
+          </a:xfrm>
+          <a:prstGeom prst="rect">
+            <a:avLst/>
+          </a:prstGeom>
+          <a:noFill/>
+        </p:spPr>
+        <p:txBody>
+          <a:bodyPr wrap="none" rtlCol="0">
+            <a:spAutoFit/>
+          </a:bodyPr>
+          <a:lstStyle/>
+          <a:p>
+            <a:r>
+              <a:rPr lang="en-GB" sz="1400"/>
+              <a:t>Image: See Credits [3]</a:t>
+            </a:r>
+            <a:endParaRPr lang="en-GB" sz="1400" dirty="0"/>
           </a:p>
         </p:txBody>
       </p:sp>
     </p:spTree>
     <p:extLst>
       <p:ext uri="{BB962C8B-B14F-4D97-AF65-F5344CB8AC3E}">
-        <p14:creationId xmlns:p14="http://schemas.microsoft.com/office/powerpoint/2010/main" val="729282085"/>
+        <p14:creationId xmlns:p14="http://schemas.microsoft.com/office/powerpoint/2010/main" val="3383671659"/>
       </p:ext>
     </p:extLst>
   </p:cSld>
@@ -5503,329 +5355,6 @@
           <p:cNvPr id="2" name="Title 1">
             <a:extLst>
               <a:ext uri="{FF2B5EF4-FFF2-40B4-BE49-F238E27FC236}">
-                <a16:creationId xmlns:a16="http://schemas.microsoft.com/office/drawing/2014/main" id="{775BFE92-9990-4094-B7B2-01514614F16E}"/>
-              </a:ext>
-            </a:extLst>
-          </p:cNvPr>
-          <p:cNvSpPr>
-            <a:spLocks noGrp="1"/>
-          </p:cNvSpPr>
-          <p:nvPr>
-            <p:ph type="title"/>
-          </p:nvPr>
-        </p:nvSpPr>
-        <p:spPr/>
-        <p:txBody>
-          <a:bodyPr/>
-          <a:lstStyle/>
-          <a:p>
-            <a:r>
-              <a:rPr lang="en-GB" dirty="0"/>
-              <a:t>FAIR and You</a:t>
-            </a:r>
-          </a:p>
-        </p:txBody>
-      </p:sp>
-      <p:pic>
-        <p:nvPicPr>
-          <p:cNvPr id="4" name="Picture 2" descr="http://2.bp.blogspot.com/-pSVlRf9P_q0/V-zHNtoNHmI/AAAAAAAALGU/mVlaYp0n1DMtmp9rRMtAwV_a0Jj-MD2fwCK4B/s1600/FAIR.png">
-            <a:extLst>
-              <a:ext uri="{FF2B5EF4-FFF2-40B4-BE49-F238E27FC236}">
-                <a16:creationId xmlns:a16="http://schemas.microsoft.com/office/drawing/2014/main" id="{F1145B5C-E672-4E3C-B4D6-B2EC43366A16}"/>
-              </a:ext>
-            </a:extLst>
-          </p:cNvPr>
-          <p:cNvPicPr>
-            <a:picLocks noChangeAspect="1" noChangeArrowheads="1"/>
-          </p:cNvPicPr>
-          <p:nvPr/>
-        </p:nvPicPr>
-        <p:blipFill>
-          <a:blip r:embed="rId2">
-            <a:extLst>
-              <a:ext uri="{28A0092B-C50C-407E-A947-70E740481C1C}">
-                <a14:useLocalDpi xmlns:a14="http://schemas.microsoft.com/office/drawing/2010/main" val="0"/>
-              </a:ext>
-            </a:extLst>
-          </a:blip>
-          <a:srcRect/>
-          <a:stretch>
-            <a:fillRect/>
-          </a:stretch>
-        </p:blipFill>
-        <p:spPr bwMode="auto">
-          <a:xfrm>
-            <a:off x="1326968" y="2190209"/>
-            <a:ext cx="9036496" cy="3066791"/>
-          </a:xfrm>
-          <a:prstGeom prst="rect">
-            <a:avLst/>
-          </a:prstGeom>
-          <a:noFill/>
-          <a:extLst>
-            <a:ext uri="{909E8E84-426E-40DD-AFC4-6F175D3DCCD1}">
-              <a14:hiddenFill xmlns:a14="http://schemas.microsoft.com/office/drawing/2010/main">
-                <a:solidFill>
-                  <a:srgbClr val="FFFFFF"/>
-                </a:solidFill>
-              </a14:hiddenFill>
-            </a:ext>
-          </a:extLst>
-        </p:spPr>
-      </p:pic>
-      <p:sp>
-        <p:nvSpPr>
-          <p:cNvPr id="5" name="Rectangle 4">
-            <a:extLst>
-              <a:ext uri="{FF2B5EF4-FFF2-40B4-BE49-F238E27FC236}">
-                <a16:creationId xmlns:a16="http://schemas.microsoft.com/office/drawing/2014/main" id="{C79D8DC5-0E5F-4B99-900C-3E278A5F248F}"/>
-              </a:ext>
-            </a:extLst>
-          </p:cNvPr>
-          <p:cNvSpPr/>
-          <p:nvPr/>
-        </p:nvSpPr>
-        <p:spPr>
-          <a:xfrm>
-            <a:off x="6096000" y="5244416"/>
-            <a:ext cx="1354858" cy="415498"/>
-          </a:xfrm>
-          <a:prstGeom prst="rect">
-            <a:avLst/>
-          </a:prstGeom>
-        </p:spPr>
-        <p:txBody>
-          <a:bodyPr wrap="none">
-            <a:spAutoFit/>
-          </a:bodyPr>
-          <a:lstStyle/>
-          <a:p>
-            <a:r>
-              <a:rPr lang="en-GB" sz="2100" dirty="0">
-                <a:solidFill>
-                  <a:schemeClr val="tx2">
-                    <a:lumMod val="60000"/>
-                    <a:lumOff val="40000"/>
-                  </a:schemeClr>
-                </a:solidFill>
-                <a:latin typeface="Corbel" panose="020B0503020204020204" pitchFamily="34" charset="0"/>
-              </a:rPr>
-              <a:t>Intelligible</a:t>
-            </a:r>
-          </a:p>
-        </p:txBody>
-      </p:sp>
-      <p:sp>
-        <p:nvSpPr>
-          <p:cNvPr id="6" name="Rectangle 5">
-            <a:extLst>
-              <a:ext uri="{FF2B5EF4-FFF2-40B4-BE49-F238E27FC236}">
-                <a16:creationId xmlns:a16="http://schemas.microsoft.com/office/drawing/2014/main" id="{F1F2D28B-48FB-4842-BF60-77A16A3FBD58}"/>
-              </a:ext>
-            </a:extLst>
-          </p:cNvPr>
-          <p:cNvSpPr/>
-          <p:nvPr/>
-        </p:nvSpPr>
-        <p:spPr>
-          <a:xfrm>
-            <a:off x="8210279" y="5257000"/>
-            <a:ext cx="1655774" cy="415498"/>
-          </a:xfrm>
-          <a:prstGeom prst="rect">
-            <a:avLst/>
-          </a:prstGeom>
-          <a:solidFill>
-            <a:schemeClr val="bg1"/>
-          </a:solidFill>
-        </p:spPr>
-        <p:txBody>
-          <a:bodyPr wrap="none">
-            <a:spAutoFit/>
-          </a:bodyPr>
-          <a:lstStyle/>
-          <a:p>
-            <a:r>
-              <a:rPr lang="en-GB" sz="2100" dirty="0">
-                <a:solidFill>
-                  <a:schemeClr val="tx2">
-                    <a:lumMod val="60000"/>
-                    <a:lumOff val="40000"/>
-                  </a:schemeClr>
-                </a:solidFill>
-                <a:latin typeface="Corbel" panose="020B0503020204020204" pitchFamily="34" charset="0"/>
-              </a:rPr>
-              <a:t>Reproducible</a:t>
-            </a:r>
-          </a:p>
-        </p:txBody>
-      </p:sp>
-      <p:sp>
-        <p:nvSpPr>
-          <p:cNvPr id="7" name="Rectangle 6">
-            <a:extLst>
-              <a:ext uri="{FF2B5EF4-FFF2-40B4-BE49-F238E27FC236}">
-                <a16:creationId xmlns:a16="http://schemas.microsoft.com/office/drawing/2014/main" id="{725D77CC-C0EF-4659-87DC-E623FBCA6E30}"/>
-              </a:ext>
-            </a:extLst>
-          </p:cNvPr>
-          <p:cNvSpPr/>
-          <p:nvPr/>
-        </p:nvSpPr>
-        <p:spPr>
-          <a:xfrm>
-            <a:off x="1988588" y="5257000"/>
-            <a:ext cx="971741" cy="415498"/>
-          </a:xfrm>
-          <a:prstGeom prst="rect">
-            <a:avLst/>
-          </a:prstGeom>
-        </p:spPr>
-        <p:txBody>
-          <a:bodyPr wrap="none">
-            <a:spAutoFit/>
-          </a:bodyPr>
-          <a:lstStyle/>
-          <a:p>
-            <a:r>
-              <a:rPr lang="en-GB" sz="2100" dirty="0">
-                <a:solidFill>
-                  <a:schemeClr val="tx2">
-                    <a:lumMod val="60000"/>
-                    <a:lumOff val="40000"/>
-                  </a:schemeClr>
-                </a:solidFill>
-                <a:latin typeface="Corbel" panose="020B0503020204020204" pitchFamily="34" charset="0"/>
-              </a:rPr>
-              <a:t>Citable</a:t>
-            </a:r>
-          </a:p>
-        </p:txBody>
-      </p:sp>
-      <p:sp>
-        <p:nvSpPr>
-          <p:cNvPr id="8" name="Rectangle 7">
-            <a:extLst>
-              <a:ext uri="{FF2B5EF4-FFF2-40B4-BE49-F238E27FC236}">
-                <a16:creationId xmlns:a16="http://schemas.microsoft.com/office/drawing/2014/main" id="{C66A31C1-ACF8-4FA1-AF05-7B006780E7B3}"/>
-              </a:ext>
-            </a:extLst>
-          </p:cNvPr>
-          <p:cNvSpPr/>
-          <p:nvPr/>
-        </p:nvSpPr>
-        <p:spPr>
-          <a:xfrm>
-            <a:off x="3440316" y="5257000"/>
-            <a:ext cx="2216889" cy="415498"/>
-          </a:xfrm>
-          <a:prstGeom prst="rect">
-            <a:avLst/>
-          </a:prstGeom>
-        </p:spPr>
-        <p:txBody>
-          <a:bodyPr wrap="none">
-            <a:spAutoFit/>
-          </a:bodyPr>
-          <a:lstStyle/>
-          <a:p>
-            <a:r>
-              <a:rPr lang="en-GB" sz="2100" dirty="0">
-                <a:solidFill>
-                  <a:schemeClr val="tx2">
-                    <a:lumMod val="60000"/>
-                    <a:lumOff val="40000"/>
-                  </a:schemeClr>
-                </a:solidFill>
-                <a:latin typeface="Corbel" panose="020B0503020204020204" pitchFamily="34" charset="0"/>
-              </a:rPr>
-              <a:t>Track &amp; Countable</a:t>
-            </a:r>
-          </a:p>
-        </p:txBody>
-      </p:sp>
-      <p:sp>
-        <p:nvSpPr>
-          <p:cNvPr id="9" name="TextBox 8">
-            <a:extLst>
-              <a:ext uri="{FF2B5EF4-FFF2-40B4-BE49-F238E27FC236}">
-                <a16:creationId xmlns:a16="http://schemas.microsoft.com/office/drawing/2014/main" id="{83A55002-18C5-4D7D-B132-2D7C4273B10D}"/>
-              </a:ext>
-            </a:extLst>
-          </p:cNvPr>
-          <p:cNvSpPr txBox="1"/>
-          <p:nvPr/>
-        </p:nvSpPr>
-        <p:spPr>
-          <a:xfrm>
-            <a:off x="54592" y="6465579"/>
-            <a:ext cx="1775807" cy="307777"/>
-          </a:xfrm>
-          <a:prstGeom prst="rect">
-            <a:avLst/>
-          </a:prstGeom>
-          <a:noFill/>
-        </p:spPr>
-        <p:txBody>
-          <a:bodyPr wrap="none" rtlCol="0">
-            <a:spAutoFit/>
-          </a:bodyPr>
-          <a:lstStyle/>
-          <a:p>
-            <a:r>
-              <a:rPr lang="en-GB" sz="1400"/>
-              <a:t>Image: </a:t>
-            </a:r>
-            <a:r>
-              <a:rPr lang="en-GB" sz="1400" smtClean="0"/>
-              <a:t>See Credits [3]</a:t>
-            </a:r>
-            <a:endParaRPr lang="en-GB" sz="1400" dirty="0"/>
-          </a:p>
-        </p:txBody>
-      </p:sp>
-    </p:spTree>
-    <p:extLst>
-      <p:ext uri="{BB962C8B-B14F-4D97-AF65-F5344CB8AC3E}">
-        <p14:creationId xmlns:p14="http://schemas.microsoft.com/office/powerpoint/2010/main" val="3383671659"/>
-      </p:ext>
-    </p:extLst>
-  </p:cSld>
-  <p:clrMapOvr>
-    <a:masterClrMapping/>
-  </p:clrMapOvr>
-  <p:timing>
-    <p:tnLst>
-      <p:par>
-        <p:cTn id="1" dur="indefinite" restart="never" nodeType="tmRoot"/>
-      </p:par>
-    </p:tnLst>
-  </p:timing>
-</p:sld>
-</file>
-
-<file path=ppt/slides/slide17.xml><?xml version="1.0" encoding="utf-8"?>
-<p:sld xmlns:a="http://schemas.openxmlformats.org/drawingml/2006/main" xmlns:r="http://schemas.openxmlformats.org/officeDocument/2006/relationships" xmlns:p="http://schemas.openxmlformats.org/presentationml/2006/main">
-  <p:cSld>
-    <p:spTree>
-      <p:nvGrpSpPr>
-        <p:cNvPr id="1" name=""/>
-        <p:cNvGrpSpPr/>
-        <p:nvPr/>
-      </p:nvGrpSpPr>
-      <p:grpSpPr>
-        <a:xfrm>
-          <a:off x="0" y="0"/>
-          <a:ext cx="0" cy="0"/>
-          <a:chOff x="0" y="0"/>
-          <a:chExt cx="0" cy="0"/>
-        </a:xfrm>
-      </p:grpSpPr>
-      <p:sp>
-        <p:nvSpPr>
-          <p:cNvPr id="2" name="Title 1">
-            <a:extLst>
-              <a:ext uri="{FF2B5EF4-FFF2-40B4-BE49-F238E27FC236}">
                 <a16:creationId xmlns:a16="http://schemas.microsoft.com/office/drawing/2014/main" id="{DCE85B1F-4F7D-4B0E-B52B-0D935F9C12EE}"/>
               </a:ext>
             </a:extLst>
@@ -5877,7 +5406,7 @@
             </a:pPr>
             <a:r>
               <a:rPr lang="en-GB" dirty="0"/>
-              <a:t>FAIR != Open</a:t>
+              <a:t>FAIR ≠ Open</a:t>
             </a:r>
           </a:p>
           <a:p>
@@ -5925,17 +5454,10 @@
   <p:clrMapOvr>
     <a:masterClrMapping/>
   </p:clrMapOvr>
-  <p:timing>
-    <p:tnLst>
-      <p:par>
-        <p:cTn id="1" dur="indefinite" restart="never" nodeType="tmRoot"/>
-      </p:par>
-    </p:tnLst>
-  </p:timing>
 </p:sld>
 </file>
 
-<file path=ppt/slides/slide18.xml><?xml version="1.0" encoding="utf-8"?>
+<file path=ppt/slides/slide17.xml><?xml version="1.0" encoding="utf-8"?>
 <p:sld xmlns:a="http://schemas.openxmlformats.org/drawingml/2006/main" xmlns:r="http://schemas.openxmlformats.org/officeDocument/2006/relationships" xmlns:p="http://schemas.openxmlformats.org/presentationml/2006/main">
   <p:cSld>
     <p:bg>
@@ -5968,7 +5490,7 @@
                 <a16:creationId xmlns:a16="http://schemas.microsoft.com/office/drawing/2014/main" id="{91F32EBA-ED97-466E-8CFA-8382584155D0}"/>
               </a:ext>
               <a:ext uri="{C183D7F6-B498-43B3-948B-1728B52AA6E4}">
-                <adec:decorative xmlns="" xmlns:adec="http://schemas.microsoft.com/office/drawing/2017/decorative" val="1"/>
+                <adec:decorative xmlns:adec="http://schemas.microsoft.com/office/drawing/2017/decorative" val="1"/>
               </a:ext>
             </a:extLst>
           </p:cNvPr>
@@ -6087,7 +5609,7 @@
               <a:buNone/>
             </a:pPr>
             <a:r>
-              <a:rPr lang="en-GB" sz="2400" smtClean="0"/>
+              <a:rPr lang="en-GB" sz="2400"/>
               <a:t>Answer the quiz questions on the webpage. </a:t>
             </a:r>
             <a:endParaRPr lang="en-GB" sz="2400" dirty="0"/>
@@ -6102,7 +5624,7 @@
                 <a16:creationId xmlns:a16="http://schemas.microsoft.com/office/drawing/2014/main" id="{62A38935-BB53-4DF7-A56E-48DD25B685D7}"/>
               </a:ext>
               <a:ext uri="{C183D7F6-B498-43B3-948B-1728B52AA6E4}">
-                <adec:decorative xmlns="" xmlns:adec="http://schemas.microsoft.com/office/drawing/2017/decorative" val="1"/>
+                <adec:decorative xmlns:adec="http://schemas.microsoft.com/office/drawing/2017/decorative" val="1"/>
               </a:ext>
             </a:extLst>
           </p:cNvPr>
@@ -6889,7 +6411,7 @@
                 <a14:useLocalDpi xmlns:a14="http://schemas.microsoft.com/office/drawing/2010/main" val="0"/>
               </a:ext>
               <a:ext uri="{96DAC541-7B7A-43D3-8B79-37D633B846F1}">
-                <asvg:svgBlip xmlns="" xmlns:asvg="http://schemas.microsoft.com/office/drawing/2016/SVG/main" r:embed="rId3"/>
+                <asvg:svgBlip xmlns:asvg="http://schemas.microsoft.com/office/drawing/2016/SVG/main" r:embed="rId3"/>
               </a:ext>
             </a:extLst>
           </a:blip>
@@ -6917,13 +6439,155 @@
   <p:clrMapOvr>
     <a:masterClrMapping/>
   </p:clrMapOvr>
-  <p:timing>
-    <p:tnLst>
-      <p:par>
-        <p:cTn id="1" dur="indefinite" restart="never" nodeType="tmRoot"/>
-      </p:par>
-    </p:tnLst>
-  </p:timing>
+</p:sld>
+</file>
+
+<file path=ppt/slides/slide18.xml><?xml version="1.0" encoding="utf-8"?>
+<p:sld xmlns:a="http://schemas.openxmlformats.org/drawingml/2006/main" xmlns:r="http://schemas.openxmlformats.org/officeDocument/2006/relationships" xmlns:p="http://schemas.openxmlformats.org/presentationml/2006/main">
+  <p:cSld>
+    <p:spTree>
+      <p:nvGrpSpPr>
+        <p:cNvPr id="1" name=""/>
+        <p:cNvGrpSpPr/>
+        <p:nvPr/>
+      </p:nvGrpSpPr>
+      <p:grpSpPr>
+        <a:xfrm>
+          <a:off x="0" y="0"/>
+          <a:ext cx="0" cy="0"/>
+          <a:chOff x="0" y="0"/>
+          <a:chExt cx="0" cy="0"/>
+        </a:xfrm>
+      </p:grpSpPr>
+      <p:sp>
+        <p:nvSpPr>
+          <p:cNvPr id="2" name="Title 1"/>
+          <p:cNvSpPr>
+            <a:spLocks noGrp="1"/>
+          </p:cNvSpPr>
+          <p:nvPr>
+            <p:ph type="title"/>
+          </p:nvPr>
+        </p:nvSpPr>
+        <p:spPr/>
+        <p:txBody>
+          <a:bodyPr/>
+          <a:lstStyle/>
+          <a:p>
+            <a:r>
+              <a:rPr lang="en-GB"/>
+              <a:t>Credits</a:t>
+            </a:r>
+          </a:p>
+        </p:txBody>
+      </p:sp>
+      <p:sp>
+        <p:nvSpPr>
+          <p:cNvPr id="3" name="Content Placeholder 2"/>
+          <p:cNvSpPr>
+            <a:spLocks noGrp="1"/>
+          </p:cNvSpPr>
+          <p:nvPr>
+            <p:ph idx="1"/>
+          </p:nvPr>
+        </p:nvSpPr>
+        <p:spPr/>
+        <p:txBody>
+          <a:bodyPr>
+            <a:normAutofit fontScale="85000" lnSpcReduction="20000"/>
+          </a:bodyPr>
+          <a:lstStyle/>
+          <a:p>
+            <a:pPr marL="514350" indent="-514350">
+              <a:buFont typeface="+mj-lt"/>
+              <a:buAutoNum type="arabicPeriod"/>
+            </a:pPr>
+            <a:r>
+              <a:rPr lang="en-GB"/>
+              <a:t>Research data MANTRA ('Research Data Management training') – Research data in context, University of Edinburgh </a:t>
+            </a:r>
+            <a:br>
+              <a:rPr lang="en-GB"/>
+            </a:br>
+            <a:r>
+              <a:rPr lang="en-GB"/>
+              <a:t>https://mantra.ed.ac.uk</a:t>
+            </a:r>
+            <a:br>
+              <a:rPr lang="en-GB"/>
+            </a:br>
+            <a:endParaRPr lang="en-GB"/>
+          </a:p>
+          <a:p>
+            <a:pPr marL="514350" indent="-514350">
+              <a:buFont typeface="+mj-lt"/>
+              <a:buAutoNum type="arabicPeriod"/>
+            </a:pPr>
+            <a:r>
+              <a:rPr lang="en-GB"/>
+              <a:t>Lab microscope photo image - CSIRO, CC BY 3.0, via Wikimedia Commons https://commons.wikimedia.org/wiki/File:CSIRO_ScienceImage_435_Scientist_using_microscope.jpg </a:t>
+            </a:r>
+          </a:p>
+          <a:p>
+            <a:pPr marL="514350" indent="-514350">
+              <a:buFont typeface="+mj-lt"/>
+              <a:buAutoNum type="arabicPeriod"/>
+            </a:pPr>
+            <a:endParaRPr lang="en-GB"/>
+          </a:p>
+          <a:p>
+            <a:pPr marL="514350" indent="-514350">
+              <a:buFont typeface="+mj-lt"/>
+              <a:buAutoNum type="arabicPeriod"/>
+            </a:pPr>
+            <a:r>
+              <a:rPr lang="en-GB"/>
+              <a:t>FAIR logo - SangyaPundir, CC BY-SA 4.0 via Wikimedia Commons </a:t>
+            </a:r>
+            <a:br>
+              <a:rPr lang="en-GB"/>
+            </a:br>
+            <a:r>
+              <a:rPr lang="en-GB"/>
+              <a:t>https://upload.wikimedia.org/wikipedia/commons/thumb/a/aa/FAIR_data_principles.jpg/800px-FAIR_data_principles.jpg </a:t>
+            </a:r>
+            <a:br>
+              <a:rPr lang="en-GB"/>
+            </a:br>
+            <a:endParaRPr lang="en-GB"/>
+          </a:p>
+          <a:p>
+            <a:pPr marL="514350" indent="-514350">
+              <a:buFont typeface="+mj-lt"/>
+              <a:buAutoNum type="arabicPeriod"/>
+            </a:pPr>
+            <a:r>
+              <a:rPr lang="en-GB"/>
+              <a:t>FAIR Principles, GO FAIR Initiative </a:t>
+            </a:r>
+            <a:br>
+              <a:rPr lang="en-GB"/>
+            </a:br>
+            <a:r>
+              <a:rPr lang="en-GB"/>
+              <a:t>www.go-fair.org/fair-principles</a:t>
+            </a:r>
+          </a:p>
+          <a:p>
+            <a:endParaRPr lang="en-GB"/>
+          </a:p>
+        </p:txBody>
+      </p:sp>
+    </p:spTree>
+    <p:extLst>
+      <p:ext uri="{BB962C8B-B14F-4D97-AF65-F5344CB8AC3E}">
+        <p14:creationId xmlns:p14="http://schemas.microsoft.com/office/powerpoint/2010/main" val="2167788240"/>
+      </p:ext>
+    </p:extLst>
+  </p:cSld>
+  <p:clrMapOvr>
+    <a:masterClrMapping/>
+  </p:clrMapOvr>
 </p:sld>
 </file>
 
@@ -6946,7 +6610,13 @@
       </p:grpSpPr>
       <p:sp>
         <p:nvSpPr>
-          <p:cNvPr id="2" name="Title 1"/>
+          <p:cNvPr id="2" name="Title 1">
+            <a:extLst>
+              <a:ext uri="{FF2B5EF4-FFF2-40B4-BE49-F238E27FC236}">
+                <a16:creationId xmlns:a16="http://schemas.microsoft.com/office/drawing/2014/main" id="{DCE85B1F-4F7D-4B0E-B52B-0D935F9C12EE}"/>
+              </a:ext>
+            </a:extLst>
+          </p:cNvPr>
           <p:cNvSpPr>
             <a:spLocks noGrp="1"/>
           </p:cNvSpPr>
@@ -6960,16 +6630,21 @@
           <a:lstStyle/>
           <a:p>
             <a:r>
-              <a:rPr lang="en-GB" smtClean="0"/>
-              <a:t>Credits</a:t>
-            </a:r>
-            <a:endParaRPr lang="en-GB"/>
-          </a:p>
-        </p:txBody>
-      </p:sp>
-      <p:sp>
-        <p:nvSpPr>
-          <p:cNvPr id="3" name="Content Placeholder 2"/>
+              <a:rPr lang="en-GB" dirty="0"/>
+              <a:t>Persistent identifiers (PIDs)</a:t>
+            </a:r>
+          </a:p>
+        </p:txBody>
+      </p:sp>
+      <p:sp>
+        <p:nvSpPr>
+          <p:cNvPr id="6" name="Content Placeholder 5">
+            <a:extLst>
+              <a:ext uri="{FF2B5EF4-FFF2-40B4-BE49-F238E27FC236}">
+                <a16:creationId xmlns:a16="http://schemas.microsoft.com/office/drawing/2014/main" id="{EF786E17-0337-4633-BDF5-676F4C563757}"/>
+              </a:ext>
+            </a:extLst>
+          </p:cNvPr>
           <p:cNvSpPr>
             <a:spLocks noGrp="1"/>
           </p:cNvSpPr>
@@ -6977,138 +6652,147 @@
             <p:ph idx="1"/>
           </p:nvPr>
         </p:nvSpPr>
-        <p:spPr/>
+        <p:spPr>
+          <a:xfrm>
+            <a:off x="838200" y="1555422"/>
+            <a:ext cx="10515600" cy="4817097"/>
+          </a:xfrm>
+        </p:spPr>
         <p:txBody>
           <a:bodyPr>
-            <a:normAutofit fontScale="85000" lnSpcReduction="20000"/>
+            <a:normAutofit lnSpcReduction="10000"/>
           </a:bodyPr>
           <a:lstStyle/>
           <a:p>
-            <a:pPr marL="514350" indent="-514350">
-              <a:buFont typeface="+mj-lt"/>
-              <a:buAutoNum type="arabicPeriod"/>
+            <a:pPr marL="0" indent="0">
+              <a:buNone/>
             </a:pPr>
             <a:r>
-              <a:rPr lang="en-GB" smtClean="0"/>
-              <a:t>Research data MANTRA ('Research Data Management training') – Research data in context, University of Edinburgh </a:t>
-            </a:r>
-            <a:br>
-              <a:rPr lang="en-GB" smtClean="0"/>
-            </a:br>
+              <a:rPr lang="en-GB" dirty="0"/>
+              <a:t>A persistent identifier is a long-lasting reference to a digital resource.</a:t>
+            </a:r>
+          </a:p>
+          <a:p>
+            <a:pPr marL="0" indent="0">
+              <a:buNone/>
+            </a:pPr>
+            <a:endParaRPr lang="en-GB" dirty="0"/>
+          </a:p>
+          <a:p>
+            <a:pPr marL="0" indent="0">
+              <a:buNone/>
+            </a:pPr>
+            <a:r>
+              <a:rPr lang="en-GB" dirty="0"/>
+              <a:t>Digital Object Identifier </a:t>
+            </a:r>
+            <a:r>
+              <a:rPr lang="en-GB" dirty="0">
+                <a:hlinkClick r:id="rId2"/>
+              </a:rPr>
+              <a:t>(DOI)</a:t>
+            </a:r>
+            <a:r>
+              <a:rPr lang="en-GB" dirty="0"/>
+              <a:t> (prefix doi.org in the web links). </a:t>
+            </a:r>
+          </a:p>
+          <a:p>
+            <a:pPr marL="0" indent="0">
+              <a:buNone/>
+            </a:pPr>
+            <a:endParaRPr lang="en-GB" dirty="0">
+              <a:hlinkClick r:id="rId3"/>
+            </a:endParaRPr>
+          </a:p>
+          <a:p>
+            <a:pPr marL="0" indent="0">
+              <a:buNone/>
+            </a:pPr>
+            <a:r>
+              <a:rPr lang="en-GB" dirty="0">
+                <a:hlinkClick r:id="rId3"/>
+              </a:rPr>
+              <a:t>https://doi.org/10.1038/</a:t>
+            </a:r>
+            <a:r>
+              <a:rPr lang="en-GB" dirty="0">
+                <a:solidFill>
+                  <a:srgbClr val="7030A0"/>
+                </a:solidFill>
+                <a:hlinkClick r:id="rId3"/>
+              </a:rPr>
+              <a:t>sdata.2016.18</a:t>
+            </a:r>
+            <a:r>
+              <a:rPr lang="en-GB" dirty="0"/>
+              <a:t> resolves to the FAIR paper</a:t>
+            </a:r>
+          </a:p>
+          <a:p>
+            <a:pPr marL="0" indent="0">
+              <a:buNone/>
+            </a:pPr>
+            <a:endParaRPr lang="en-GB" dirty="0"/>
+          </a:p>
+          <a:p>
+            <a:pPr marL="0" indent="0">
+              <a:buNone/>
+            </a:pPr>
+            <a:r>
+              <a:rPr lang="en-GB" dirty="0"/>
+              <a:t>Repositories often maintain web addresses in a stable form (permalinks) </a:t>
+            </a:r>
             <a:r>
               <a:rPr lang="en-GB"/>
-              <a:t>https://</a:t>
-            </a:r>
-            <a:r>
-              <a:rPr lang="en-GB" smtClean="0"/>
-              <a:t>mantra.ed.ac.uk</a:t>
-            </a:r>
-            <a:br>
-              <a:rPr lang="en-GB" smtClean="0"/>
-            </a:br>
-            <a:endParaRPr lang="en-GB" smtClean="0"/>
-          </a:p>
-          <a:p>
-            <a:pPr marL="514350" indent="-514350">
-              <a:buFont typeface="+mj-lt"/>
-              <a:buAutoNum type="arabicPeriod"/>
+              <a:t>http://&lt;repository.address&gt;/&lt;identifier&gt;.</a:t>
+            </a:r>
+            <a:endParaRPr lang="en-GB" dirty="0"/>
+          </a:p>
+          <a:p>
+            <a:pPr marL="0" indent="0">
+              <a:buNone/>
             </a:pPr>
-            <a:r>
-              <a:rPr lang="en-GB" smtClean="0"/>
-              <a:t>Lab microscope photo image </a:t>
-            </a:r>
-            <a:r>
-              <a:rPr lang="en-GB"/>
-              <a:t>- CSIRO, CC BY </a:t>
-            </a:r>
-            <a:r>
-              <a:rPr lang="en-GB" smtClean="0"/>
-              <a:t>3.0, </a:t>
-            </a:r>
-            <a:r>
-              <a:rPr lang="en-GB"/>
-              <a:t>via Wikimedia Commons https://</a:t>
-            </a:r>
-            <a:r>
-              <a:rPr lang="en-GB" smtClean="0"/>
-              <a:t>commons.wikimedia.org/wiki/File:CSIRO_ScienceImage_435_Scientist_using_microscope.jpg </a:t>
-            </a:r>
-          </a:p>
-          <a:p>
-            <a:pPr marL="514350" indent="-514350">
-              <a:buFont typeface="+mj-lt"/>
-              <a:buAutoNum type="arabicPeriod"/>
+            <a:endParaRPr lang="en-GB" dirty="0">
+              <a:hlinkClick r:id="rId4"/>
+            </a:endParaRPr>
+          </a:p>
+          <a:p>
+            <a:pPr marL="0" indent="0">
+              <a:buNone/>
             </a:pPr>
-            <a:endParaRPr lang="en-GB" smtClean="0"/>
-          </a:p>
-          <a:p>
-            <a:pPr marL="514350" indent="-514350">
-              <a:buFont typeface="+mj-lt"/>
-              <a:buAutoNum type="arabicPeriod"/>
+            <a:r>
+              <a:rPr lang="en-GB" dirty="0">
+                <a:hlinkClick r:id="rId4"/>
+              </a:rPr>
+              <a:t>http://identifiers.org/</a:t>
+            </a:r>
+            <a:r>
+              <a:rPr lang="en-GB" dirty="0">
+                <a:solidFill>
+                  <a:srgbClr val="7030A0"/>
+                </a:solidFill>
+                <a:hlinkClick r:id="rId4"/>
+              </a:rPr>
+              <a:t>SO:0000167</a:t>
+            </a:r>
+            <a:r>
+              <a:rPr lang="en-GB" dirty="0"/>
+              <a:t> defines promoter role</a:t>
+            </a:r>
+          </a:p>
+          <a:p>
+            <a:pPr marL="0" indent="0">
+              <a:buNone/>
             </a:pPr>
-            <a:r>
-              <a:rPr lang="en-GB" smtClean="0"/>
-              <a:t>FAIR logo - </a:t>
-            </a:r>
-            <a:r>
-              <a:rPr lang="en-GB"/>
-              <a:t>SangyaPundir, CC BY-SA 4.0 via Wikimedia Commons </a:t>
-            </a:r>
-            <a:br>
-              <a:rPr lang="en-GB"/>
-            </a:br>
-            <a:r>
-              <a:rPr lang="en-GB"/>
-              <a:t>https://</a:t>
-            </a:r>
-            <a:r>
-              <a:rPr lang="en-GB" smtClean="0"/>
-              <a:t>upload.wikimedia.org/wikipedia/commons/thumb/a/aa/FAIR_data_principles.jpg/800px-FAIR_data_principles.jpg </a:t>
-            </a:r>
-            <a:r>
-              <a:rPr lang="en-GB"/>
-              <a:t/>
-            </a:r>
-            <a:br>
-              <a:rPr lang="en-GB"/>
-            </a:br>
-            <a:endParaRPr lang="en-GB" smtClean="0"/>
-          </a:p>
-          <a:p>
-            <a:pPr marL="514350" indent="-514350">
-              <a:buFont typeface="+mj-lt"/>
-              <a:buAutoNum type="arabicPeriod"/>
-            </a:pPr>
-            <a:r>
-              <a:rPr lang="en-GB"/>
-              <a:t>FAIR </a:t>
-            </a:r>
-            <a:r>
-              <a:rPr lang="en-GB" smtClean="0"/>
-              <a:t>Principles, GO FAIR Initiative </a:t>
-            </a:r>
-            <a:r>
-              <a:rPr lang="en-GB"/>
-              <a:t/>
-            </a:r>
-            <a:br>
-              <a:rPr lang="en-GB"/>
-            </a:br>
-            <a:r>
-              <a:rPr lang="en-GB" smtClean="0"/>
-              <a:t>www.go-fair.org/fair-principles</a:t>
-            </a:r>
-            <a:endParaRPr lang="en-GB"/>
-          </a:p>
-          <a:p>
-            <a:endParaRPr lang="en-GB"/>
+            <a:endParaRPr lang="en-GB" dirty="0"/>
           </a:p>
         </p:txBody>
       </p:sp>
     </p:spTree>
     <p:extLst>
       <p:ext uri="{BB962C8B-B14F-4D97-AF65-F5344CB8AC3E}">
-        <p14:creationId xmlns:p14="http://schemas.microsoft.com/office/powerpoint/2010/main" val="2167788240"/>
+        <p14:creationId xmlns:p14="http://schemas.microsoft.com/office/powerpoint/2010/main" val="802694384"/>
       </p:ext>
     </p:extLst>
   </p:cSld>
@@ -7143,7 +6827,7 @@
                 <a16:creationId xmlns:a16="http://schemas.microsoft.com/office/drawing/2014/main" id="{C4E4288A-DFC8-40A2-90E5-70E851A933AD}"/>
               </a:ext>
               <a:ext uri="{C183D7F6-B498-43B3-948B-1728B52AA6E4}">
-                <adec:decorative xmlns="" xmlns:adec="http://schemas.microsoft.com/office/drawing/2017/decorative" val="1"/>
+                <adec:decorative xmlns:adec="http://schemas.microsoft.com/office/drawing/2017/decorative" val="1"/>
               </a:ext>
             </a:extLst>
           </p:cNvPr>
@@ -7229,17 +6913,12 @@
             </a:r>
             <a:r>
               <a:rPr lang="en-GB" sz="4000"/>
-              <a:t>is </a:t>
-            </a:r>
-            <a:r>
-              <a:rPr lang="en-GB" sz="4000" smtClean="0"/>
-              <a:t>research data</a:t>
-            </a:r>
-            <a:r>
-              <a:rPr lang="en-GB" sz="4000" dirty="0" smtClean="0"/>
+              <a:t>is research data</a:t>
+            </a:r>
+            <a:r>
+              <a:rPr lang="en-GB" sz="4000" dirty="0"/>
               <a:t>?</a:t>
             </a:r>
-            <a:endParaRPr lang="en-GB" sz="4000" dirty="0"/>
           </a:p>
         </p:txBody>
       </p:sp>
@@ -7251,7 +6930,7 @@
                 <a16:creationId xmlns:a16="http://schemas.microsoft.com/office/drawing/2014/main" id="{A94A2FC9-6D19-473C-B868-99FDB2044AA9}"/>
               </a:ext>
               <a:ext uri="{C183D7F6-B498-43B3-948B-1728B52AA6E4}">
-                <adec:decorative xmlns="" xmlns:adec="http://schemas.microsoft.com/office/drawing/2017/decorative" val="1"/>
+                <adec:decorative xmlns:adec="http://schemas.microsoft.com/office/drawing/2017/decorative" val="1"/>
               </a:ext>
             </a:extLst>
           </p:cNvPr>
@@ -7470,7 +7149,7 @@
                 <a14:useLocalDpi xmlns:a14="http://schemas.microsoft.com/office/drawing/2010/main" val="0"/>
               </a:ext>
               <a:ext uri="{96DAC541-7B7A-43D3-8B79-37D633B846F1}">
-                <asvg:svgBlip xmlns="" xmlns:asvg="http://schemas.microsoft.com/office/drawing/2016/SVG/main" r:embed="rId3"/>
+                <asvg:svgBlip xmlns:asvg="http://schemas.microsoft.com/office/drawing/2016/SVG/main" r:embed="rId3"/>
               </a:ext>
             </a:extLst>
           </a:blip>
@@ -7554,68 +7233,13 @@
                   </a:schemeClr>
                 </a:solidFill>
               </a:rPr>
-              <a:t>"Research data [is] collected, observed or generated for the purpose of analysis, to produce and validate original research </a:t>
-            </a:r>
-            <a:r>
-              <a:rPr lang="en-GB" sz="2000" smtClean="0">
-                <a:solidFill>
-                  <a:schemeClr val="accent1">
-                    <a:lumMod val="40000"/>
-                    <a:lumOff val="60000"/>
-                  </a:schemeClr>
-                </a:solidFill>
-              </a:rPr>
-              <a:t>results</a:t>
-            </a:r>
-            <a:r>
-              <a:rPr lang="en-GB" sz="2000">
-                <a:solidFill>
-                  <a:schemeClr val="accent1">
-                    <a:lumMod val="40000"/>
-                    <a:lumOff val="60000"/>
-                  </a:schemeClr>
-                </a:solidFill>
-              </a:rPr>
-              <a:t> </a:t>
-            </a:r>
-            <a:r>
-              <a:rPr lang="en-GB" sz="2000" smtClean="0">
-                <a:solidFill>
-                  <a:schemeClr val="accent1">
-                    <a:lumMod val="40000"/>
-                    <a:lumOff val="60000"/>
-                  </a:schemeClr>
-                </a:solidFill>
-              </a:rPr>
-              <a:t>[.. </a:t>
-            </a:r>
-            <a:r>
-              <a:rPr lang="en-GB" sz="2000">
-                <a:solidFill>
-                  <a:schemeClr val="accent1">
-                    <a:lumMod val="40000"/>
-                    <a:lumOff val="60000"/>
-                  </a:schemeClr>
-                </a:solidFill>
-              </a:rPr>
-              <a:t>ie] whatever is necessary to verify or reproduce research findings, or to gain a richer understanding of them"</a:t>
+              <a:t>"Research data [is] collected, observed or generated for the purpose of analysis, to produce and validate original research results [.. ie] whatever is necessary to verify or reproduce research findings, or to gain a richer understanding of them"</a:t>
             </a:r>
           </a:p>
           <a:p>
             <a:pPr marL="457200" lvl="1" indent="0" algn="ctr">
               <a:buNone/>
             </a:pPr>
-            <a:r>
-              <a:rPr lang="en-GB" sz="1600" smtClean="0">
-                <a:solidFill>
-                  <a:schemeClr val="accent1">
-                    <a:lumMod val="40000"/>
-                    <a:lumOff val="60000"/>
-                  </a:schemeClr>
-                </a:solidFill>
-              </a:rPr>
-              <a:t>Research </a:t>
-            </a:r>
             <a:r>
               <a:rPr lang="en-GB" sz="1600">
                 <a:solidFill>
@@ -7625,40 +7249,7 @@
                   </a:schemeClr>
                 </a:solidFill>
               </a:rPr>
-              <a:t>Data </a:t>
-            </a:r>
-            <a:r>
-              <a:rPr lang="en-GB" sz="1600" smtClean="0">
-                <a:solidFill>
-                  <a:schemeClr val="accent1">
-                    <a:lumMod val="40000"/>
-                    <a:lumOff val="60000"/>
-                  </a:schemeClr>
-                </a:solidFill>
-              </a:rPr>
-              <a:t>MANTRA, </a:t>
-            </a:r>
-            <a:r>
-              <a:rPr lang="en-GB" sz="1600">
-                <a:solidFill>
-                  <a:schemeClr val="accent1">
-                    <a:lumMod val="40000"/>
-                    <a:lumOff val="60000"/>
-                  </a:schemeClr>
-                </a:solidFill>
-              </a:rPr>
-              <a:t>University of </a:t>
-            </a:r>
-            <a:r>
-              <a:rPr lang="en-GB" sz="1600" smtClean="0">
-                <a:solidFill>
-                  <a:schemeClr val="accent1">
-                    <a:lumMod val="40000"/>
-                    <a:lumOff val="60000"/>
-                  </a:schemeClr>
-                </a:solidFill>
-              </a:rPr>
-              <a:t>Edinburgh </a:t>
+              <a:t>Research Data MANTRA, University of Edinburgh </a:t>
             </a:r>
           </a:p>
         </p:txBody>
@@ -7671,7 +7262,7 @@
                 <a16:creationId xmlns:a16="http://schemas.microsoft.com/office/drawing/2014/main" id="{8BED0409-854E-49C4-876E-A78C6D881BC8}"/>
               </a:ext>
               <a:ext uri="{C183D7F6-B498-43B3-948B-1728B52AA6E4}">
-                <adec:decorative xmlns="" xmlns:adec="http://schemas.microsoft.com/office/drawing/2017/decorative" val="1"/>
+                <adec:decorative xmlns:adec="http://schemas.microsoft.com/office/drawing/2017/decorative" val="1"/>
               </a:ext>
             </a:extLst>
           </p:cNvPr>
@@ -8316,7 +7907,7 @@
                 <a16:creationId xmlns:a16="http://schemas.microsoft.com/office/drawing/2014/main" id="{D4340B2E-01FD-4F5D-9C4D-AD3923AD20BA}"/>
               </a:ext>
               <a:ext uri="{C183D7F6-B498-43B3-948B-1728B52AA6E4}">
-                <adec:decorative xmlns="" xmlns:adec="http://schemas.microsoft.com/office/drawing/2017/decorative" val="1"/>
+                <adec:decorative xmlns:adec="http://schemas.microsoft.com/office/drawing/2017/decorative" val="1"/>
               </a:ext>
             </a:extLst>
           </p:cNvPr>
@@ -8535,7 +8126,7 @@
                 <a14:useLocalDpi xmlns:a14="http://schemas.microsoft.com/office/drawing/2010/main" val="0"/>
               </a:ext>
               <a:ext uri="{96DAC541-7B7A-43D3-8B79-37D633B846F1}">
-                <asvg:svgBlip xmlns="" xmlns:asvg="http://schemas.microsoft.com/office/drawing/2016/SVG/main" r:embed="rId5"/>
+                <asvg:svgBlip xmlns:asvg="http://schemas.microsoft.com/office/drawing/2016/SVG/main" r:embed="rId5"/>
               </a:ext>
             </a:extLst>
           </a:blip>
@@ -8574,7 +8165,7 @@
                 <a14:useLocalDpi xmlns:a14="http://schemas.microsoft.com/office/drawing/2010/main" val="0"/>
               </a:ext>
               <a:ext uri="{96DAC541-7B7A-43D3-8B79-37D633B846F1}">
-                <asvg:svgBlip xmlns="" xmlns:asvg="http://schemas.microsoft.com/office/drawing/2016/SVG/main" r:embed="rId7"/>
+                <asvg:svgBlip xmlns:asvg="http://schemas.microsoft.com/office/drawing/2016/SVG/main" r:embed="rId7"/>
               </a:ext>
             </a:extLst>
           </a:blip>
@@ -8792,18 +8383,18 @@
               <a:buNone/>
             </a:pPr>
             <a:r>
-              <a:rPr lang="en-GB" sz="2000" smtClean="0"/>
+              <a:rPr lang="en-GB" sz="2000"/>
               <a:t>Data does not only mean Excel files or readings</a:t>
             </a:r>
             <a:br>
-              <a:rPr lang="en-GB" sz="2000" smtClean="0"/>
+              <a:rPr lang="en-GB" sz="2000"/>
             </a:br>
             <a:r>
-              <a:rPr lang="en-GB" sz="2000" smtClean="0"/>
+              <a:rPr lang="en-GB" sz="2000"/>
               <a:t>from a machine. </a:t>
             </a:r>
             <a:r>
-              <a:rPr lang="en-GB" sz="2000" b="1" smtClean="0"/>
+              <a:rPr lang="en-GB" sz="2000" b="1"/>
               <a:t>Data also includes:</a:t>
             </a:r>
           </a:p>
@@ -8814,7 +8405,7 @@
               </a:lnSpc>
             </a:pPr>
             <a:r>
-              <a:rPr lang="en-GB" sz="2000" smtClean="0"/>
+              <a:rPr lang="en-GB" sz="2000"/>
               <a:t>images, not only from microscopes</a:t>
             </a:r>
           </a:p>
@@ -8825,14 +8416,14 @@
               </a:lnSpc>
             </a:pPr>
             <a:r>
-              <a:rPr lang="en-GB" sz="2000" smtClean="0"/>
+              <a:rPr lang="en-GB" sz="2000"/>
               <a:t>information about biological materials, </a:t>
             </a:r>
             <a:br>
-              <a:rPr lang="en-GB" sz="2000" smtClean="0"/>
+              <a:rPr lang="en-GB" sz="2000"/>
             </a:br>
             <a:r>
-              <a:rPr lang="en-GB" sz="2000" smtClean="0"/>
+              <a:rPr lang="en-GB" sz="2000"/>
               <a:t>like strain or patient details</a:t>
             </a:r>
           </a:p>
@@ -8843,10 +8434,10 @@
               </a:lnSpc>
             </a:pPr>
             <a:r>
-              <a:rPr lang="en-GB" sz="2000" smtClean="0"/>
+              <a:rPr lang="en-GB" sz="2000"/>
               <a:t>recipes, laboratory and measurement protocols</a:t>
             </a:r>
-            <a:endParaRPr lang="pl-PL" sz="2000" smtClean="0"/>
+            <a:endParaRPr lang="pl-PL" sz="2000"/>
           </a:p>
           <a:p>
             <a:pPr>
@@ -8855,10 +8446,10 @@
               </a:lnSpc>
             </a:pPr>
             <a:r>
-              <a:rPr lang="pl-PL" sz="2000" smtClean="0"/>
+              <a:rPr lang="pl-PL" sz="2000"/>
               <a:t>models</a:t>
             </a:r>
-            <a:endParaRPr lang="en-GB" sz="2000" smtClean="0"/>
+            <a:endParaRPr lang="en-GB" sz="2000"/>
           </a:p>
           <a:p>
             <a:pPr>
@@ -8867,7 +8458,7 @@
               </a:lnSpc>
             </a:pPr>
             <a:r>
-              <a:rPr lang="en-GB" sz="2000" smtClean="0"/>
+              <a:rPr lang="en-GB" sz="2000"/>
               <a:t>scripts, analysis procedures, and custom software are also considered data</a:t>
             </a:r>
             <a:endParaRPr lang="en-GB" sz="2000" dirty="0"/>
@@ -8884,13 +8475,6 @@
   <p:clrMapOvr>
     <a:masterClrMapping/>
   </p:clrMapOvr>
-  <p:timing>
-    <p:tnLst>
-      <p:par>
-        <p:cTn id="1" dur="indefinite" restart="never" nodeType="tmRoot"/>
-      </p:par>
-    </p:tnLst>
-  </p:timing>
 </p:sld>
 </file>
 
@@ -8964,7 +8548,7 @@
               <a:buNone/>
             </a:pPr>
             <a:r>
-              <a:rPr lang="en-GB" smtClean="0"/>
+              <a:rPr lang="en-GB"/>
               <a:t>We're going to do an exercise looking at some real research data. </a:t>
             </a:r>
           </a:p>
@@ -9005,10 +8589,9 @@
           <a:lstStyle/>
           <a:p>
             <a:r>
-              <a:rPr lang="en-GB" sz="1600" smtClean="0"/>
+              <a:rPr lang="en-GB" sz="1600"/>
               <a:t>Image: See Credits [2]</a:t>
             </a:r>
-            <a:endParaRPr lang="en-GB" sz="1600"/>
           </a:p>
         </p:txBody>
       </p:sp>
@@ -9046,13 +8629,6 @@
   <p:clrMapOvr>
     <a:masterClrMapping/>
   </p:clrMapOvr>
-  <p:timing>
-    <p:tnLst>
-      <p:par>
-        <p:cTn id="1" dur="indefinite" restart="never" nodeType="tmRoot"/>
-      </p:par>
-    </p:tnLst>
-  </p:timing>
 </p:sld>
 </file>
 
@@ -9095,7 +8671,7 @@
           <a:lstStyle/>
           <a:p>
             <a:r>
-              <a:rPr lang="en-GB" smtClean="0"/>
+              <a:rPr lang="en-GB"/>
               <a:t>Exercise 1a: Impossible </a:t>
             </a:r>
             <a:r>
@@ -9150,13 +8726,6 @@
   <p:clrMapOvr>
     <a:masterClrMapping/>
   </p:clrMapOvr>
-  <p:timing>
-    <p:tnLst>
-      <p:par>
-        <p:cTn id="1" dur="indefinite" restart="never" nodeType="tmRoot"/>
-      </p:par>
-    </p:tnLst>
-  </p:timing>
 </p:sld>
 </file>
 
@@ -9199,14 +8768,13 @@
           <a:lstStyle/>
           <a:p>
             <a:r>
-              <a:rPr lang="en-GB" smtClean="0"/>
+              <a:rPr lang="en-GB"/>
               <a:t>Exercise 1b: Impossible </a:t>
             </a:r>
             <a:r>
-              <a:rPr lang="en-GB" dirty="0" smtClean="0"/>
+              <a:rPr lang="en-GB" dirty="0"/>
               <a:t>average</a:t>
             </a:r>
-            <a:endParaRPr lang="en-GB" dirty="0"/>
           </a:p>
         </p:txBody>
       </p:sp>
@@ -9240,18 +8808,14 @@
               <a:t> to find the right data table and </a:t>
             </a:r>
             <a:r>
-              <a:rPr lang="en-GB" dirty="0" smtClean="0"/>
+              <a:rPr lang="en-GB" dirty="0"/>
               <a:t>column</a:t>
             </a:r>
           </a:p>
           <a:p>
             <a:r>
-              <a:rPr lang="pl-PL" dirty="0" smtClean="0"/>
-              <a:t>Numerical </a:t>
-            </a:r>
-            <a:r>
               <a:rPr lang="pl-PL" dirty="0"/>
-              <a:t>data in pdf not suitable for calculations</a:t>
+              <a:t>Numerical data in pdf not suitable for calculations</a:t>
             </a:r>
           </a:p>
           <a:p>
@@ -9272,13 +8836,6 @@
   <p:clrMapOvr>
     <a:masterClrMapping/>
   </p:clrMapOvr>
-  <p:timing>
-    <p:tnLst>
-      <p:par>
-        <p:cTn id="1" dur="indefinite" restart="never" nodeType="tmRoot"/>
-      </p:par>
-    </p:tnLst>
-  </p:timing>
 </p:sld>
 </file>
 
@@ -9368,11 +8925,7 @@
             </a:r>
             <a:r>
               <a:rPr lang="en-GB"/>
-              <a:t>protocol </a:t>
-            </a:r>
-            <a:r>
-              <a:rPr lang="en-GB" smtClean="0"/>
-              <a:t>was difficult </a:t>
+              <a:t>protocol was difficult </a:t>
             </a:r>
             <a:r>
               <a:rPr lang="en-GB" dirty="0"/>
@@ -9503,13 +9056,6 @@
   <p:clrMapOvr>
     <a:masterClrMapping/>
   </p:clrMapOvr>
-  <p:timing>
-    <p:tnLst>
-      <p:par>
-        <p:cTn id="1" dur="indefinite" restart="never" nodeType="tmRoot"/>
-      </p:par>
-    </p:tnLst>
-  </p:timing>
 </p:sld>
 </file>
 
@@ -9635,13 +9181,6 @@
   <p:clrMapOvr>
     <a:masterClrMapping/>
   </p:clrMapOvr>
-  <p:timing>
-    <p:tnLst>
-      <p:par>
-        <p:cTn id="1" dur="indefinite" restart="never" nodeType="tmRoot"/>
-      </p:par>
-    </p:tnLst>
-  </p:timing>
 </p:sld>
 </file>
 
@@ -9767,11 +9306,7 @@
           <a:p>
             <a:r>
               <a:rPr lang="en-GB" sz="1400"/>
-              <a:t>Image: </a:t>
-            </a:r>
-            <a:r>
-              <a:rPr lang="en-GB" sz="1400" smtClean="0"/>
-              <a:t>See Credits [3]</a:t>
+              <a:t>Image: See Credits [3]</a:t>
             </a:r>
             <a:endParaRPr lang="en-GB" sz="1400" dirty="0"/>
           </a:p>
@@ -9787,13 +9322,6 @@
   <p:clrMapOvr>
     <a:masterClrMapping/>
   </p:clrMapOvr>
-  <p:timing>
-    <p:tnLst>
-      <p:par>
-        <p:cTn id="1" dur="indefinite" restart="never" nodeType="tmRoot"/>
-      </p:par>
-    </p:tnLst>
-  </p:timing>
 </p:sld>
 </file>
 
@@ -9901,7 +9429,7 @@
               <a:buChar char="•"/>
             </a:pPr>
             <a:r>
-              <a:rPr lang="en-GB" sz="2000" dirty="0" smtClean="0">
+              <a:rPr lang="en-GB" sz="2000" dirty="0">
                 <a:solidFill>
                   <a:srgbClr val="0070C0"/>
                 </a:solidFill>
@@ -9909,20 +9437,12 @@
               <a:t>persistent identifiers pointing </a:t>
             </a:r>
             <a:r>
-              <a:rPr lang="pl-PL" sz="2000" dirty="0" smtClean="0">
-                <a:solidFill>
-                  <a:srgbClr val="0070C0"/>
-                </a:solidFill>
-              </a:rPr>
-              <a:t>to </a:t>
-            </a:r>
-            <a:r>
               <a:rPr lang="pl-PL" sz="2000" dirty="0">
                 <a:solidFill>
                   <a:srgbClr val="0070C0"/>
                 </a:solidFill>
               </a:rPr>
-              <a:t>the data</a:t>
+              <a:t>to the data</a:t>
             </a:r>
             <a:endParaRPr lang="pl-PL" sz="2000" dirty="0">
               <a:solidFill>
@@ -9937,7 +9457,7 @@
               <a:buChar char="•"/>
             </a:pPr>
             <a:r>
-              <a:rPr lang="en-GB" sz="2000" dirty="0" smtClean="0">
+              <a:rPr lang="en-GB" sz="2000" dirty="0">
                 <a:solidFill>
                   <a:srgbClr val="0070C0"/>
                 </a:solidFill>
@@ -9945,20 +9465,12 @@
               <a:t>descriptions that allow discovery</a:t>
             </a:r>
             <a:r>
-              <a:rPr lang="pl-PL" sz="2000" dirty="0" smtClean="0">
-                <a:solidFill>
-                  <a:srgbClr val="0070C0"/>
-                </a:solidFill>
-              </a:rPr>
-              <a:t> </a:t>
-            </a:r>
-            <a:r>
               <a:rPr lang="pl-PL" sz="2000" dirty="0">
                 <a:solidFill>
                   <a:srgbClr val="0070C0"/>
                 </a:solidFill>
               </a:rPr>
-              <a:t>by</a:t>
+              <a:t> by</a:t>
             </a:r>
             <a:r>
               <a:rPr lang="en-GB" sz="2000" dirty="0">
@@ -10027,20 +9539,12 @@
               <a:buChar char="•"/>
             </a:pPr>
             <a:r>
-              <a:rPr lang="en-GB" sz="2000" dirty="0" smtClean="0">
-                <a:solidFill>
-                  <a:srgbClr val="0070C0"/>
-                </a:solidFill>
-              </a:rPr>
-              <a:t>metadata </a:t>
-            </a:r>
-            <a:r>
               <a:rPr lang="en-GB" sz="2000" dirty="0">
                 <a:solidFill>
                   <a:srgbClr val="0070C0"/>
                 </a:solidFill>
               </a:rPr>
-              <a:t>available even when the data are no</a:t>
+              <a:t>metadata available even when the data are no</a:t>
             </a:r>
             <a:r>
               <a:rPr lang="pl-PL" sz="2000" dirty="0">

</xml_diff>

<commit_message>
added answer for ex2
</commit_message>
<xml_diff>
--- a/instructors/02-Being_FAIR.pptx
+++ b/instructors/02-Being_FAIR.pptx
@@ -5,7 +5,7 @@
     <p:sldMasterId id="2147483648" r:id="rId1"/>
   </p:sldMasterIdLst>
   <p:notesMasterIdLst>
-    <p:notesMasterId r:id="rId21"/>
+    <p:notesMasterId r:id="rId22"/>
   </p:notesMasterIdLst>
   <p:sldIdLst>
     <p:sldId id="256" r:id="rId2"/>
@@ -18,15 +18,16 @@
     <p:sldId id="265" r:id="rId9"/>
     <p:sldId id="281" r:id="rId10"/>
     <p:sldId id="282" r:id="rId11"/>
-    <p:sldId id="271" r:id="rId12"/>
-    <p:sldId id="274" r:id="rId13"/>
-    <p:sldId id="273" r:id="rId14"/>
-    <p:sldId id="283" r:id="rId15"/>
-    <p:sldId id="266" r:id="rId16"/>
-    <p:sldId id="277" r:id="rId17"/>
-    <p:sldId id="278" r:id="rId18"/>
-    <p:sldId id="280" r:id="rId19"/>
-    <p:sldId id="272" r:id="rId20"/>
+    <p:sldId id="272" r:id="rId12"/>
+    <p:sldId id="271" r:id="rId13"/>
+    <p:sldId id="274" r:id="rId14"/>
+    <p:sldId id="273" r:id="rId15"/>
+    <p:sldId id="283" r:id="rId16"/>
+    <p:sldId id="284" r:id="rId17"/>
+    <p:sldId id="266" r:id="rId18"/>
+    <p:sldId id="277" r:id="rId19"/>
+    <p:sldId id="278" r:id="rId20"/>
+    <p:sldId id="280" r:id="rId21"/>
   </p:sldIdLst>
   <p:sldSz cx="12192000" cy="6858000"/>
   <p:notesSz cx="6858000" cy="9144000"/>
@@ -215,7 +216,7 @@
           <a:p>
             <a:fld id="{AA8A194F-1EDC-44D6-902F-D21F13A5BCE4}" type="datetimeFigureOut">
               <a:rPr lang="en-GB" smtClean="0"/>
-              <a:t>14/01/2024</a:t>
+              <a:t>15/01/2024</a:t>
             </a:fld>
             <a:endParaRPr lang="en-GB"/>
           </a:p>
@@ -791,7 +792,7 @@
             <a:fld id="{DE72BEAC-A25F-4480-8AFC-1D3E290F2CC8}" type="datetimeFigureOut">
               <a:rPr lang="en-GB" smtClean="0"/>
               <a:pPr/>
-              <a:t>14/01/2024</a:t>
+              <a:t>15/01/2024</a:t>
             </a:fld>
             <a:endParaRPr lang="en-GB" dirty="0"/>
           </a:p>
@@ -1055,7 +1056,7 @@
           <a:p>
             <a:fld id="{DE72BEAC-A25F-4480-8AFC-1D3E290F2CC8}" type="datetimeFigureOut">
               <a:rPr lang="en-GB" smtClean="0"/>
-              <a:t>14/01/2024</a:t>
+              <a:t>15/01/2024</a:t>
             </a:fld>
             <a:endParaRPr lang="en-GB" dirty="0"/>
           </a:p>
@@ -1265,7 +1266,7 @@
           <a:p>
             <a:fld id="{DE72BEAC-A25F-4480-8AFC-1D3E290F2CC8}" type="datetimeFigureOut">
               <a:rPr lang="en-GB" smtClean="0"/>
-              <a:t>14/01/2024</a:t>
+              <a:t>15/01/2024</a:t>
             </a:fld>
             <a:endParaRPr lang="en-GB" dirty="0"/>
           </a:p>
@@ -1465,7 +1466,7 @@
           <a:p>
             <a:fld id="{DE72BEAC-A25F-4480-8AFC-1D3E290F2CC8}" type="datetimeFigureOut">
               <a:rPr lang="en-GB" smtClean="0"/>
-              <a:t>14/01/2024</a:t>
+              <a:t>15/01/2024</a:t>
             </a:fld>
             <a:endParaRPr lang="en-GB" dirty="0"/>
           </a:p>
@@ -1741,7 +1742,7 @@
           <a:p>
             <a:fld id="{DE72BEAC-A25F-4480-8AFC-1D3E290F2CC8}" type="datetimeFigureOut">
               <a:rPr lang="en-GB" smtClean="0"/>
-              <a:t>14/01/2024</a:t>
+              <a:t>15/01/2024</a:t>
             </a:fld>
             <a:endParaRPr lang="en-GB" dirty="0"/>
           </a:p>
@@ -2009,7 +2010,7 @@
           <a:p>
             <a:fld id="{DE72BEAC-A25F-4480-8AFC-1D3E290F2CC8}" type="datetimeFigureOut">
               <a:rPr lang="en-GB" smtClean="0"/>
-              <a:t>14/01/2024</a:t>
+              <a:t>15/01/2024</a:t>
             </a:fld>
             <a:endParaRPr lang="en-GB" dirty="0"/>
           </a:p>
@@ -2424,7 +2425,7 @@
           <a:p>
             <a:fld id="{DE72BEAC-A25F-4480-8AFC-1D3E290F2CC8}" type="datetimeFigureOut">
               <a:rPr lang="en-GB" smtClean="0"/>
-              <a:t>14/01/2024</a:t>
+              <a:t>15/01/2024</a:t>
             </a:fld>
             <a:endParaRPr lang="en-GB" dirty="0"/>
           </a:p>
@@ -2566,7 +2567,7 @@
           <a:p>
             <a:fld id="{DE72BEAC-A25F-4480-8AFC-1D3E290F2CC8}" type="datetimeFigureOut">
               <a:rPr lang="en-GB" smtClean="0"/>
-              <a:t>14/01/2024</a:t>
+              <a:t>15/01/2024</a:t>
             </a:fld>
             <a:endParaRPr lang="en-GB" dirty="0"/>
           </a:p>
@@ -2679,7 +2680,7 @@
           <a:p>
             <a:fld id="{DE72BEAC-A25F-4480-8AFC-1D3E290F2CC8}" type="datetimeFigureOut">
               <a:rPr lang="en-GB" smtClean="0"/>
-              <a:t>14/01/2024</a:t>
+              <a:t>15/01/2024</a:t>
             </a:fld>
             <a:endParaRPr lang="en-GB" dirty="0"/>
           </a:p>
@@ -2992,7 +2993,7 @@
           <a:p>
             <a:fld id="{DE72BEAC-A25F-4480-8AFC-1D3E290F2CC8}" type="datetimeFigureOut">
               <a:rPr lang="en-GB" smtClean="0"/>
-              <a:t>14/01/2024</a:t>
+              <a:t>15/01/2024</a:t>
             </a:fld>
             <a:endParaRPr lang="en-GB" dirty="0"/>
           </a:p>
@@ -3281,7 +3282,7 @@
           <a:p>
             <a:fld id="{DE72BEAC-A25F-4480-8AFC-1D3E290F2CC8}" type="datetimeFigureOut">
               <a:rPr lang="en-GB" smtClean="0"/>
-              <a:t>14/01/2024</a:t>
+              <a:t>15/01/2024</a:t>
             </a:fld>
             <a:endParaRPr lang="en-GB" dirty="0"/>
           </a:p>
@@ -3523,7 +3524,7 @@
             <a:fld id="{DE72BEAC-A25F-4480-8AFC-1D3E290F2CC8}" type="datetimeFigureOut">
               <a:rPr lang="en-GB" smtClean="0"/>
               <a:pPr/>
-              <a:t>14/01/2024</a:t>
+              <a:t>15/01/2024</a:t>
             </a:fld>
             <a:endParaRPr lang="en-GB" dirty="0"/>
           </a:p>
@@ -4372,6 +4373,212 @@
           <a:p>
             <a:r>
               <a:rPr lang="en-GB" dirty="0"/>
+              <a:t>Persistent identifiers (PIDs)</a:t>
+            </a:r>
+          </a:p>
+        </p:txBody>
+      </p:sp>
+      <p:sp>
+        <p:nvSpPr>
+          <p:cNvPr id="6" name="Content Placeholder 5">
+            <a:extLst>
+              <a:ext uri="{FF2B5EF4-FFF2-40B4-BE49-F238E27FC236}">
+                <a16:creationId xmlns:a16="http://schemas.microsoft.com/office/drawing/2014/main" id="{EF786E17-0337-4633-BDF5-676F4C563757}"/>
+              </a:ext>
+            </a:extLst>
+          </p:cNvPr>
+          <p:cNvSpPr>
+            <a:spLocks noGrp="1"/>
+          </p:cNvSpPr>
+          <p:nvPr>
+            <p:ph idx="1"/>
+          </p:nvPr>
+        </p:nvSpPr>
+        <p:spPr>
+          <a:xfrm>
+            <a:off x="838200" y="1555422"/>
+            <a:ext cx="10515600" cy="4817097"/>
+          </a:xfrm>
+        </p:spPr>
+        <p:txBody>
+          <a:bodyPr>
+            <a:normAutofit lnSpcReduction="10000"/>
+          </a:bodyPr>
+          <a:lstStyle/>
+          <a:p>
+            <a:pPr marL="0" indent="0">
+              <a:buNone/>
+            </a:pPr>
+            <a:r>
+              <a:rPr lang="en-GB" dirty="0"/>
+              <a:t>A persistent identifier is a long-lasting reference to a digital resource.</a:t>
+            </a:r>
+          </a:p>
+          <a:p>
+            <a:pPr marL="0" indent="0">
+              <a:buNone/>
+            </a:pPr>
+            <a:endParaRPr lang="en-GB" dirty="0"/>
+          </a:p>
+          <a:p>
+            <a:pPr marL="0" indent="0">
+              <a:buNone/>
+            </a:pPr>
+            <a:r>
+              <a:rPr lang="en-GB" dirty="0"/>
+              <a:t>Digital Object Identifier </a:t>
+            </a:r>
+            <a:r>
+              <a:rPr lang="en-GB" dirty="0">
+                <a:hlinkClick r:id="rId2"/>
+              </a:rPr>
+              <a:t>(DOI)</a:t>
+            </a:r>
+            <a:r>
+              <a:rPr lang="en-GB" dirty="0"/>
+              <a:t> (prefix doi.org in the web links). </a:t>
+            </a:r>
+          </a:p>
+          <a:p>
+            <a:pPr marL="0" indent="0">
+              <a:buNone/>
+            </a:pPr>
+            <a:endParaRPr lang="en-GB" dirty="0">
+              <a:hlinkClick r:id="rId3"/>
+            </a:endParaRPr>
+          </a:p>
+          <a:p>
+            <a:pPr marL="0" indent="0">
+              <a:buNone/>
+            </a:pPr>
+            <a:r>
+              <a:rPr lang="en-GB" dirty="0">
+                <a:hlinkClick r:id="rId3"/>
+              </a:rPr>
+              <a:t>https://doi.org/10.1038/</a:t>
+            </a:r>
+            <a:r>
+              <a:rPr lang="en-GB" dirty="0">
+                <a:solidFill>
+                  <a:srgbClr val="7030A0"/>
+                </a:solidFill>
+                <a:hlinkClick r:id="rId3"/>
+              </a:rPr>
+              <a:t>sdata.2016.18</a:t>
+            </a:r>
+            <a:r>
+              <a:rPr lang="en-GB" dirty="0"/>
+              <a:t> resolves to the FAIR paper</a:t>
+            </a:r>
+          </a:p>
+          <a:p>
+            <a:pPr marL="0" indent="0">
+              <a:buNone/>
+            </a:pPr>
+            <a:endParaRPr lang="en-GB" dirty="0"/>
+          </a:p>
+          <a:p>
+            <a:pPr marL="0" indent="0">
+              <a:buNone/>
+            </a:pPr>
+            <a:r>
+              <a:rPr lang="en-GB" dirty="0"/>
+              <a:t>Repositories often maintain web addresses in a stable form (permalinks) http://&lt;repository.address&gt;/&lt;identifier&gt;.</a:t>
+            </a:r>
+          </a:p>
+          <a:p>
+            <a:pPr marL="0" indent="0">
+              <a:buNone/>
+            </a:pPr>
+            <a:endParaRPr lang="en-GB" dirty="0">
+              <a:hlinkClick r:id="rId4"/>
+            </a:endParaRPr>
+          </a:p>
+          <a:p>
+            <a:pPr marL="0" indent="0">
+              <a:buNone/>
+            </a:pPr>
+            <a:r>
+              <a:rPr lang="en-GB" dirty="0">
+                <a:hlinkClick r:id="rId4"/>
+              </a:rPr>
+              <a:t>http://identifiers.org/</a:t>
+            </a:r>
+            <a:r>
+              <a:rPr lang="en-GB" dirty="0">
+                <a:solidFill>
+                  <a:srgbClr val="7030A0"/>
+                </a:solidFill>
+                <a:hlinkClick r:id="rId4"/>
+              </a:rPr>
+              <a:t>SO:0000167</a:t>
+            </a:r>
+            <a:r>
+              <a:rPr lang="en-GB" dirty="0"/>
+              <a:t> defines promoter role</a:t>
+            </a:r>
+          </a:p>
+          <a:p>
+            <a:pPr marL="0" indent="0">
+              <a:buNone/>
+            </a:pPr>
+            <a:endParaRPr lang="en-GB" dirty="0"/>
+          </a:p>
+        </p:txBody>
+      </p:sp>
+    </p:spTree>
+    <p:extLst>
+      <p:ext uri="{BB962C8B-B14F-4D97-AF65-F5344CB8AC3E}">
+        <p14:creationId xmlns:p14="http://schemas.microsoft.com/office/powerpoint/2010/main" val="802694384"/>
+      </p:ext>
+    </p:extLst>
+  </p:cSld>
+  <p:clrMapOvr>
+    <a:masterClrMapping/>
+  </p:clrMapOvr>
+</p:sld>
+</file>
+
+<file path=ppt/slides/slide12.xml><?xml version="1.0" encoding="utf-8"?>
+<p:sld xmlns:a="http://schemas.openxmlformats.org/drawingml/2006/main" xmlns:r="http://schemas.openxmlformats.org/officeDocument/2006/relationships" xmlns:p="http://schemas.openxmlformats.org/presentationml/2006/main">
+  <p:cSld>
+    <p:spTree>
+      <p:nvGrpSpPr>
+        <p:cNvPr id="1" name=""/>
+        <p:cNvGrpSpPr/>
+        <p:nvPr/>
+      </p:nvGrpSpPr>
+      <p:grpSpPr>
+        <a:xfrm>
+          <a:off x="0" y="0"/>
+          <a:ext cx="0" cy="0"/>
+          <a:chOff x="0" y="0"/>
+          <a:chExt cx="0" cy="0"/>
+        </a:xfrm>
+      </p:grpSpPr>
+      <p:sp>
+        <p:nvSpPr>
+          <p:cNvPr id="2" name="Title 1">
+            <a:extLst>
+              <a:ext uri="{FF2B5EF4-FFF2-40B4-BE49-F238E27FC236}">
+                <a16:creationId xmlns:a16="http://schemas.microsoft.com/office/drawing/2014/main" id="{DCE85B1F-4F7D-4B0E-B52B-0D935F9C12EE}"/>
+              </a:ext>
+            </a:extLst>
+          </p:cNvPr>
+          <p:cNvSpPr>
+            <a:spLocks noGrp="1"/>
+          </p:cNvSpPr>
+          <p:nvPr>
+            <p:ph type="title"/>
+          </p:nvPr>
+        </p:nvSpPr>
+        <p:spPr/>
+        <p:txBody>
+          <a:bodyPr/>
+          <a:lstStyle/>
+          <a:p>
+            <a:r>
+              <a:rPr lang="en-GB" dirty="0"/>
               <a:t>Interoperable</a:t>
             </a:r>
           </a:p>
@@ -4454,7 +4661,7 @@
 </p:sld>
 </file>
 
-<file path=ppt/slides/slide12.xml><?xml version="1.0" encoding="utf-8"?>
+<file path=ppt/slides/slide13.xml><?xml version="1.0" encoding="utf-8"?>
 <p:sld xmlns:a="http://schemas.openxmlformats.org/drawingml/2006/main" xmlns:r="http://schemas.openxmlformats.org/officeDocument/2006/relationships" xmlns:p="http://schemas.openxmlformats.org/presentationml/2006/main">
   <p:cSld>
     <p:spTree>
@@ -4640,7 +4847,7 @@
 </p:sld>
 </file>
 
-<file path=ppt/slides/slide13.xml><?xml version="1.0" encoding="utf-8"?>
+<file path=ppt/slides/slide14.xml><?xml version="1.0" encoding="utf-8"?>
 <p:sld xmlns:a="http://schemas.openxmlformats.org/drawingml/2006/main" xmlns:r="http://schemas.openxmlformats.org/officeDocument/2006/relationships" xmlns:p="http://schemas.openxmlformats.org/presentationml/2006/main">
   <p:cSld>
     <p:spTree>
@@ -4860,7 +5067,7 @@
 </p:sld>
 </file>
 
-<file path=ppt/slides/slide14.xml><?xml version="1.0" encoding="utf-8"?>
+<file path=ppt/slides/slide15.xml><?xml version="1.0" encoding="utf-8"?>
 <p:sld xmlns:a="http://schemas.openxmlformats.org/drawingml/2006/main" xmlns:r="http://schemas.openxmlformats.org/officeDocument/2006/relationships" xmlns:p="http://schemas.openxmlformats.org/presentationml/2006/main">
   <p:cSld>
     <p:spTree>
@@ -5021,7 +5228,252 @@
 </p:sld>
 </file>
 
-<file path=ppt/slides/slide15.xml><?xml version="1.0" encoding="utf-8"?>
+<file path=ppt/slides/slide16.xml><?xml version="1.0" encoding="utf-8"?>
+<p:sld xmlns:a="http://schemas.openxmlformats.org/drawingml/2006/main" xmlns:r="http://schemas.openxmlformats.org/officeDocument/2006/relationships" xmlns:p="http://schemas.openxmlformats.org/presentationml/2006/main">
+  <p:cSld>
+    <p:spTree>
+      <p:nvGrpSpPr>
+        <p:cNvPr id="1" name=""/>
+        <p:cNvGrpSpPr/>
+        <p:nvPr/>
+      </p:nvGrpSpPr>
+      <p:grpSpPr>
+        <a:xfrm>
+          <a:off x="0" y="0"/>
+          <a:ext cx="0" cy="0"/>
+          <a:chOff x="0" y="0"/>
+          <a:chExt cx="0" cy="0"/>
+        </a:xfrm>
+      </p:grpSpPr>
+      <p:sp>
+        <p:nvSpPr>
+          <p:cNvPr id="20" name="TextBox 19">
+            <a:extLst>
+              <a:ext uri="{FF2B5EF4-FFF2-40B4-BE49-F238E27FC236}">
+                <a16:creationId xmlns:a16="http://schemas.microsoft.com/office/drawing/2014/main" id="{BBB4BE07-838A-42E8-885A-B00934880DB6}"/>
+              </a:ext>
+            </a:extLst>
+          </p:cNvPr>
+          <p:cNvSpPr txBox="1"/>
+          <p:nvPr/>
+        </p:nvSpPr>
+        <p:spPr>
+          <a:xfrm>
+            <a:off x="635001" y="1536174"/>
+            <a:ext cx="10985500" cy="4154984"/>
+          </a:xfrm>
+          <a:prstGeom prst="rect">
+            <a:avLst/>
+          </a:prstGeom>
+          <a:noFill/>
+        </p:spPr>
+        <p:txBody>
+          <a:bodyPr wrap="square" rtlCol="0">
+            <a:spAutoFit/>
+          </a:bodyPr>
+          <a:lstStyle/>
+          <a:p>
+            <a:r>
+              <a:rPr lang="en-GB" sz="2400" b="1" dirty="0">
+                <a:solidFill>
+                  <a:srgbClr val="0070C0"/>
+                </a:solidFill>
+              </a:rPr>
+              <a:t>F: </a:t>
+            </a:r>
+            <a:r>
+              <a:rPr lang="en-GB" sz="2400" dirty="0">
+                <a:solidFill>
+                  <a:srgbClr val="0070C0"/>
+                </a:solidFill>
+              </a:rPr>
+              <a:t>PID (DOI), metadata for discoverability (keywords and subject, title, description)</a:t>
+            </a:r>
+          </a:p>
+          <a:p>
+            <a:endParaRPr lang="en-GB" sz="2400" dirty="0">
+              <a:solidFill>
+                <a:srgbClr val="0070C0"/>
+              </a:solidFill>
+            </a:endParaRPr>
+          </a:p>
+          <a:p>
+            <a:r>
+              <a:rPr lang="en-GB" sz="2400" b="1" dirty="0">
+                <a:solidFill>
+                  <a:srgbClr val="0070C0"/>
+                </a:solidFill>
+              </a:rPr>
+              <a:t>A: </a:t>
+            </a:r>
+            <a:r>
+              <a:rPr lang="en-GB" sz="2400" dirty="0">
+                <a:solidFill>
+                  <a:srgbClr val="0070C0"/>
+                </a:solidFill>
+              </a:rPr>
+              <a:t>Data can be downloaded; access to stats on downloads and views </a:t>
+            </a:r>
+          </a:p>
+          <a:p>
+            <a:endParaRPr lang="en-GB" sz="2400" dirty="0">
+              <a:solidFill>
+                <a:srgbClr val="0070C0"/>
+              </a:solidFill>
+            </a:endParaRPr>
+          </a:p>
+          <a:p>
+            <a:r>
+              <a:rPr lang="en-GB" sz="2400" b="1" dirty="0">
+                <a:solidFill>
+                  <a:srgbClr val="0070C0"/>
+                </a:solidFill>
+              </a:rPr>
+              <a:t>I: </a:t>
+            </a:r>
+            <a:r>
+              <a:rPr lang="en-GB" sz="2400" dirty="0">
+                <a:solidFill>
+                  <a:srgbClr val="0070C0"/>
+                </a:solidFill>
+              </a:rPr>
+              <a:t>Common file formats (.csv, .</a:t>
+            </a:r>
+            <a:r>
+              <a:rPr lang="en-GB" sz="2400" dirty="0" err="1">
+                <a:solidFill>
+                  <a:srgbClr val="0070C0"/>
+                </a:solidFill>
+              </a:rPr>
+              <a:t>tif</a:t>
+            </a:r>
+            <a:r>
+              <a:rPr lang="en-GB" sz="2400" dirty="0">
+                <a:solidFill>
+                  <a:srgbClr val="0070C0"/>
+                </a:solidFill>
+              </a:rPr>
+              <a:t>, .nd2) </a:t>
+            </a:r>
+          </a:p>
+          <a:p>
+            <a:r>
+              <a:rPr lang="en-GB" sz="2400" dirty="0">
+                <a:solidFill>
+                  <a:srgbClr val="0070C0"/>
+                </a:solidFill>
+              </a:rPr>
+              <a:t>   Metadata elements can be exported in different metadata standard formats</a:t>
+            </a:r>
+          </a:p>
+          <a:p>
+            <a:endParaRPr lang="en-GB" sz="2400" dirty="0">
+              <a:solidFill>
+                <a:srgbClr val="0070C0"/>
+              </a:solidFill>
+            </a:endParaRPr>
+          </a:p>
+          <a:p>
+            <a:r>
+              <a:rPr lang="en-GB" sz="2400" b="1" dirty="0">
+                <a:solidFill>
+                  <a:srgbClr val="0070C0"/>
+                </a:solidFill>
+              </a:rPr>
+              <a:t>R: </a:t>
+            </a:r>
+            <a:r>
+              <a:rPr lang="en-GB" sz="2400" dirty="0">
+                <a:solidFill>
+                  <a:srgbClr val="0070C0"/>
+                </a:solidFill>
+              </a:rPr>
+              <a:t>well described (README), clear license, links that associates with other related resources (where it is published and related works) </a:t>
+            </a:r>
+          </a:p>
+          <a:p>
+            <a:endParaRPr lang="en-GB" sz="2400" dirty="0">
+              <a:solidFill>
+                <a:srgbClr val="0070C0"/>
+              </a:solidFill>
+            </a:endParaRPr>
+          </a:p>
+          <a:p>
+            <a:endParaRPr lang="en-GB" sz="2400" dirty="0">
+              <a:solidFill>
+                <a:srgbClr val="0070C0"/>
+              </a:solidFill>
+            </a:endParaRPr>
+          </a:p>
+        </p:txBody>
+      </p:sp>
+      <p:sp>
+        <p:nvSpPr>
+          <p:cNvPr id="22" name="Title 1">
+            <a:extLst>
+              <a:ext uri="{FF2B5EF4-FFF2-40B4-BE49-F238E27FC236}">
+                <a16:creationId xmlns:a16="http://schemas.microsoft.com/office/drawing/2014/main" id="{E7F79A3B-183F-4584-BC4A-808958D032BE}"/>
+              </a:ext>
+            </a:extLst>
+          </p:cNvPr>
+          <p:cNvSpPr txBox="1">
+            <a:spLocks/>
+          </p:cNvSpPr>
+          <p:nvPr/>
+        </p:nvSpPr>
+        <p:spPr>
+          <a:xfrm>
+            <a:off x="838200" y="365125"/>
+            <a:ext cx="10515600" cy="1325563"/>
+          </a:xfrm>
+          <a:prstGeom prst="rect">
+            <a:avLst/>
+          </a:prstGeom>
+        </p:spPr>
+        <p:txBody>
+          <a:bodyPr/>
+          <a:lstStyle>
+            <a:lvl1pPr algn="l" defTabSz="914400" rtl="0" eaLnBrk="1" latinLnBrk="0" hangingPunct="1">
+              <a:lnSpc>
+                <a:spcPct val="90000"/>
+              </a:lnSpc>
+              <a:spcBef>
+                <a:spcPct val="0"/>
+              </a:spcBef>
+              <a:buNone/>
+              <a:defRPr sz="4400" kern="1200">
+                <a:solidFill>
+                  <a:srgbClr val="0070C0"/>
+                </a:solidFill>
+                <a:latin typeface="+mj-lt"/>
+                <a:ea typeface="+mj-ea"/>
+                <a:cs typeface="+mj-cs"/>
+              </a:defRPr>
+            </a:lvl1pPr>
+          </a:lstStyle>
+          <a:p>
+            <a:r>
+              <a:rPr lang="en-GB"/>
+              <a:t>Exercise 2 – Public record FAIR elements</a:t>
+            </a:r>
+            <a:endParaRPr lang="en-GB" dirty="0"/>
+          </a:p>
+        </p:txBody>
+      </p:sp>
+    </p:spTree>
+    <p:extLst>
+      <p:ext uri="{BB962C8B-B14F-4D97-AF65-F5344CB8AC3E}">
+        <p14:creationId xmlns:p14="http://schemas.microsoft.com/office/powerpoint/2010/main" val="1205450936"/>
+      </p:ext>
+    </p:extLst>
+  </p:cSld>
+  <p:clrMapOvr>
+    <a:masterClrMapping/>
+  </p:clrMapOvr>
+</p:sld>
+</file>
+
+<file path=ppt/slides/slide17.xml><?xml version="1.0" encoding="utf-8"?>
 <p:sld xmlns:a="http://schemas.openxmlformats.org/drawingml/2006/main" xmlns:r="http://schemas.openxmlformats.org/officeDocument/2006/relationships" xmlns:p="http://schemas.openxmlformats.org/presentationml/2006/main">
   <p:cSld>
     <p:spTree>
@@ -5333,7 +5785,7 @@
 </p:sld>
 </file>
 
-<file path=ppt/slides/slide16.xml><?xml version="1.0" encoding="utf-8"?>
+<file path=ppt/slides/slide18.xml><?xml version="1.0" encoding="utf-8"?>
 <p:sld xmlns:a="http://schemas.openxmlformats.org/drawingml/2006/main" xmlns:r="http://schemas.openxmlformats.org/officeDocument/2006/relationships" xmlns:p="http://schemas.openxmlformats.org/presentationml/2006/main">
   <p:cSld>
     <p:spTree>
@@ -5457,7 +5909,7 @@
 </p:sld>
 </file>
 
-<file path=ppt/slides/slide17.xml><?xml version="1.0" encoding="utf-8"?>
+<file path=ppt/slides/slide19.xml><?xml version="1.0" encoding="utf-8"?>
 <p:sld xmlns:a="http://schemas.openxmlformats.org/drawingml/2006/main" xmlns:r="http://schemas.openxmlformats.org/officeDocument/2006/relationships" xmlns:p="http://schemas.openxmlformats.org/presentationml/2006/main">
   <p:cSld>
     <p:bg>
@@ -6433,366 +6885,6 @@
     <p:extLst>
       <p:ext uri="{BB962C8B-B14F-4D97-AF65-F5344CB8AC3E}">
         <p14:creationId xmlns:p14="http://schemas.microsoft.com/office/powerpoint/2010/main" val="3463603090"/>
-      </p:ext>
-    </p:extLst>
-  </p:cSld>
-  <p:clrMapOvr>
-    <a:masterClrMapping/>
-  </p:clrMapOvr>
-</p:sld>
-</file>
-
-<file path=ppt/slides/slide18.xml><?xml version="1.0" encoding="utf-8"?>
-<p:sld xmlns:a="http://schemas.openxmlformats.org/drawingml/2006/main" xmlns:r="http://schemas.openxmlformats.org/officeDocument/2006/relationships" xmlns:p="http://schemas.openxmlformats.org/presentationml/2006/main">
-  <p:cSld>
-    <p:spTree>
-      <p:nvGrpSpPr>
-        <p:cNvPr id="1" name=""/>
-        <p:cNvGrpSpPr/>
-        <p:nvPr/>
-      </p:nvGrpSpPr>
-      <p:grpSpPr>
-        <a:xfrm>
-          <a:off x="0" y="0"/>
-          <a:ext cx="0" cy="0"/>
-          <a:chOff x="0" y="0"/>
-          <a:chExt cx="0" cy="0"/>
-        </a:xfrm>
-      </p:grpSpPr>
-      <p:sp>
-        <p:nvSpPr>
-          <p:cNvPr id="2" name="Title 1"/>
-          <p:cNvSpPr>
-            <a:spLocks noGrp="1"/>
-          </p:cNvSpPr>
-          <p:nvPr>
-            <p:ph type="title"/>
-          </p:nvPr>
-        </p:nvSpPr>
-        <p:spPr/>
-        <p:txBody>
-          <a:bodyPr/>
-          <a:lstStyle/>
-          <a:p>
-            <a:r>
-              <a:rPr lang="en-GB"/>
-              <a:t>Credits</a:t>
-            </a:r>
-          </a:p>
-        </p:txBody>
-      </p:sp>
-      <p:sp>
-        <p:nvSpPr>
-          <p:cNvPr id="3" name="Content Placeholder 2"/>
-          <p:cNvSpPr>
-            <a:spLocks noGrp="1"/>
-          </p:cNvSpPr>
-          <p:nvPr>
-            <p:ph idx="1"/>
-          </p:nvPr>
-        </p:nvSpPr>
-        <p:spPr/>
-        <p:txBody>
-          <a:bodyPr>
-            <a:normAutofit fontScale="85000" lnSpcReduction="20000"/>
-          </a:bodyPr>
-          <a:lstStyle/>
-          <a:p>
-            <a:pPr marL="514350" indent="-514350">
-              <a:buFont typeface="+mj-lt"/>
-              <a:buAutoNum type="arabicPeriod"/>
-            </a:pPr>
-            <a:r>
-              <a:rPr lang="en-GB"/>
-              <a:t>Research data MANTRA ('Research Data Management training') – Research data in context, University of Edinburgh </a:t>
-            </a:r>
-            <a:br>
-              <a:rPr lang="en-GB"/>
-            </a:br>
-            <a:r>
-              <a:rPr lang="en-GB"/>
-              <a:t>https://mantra.ed.ac.uk</a:t>
-            </a:r>
-            <a:br>
-              <a:rPr lang="en-GB"/>
-            </a:br>
-            <a:endParaRPr lang="en-GB"/>
-          </a:p>
-          <a:p>
-            <a:pPr marL="514350" indent="-514350">
-              <a:buFont typeface="+mj-lt"/>
-              <a:buAutoNum type="arabicPeriod"/>
-            </a:pPr>
-            <a:r>
-              <a:rPr lang="en-GB"/>
-              <a:t>Lab microscope photo image - CSIRO, CC BY 3.0, via Wikimedia Commons https://commons.wikimedia.org/wiki/File:CSIRO_ScienceImage_435_Scientist_using_microscope.jpg </a:t>
-            </a:r>
-          </a:p>
-          <a:p>
-            <a:pPr marL="514350" indent="-514350">
-              <a:buFont typeface="+mj-lt"/>
-              <a:buAutoNum type="arabicPeriod"/>
-            </a:pPr>
-            <a:endParaRPr lang="en-GB"/>
-          </a:p>
-          <a:p>
-            <a:pPr marL="514350" indent="-514350">
-              <a:buFont typeface="+mj-lt"/>
-              <a:buAutoNum type="arabicPeriod"/>
-            </a:pPr>
-            <a:r>
-              <a:rPr lang="en-GB"/>
-              <a:t>FAIR logo - SangyaPundir, CC BY-SA 4.0 via Wikimedia Commons </a:t>
-            </a:r>
-            <a:br>
-              <a:rPr lang="en-GB"/>
-            </a:br>
-            <a:r>
-              <a:rPr lang="en-GB"/>
-              <a:t>https://upload.wikimedia.org/wikipedia/commons/thumb/a/aa/FAIR_data_principles.jpg/800px-FAIR_data_principles.jpg </a:t>
-            </a:r>
-            <a:br>
-              <a:rPr lang="en-GB"/>
-            </a:br>
-            <a:endParaRPr lang="en-GB"/>
-          </a:p>
-          <a:p>
-            <a:pPr marL="514350" indent="-514350">
-              <a:buFont typeface="+mj-lt"/>
-              <a:buAutoNum type="arabicPeriod"/>
-            </a:pPr>
-            <a:r>
-              <a:rPr lang="en-GB"/>
-              <a:t>FAIR Principles, GO FAIR Initiative </a:t>
-            </a:r>
-            <a:br>
-              <a:rPr lang="en-GB"/>
-            </a:br>
-            <a:r>
-              <a:rPr lang="en-GB"/>
-              <a:t>www.go-fair.org/fair-principles</a:t>
-            </a:r>
-          </a:p>
-          <a:p>
-            <a:endParaRPr lang="en-GB"/>
-          </a:p>
-        </p:txBody>
-      </p:sp>
-    </p:spTree>
-    <p:extLst>
-      <p:ext uri="{BB962C8B-B14F-4D97-AF65-F5344CB8AC3E}">
-        <p14:creationId xmlns:p14="http://schemas.microsoft.com/office/powerpoint/2010/main" val="2167788240"/>
-      </p:ext>
-    </p:extLst>
-  </p:cSld>
-  <p:clrMapOvr>
-    <a:masterClrMapping/>
-  </p:clrMapOvr>
-</p:sld>
-</file>
-
-<file path=ppt/slides/slide19.xml><?xml version="1.0" encoding="utf-8"?>
-<p:sld xmlns:a="http://schemas.openxmlformats.org/drawingml/2006/main" xmlns:r="http://schemas.openxmlformats.org/officeDocument/2006/relationships" xmlns:p="http://schemas.openxmlformats.org/presentationml/2006/main">
-  <p:cSld>
-    <p:spTree>
-      <p:nvGrpSpPr>
-        <p:cNvPr id="1" name=""/>
-        <p:cNvGrpSpPr/>
-        <p:nvPr/>
-      </p:nvGrpSpPr>
-      <p:grpSpPr>
-        <a:xfrm>
-          <a:off x="0" y="0"/>
-          <a:ext cx="0" cy="0"/>
-          <a:chOff x="0" y="0"/>
-          <a:chExt cx="0" cy="0"/>
-        </a:xfrm>
-      </p:grpSpPr>
-      <p:sp>
-        <p:nvSpPr>
-          <p:cNvPr id="2" name="Title 1">
-            <a:extLst>
-              <a:ext uri="{FF2B5EF4-FFF2-40B4-BE49-F238E27FC236}">
-                <a16:creationId xmlns:a16="http://schemas.microsoft.com/office/drawing/2014/main" id="{DCE85B1F-4F7D-4B0E-B52B-0D935F9C12EE}"/>
-              </a:ext>
-            </a:extLst>
-          </p:cNvPr>
-          <p:cNvSpPr>
-            <a:spLocks noGrp="1"/>
-          </p:cNvSpPr>
-          <p:nvPr>
-            <p:ph type="title"/>
-          </p:nvPr>
-        </p:nvSpPr>
-        <p:spPr/>
-        <p:txBody>
-          <a:bodyPr/>
-          <a:lstStyle/>
-          <a:p>
-            <a:r>
-              <a:rPr lang="en-GB" dirty="0"/>
-              <a:t>Persistent identifiers (PIDs)</a:t>
-            </a:r>
-          </a:p>
-        </p:txBody>
-      </p:sp>
-      <p:sp>
-        <p:nvSpPr>
-          <p:cNvPr id="6" name="Content Placeholder 5">
-            <a:extLst>
-              <a:ext uri="{FF2B5EF4-FFF2-40B4-BE49-F238E27FC236}">
-                <a16:creationId xmlns:a16="http://schemas.microsoft.com/office/drawing/2014/main" id="{EF786E17-0337-4633-BDF5-676F4C563757}"/>
-              </a:ext>
-            </a:extLst>
-          </p:cNvPr>
-          <p:cNvSpPr>
-            <a:spLocks noGrp="1"/>
-          </p:cNvSpPr>
-          <p:nvPr>
-            <p:ph idx="1"/>
-          </p:nvPr>
-        </p:nvSpPr>
-        <p:spPr>
-          <a:xfrm>
-            <a:off x="838200" y="1555422"/>
-            <a:ext cx="10515600" cy="4817097"/>
-          </a:xfrm>
-        </p:spPr>
-        <p:txBody>
-          <a:bodyPr>
-            <a:normAutofit lnSpcReduction="10000"/>
-          </a:bodyPr>
-          <a:lstStyle/>
-          <a:p>
-            <a:pPr marL="0" indent="0">
-              <a:buNone/>
-            </a:pPr>
-            <a:r>
-              <a:rPr lang="en-GB" dirty="0"/>
-              <a:t>A persistent identifier is a long-lasting reference to a digital resource.</a:t>
-            </a:r>
-          </a:p>
-          <a:p>
-            <a:pPr marL="0" indent="0">
-              <a:buNone/>
-            </a:pPr>
-            <a:endParaRPr lang="en-GB" dirty="0"/>
-          </a:p>
-          <a:p>
-            <a:pPr marL="0" indent="0">
-              <a:buNone/>
-            </a:pPr>
-            <a:r>
-              <a:rPr lang="en-GB" dirty="0"/>
-              <a:t>Digital Object Identifier </a:t>
-            </a:r>
-            <a:r>
-              <a:rPr lang="en-GB" dirty="0">
-                <a:hlinkClick r:id="rId2"/>
-              </a:rPr>
-              <a:t>(DOI)</a:t>
-            </a:r>
-            <a:r>
-              <a:rPr lang="en-GB" dirty="0"/>
-              <a:t> (prefix doi.org in the web links). </a:t>
-            </a:r>
-          </a:p>
-          <a:p>
-            <a:pPr marL="0" indent="0">
-              <a:buNone/>
-            </a:pPr>
-            <a:endParaRPr lang="en-GB" dirty="0">
-              <a:hlinkClick r:id="rId3"/>
-            </a:endParaRPr>
-          </a:p>
-          <a:p>
-            <a:pPr marL="0" indent="0">
-              <a:buNone/>
-            </a:pPr>
-            <a:r>
-              <a:rPr lang="en-GB" dirty="0">
-                <a:hlinkClick r:id="rId3"/>
-              </a:rPr>
-              <a:t>https://doi.org/10.1038/</a:t>
-            </a:r>
-            <a:r>
-              <a:rPr lang="en-GB" dirty="0">
-                <a:solidFill>
-                  <a:srgbClr val="7030A0"/>
-                </a:solidFill>
-                <a:hlinkClick r:id="rId3"/>
-              </a:rPr>
-              <a:t>sdata.2016.18</a:t>
-            </a:r>
-            <a:r>
-              <a:rPr lang="en-GB" dirty="0"/>
-              <a:t> resolves to the FAIR paper</a:t>
-            </a:r>
-          </a:p>
-          <a:p>
-            <a:pPr marL="0" indent="0">
-              <a:buNone/>
-            </a:pPr>
-            <a:endParaRPr lang="en-GB" dirty="0"/>
-          </a:p>
-          <a:p>
-            <a:pPr marL="0" indent="0">
-              <a:buNone/>
-            </a:pPr>
-            <a:r>
-              <a:rPr lang="en-GB" dirty="0"/>
-              <a:t>Repositories often maintain web addresses in a stable form (permalinks) </a:t>
-            </a:r>
-            <a:r>
-              <a:rPr lang="en-GB"/>
-              <a:t>http://&lt;repository.address&gt;/&lt;identifier&gt;.</a:t>
-            </a:r>
-            <a:endParaRPr lang="en-GB" dirty="0"/>
-          </a:p>
-          <a:p>
-            <a:pPr marL="0" indent="0">
-              <a:buNone/>
-            </a:pPr>
-            <a:endParaRPr lang="en-GB" dirty="0">
-              <a:hlinkClick r:id="rId4"/>
-            </a:endParaRPr>
-          </a:p>
-          <a:p>
-            <a:pPr marL="0" indent="0">
-              <a:buNone/>
-            </a:pPr>
-            <a:r>
-              <a:rPr lang="en-GB" dirty="0">
-                <a:hlinkClick r:id="rId4"/>
-              </a:rPr>
-              <a:t>http://identifiers.org/</a:t>
-            </a:r>
-            <a:r>
-              <a:rPr lang="en-GB" dirty="0">
-                <a:solidFill>
-                  <a:srgbClr val="7030A0"/>
-                </a:solidFill>
-                <a:hlinkClick r:id="rId4"/>
-              </a:rPr>
-              <a:t>SO:0000167</a:t>
-            </a:r>
-            <a:r>
-              <a:rPr lang="en-GB" dirty="0"/>
-              <a:t> defines promoter role</a:t>
-            </a:r>
-          </a:p>
-          <a:p>
-            <a:pPr marL="0" indent="0">
-              <a:buNone/>
-            </a:pPr>
-            <a:endParaRPr lang="en-GB" dirty="0"/>
-          </a:p>
-        </p:txBody>
-      </p:sp>
-    </p:spTree>
-    <p:extLst>
-      <p:ext uri="{BB962C8B-B14F-4D97-AF65-F5344CB8AC3E}">
-        <p14:creationId xmlns:p14="http://schemas.microsoft.com/office/powerpoint/2010/main" val="802694384"/>
       </p:ext>
     </p:extLst>
   </p:cSld>
@@ -8469,6 +8561,155 @@
     <p:extLst>
       <p:ext uri="{BB962C8B-B14F-4D97-AF65-F5344CB8AC3E}">
         <p14:creationId xmlns:p14="http://schemas.microsoft.com/office/powerpoint/2010/main" val="517217346"/>
+      </p:ext>
+    </p:extLst>
+  </p:cSld>
+  <p:clrMapOvr>
+    <a:masterClrMapping/>
+  </p:clrMapOvr>
+</p:sld>
+</file>
+
+<file path=ppt/slides/slide20.xml><?xml version="1.0" encoding="utf-8"?>
+<p:sld xmlns:a="http://schemas.openxmlformats.org/drawingml/2006/main" xmlns:r="http://schemas.openxmlformats.org/officeDocument/2006/relationships" xmlns:p="http://schemas.openxmlformats.org/presentationml/2006/main">
+  <p:cSld>
+    <p:spTree>
+      <p:nvGrpSpPr>
+        <p:cNvPr id="1" name=""/>
+        <p:cNvGrpSpPr/>
+        <p:nvPr/>
+      </p:nvGrpSpPr>
+      <p:grpSpPr>
+        <a:xfrm>
+          <a:off x="0" y="0"/>
+          <a:ext cx="0" cy="0"/>
+          <a:chOff x="0" y="0"/>
+          <a:chExt cx="0" cy="0"/>
+        </a:xfrm>
+      </p:grpSpPr>
+      <p:sp>
+        <p:nvSpPr>
+          <p:cNvPr id="2" name="Title 1"/>
+          <p:cNvSpPr>
+            <a:spLocks noGrp="1"/>
+          </p:cNvSpPr>
+          <p:nvPr>
+            <p:ph type="title"/>
+          </p:nvPr>
+        </p:nvSpPr>
+        <p:spPr/>
+        <p:txBody>
+          <a:bodyPr/>
+          <a:lstStyle/>
+          <a:p>
+            <a:r>
+              <a:rPr lang="en-GB"/>
+              <a:t>Credits</a:t>
+            </a:r>
+          </a:p>
+        </p:txBody>
+      </p:sp>
+      <p:sp>
+        <p:nvSpPr>
+          <p:cNvPr id="3" name="Content Placeholder 2"/>
+          <p:cNvSpPr>
+            <a:spLocks noGrp="1"/>
+          </p:cNvSpPr>
+          <p:nvPr>
+            <p:ph idx="1"/>
+          </p:nvPr>
+        </p:nvSpPr>
+        <p:spPr/>
+        <p:txBody>
+          <a:bodyPr>
+            <a:normAutofit fontScale="85000" lnSpcReduction="20000"/>
+          </a:bodyPr>
+          <a:lstStyle/>
+          <a:p>
+            <a:pPr marL="514350" indent="-514350">
+              <a:buFont typeface="+mj-lt"/>
+              <a:buAutoNum type="arabicPeriod"/>
+            </a:pPr>
+            <a:r>
+              <a:rPr lang="en-GB"/>
+              <a:t>Research data MANTRA ('Research Data Management training') – Research data in context, University of Edinburgh </a:t>
+            </a:r>
+            <a:br>
+              <a:rPr lang="en-GB"/>
+            </a:br>
+            <a:r>
+              <a:rPr lang="en-GB"/>
+              <a:t>https://mantra.ed.ac.uk</a:t>
+            </a:r>
+            <a:br>
+              <a:rPr lang="en-GB"/>
+            </a:br>
+            <a:endParaRPr lang="en-GB"/>
+          </a:p>
+          <a:p>
+            <a:pPr marL="514350" indent="-514350">
+              <a:buFont typeface="+mj-lt"/>
+              <a:buAutoNum type="arabicPeriod"/>
+            </a:pPr>
+            <a:r>
+              <a:rPr lang="en-GB"/>
+              <a:t>Lab microscope photo image - CSIRO, CC BY 3.0, via Wikimedia Commons https://commons.wikimedia.org/wiki/File:CSIRO_ScienceImage_435_Scientist_using_microscope.jpg </a:t>
+            </a:r>
+          </a:p>
+          <a:p>
+            <a:pPr marL="514350" indent="-514350">
+              <a:buFont typeface="+mj-lt"/>
+              <a:buAutoNum type="arabicPeriod"/>
+            </a:pPr>
+            <a:endParaRPr lang="en-GB"/>
+          </a:p>
+          <a:p>
+            <a:pPr marL="514350" indent="-514350">
+              <a:buFont typeface="+mj-lt"/>
+              <a:buAutoNum type="arabicPeriod"/>
+            </a:pPr>
+            <a:r>
+              <a:rPr lang="en-GB"/>
+              <a:t>FAIR logo - SangyaPundir, CC BY-SA 4.0 via Wikimedia Commons </a:t>
+            </a:r>
+            <a:br>
+              <a:rPr lang="en-GB"/>
+            </a:br>
+            <a:r>
+              <a:rPr lang="en-GB"/>
+              <a:t>https://upload.wikimedia.org/wikipedia/commons/thumb/a/aa/FAIR_data_principles.jpg/800px-FAIR_data_principles.jpg </a:t>
+            </a:r>
+            <a:br>
+              <a:rPr lang="en-GB"/>
+            </a:br>
+            <a:endParaRPr lang="en-GB"/>
+          </a:p>
+          <a:p>
+            <a:pPr marL="514350" indent="-514350">
+              <a:buFont typeface="+mj-lt"/>
+              <a:buAutoNum type="arabicPeriod"/>
+            </a:pPr>
+            <a:r>
+              <a:rPr lang="en-GB"/>
+              <a:t>FAIR Principles, GO FAIR Initiative </a:t>
+            </a:r>
+            <a:br>
+              <a:rPr lang="en-GB"/>
+            </a:br>
+            <a:r>
+              <a:rPr lang="en-GB"/>
+              <a:t>www.go-fair.org/fair-principles</a:t>
+            </a:r>
+          </a:p>
+          <a:p>
+            <a:endParaRPr lang="en-GB"/>
+          </a:p>
+        </p:txBody>
+      </p:sp>
+    </p:spTree>
+    <p:extLst>
+      <p:ext uri="{BB962C8B-B14F-4D97-AF65-F5344CB8AC3E}">
+        <p14:creationId xmlns:p14="http://schemas.microsoft.com/office/powerpoint/2010/main" val="2167788240"/>
       </p:ext>
     </p:extLst>
   </p:cSld>

</xml_diff>

<commit_message>
tweaks after jan run
</commit_message>
<xml_diff>
--- a/instructors/02-Being_FAIR.pptx
+++ b/instructors/02-Being_FAIR.pptx
@@ -216,7 +216,7 @@
           <a:p>
             <a:fld id="{AA8A194F-1EDC-44D6-902F-D21F13A5BCE4}" type="datetimeFigureOut">
               <a:rPr lang="en-GB" smtClean="0"/>
-              <a:t>15/01/2024</a:t>
+              <a:t>16/01/2024</a:t>
             </a:fld>
             <a:endParaRPr lang="en-GB"/>
           </a:p>
@@ -792,7 +792,7 @@
             <a:fld id="{DE72BEAC-A25F-4480-8AFC-1D3E290F2CC8}" type="datetimeFigureOut">
               <a:rPr lang="en-GB" smtClean="0"/>
               <a:pPr/>
-              <a:t>15/01/2024</a:t>
+              <a:t>16/01/2024</a:t>
             </a:fld>
             <a:endParaRPr lang="en-GB" dirty="0"/>
           </a:p>
@@ -1056,7 +1056,7 @@
           <a:p>
             <a:fld id="{DE72BEAC-A25F-4480-8AFC-1D3E290F2CC8}" type="datetimeFigureOut">
               <a:rPr lang="en-GB" smtClean="0"/>
-              <a:t>15/01/2024</a:t>
+              <a:t>16/01/2024</a:t>
             </a:fld>
             <a:endParaRPr lang="en-GB" dirty="0"/>
           </a:p>
@@ -1266,7 +1266,7 @@
           <a:p>
             <a:fld id="{DE72BEAC-A25F-4480-8AFC-1D3E290F2CC8}" type="datetimeFigureOut">
               <a:rPr lang="en-GB" smtClean="0"/>
-              <a:t>15/01/2024</a:t>
+              <a:t>16/01/2024</a:t>
             </a:fld>
             <a:endParaRPr lang="en-GB" dirty="0"/>
           </a:p>
@@ -1466,7 +1466,7 @@
           <a:p>
             <a:fld id="{DE72BEAC-A25F-4480-8AFC-1D3E290F2CC8}" type="datetimeFigureOut">
               <a:rPr lang="en-GB" smtClean="0"/>
-              <a:t>15/01/2024</a:t>
+              <a:t>16/01/2024</a:t>
             </a:fld>
             <a:endParaRPr lang="en-GB" dirty="0"/>
           </a:p>
@@ -1742,7 +1742,7 @@
           <a:p>
             <a:fld id="{DE72BEAC-A25F-4480-8AFC-1D3E290F2CC8}" type="datetimeFigureOut">
               <a:rPr lang="en-GB" smtClean="0"/>
-              <a:t>15/01/2024</a:t>
+              <a:t>16/01/2024</a:t>
             </a:fld>
             <a:endParaRPr lang="en-GB" dirty="0"/>
           </a:p>
@@ -2010,7 +2010,7 @@
           <a:p>
             <a:fld id="{DE72BEAC-A25F-4480-8AFC-1D3E290F2CC8}" type="datetimeFigureOut">
               <a:rPr lang="en-GB" smtClean="0"/>
-              <a:t>15/01/2024</a:t>
+              <a:t>16/01/2024</a:t>
             </a:fld>
             <a:endParaRPr lang="en-GB" dirty="0"/>
           </a:p>
@@ -2425,7 +2425,7 @@
           <a:p>
             <a:fld id="{DE72BEAC-A25F-4480-8AFC-1D3E290F2CC8}" type="datetimeFigureOut">
               <a:rPr lang="en-GB" smtClean="0"/>
-              <a:t>15/01/2024</a:t>
+              <a:t>16/01/2024</a:t>
             </a:fld>
             <a:endParaRPr lang="en-GB" dirty="0"/>
           </a:p>
@@ -2567,7 +2567,7 @@
           <a:p>
             <a:fld id="{DE72BEAC-A25F-4480-8AFC-1D3E290F2CC8}" type="datetimeFigureOut">
               <a:rPr lang="en-GB" smtClean="0"/>
-              <a:t>15/01/2024</a:t>
+              <a:t>16/01/2024</a:t>
             </a:fld>
             <a:endParaRPr lang="en-GB" dirty="0"/>
           </a:p>
@@ -2680,7 +2680,7 @@
           <a:p>
             <a:fld id="{DE72BEAC-A25F-4480-8AFC-1D3E290F2CC8}" type="datetimeFigureOut">
               <a:rPr lang="en-GB" smtClean="0"/>
-              <a:t>15/01/2024</a:t>
+              <a:t>16/01/2024</a:t>
             </a:fld>
             <a:endParaRPr lang="en-GB" dirty="0"/>
           </a:p>
@@ -2993,7 +2993,7 @@
           <a:p>
             <a:fld id="{DE72BEAC-A25F-4480-8AFC-1D3E290F2CC8}" type="datetimeFigureOut">
               <a:rPr lang="en-GB" smtClean="0"/>
-              <a:t>15/01/2024</a:t>
+              <a:t>16/01/2024</a:t>
             </a:fld>
             <a:endParaRPr lang="en-GB" dirty="0"/>
           </a:p>
@@ -3282,7 +3282,7 @@
           <a:p>
             <a:fld id="{DE72BEAC-A25F-4480-8AFC-1D3E290F2CC8}" type="datetimeFigureOut">
               <a:rPr lang="en-GB" smtClean="0"/>
-              <a:t>15/01/2024</a:t>
+              <a:t>16/01/2024</a:t>
             </a:fld>
             <a:endParaRPr lang="en-GB" dirty="0"/>
           </a:p>
@@ -3524,7 +3524,7 @@
             <a:fld id="{DE72BEAC-A25F-4480-8AFC-1D3E290F2CC8}" type="datetimeFigureOut">
               <a:rPr lang="en-GB" smtClean="0"/>
               <a:pPr/>
-              <a:t>15/01/2024</a:t>
+              <a:t>16/01/2024</a:t>
             </a:fld>
             <a:endParaRPr lang="en-GB" dirty="0"/>
           </a:p>
@@ -4607,7 +4607,19 @@
           <a:p>
             <a:r>
               <a:rPr lang="en-GB" dirty="0"/>
-              <a:t>Use standard or open-source file formats where possible (domain specific)</a:t>
+              <a:t>Use standard</a:t>
+            </a:r>
+            <a:r>
+              <a:rPr lang="pl-PL"/>
+              <a:t>(common)</a:t>
+            </a:r>
+            <a:r>
+              <a:rPr lang="en-GB"/>
+              <a:t> </a:t>
+            </a:r>
+            <a:r>
+              <a:rPr lang="en-GB" dirty="0"/>
+              <a:t>or open-source file formats where possible (domain specific)</a:t>
             </a:r>
           </a:p>
           <a:p>

</xml_diff>